<commit_message>
Worked on the appendix and the main section of the thesis. Extended the chapter on the characterization of the two-qubit processor and added more figures to it.
</commit_message>
<xml_diff>
--- a/material/figures/introduction/cooper_pair_box.pptx
+++ b/material/figures/introduction/cooper_pair_box.pptx
@@ -6,6 +6,7 @@
   </p:sldMasterIdLst>
   <p:sldIdLst>
     <p:sldId id="256" r:id="rId2"/>
+    <p:sldId id="257" r:id="rId3"/>
   </p:sldIdLst>
   <p:sldSz cx="9144000" cy="6858000" type="screen4x3"/>
   <p:notesSz cx="6858000" cy="9144000"/>
@@ -289,7 +290,7 @@
             <a:fld id="{E233F2FC-336D-4AEC-8E34-B26C5DCCE050}" type="datetimeFigureOut">
               <a:rPr lang="de-DE" smtClean="0"/>
               <a:pPr/>
-              <a:t>24.05.2012</a:t>
+              <a:t>18.06.2012</a:t>
             </a:fld>
             <a:endParaRPr lang="de-DE"/>
           </a:p>
@@ -456,7 +457,7 @@
             <a:fld id="{E233F2FC-336D-4AEC-8E34-B26C5DCCE050}" type="datetimeFigureOut">
               <a:rPr lang="de-DE" smtClean="0"/>
               <a:pPr/>
-              <a:t>24.05.2012</a:t>
+              <a:t>18.06.2012</a:t>
             </a:fld>
             <a:endParaRPr lang="de-DE"/>
           </a:p>
@@ -633,7 +634,7 @@
             <a:fld id="{E233F2FC-336D-4AEC-8E34-B26C5DCCE050}" type="datetimeFigureOut">
               <a:rPr lang="de-DE" smtClean="0"/>
               <a:pPr/>
-              <a:t>24.05.2012</a:t>
+              <a:t>18.06.2012</a:t>
             </a:fld>
             <a:endParaRPr lang="de-DE"/>
           </a:p>
@@ -800,7 +801,7 @@
             <a:fld id="{E233F2FC-336D-4AEC-8E34-B26C5DCCE050}" type="datetimeFigureOut">
               <a:rPr lang="de-DE" smtClean="0"/>
               <a:pPr/>
-              <a:t>24.05.2012</a:t>
+              <a:t>18.06.2012</a:t>
             </a:fld>
             <a:endParaRPr lang="de-DE"/>
           </a:p>
@@ -1043,7 +1044,7 @@
             <a:fld id="{E233F2FC-336D-4AEC-8E34-B26C5DCCE050}" type="datetimeFigureOut">
               <a:rPr lang="de-DE" smtClean="0"/>
               <a:pPr/>
-              <a:t>24.05.2012</a:t>
+              <a:t>18.06.2012</a:t>
             </a:fld>
             <a:endParaRPr lang="de-DE"/>
           </a:p>
@@ -1328,7 +1329,7 @@
             <a:fld id="{E233F2FC-336D-4AEC-8E34-B26C5DCCE050}" type="datetimeFigureOut">
               <a:rPr lang="de-DE" smtClean="0"/>
               <a:pPr/>
-              <a:t>24.05.2012</a:t>
+              <a:t>18.06.2012</a:t>
             </a:fld>
             <a:endParaRPr lang="de-DE"/>
           </a:p>
@@ -1747,7 +1748,7 @@
             <a:fld id="{E233F2FC-336D-4AEC-8E34-B26C5DCCE050}" type="datetimeFigureOut">
               <a:rPr lang="de-DE" smtClean="0"/>
               <a:pPr/>
-              <a:t>24.05.2012</a:t>
+              <a:t>18.06.2012</a:t>
             </a:fld>
             <a:endParaRPr lang="de-DE"/>
           </a:p>
@@ -1862,7 +1863,7 @@
             <a:fld id="{E233F2FC-336D-4AEC-8E34-B26C5DCCE050}" type="datetimeFigureOut">
               <a:rPr lang="de-DE" smtClean="0"/>
               <a:pPr/>
-              <a:t>24.05.2012</a:t>
+              <a:t>18.06.2012</a:t>
             </a:fld>
             <a:endParaRPr lang="de-DE"/>
           </a:p>
@@ -1954,7 +1955,7 @@
             <a:fld id="{E233F2FC-336D-4AEC-8E34-B26C5DCCE050}" type="datetimeFigureOut">
               <a:rPr lang="de-DE" smtClean="0"/>
               <a:pPr/>
-              <a:t>24.05.2012</a:t>
+              <a:t>18.06.2012</a:t>
             </a:fld>
             <a:endParaRPr lang="de-DE"/>
           </a:p>
@@ -2228,7 +2229,7 @@
             <a:fld id="{E233F2FC-336D-4AEC-8E34-B26C5DCCE050}" type="datetimeFigureOut">
               <a:rPr lang="de-DE" smtClean="0"/>
               <a:pPr/>
-              <a:t>24.05.2012</a:t>
+              <a:t>18.06.2012</a:t>
             </a:fld>
             <a:endParaRPr lang="de-DE"/>
           </a:p>
@@ -2478,7 +2479,7 @@
             <a:fld id="{E233F2FC-336D-4AEC-8E34-B26C5DCCE050}" type="datetimeFigureOut">
               <a:rPr lang="de-DE" smtClean="0"/>
               <a:pPr/>
-              <a:t>24.05.2012</a:t>
+              <a:t>18.06.2012</a:t>
             </a:fld>
             <a:endParaRPr lang="de-DE"/>
           </a:p>
@@ -2688,7 +2689,7 @@
             <a:fld id="{E233F2FC-336D-4AEC-8E34-B26C5DCCE050}" type="datetimeFigureOut">
               <a:rPr lang="de-DE" smtClean="0"/>
               <a:pPr/>
-              <a:t>24.05.2012</a:t>
+              <a:t>18.06.2012</a:t>
             </a:fld>
             <a:endParaRPr lang="de-DE"/>
           </a:p>
@@ -4220,6 +4221,1914 @@
             <a:endParaRPr lang="de-DE" i="1" baseline="-25000" dirty="0">
               <a:latin typeface="Times New Roman" pitchFamily="18" charset="0"/>
               <a:cs typeface="Times New Roman" pitchFamily="18" charset="0"/>
+            </a:endParaRPr>
+          </a:p>
+        </p:txBody>
+      </p:sp>
+    </p:spTree>
+  </p:cSld>
+  <p:clrMapOvr>
+    <a:masterClrMapping/>
+  </p:clrMapOvr>
+</p:sld>
+</file>
+
+<file path=ppt/slides/slide2.xml><?xml version="1.0" encoding="utf-8"?>
+<p:sld xmlns:a="http://schemas.openxmlformats.org/drawingml/2006/main" xmlns:r="http://schemas.openxmlformats.org/officeDocument/2006/relationships" xmlns:p="http://schemas.openxmlformats.org/presentationml/2006/main">
+  <p:cSld>
+    <p:spTree>
+      <p:nvGrpSpPr>
+        <p:cNvPr id="1" name=""/>
+        <p:cNvGrpSpPr/>
+        <p:nvPr/>
+      </p:nvGrpSpPr>
+      <p:grpSpPr>
+        <a:xfrm>
+          <a:off x="0" y="0"/>
+          <a:ext cx="0" cy="0"/>
+          <a:chOff x="0" y="0"/>
+          <a:chExt cx="0" cy="0"/>
+        </a:xfrm>
+      </p:grpSpPr>
+      <p:cxnSp>
+        <p:nvCxnSpPr>
+          <p:cNvPr id="84" name="Gerade Verbindung 83"/>
+          <p:cNvCxnSpPr/>
+          <p:nvPr/>
+        </p:nvCxnSpPr>
+        <p:spPr>
+          <a:xfrm>
+            <a:off x="4932040" y="1916832"/>
+            <a:ext cx="0" cy="1152128"/>
+          </a:xfrm>
+          <a:prstGeom prst="line">
+            <a:avLst/>
+          </a:prstGeom>
+          <a:ln w="19050">
+            <a:solidFill>
+              <a:schemeClr val="tx1"/>
+            </a:solidFill>
+            <a:headEnd type="none" w="med" len="med"/>
+            <a:tailEnd type="none" w="med" len="med"/>
+          </a:ln>
+        </p:spPr>
+        <p:style>
+          <a:lnRef idx="1">
+            <a:schemeClr val="accent1"/>
+          </a:lnRef>
+          <a:fillRef idx="0">
+            <a:schemeClr val="accent1"/>
+          </a:fillRef>
+          <a:effectRef idx="0">
+            <a:schemeClr val="accent1"/>
+          </a:effectRef>
+          <a:fontRef idx="minor">
+            <a:schemeClr val="tx1"/>
+          </a:fontRef>
+        </p:style>
+      </p:cxnSp>
+      <p:sp>
+        <p:nvSpPr>
+          <p:cNvPr id="111" name="Rechteck 110"/>
+          <p:cNvSpPr/>
+          <p:nvPr/>
+        </p:nvSpPr>
+        <p:spPr>
+          <a:xfrm>
+            <a:off x="4788024" y="2276872"/>
+            <a:ext cx="288032" cy="288032"/>
+          </a:xfrm>
+          <a:prstGeom prst="rect">
+            <a:avLst/>
+          </a:prstGeom>
+          <a:solidFill>
+            <a:schemeClr val="bg1"/>
+          </a:solidFill>
+          <a:ln w="19050">
+            <a:solidFill>
+              <a:schemeClr val="tx1"/>
+            </a:solidFill>
+          </a:ln>
+        </p:spPr>
+        <p:style>
+          <a:lnRef idx="2">
+            <a:schemeClr val="accent1">
+              <a:shade val="50000"/>
+            </a:schemeClr>
+          </a:lnRef>
+          <a:fillRef idx="1">
+            <a:schemeClr val="accent1"/>
+          </a:fillRef>
+          <a:effectRef idx="0">
+            <a:schemeClr val="accent1"/>
+          </a:effectRef>
+          <a:fontRef idx="minor">
+            <a:schemeClr val="lt1"/>
+          </a:fontRef>
+        </p:style>
+        <p:txBody>
+          <a:bodyPr rtlCol="0" anchor="ctr"/>
+          <a:lstStyle/>
+          <a:p>
+            <a:pPr algn="ctr"/>
+            <a:endParaRPr lang="de-DE"/>
+          </a:p>
+        </p:txBody>
+      </p:sp>
+      <p:cxnSp>
+        <p:nvCxnSpPr>
+          <p:cNvPr id="40" name="Gerade Verbindung 39"/>
+          <p:cNvCxnSpPr/>
+          <p:nvPr/>
+        </p:nvCxnSpPr>
+        <p:spPr>
+          <a:xfrm>
+            <a:off x="2195736" y="1916832"/>
+            <a:ext cx="0" cy="216024"/>
+          </a:xfrm>
+          <a:prstGeom prst="line">
+            <a:avLst/>
+          </a:prstGeom>
+          <a:ln w="19050">
+            <a:solidFill>
+              <a:schemeClr val="tx1"/>
+            </a:solidFill>
+            <a:tailEnd type="oval"/>
+          </a:ln>
+        </p:spPr>
+        <p:style>
+          <a:lnRef idx="1">
+            <a:schemeClr val="accent1"/>
+          </a:lnRef>
+          <a:fillRef idx="0">
+            <a:schemeClr val="accent1"/>
+          </a:fillRef>
+          <a:effectRef idx="0">
+            <a:schemeClr val="accent1"/>
+          </a:effectRef>
+          <a:fontRef idx="minor">
+            <a:schemeClr val="tx1"/>
+          </a:fontRef>
+        </p:style>
+      </p:cxnSp>
+      <p:sp>
+        <p:nvSpPr>
+          <p:cNvPr id="41" name="Rechteck 40"/>
+          <p:cNvSpPr/>
+          <p:nvPr/>
+        </p:nvSpPr>
+        <p:spPr>
+          <a:xfrm>
+            <a:off x="1907704" y="2132856"/>
+            <a:ext cx="576064" cy="576064"/>
+          </a:xfrm>
+          <a:prstGeom prst="rect">
+            <a:avLst/>
+          </a:prstGeom>
+          <a:noFill/>
+          <a:ln w="19050">
+            <a:solidFill>
+              <a:schemeClr val="tx1"/>
+            </a:solidFill>
+          </a:ln>
+        </p:spPr>
+        <p:style>
+          <a:lnRef idx="2">
+            <a:schemeClr val="accent1">
+              <a:shade val="50000"/>
+            </a:schemeClr>
+          </a:lnRef>
+          <a:fillRef idx="1">
+            <a:schemeClr val="accent1"/>
+          </a:fillRef>
+          <a:effectRef idx="0">
+            <a:schemeClr val="accent1"/>
+          </a:effectRef>
+          <a:fontRef idx="minor">
+            <a:schemeClr val="lt1"/>
+          </a:fontRef>
+        </p:style>
+        <p:txBody>
+          <a:bodyPr rtlCol="0" anchor="ctr"/>
+          <a:lstStyle/>
+          <a:p>
+            <a:pPr algn="ctr"/>
+            <a:endParaRPr lang="de-DE"/>
+          </a:p>
+        </p:txBody>
+      </p:sp>
+      <p:cxnSp>
+        <p:nvCxnSpPr>
+          <p:cNvPr id="43" name="Gerade Verbindung 42"/>
+          <p:cNvCxnSpPr>
+            <a:stCxn id="41" idx="2"/>
+          </p:cNvCxnSpPr>
+          <p:nvPr/>
+        </p:nvCxnSpPr>
+        <p:spPr>
+          <a:xfrm>
+            <a:off x="2195736" y="2708920"/>
+            <a:ext cx="0" cy="360040"/>
+          </a:xfrm>
+          <a:prstGeom prst="line">
+            <a:avLst/>
+          </a:prstGeom>
+          <a:ln w="19050">
+            <a:solidFill>
+              <a:schemeClr val="tx1"/>
+            </a:solidFill>
+            <a:headEnd type="oval" w="med" len="med"/>
+            <a:tailEnd type="none" w="med" len="med"/>
+          </a:ln>
+        </p:spPr>
+        <p:style>
+          <a:lnRef idx="1">
+            <a:schemeClr val="accent1"/>
+          </a:lnRef>
+          <a:fillRef idx="0">
+            <a:schemeClr val="accent1"/>
+          </a:fillRef>
+          <a:effectRef idx="0">
+            <a:schemeClr val="accent1"/>
+          </a:effectRef>
+          <a:fontRef idx="minor">
+            <a:schemeClr val="tx1"/>
+          </a:fontRef>
+        </p:style>
+      </p:cxnSp>
+      <p:grpSp>
+        <p:nvGrpSpPr>
+          <p:cNvPr id="44" name="Gruppieren 43"/>
+          <p:cNvGrpSpPr/>
+          <p:nvPr/>
+        </p:nvGrpSpPr>
+        <p:grpSpPr>
+          <a:xfrm>
+            <a:off x="2375612" y="2312732"/>
+            <a:ext cx="216024" cy="216024"/>
+            <a:chOff x="2771800" y="2348880"/>
+            <a:chExt cx="288032" cy="288032"/>
+          </a:xfrm>
+        </p:grpSpPr>
+        <p:cxnSp>
+          <p:nvCxnSpPr>
+            <p:cNvPr id="45" name="Gerade Verbindung 44"/>
+            <p:cNvCxnSpPr/>
+            <p:nvPr/>
+          </p:nvCxnSpPr>
+          <p:spPr>
+            <a:xfrm>
+              <a:off x="2771800" y="2348880"/>
+              <a:ext cx="288032" cy="288032"/>
+            </a:xfrm>
+            <a:prstGeom prst="line">
+              <a:avLst/>
+            </a:prstGeom>
+            <a:ln w="19050">
+              <a:solidFill>
+                <a:schemeClr val="tx1"/>
+              </a:solidFill>
+            </a:ln>
+          </p:spPr>
+          <p:style>
+            <a:lnRef idx="1">
+              <a:schemeClr val="accent1"/>
+            </a:lnRef>
+            <a:fillRef idx="0">
+              <a:schemeClr val="accent1"/>
+            </a:fillRef>
+            <a:effectRef idx="0">
+              <a:schemeClr val="accent1"/>
+            </a:effectRef>
+            <a:fontRef idx="minor">
+              <a:schemeClr val="tx1"/>
+            </a:fontRef>
+          </p:style>
+        </p:cxnSp>
+        <p:cxnSp>
+          <p:nvCxnSpPr>
+            <p:cNvPr id="46" name="Gerade Verbindung 45"/>
+            <p:cNvCxnSpPr/>
+            <p:nvPr/>
+          </p:nvCxnSpPr>
+          <p:spPr>
+            <a:xfrm flipV="1">
+              <a:off x="2771800" y="2348880"/>
+              <a:ext cx="288032" cy="288032"/>
+            </a:xfrm>
+            <a:prstGeom prst="line">
+              <a:avLst/>
+            </a:prstGeom>
+            <a:ln w="19050">
+              <a:solidFill>
+                <a:schemeClr val="tx1"/>
+              </a:solidFill>
+            </a:ln>
+          </p:spPr>
+          <p:style>
+            <a:lnRef idx="1">
+              <a:schemeClr val="accent1"/>
+            </a:lnRef>
+            <a:fillRef idx="0">
+              <a:schemeClr val="accent1"/>
+            </a:fillRef>
+            <a:effectRef idx="0">
+              <a:schemeClr val="accent1"/>
+            </a:effectRef>
+            <a:fontRef idx="minor">
+              <a:schemeClr val="tx1"/>
+            </a:fontRef>
+          </p:style>
+        </p:cxnSp>
+      </p:grpSp>
+      <p:cxnSp>
+        <p:nvCxnSpPr>
+          <p:cNvPr id="52" name="Gerade Verbindung 51"/>
+          <p:cNvCxnSpPr/>
+          <p:nvPr/>
+        </p:nvCxnSpPr>
+        <p:spPr>
+          <a:xfrm>
+            <a:off x="2051720" y="1916832"/>
+            <a:ext cx="288032" cy="0"/>
+          </a:xfrm>
+          <a:prstGeom prst="line">
+            <a:avLst/>
+          </a:prstGeom>
+          <a:ln w="19050">
+            <a:solidFill>
+              <a:schemeClr val="tx1"/>
+            </a:solidFill>
+          </a:ln>
+        </p:spPr>
+        <p:style>
+          <a:lnRef idx="1">
+            <a:schemeClr val="accent1"/>
+          </a:lnRef>
+          <a:fillRef idx="0">
+            <a:schemeClr val="accent1"/>
+          </a:fillRef>
+          <a:effectRef idx="0">
+            <a:schemeClr val="accent1"/>
+          </a:effectRef>
+          <a:fontRef idx="minor">
+            <a:schemeClr val="tx1"/>
+          </a:fontRef>
+        </p:style>
+      </p:cxnSp>
+      <p:cxnSp>
+        <p:nvCxnSpPr>
+          <p:cNvPr id="53" name="Gerade Verbindung 52"/>
+          <p:cNvCxnSpPr/>
+          <p:nvPr/>
+        </p:nvCxnSpPr>
+        <p:spPr>
+          <a:xfrm>
+            <a:off x="2051720" y="1844824"/>
+            <a:ext cx="288032" cy="0"/>
+          </a:xfrm>
+          <a:prstGeom prst="line">
+            <a:avLst/>
+          </a:prstGeom>
+          <a:ln w="19050">
+            <a:solidFill>
+              <a:schemeClr val="tx1"/>
+            </a:solidFill>
+          </a:ln>
+        </p:spPr>
+        <p:style>
+          <a:lnRef idx="1">
+            <a:schemeClr val="accent1"/>
+          </a:lnRef>
+          <a:fillRef idx="0">
+            <a:schemeClr val="accent1"/>
+          </a:fillRef>
+          <a:effectRef idx="0">
+            <a:schemeClr val="accent1"/>
+          </a:effectRef>
+          <a:fontRef idx="minor">
+            <a:schemeClr val="tx1"/>
+          </a:fontRef>
+        </p:style>
+      </p:cxnSp>
+      <p:cxnSp>
+        <p:nvCxnSpPr>
+          <p:cNvPr id="54" name="Gerade Verbindung 53"/>
+          <p:cNvCxnSpPr/>
+          <p:nvPr/>
+        </p:nvCxnSpPr>
+        <p:spPr>
+          <a:xfrm flipH="1">
+            <a:off x="3131840" y="1628800"/>
+            <a:ext cx="9525" cy="1440160"/>
+          </a:xfrm>
+          <a:prstGeom prst="line">
+            <a:avLst/>
+          </a:prstGeom>
+          <a:ln w="19050">
+            <a:solidFill>
+              <a:schemeClr val="tx1"/>
+            </a:solidFill>
+            <a:headEnd type="none" w="med" len="med"/>
+            <a:tailEnd type="none" w="med" len="med"/>
+          </a:ln>
+        </p:spPr>
+        <p:style>
+          <a:lnRef idx="1">
+            <a:schemeClr val="accent1"/>
+          </a:lnRef>
+          <a:fillRef idx="0">
+            <a:schemeClr val="accent1"/>
+          </a:fillRef>
+          <a:effectRef idx="0">
+            <a:schemeClr val="accent1"/>
+          </a:effectRef>
+          <a:fontRef idx="minor">
+            <a:schemeClr val="tx1"/>
+          </a:fontRef>
+        </p:style>
+      </p:cxnSp>
+      <p:cxnSp>
+        <p:nvCxnSpPr>
+          <p:cNvPr id="59" name="Gerade Verbindung 58"/>
+          <p:cNvCxnSpPr/>
+          <p:nvPr/>
+        </p:nvCxnSpPr>
+        <p:spPr>
+          <a:xfrm>
+            <a:off x="2915816" y="3068960"/>
+            <a:ext cx="432048" cy="0"/>
+          </a:xfrm>
+          <a:prstGeom prst="line">
+            <a:avLst/>
+          </a:prstGeom>
+          <a:ln w="19050">
+            <a:solidFill>
+              <a:schemeClr val="tx1"/>
+            </a:solidFill>
+          </a:ln>
+        </p:spPr>
+        <p:style>
+          <a:lnRef idx="1">
+            <a:schemeClr val="accent1"/>
+          </a:lnRef>
+          <a:fillRef idx="0">
+            <a:schemeClr val="accent1"/>
+          </a:fillRef>
+          <a:effectRef idx="0">
+            <a:schemeClr val="accent1"/>
+          </a:effectRef>
+          <a:fontRef idx="minor">
+            <a:schemeClr val="tx1"/>
+          </a:fontRef>
+        </p:style>
+      </p:cxnSp>
+      <p:cxnSp>
+        <p:nvCxnSpPr>
+          <p:cNvPr id="60" name="Gerade Verbindung 59"/>
+          <p:cNvCxnSpPr/>
+          <p:nvPr/>
+        </p:nvCxnSpPr>
+        <p:spPr>
+          <a:xfrm flipH="1">
+            <a:off x="2987824" y="3140968"/>
+            <a:ext cx="288032" cy="0"/>
+          </a:xfrm>
+          <a:prstGeom prst="line">
+            <a:avLst/>
+          </a:prstGeom>
+          <a:ln w="19050">
+            <a:solidFill>
+              <a:schemeClr val="tx1"/>
+            </a:solidFill>
+          </a:ln>
+        </p:spPr>
+        <p:style>
+          <a:lnRef idx="1">
+            <a:schemeClr val="accent1"/>
+          </a:lnRef>
+          <a:fillRef idx="0">
+            <a:schemeClr val="accent1"/>
+          </a:fillRef>
+          <a:effectRef idx="0">
+            <a:schemeClr val="accent1"/>
+          </a:effectRef>
+          <a:fontRef idx="minor">
+            <a:schemeClr val="tx1"/>
+          </a:fontRef>
+        </p:style>
+      </p:cxnSp>
+      <p:cxnSp>
+        <p:nvCxnSpPr>
+          <p:cNvPr id="61" name="Gerade Verbindung 60"/>
+          <p:cNvCxnSpPr/>
+          <p:nvPr/>
+        </p:nvCxnSpPr>
+        <p:spPr>
+          <a:xfrm flipH="1">
+            <a:off x="3059832" y="3212976"/>
+            <a:ext cx="144016" cy="0"/>
+          </a:xfrm>
+          <a:prstGeom prst="line">
+            <a:avLst/>
+          </a:prstGeom>
+          <a:ln w="19050">
+            <a:solidFill>
+              <a:schemeClr val="tx1"/>
+            </a:solidFill>
+          </a:ln>
+        </p:spPr>
+        <p:style>
+          <a:lnRef idx="1">
+            <a:schemeClr val="accent1"/>
+          </a:lnRef>
+          <a:fillRef idx="0">
+            <a:schemeClr val="accent1"/>
+          </a:fillRef>
+          <a:effectRef idx="0">
+            <a:schemeClr val="accent1"/>
+          </a:effectRef>
+          <a:fontRef idx="minor">
+            <a:schemeClr val="tx1"/>
+          </a:fontRef>
+        </p:style>
+      </p:cxnSp>
+      <p:cxnSp>
+        <p:nvCxnSpPr>
+          <p:cNvPr id="65" name="Gerade Verbindung 64"/>
+          <p:cNvCxnSpPr/>
+          <p:nvPr/>
+        </p:nvCxnSpPr>
+        <p:spPr>
+          <a:xfrm flipV="1">
+            <a:off x="2195736" y="1628800"/>
+            <a:ext cx="0" cy="216024"/>
+          </a:xfrm>
+          <a:prstGeom prst="line">
+            <a:avLst/>
+          </a:prstGeom>
+          <a:ln w="19050">
+            <a:solidFill>
+              <a:schemeClr val="tx1"/>
+            </a:solidFill>
+          </a:ln>
+        </p:spPr>
+        <p:style>
+          <a:lnRef idx="1">
+            <a:schemeClr val="accent1"/>
+          </a:lnRef>
+          <a:fillRef idx="0">
+            <a:schemeClr val="accent1"/>
+          </a:fillRef>
+          <a:effectRef idx="0">
+            <a:schemeClr val="accent1"/>
+          </a:effectRef>
+          <a:fontRef idx="minor">
+            <a:schemeClr val="tx1"/>
+          </a:fontRef>
+        </p:style>
+      </p:cxnSp>
+      <p:sp>
+        <p:nvSpPr>
+          <p:cNvPr id="66" name="Ellipse 65"/>
+          <p:cNvSpPr/>
+          <p:nvPr/>
+        </p:nvSpPr>
+        <p:spPr>
+          <a:xfrm>
+            <a:off x="2490542" y="1448636"/>
+            <a:ext cx="360040" cy="360040"/>
+          </a:xfrm>
+          <a:prstGeom prst="ellipse">
+            <a:avLst/>
+          </a:prstGeom>
+          <a:noFill/>
+          <a:ln w="19050">
+            <a:solidFill>
+              <a:schemeClr val="tx1"/>
+            </a:solidFill>
+          </a:ln>
+        </p:spPr>
+        <p:style>
+          <a:lnRef idx="2">
+            <a:schemeClr val="accent1">
+              <a:shade val="50000"/>
+            </a:schemeClr>
+          </a:lnRef>
+          <a:fillRef idx="1">
+            <a:schemeClr val="accent1"/>
+          </a:fillRef>
+          <a:effectRef idx="0">
+            <a:schemeClr val="accent1"/>
+          </a:effectRef>
+          <a:fontRef idx="minor">
+            <a:schemeClr val="lt1"/>
+          </a:fontRef>
+        </p:style>
+        <p:txBody>
+          <a:bodyPr rtlCol="0" anchor="ctr"/>
+          <a:lstStyle/>
+          <a:p>
+            <a:pPr algn="ctr"/>
+            <a:endParaRPr lang="de-DE" sz="1400" i="1" baseline="-25000" dirty="0">
+              <a:solidFill>
+                <a:schemeClr val="tx1"/>
+              </a:solidFill>
+              <a:latin typeface="Times New Roman" pitchFamily="18" charset="0"/>
+              <a:cs typeface="Times New Roman" pitchFamily="18" charset="0"/>
+            </a:endParaRPr>
+          </a:p>
+        </p:txBody>
+      </p:sp>
+      <p:sp>
+        <p:nvSpPr>
+          <p:cNvPr id="67" name="Rechteck 66"/>
+          <p:cNvSpPr/>
+          <p:nvPr/>
+        </p:nvSpPr>
+        <p:spPr>
+          <a:xfrm>
+            <a:off x="2481719" y="1465039"/>
+            <a:ext cx="352981" cy="307777"/>
+          </a:xfrm>
+          <a:prstGeom prst="rect">
+            <a:avLst/>
+          </a:prstGeom>
+          <a:ln w="19050">
+            <a:noFill/>
+          </a:ln>
+        </p:spPr>
+        <p:txBody>
+          <a:bodyPr wrap="none">
+            <a:spAutoFit/>
+          </a:bodyPr>
+          <a:lstStyle/>
+          <a:p>
+            <a:pPr algn="ctr"/>
+            <a:r>
+              <a:rPr lang="de-DE" sz="1400" i="1" dirty="0" err="1" smtClean="0">
+                <a:solidFill>
+                  <a:schemeClr val="tx1"/>
+                </a:solidFill>
+                <a:latin typeface="Times New Roman" pitchFamily="18" charset="0"/>
+                <a:cs typeface="Times New Roman" pitchFamily="18" charset="0"/>
+              </a:rPr>
+              <a:t>V</a:t>
+            </a:r>
+            <a:r>
+              <a:rPr lang="de-DE" sz="1400" i="1" baseline="-25000" dirty="0" err="1" smtClean="0">
+                <a:solidFill>
+                  <a:schemeClr val="tx1"/>
+                </a:solidFill>
+                <a:latin typeface="Times New Roman" pitchFamily="18" charset="0"/>
+                <a:cs typeface="Times New Roman" pitchFamily="18" charset="0"/>
+              </a:rPr>
+              <a:t>g</a:t>
+            </a:r>
+            <a:endParaRPr lang="de-DE" sz="2000" i="1" baseline="-25000" dirty="0">
+              <a:solidFill>
+                <a:schemeClr val="tx1"/>
+              </a:solidFill>
+              <a:latin typeface="Times New Roman" pitchFamily="18" charset="0"/>
+              <a:cs typeface="Times New Roman" pitchFamily="18" charset="0"/>
+            </a:endParaRPr>
+          </a:p>
+        </p:txBody>
+      </p:sp>
+      <p:cxnSp>
+        <p:nvCxnSpPr>
+          <p:cNvPr id="68" name="Gerade Verbindung 67"/>
+          <p:cNvCxnSpPr/>
+          <p:nvPr/>
+        </p:nvCxnSpPr>
+        <p:spPr>
+          <a:xfrm>
+            <a:off x="2186771" y="1637438"/>
+            <a:ext cx="288032" cy="0"/>
+          </a:xfrm>
+          <a:prstGeom prst="line">
+            <a:avLst/>
+          </a:prstGeom>
+          <a:ln w="19050">
+            <a:solidFill>
+              <a:schemeClr val="tx1"/>
+            </a:solidFill>
+          </a:ln>
+        </p:spPr>
+        <p:style>
+          <a:lnRef idx="1">
+            <a:schemeClr val="accent1"/>
+          </a:lnRef>
+          <a:fillRef idx="0">
+            <a:schemeClr val="accent1"/>
+          </a:fillRef>
+          <a:effectRef idx="0">
+            <a:schemeClr val="accent1"/>
+          </a:effectRef>
+          <a:fontRef idx="minor">
+            <a:schemeClr val="tx1"/>
+          </a:fontRef>
+        </p:style>
+      </p:cxnSp>
+      <p:cxnSp>
+        <p:nvCxnSpPr>
+          <p:cNvPr id="69" name="Gerade Verbindung 68"/>
+          <p:cNvCxnSpPr/>
+          <p:nvPr/>
+        </p:nvCxnSpPr>
+        <p:spPr>
+          <a:xfrm flipH="1">
+            <a:off x="2862026" y="1637438"/>
+            <a:ext cx="288032" cy="0"/>
+          </a:xfrm>
+          <a:prstGeom prst="line">
+            <a:avLst/>
+          </a:prstGeom>
+          <a:ln w="19050">
+            <a:solidFill>
+              <a:schemeClr val="tx1"/>
+            </a:solidFill>
+          </a:ln>
+        </p:spPr>
+        <p:style>
+          <a:lnRef idx="1">
+            <a:schemeClr val="accent1"/>
+          </a:lnRef>
+          <a:fillRef idx="0">
+            <a:schemeClr val="accent1"/>
+          </a:fillRef>
+          <a:effectRef idx="0">
+            <a:schemeClr val="accent1"/>
+          </a:effectRef>
+          <a:fontRef idx="minor">
+            <a:schemeClr val="tx1"/>
+          </a:fontRef>
+        </p:style>
+      </p:cxnSp>
+      <p:cxnSp>
+        <p:nvCxnSpPr>
+          <p:cNvPr id="73" name="Gerade Verbindung 72"/>
+          <p:cNvCxnSpPr/>
+          <p:nvPr/>
+        </p:nvCxnSpPr>
+        <p:spPr>
+          <a:xfrm>
+            <a:off x="1763688" y="2462695"/>
+            <a:ext cx="288032" cy="0"/>
+          </a:xfrm>
+          <a:prstGeom prst="line">
+            <a:avLst/>
+          </a:prstGeom>
+          <a:ln w="19050">
+            <a:solidFill>
+              <a:schemeClr val="tx1"/>
+            </a:solidFill>
+            <a:prstDash val="solid"/>
+          </a:ln>
+        </p:spPr>
+        <p:style>
+          <a:lnRef idx="1">
+            <a:schemeClr val="accent1"/>
+          </a:lnRef>
+          <a:fillRef idx="0">
+            <a:schemeClr val="accent1"/>
+          </a:fillRef>
+          <a:effectRef idx="0">
+            <a:schemeClr val="accent1"/>
+          </a:effectRef>
+          <a:fontRef idx="minor">
+            <a:schemeClr val="tx1"/>
+          </a:fontRef>
+        </p:style>
+      </p:cxnSp>
+      <p:cxnSp>
+        <p:nvCxnSpPr>
+          <p:cNvPr id="74" name="Gerade Verbindung 73"/>
+          <p:cNvCxnSpPr/>
+          <p:nvPr/>
+        </p:nvCxnSpPr>
+        <p:spPr>
+          <a:xfrm>
+            <a:off x="1763688" y="2384740"/>
+            <a:ext cx="288032" cy="0"/>
+          </a:xfrm>
+          <a:prstGeom prst="line">
+            <a:avLst/>
+          </a:prstGeom>
+          <a:ln w="19050">
+            <a:solidFill>
+              <a:schemeClr val="tx1"/>
+            </a:solidFill>
+            <a:prstDash val="solid"/>
+          </a:ln>
+        </p:spPr>
+        <p:style>
+          <a:lnRef idx="1">
+            <a:schemeClr val="accent1"/>
+          </a:lnRef>
+          <a:fillRef idx="0">
+            <a:schemeClr val="accent1"/>
+          </a:fillRef>
+          <a:effectRef idx="0">
+            <a:schemeClr val="accent1"/>
+          </a:effectRef>
+          <a:fontRef idx="minor">
+            <a:schemeClr val="tx1"/>
+          </a:fontRef>
+        </p:style>
+      </p:cxnSp>
+      <p:cxnSp>
+        <p:nvCxnSpPr>
+          <p:cNvPr id="76" name="Gerade Verbindung 75"/>
+          <p:cNvCxnSpPr/>
+          <p:nvPr/>
+        </p:nvCxnSpPr>
+        <p:spPr>
+          <a:xfrm>
+            <a:off x="1979712" y="3068960"/>
+            <a:ext cx="432048" cy="0"/>
+          </a:xfrm>
+          <a:prstGeom prst="line">
+            <a:avLst/>
+          </a:prstGeom>
+          <a:ln w="19050">
+            <a:solidFill>
+              <a:schemeClr val="tx1"/>
+            </a:solidFill>
+          </a:ln>
+        </p:spPr>
+        <p:style>
+          <a:lnRef idx="1">
+            <a:schemeClr val="accent1"/>
+          </a:lnRef>
+          <a:fillRef idx="0">
+            <a:schemeClr val="accent1"/>
+          </a:fillRef>
+          <a:effectRef idx="0">
+            <a:schemeClr val="accent1"/>
+          </a:effectRef>
+          <a:fontRef idx="minor">
+            <a:schemeClr val="tx1"/>
+          </a:fontRef>
+        </p:style>
+      </p:cxnSp>
+      <p:cxnSp>
+        <p:nvCxnSpPr>
+          <p:cNvPr id="77" name="Gerade Verbindung 76"/>
+          <p:cNvCxnSpPr/>
+          <p:nvPr/>
+        </p:nvCxnSpPr>
+        <p:spPr>
+          <a:xfrm flipH="1">
+            <a:off x="2051720" y="3140968"/>
+            <a:ext cx="288032" cy="0"/>
+          </a:xfrm>
+          <a:prstGeom prst="line">
+            <a:avLst/>
+          </a:prstGeom>
+          <a:ln w="19050">
+            <a:solidFill>
+              <a:schemeClr val="tx1"/>
+            </a:solidFill>
+          </a:ln>
+        </p:spPr>
+        <p:style>
+          <a:lnRef idx="1">
+            <a:schemeClr val="accent1"/>
+          </a:lnRef>
+          <a:fillRef idx="0">
+            <a:schemeClr val="accent1"/>
+          </a:fillRef>
+          <a:effectRef idx="0">
+            <a:schemeClr val="accent1"/>
+          </a:effectRef>
+          <a:fontRef idx="minor">
+            <a:schemeClr val="tx1"/>
+          </a:fontRef>
+        </p:style>
+      </p:cxnSp>
+      <p:cxnSp>
+        <p:nvCxnSpPr>
+          <p:cNvPr id="78" name="Gerade Verbindung 77"/>
+          <p:cNvCxnSpPr/>
+          <p:nvPr/>
+        </p:nvCxnSpPr>
+        <p:spPr>
+          <a:xfrm flipH="1">
+            <a:off x="2123728" y="3212976"/>
+            <a:ext cx="144016" cy="0"/>
+          </a:xfrm>
+          <a:prstGeom prst="line">
+            <a:avLst/>
+          </a:prstGeom>
+          <a:ln w="19050">
+            <a:solidFill>
+              <a:schemeClr val="tx1"/>
+            </a:solidFill>
+          </a:ln>
+        </p:spPr>
+        <p:style>
+          <a:lnRef idx="1">
+            <a:schemeClr val="accent1"/>
+          </a:lnRef>
+          <a:fillRef idx="0">
+            <a:schemeClr val="accent1"/>
+          </a:fillRef>
+          <a:effectRef idx="0">
+            <a:schemeClr val="accent1"/>
+          </a:effectRef>
+          <a:fontRef idx="minor">
+            <a:schemeClr val="tx1"/>
+          </a:fontRef>
+        </p:style>
+      </p:cxnSp>
+      <p:sp>
+        <p:nvSpPr>
+          <p:cNvPr id="79" name="Textfeld 78"/>
+          <p:cNvSpPr txBox="1"/>
+          <p:nvPr/>
+        </p:nvSpPr>
+        <p:spPr>
+          <a:xfrm>
+            <a:off x="1331640" y="2204864"/>
+            <a:ext cx="429926" cy="369332"/>
+          </a:xfrm>
+          <a:prstGeom prst="rect">
+            <a:avLst/>
+          </a:prstGeom>
+          <a:noFill/>
+        </p:spPr>
+        <p:txBody>
+          <a:bodyPr wrap="none" rtlCol="0">
+            <a:spAutoFit/>
+          </a:bodyPr>
+          <a:lstStyle/>
+          <a:p>
+            <a:r>
+              <a:rPr lang="de-DE" i="1" dirty="0" smtClean="0">
+                <a:latin typeface="Times New Roman" pitchFamily="18" charset="0"/>
+                <a:cs typeface="Times New Roman" pitchFamily="18" charset="0"/>
+              </a:rPr>
+              <a:t>C</a:t>
+            </a:r>
+            <a:r>
+              <a:rPr lang="el-GR" i="1" baseline="-25000" dirty="0" smtClean="0">
+                <a:latin typeface="Times New Roman"/>
+                <a:cs typeface="Times New Roman"/>
+              </a:rPr>
+              <a:t>Σ</a:t>
+            </a:r>
+            <a:endParaRPr lang="de-DE" i="1" baseline="-25000" dirty="0">
+              <a:latin typeface="Times New Roman" pitchFamily="18" charset="0"/>
+              <a:cs typeface="Times New Roman" pitchFamily="18" charset="0"/>
+            </a:endParaRPr>
+          </a:p>
+        </p:txBody>
+      </p:sp>
+      <p:sp>
+        <p:nvSpPr>
+          <p:cNvPr id="80" name="Textfeld 79"/>
+          <p:cNvSpPr txBox="1"/>
+          <p:nvPr/>
+        </p:nvSpPr>
+        <p:spPr>
+          <a:xfrm>
+            <a:off x="2555776" y="2204864"/>
+            <a:ext cx="394660" cy="369332"/>
+          </a:xfrm>
+          <a:prstGeom prst="rect">
+            <a:avLst/>
+          </a:prstGeom>
+          <a:noFill/>
+        </p:spPr>
+        <p:txBody>
+          <a:bodyPr wrap="none" rtlCol="0">
+            <a:spAutoFit/>
+          </a:bodyPr>
+          <a:lstStyle/>
+          <a:p>
+            <a:r>
+              <a:rPr lang="de-DE" i="1" dirty="0" smtClean="0">
+                <a:latin typeface="Times New Roman" pitchFamily="18" charset="0"/>
+                <a:cs typeface="Times New Roman" pitchFamily="18" charset="0"/>
+              </a:rPr>
+              <a:t>E</a:t>
+            </a:r>
+            <a:r>
+              <a:rPr lang="de-DE" i="1" baseline="-25000" dirty="0" smtClean="0">
+                <a:latin typeface="Times New Roman" pitchFamily="18" charset="0"/>
+                <a:cs typeface="Times New Roman" pitchFamily="18" charset="0"/>
+              </a:rPr>
+              <a:t>J</a:t>
+            </a:r>
+            <a:endParaRPr lang="de-DE" i="1" baseline="-25000" dirty="0">
+              <a:latin typeface="Times New Roman" pitchFamily="18" charset="0"/>
+              <a:cs typeface="Times New Roman" pitchFamily="18" charset="0"/>
+            </a:endParaRPr>
+          </a:p>
+        </p:txBody>
+      </p:sp>
+      <p:sp>
+        <p:nvSpPr>
+          <p:cNvPr id="81" name="Textfeld 80"/>
+          <p:cNvSpPr txBox="1"/>
+          <p:nvPr/>
+        </p:nvSpPr>
+        <p:spPr>
+          <a:xfrm>
+            <a:off x="1628637" y="1673913"/>
+            <a:ext cx="449162" cy="369332"/>
+          </a:xfrm>
+          <a:prstGeom prst="rect">
+            <a:avLst/>
+          </a:prstGeom>
+          <a:noFill/>
+        </p:spPr>
+        <p:txBody>
+          <a:bodyPr wrap="none" rtlCol="0">
+            <a:spAutoFit/>
+          </a:bodyPr>
+          <a:lstStyle/>
+          <a:p>
+            <a:r>
+              <a:rPr lang="de-DE" i="1" dirty="0" smtClean="0">
+                <a:latin typeface="Times New Roman" pitchFamily="18" charset="0"/>
+                <a:cs typeface="Times New Roman" pitchFamily="18" charset="0"/>
+              </a:rPr>
+              <a:t>C</a:t>
+            </a:r>
+            <a:r>
+              <a:rPr lang="de-DE" i="1" baseline="-25000" dirty="0" smtClean="0">
+                <a:latin typeface="Times New Roman" pitchFamily="18" charset="0"/>
+                <a:cs typeface="Times New Roman" pitchFamily="18" charset="0"/>
+              </a:rPr>
+              <a:t>G</a:t>
+            </a:r>
+            <a:endParaRPr lang="de-DE" i="1" baseline="-25000" dirty="0">
+              <a:latin typeface="Times New Roman" pitchFamily="18" charset="0"/>
+              <a:cs typeface="Times New Roman" pitchFamily="18" charset="0"/>
+            </a:endParaRPr>
+          </a:p>
+        </p:txBody>
+      </p:sp>
+      <p:sp>
+        <p:nvSpPr>
+          <p:cNvPr id="82" name="Rechteck 81"/>
+          <p:cNvSpPr/>
+          <p:nvPr/>
+        </p:nvSpPr>
+        <p:spPr>
+          <a:xfrm>
+            <a:off x="1763599" y="2393132"/>
+            <a:ext cx="288032" cy="60357"/>
+          </a:xfrm>
+          <a:prstGeom prst="rect">
+            <a:avLst/>
+          </a:prstGeom>
+          <a:solidFill>
+            <a:schemeClr val="bg1"/>
+          </a:solidFill>
+          <a:ln>
+            <a:noFill/>
+          </a:ln>
+        </p:spPr>
+        <p:style>
+          <a:lnRef idx="2">
+            <a:schemeClr val="accent1">
+              <a:shade val="50000"/>
+            </a:schemeClr>
+          </a:lnRef>
+          <a:fillRef idx="1">
+            <a:schemeClr val="accent1"/>
+          </a:fillRef>
+          <a:effectRef idx="0">
+            <a:schemeClr val="accent1"/>
+          </a:effectRef>
+          <a:fontRef idx="minor">
+            <a:schemeClr val="lt1"/>
+          </a:fontRef>
+        </p:style>
+        <p:txBody>
+          <a:bodyPr rtlCol="0" anchor="ctr"/>
+          <a:lstStyle/>
+          <a:p>
+            <a:pPr algn="ctr"/>
+            <a:endParaRPr lang="de-DE"/>
+          </a:p>
+        </p:txBody>
+      </p:sp>
+      <p:grpSp>
+        <p:nvGrpSpPr>
+          <p:cNvPr id="87" name="Gruppieren 86"/>
+          <p:cNvGrpSpPr/>
+          <p:nvPr/>
+        </p:nvGrpSpPr>
+        <p:grpSpPr>
+          <a:xfrm>
+            <a:off x="4788024" y="2276872"/>
+            <a:ext cx="288032" cy="288032"/>
+            <a:chOff x="2771800" y="2348880"/>
+            <a:chExt cx="288032" cy="288032"/>
+          </a:xfrm>
+        </p:grpSpPr>
+        <p:cxnSp>
+          <p:nvCxnSpPr>
+            <p:cNvPr id="88" name="Gerade Verbindung 87"/>
+            <p:cNvCxnSpPr/>
+            <p:nvPr/>
+          </p:nvCxnSpPr>
+          <p:spPr>
+            <a:xfrm>
+              <a:off x="2771800" y="2348880"/>
+              <a:ext cx="288032" cy="288032"/>
+            </a:xfrm>
+            <a:prstGeom prst="line">
+              <a:avLst/>
+            </a:prstGeom>
+            <a:ln w="19050">
+              <a:solidFill>
+                <a:schemeClr val="tx1"/>
+              </a:solidFill>
+            </a:ln>
+          </p:spPr>
+          <p:style>
+            <a:lnRef idx="1">
+              <a:schemeClr val="accent1"/>
+            </a:lnRef>
+            <a:fillRef idx="0">
+              <a:schemeClr val="accent1"/>
+            </a:fillRef>
+            <a:effectRef idx="0">
+              <a:schemeClr val="accent1"/>
+            </a:effectRef>
+            <a:fontRef idx="minor">
+              <a:schemeClr val="tx1"/>
+            </a:fontRef>
+          </p:style>
+        </p:cxnSp>
+        <p:cxnSp>
+          <p:nvCxnSpPr>
+            <p:cNvPr id="89" name="Gerade Verbindung 88"/>
+            <p:cNvCxnSpPr/>
+            <p:nvPr/>
+          </p:nvCxnSpPr>
+          <p:spPr>
+            <a:xfrm flipV="1">
+              <a:off x="2771800" y="2348880"/>
+              <a:ext cx="288032" cy="288032"/>
+            </a:xfrm>
+            <a:prstGeom prst="line">
+              <a:avLst/>
+            </a:prstGeom>
+            <a:ln w="19050">
+              <a:solidFill>
+                <a:schemeClr val="tx1"/>
+              </a:solidFill>
+            </a:ln>
+          </p:spPr>
+          <p:style>
+            <a:lnRef idx="1">
+              <a:schemeClr val="accent1"/>
+            </a:lnRef>
+            <a:fillRef idx="0">
+              <a:schemeClr val="accent1"/>
+            </a:fillRef>
+            <a:effectRef idx="0">
+              <a:schemeClr val="accent1"/>
+            </a:effectRef>
+            <a:fontRef idx="minor">
+              <a:schemeClr val="tx1"/>
+            </a:fontRef>
+          </p:style>
+        </p:cxnSp>
+      </p:grpSp>
+      <p:cxnSp>
+        <p:nvCxnSpPr>
+          <p:cNvPr id="90" name="Gerade Verbindung 89"/>
+          <p:cNvCxnSpPr/>
+          <p:nvPr/>
+        </p:nvCxnSpPr>
+        <p:spPr>
+          <a:xfrm>
+            <a:off x="4788024" y="1916832"/>
+            <a:ext cx="288032" cy="0"/>
+          </a:xfrm>
+          <a:prstGeom prst="line">
+            <a:avLst/>
+          </a:prstGeom>
+          <a:ln w="19050">
+            <a:solidFill>
+              <a:schemeClr val="tx1"/>
+            </a:solidFill>
+          </a:ln>
+        </p:spPr>
+        <p:style>
+          <a:lnRef idx="1">
+            <a:schemeClr val="accent1"/>
+          </a:lnRef>
+          <a:fillRef idx="0">
+            <a:schemeClr val="accent1"/>
+          </a:fillRef>
+          <a:effectRef idx="0">
+            <a:schemeClr val="accent1"/>
+          </a:effectRef>
+          <a:fontRef idx="minor">
+            <a:schemeClr val="tx1"/>
+          </a:fontRef>
+        </p:style>
+      </p:cxnSp>
+      <p:cxnSp>
+        <p:nvCxnSpPr>
+          <p:cNvPr id="91" name="Gerade Verbindung 90"/>
+          <p:cNvCxnSpPr/>
+          <p:nvPr/>
+        </p:nvCxnSpPr>
+        <p:spPr>
+          <a:xfrm>
+            <a:off x="4788024" y="1844824"/>
+            <a:ext cx="288032" cy="0"/>
+          </a:xfrm>
+          <a:prstGeom prst="line">
+            <a:avLst/>
+          </a:prstGeom>
+          <a:ln w="19050">
+            <a:solidFill>
+              <a:schemeClr val="tx1"/>
+            </a:solidFill>
+          </a:ln>
+        </p:spPr>
+        <p:style>
+          <a:lnRef idx="1">
+            <a:schemeClr val="accent1"/>
+          </a:lnRef>
+          <a:fillRef idx="0">
+            <a:schemeClr val="accent1"/>
+          </a:fillRef>
+          <a:effectRef idx="0">
+            <a:schemeClr val="accent1"/>
+          </a:effectRef>
+          <a:fontRef idx="minor">
+            <a:schemeClr val="tx1"/>
+          </a:fontRef>
+        </p:style>
+      </p:cxnSp>
+      <p:cxnSp>
+        <p:nvCxnSpPr>
+          <p:cNvPr id="92" name="Gerade Verbindung 91"/>
+          <p:cNvCxnSpPr/>
+          <p:nvPr/>
+        </p:nvCxnSpPr>
+        <p:spPr>
+          <a:xfrm flipH="1">
+            <a:off x="5868144" y="1628800"/>
+            <a:ext cx="9525" cy="1440160"/>
+          </a:xfrm>
+          <a:prstGeom prst="line">
+            <a:avLst/>
+          </a:prstGeom>
+          <a:ln w="19050">
+            <a:solidFill>
+              <a:schemeClr val="tx1"/>
+            </a:solidFill>
+            <a:headEnd type="none" w="med" len="med"/>
+            <a:tailEnd type="none" w="med" len="med"/>
+          </a:ln>
+        </p:spPr>
+        <p:style>
+          <a:lnRef idx="1">
+            <a:schemeClr val="accent1"/>
+          </a:lnRef>
+          <a:fillRef idx="0">
+            <a:schemeClr val="accent1"/>
+          </a:fillRef>
+          <a:effectRef idx="0">
+            <a:schemeClr val="accent1"/>
+          </a:effectRef>
+          <a:fontRef idx="minor">
+            <a:schemeClr val="tx1"/>
+          </a:fontRef>
+        </p:style>
+      </p:cxnSp>
+      <p:cxnSp>
+        <p:nvCxnSpPr>
+          <p:cNvPr id="93" name="Gerade Verbindung 92"/>
+          <p:cNvCxnSpPr/>
+          <p:nvPr/>
+        </p:nvCxnSpPr>
+        <p:spPr>
+          <a:xfrm>
+            <a:off x="5652120" y="3068960"/>
+            <a:ext cx="432048" cy="0"/>
+          </a:xfrm>
+          <a:prstGeom prst="line">
+            <a:avLst/>
+          </a:prstGeom>
+          <a:ln w="19050">
+            <a:solidFill>
+              <a:schemeClr val="tx1"/>
+            </a:solidFill>
+          </a:ln>
+        </p:spPr>
+        <p:style>
+          <a:lnRef idx="1">
+            <a:schemeClr val="accent1"/>
+          </a:lnRef>
+          <a:fillRef idx="0">
+            <a:schemeClr val="accent1"/>
+          </a:fillRef>
+          <a:effectRef idx="0">
+            <a:schemeClr val="accent1"/>
+          </a:effectRef>
+          <a:fontRef idx="minor">
+            <a:schemeClr val="tx1"/>
+          </a:fontRef>
+        </p:style>
+      </p:cxnSp>
+      <p:cxnSp>
+        <p:nvCxnSpPr>
+          <p:cNvPr id="94" name="Gerade Verbindung 93"/>
+          <p:cNvCxnSpPr/>
+          <p:nvPr/>
+        </p:nvCxnSpPr>
+        <p:spPr>
+          <a:xfrm flipH="1">
+            <a:off x="5724128" y="3140968"/>
+            <a:ext cx="288032" cy="0"/>
+          </a:xfrm>
+          <a:prstGeom prst="line">
+            <a:avLst/>
+          </a:prstGeom>
+          <a:ln w="19050">
+            <a:solidFill>
+              <a:schemeClr val="tx1"/>
+            </a:solidFill>
+          </a:ln>
+        </p:spPr>
+        <p:style>
+          <a:lnRef idx="1">
+            <a:schemeClr val="accent1"/>
+          </a:lnRef>
+          <a:fillRef idx="0">
+            <a:schemeClr val="accent1"/>
+          </a:fillRef>
+          <a:effectRef idx="0">
+            <a:schemeClr val="accent1"/>
+          </a:effectRef>
+          <a:fontRef idx="minor">
+            <a:schemeClr val="tx1"/>
+          </a:fontRef>
+        </p:style>
+      </p:cxnSp>
+      <p:cxnSp>
+        <p:nvCxnSpPr>
+          <p:cNvPr id="95" name="Gerade Verbindung 94"/>
+          <p:cNvCxnSpPr/>
+          <p:nvPr/>
+        </p:nvCxnSpPr>
+        <p:spPr>
+          <a:xfrm flipH="1">
+            <a:off x="5796136" y="3212976"/>
+            <a:ext cx="144016" cy="0"/>
+          </a:xfrm>
+          <a:prstGeom prst="line">
+            <a:avLst/>
+          </a:prstGeom>
+          <a:ln w="19050">
+            <a:solidFill>
+              <a:schemeClr val="tx1"/>
+            </a:solidFill>
+          </a:ln>
+        </p:spPr>
+        <p:style>
+          <a:lnRef idx="1">
+            <a:schemeClr val="accent1"/>
+          </a:lnRef>
+          <a:fillRef idx="0">
+            <a:schemeClr val="accent1"/>
+          </a:fillRef>
+          <a:effectRef idx="0">
+            <a:schemeClr val="accent1"/>
+          </a:effectRef>
+          <a:fontRef idx="minor">
+            <a:schemeClr val="tx1"/>
+          </a:fontRef>
+        </p:style>
+      </p:cxnSp>
+      <p:cxnSp>
+        <p:nvCxnSpPr>
+          <p:cNvPr id="96" name="Gerade Verbindung 95"/>
+          <p:cNvCxnSpPr/>
+          <p:nvPr/>
+        </p:nvCxnSpPr>
+        <p:spPr>
+          <a:xfrm flipV="1">
+            <a:off x="4932040" y="1628800"/>
+            <a:ext cx="0" cy="216024"/>
+          </a:xfrm>
+          <a:prstGeom prst="line">
+            <a:avLst/>
+          </a:prstGeom>
+          <a:ln w="19050">
+            <a:solidFill>
+              <a:schemeClr val="tx1"/>
+            </a:solidFill>
+          </a:ln>
+        </p:spPr>
+        <p:style>
+          <a:lnRef idx="1">
+            <a:schemeClr val="accent1"/>
+          </a:lnRef>
+          <a:fillRef idx="0">
+            <a:schemeClr val="accent1"/>
+          </a:fillRef>
+          <a:effectRef idx="0">
+            <a:schemeClr val="accent1"/>
+          </a:effectRef>
+          <a:fontRef idx="minor">
+            <a:schemeClr val="tx1"/>
+          </a:fontRef>
+        </p:style>
+      </p:cxnSp>
+      <p:sp>
+        <p:nvSpPr>
+          <p:cNvPr id="97" name="Ellipse 96"/>
+          <p:cNvSpPr/>
+          <p:nvPr/>
+        </p:nvSpPr>
+        <p:spPr>
+          <a:xfrm>
+            <a:off x="5226846" y="1448636"/>
+            <a:ext cx="360040" cy="360040"/>
+          </a:xfrm>
+          <a:prstGeom prst="ellipse">
+            <a:avLst/>
+          </a:prstGeom>
+          <a:noFill/>
+          <a:ln w="19050">
+            <a:solidFill>
+              <a:schemeClr val="tx1"/>
+            </a:solidFill>
+          </a:ln>
+        </p:spPr>
+        <p:style>
+          <a:lnRef idx="2">
+            <a:schemeClr val="accent1">
+              <a:shade val="50000"/>
+            </a:schemeClr>
+          </a:lnRef>
+          <a:fillRef idx="1">
+            <a:schemeClr val="accent1"/>
+          </a:fillRef>
+          <a:effectRef idx="0">
+            <a:schemeClr val="accent1"/>
+          </a:effectRef>
+          <a:fontRef idx="minor">
+            <a:schemeClr val="lt1"/>
+          </a:fontRef>
+        </p:style>
+        <p:txBody>
+          <a:bodyPr rtlCol="0" anchor="ctr"/>
+          <a:lstStyle/>
+          <a:p>
+            <a:pPr algn="ctr"/>
+            <a:endParaRPr lang="de-DE" sz="1400" i="1" baseline="-25000" dirty="0">
+              <a:solidFill>
+                <a:schemeClr val="tx1"/>
+              </a:solidFill>
+              <a:latin typeface="Times New Roman" pitchFamily="18" charset="0"/>
+              <a:cs typeface="Times New Roman" pitchFamily="18" charset="0"/>
+            </a:endParaRPr>
+          </a:p>
+        </p:txBody>
+      </p:sp>
+      <p:sp>
+        <p:nvSpPr>
+          <p:cNvPr id="98" name="Rechteck 97"/>
+          <p:cNvSpPr/>
+          <p:nvPr/>
+        </p:nvSpPr>
+        <p:spPr>
+          <a:xfrm>
+            <a:off x="5218023" y="1465039"/>
+            <a:ext cx="352981" cy="307777"/>
+          </a:xfrm>
+          <a:prstGeom prst="rect">
+            <a:avLst/>
+          </a:prstGeom>
+          <a:ln w="19050">
+            <a:noFill/>
+          </a:ln>
+        </p:spPr>
+        <p:txBody>
+          <a:bodyPr wrap="none">
+            <a:spAutoFit/>
+          </a:bodyPr>
+          <a:lstStyle/>
+          <a:p>
+            <a:pPr algn="ctr"/>
+            <a:r>
+              <a:rPr lang="de-DE" sz="1400" i="1" dirty="0" err="1" smtClean="0">
+                <a:solidFill>
+                  <a:schemeClr val="tx1"/>
+                </a:solidFill>
+                <a:latin typeface="Times New Roman" pitchFamily="18" charset="0"/>
+                <a:cs typeface="Times New Roman" pitchFamily="18" charset="0"/>
+              </a:rPr>
+              <a:t>V</a:t>
+            </a:r>
+            <a:r>
+              <a:rPr lang="de-DE" sz="1400" i="1" baseline="-25000" dirty="0" err="1" smtClean="0">
+                <a:solidFill>
+                  <a:schemeClr val="tx1"/>
+                </a:solidFill>
+                <a:latin typeface="Times New Roman" pitchFamily="18" charset="0"/>
+                <a:cs typeface="Times New Roman" pitchFamily="18" charset="0"/>
+              </a:rPr>
+              <a:t>g</a:t>
+            </a:r>
+            <a:endParaRPr lang="de-DE" sz="2000" i="1" baseline="-25000" dirty="0">
+              <a:solidFill>
+                <a:schemeClr val="tx1"/>
+              </a:solidFill>
+              <a:latin typeface="Times New Roman" pitchFamily="18" charset="0"/>
+              <a:cs typeface="Times New Roman" pitchFamily="18" charset="0"/>
+            </a:endParaRPr>
+          </a:p>
+        </p:txBody>
+      </p:sp>
+      <p:cxnSp>
+        <p:nvCxnSpPr>
+          <p:cNvPr id="99" name="Gerade Verbindung 98"/>
+          <p:cNvCxnSpPr/>
+          <p:nvPr/>
+        </p:nvCxnSpPr>
+        <p:spPr>
+          <a:xfrm>
+            <a:off x="4923075" y="1637438"/>
+            <a:ext cx="288032" cy="0"/>
+          </a:xfrm>
+          <a:prstGeom prst="line">
+            <a:avLst/>
+          </a:prstGeom>
+          <a:ln w="19050">
+            <a:solidFill>
+              <a:schemeClr val="tx1"/>
+            </a:solidFill>
+          </a:ln>
+        </p:spPr>
+        <p:style>
+          <a:lnRef idx="1">
+            <a:schemeClr val="accent1"/>
+          </a:lnRef>
+          <a:fillRef idx="0">
+            <a:schemeClr val="accent1"/>
+          </a:fillRef>
+          <a:effectRef idx="0">
+            <a:schemeClr val="accent1"/>
+          </a:effectRef>
+          <a:fontRef idx="minor">
+            <a:schemeClr val="tx1"/>
+          </a:fontRef>
+        </p:style>
+      </p:cxnSp>
+      <p:cxnSp>
+        <p:nvCxnSpPr>
+          <p:cNvPr id="100" name="Gerade Verbindung 99"/>
+          <p:cNvCxnSpPr/>
+          <p:nvPr/>
+        </p:nvCxnSpPr>
+        <p:spPr>
+          <a:xfrm flipH="1">
+            <a:off x="5598330" y="1637438"/>
+            <a:ext cx="288032" cy="0"/>
+          </a:xfrm>
+          <a:prstGeom prst="line">
+            <a:avLst/>
+          </a:prstGeom>
+          <a:ln w="19050">
+            <a:solidFill>
+              <a:schemeClr val="tx1"/>
+            </a:solidFill>
+          </a:ln>
+        </p:spPr>
+        <p:style>
+          <a:lnRef idx="1">
+            <a:schemeClr val="accent1"/>
+          </a:lnRef>
+          <a:fillRef idx="0">
+            <a:schemeClr val="accent1"/>
+          </a:fillRef>
+          <a:effectRef idx="0">
+            <a:schemeClr val="accent1"/>
+          </a:effectRef>
+          <a:fontRef idx="minor">
+            <a:schemeClr val="tx1"/>
+          </a:fontRef>
+        </p:style>
+      </p:cxnSp>
+      <p:cxnSp>
+        <p:nvCxnSpPr>
+          <p:cNvPr id="103" name="Gerade Verbindung 102"/>
+          <p:cNvCxnSpPr/>
+          <p:nvPr/>
+        </p:nvCxnSpPr>
+        <p:spPr>
+          <a:xfrm>
+            <a:off x="4716016" y="3068960"/>
+            <a:ext cx="432048" cy="0"/>
+          </a:xfrm>
+          <a:prstGeom prst="line">
+            <a:avLst/>
+          </a:prstGeom>
+          <a:ln w="19050">
+            <a:solidFill>
+              <a:schemeClr val="tx1"/>
+            </a:solidFill>
+          </a:ln>
+        </p:spPr>
+        <p:style>
+          <a:lnRef idx="1">
+            <a:schemeClr val="accent1"/>
+          </a:lnRef>
+          <a:fillRef idx="0">
+            <a:schemeClr val="accent1"/>
+          </a:fillRef>
+          <a:effectRef idx="0">
+            <a:schemeClr val="accent1"/>
+          </a:effectRef>
+          <a:fontRef idx="minor">
+            <a:schemeClr val="tx1"/>
+          </a:fontRef>
+        </p:style>
+      </p:cxnSp>
+      <p:cxnSp>
+        <p:nvCxnSpPr>
+          <p:cNvPr id="104" name="Gerade Verbindung 103"/>
+          <p:cNvCxnSpPr/>
+          <p:nvPr/>
+        </p:nvCxnSpPr>
+        <p:spPr>
+          <a:xfrm flipH="1">
+            <a:off x="4788024" y="3140968"/>
+            <a:ext cx="288032" cy="0"/>
+          </a:xfrm>
+          <a:prstGeom prst="line">
+            <a:avLst/>
+          </a:prstGeom>
+          <a:ln w="19050">
+            <a:solidFill>
+              <a:schemeClr val="tx1"/>
+            </a:solidFill>
+          </a:ln>
+        </p:spPr>
+        <p:style>
+          <a:lnRef idx="1">
+            <a:schemeClr val="accent1"/>
+          </a:lnRef>
+          <a:fillRef idx="0">
+            <a:schemeClr val="accent1"/>
+          </a:fillRef>
+          <a:effectRef idx="0">
+            <a:schemeClr val="accent1"/>
+          </a:effectRef>
+          <a:fontRef idx="minor">
+            <a:schemeClr val="tx1"/>
+          </a:fontRef>
+        </p:style>
+      </p:cxnSp>
+      <p:cxnSp>
+        <p:nvCxnSpPr>
+          <p:cNvPr id="105" name="Gerade Verbindung 104"/>
+          <p:cNvCxnSpPr/>
+          <p:nvPr/>
+        </p:nvCxnSpPr>
+        <p:spPr>
+          <a:xfrm flipH="1">
+            <a:off x="4860032" y="3212976"/>
+            <a:ext cx="144016" cy="0"/>
+          </a:xfrm>
+          <a:prstGeom prst="line">
+            <a:avLst/>
+          </a:prstGeom>
+          <a:ln w="19050">
+            <a:solidFill>
+              <a:schemeClr val="tx1"/>
+            </a:solidFill>
+          </a:ln>
+        </p:spPr>
+        <p:style>
+          <a:lnRef idx="1">
+            <a:schemeClr val="accent1"/>
+          </a:lnRef>
+          <a:fillRef idx="0">
+            <a:schemeClr val="accent1"/>
+          </a:fillRef>
+          <a:effectRef idx="0">
+            <a:schemeClr val="accent1"/>
+          </a:effectRef>
+          <a:fontRef idx="minor">
+            <a:schemeClr val="tx1"/>
+          </a:fontRef>
+        </p:style>
+      </p:cxnSp>
+      <p:sp>
+        <p:nvSpPr>
+          <p:cNvPr id="106" name="Textfeld 105"/>
+          <p:cNvSpPr txBox="1"/>
+          <p:nvPr/>
+        </p:nvSpPr>
+        <p:spPr>
+          <a:xfrm>
+            <a:off x="4139952" y="2204864"/>
+            <a:ext cx="864096" cy="369332"/>
+          </a:xfrm>
+          <a:prstGeom prst="rect">
+            <a:avLst/>
+          </a:prstGeom>
+          <a:noFill/>
+        </p:spPr>
+        <p:txBody>
+          <a:bodyPr wrap="square" rtlCol="0">
+            <a:spAutoFit/>
+          </a:bodyPr>
+          <a:lstStyle/>
+          <a:p>
+            <a:r>
+              <a:rPr lang="de-DE" i="1" dirty="0" smtClean="0">
+                <a:latin typeface="Times New Roman" pitchFamily="18" charset="0"/>
+                <a:cs typeface="Times New Roman" pitchFamily="18" charset="0"/>
+              </a:rPr>
+              <a:t>E</a:t>
+            </a:r>
+            <a:r>
+              <a:rPr lang="de-DE" i="1" baseline="-25000" dirty="0" smtClean="0">
+                <a:latin typeface="Times New Roman" pitchFamily="18" charset="0"/>
+                <a:cs typeface="Times New Roman" pitchFamily="18" charset="0"/>
+              </a:rPr>
+              <a:t>J</a:t>
+            </a:r>
+            <a:r>
+              <a:rPr lang="de-DE" i="1" dirty="0" smtClean="0">
+                <a:latin typeface="Times New Roman" pitchFamily="18" charset="0"/>
+                <a:cs typeface="Times New Roman" pitchFamily="18" charset="0"/>
+              </a:rPr>
+              <a:t>,C</a:t>
+            </a:r>
+            <a:r>
+              <a:rPr lang="el-GR" i="1" baseline="-25000" dirty="0" smtClean="0">
+                <a:latin typeface="Times New Roman"/>
+                <a:cs typeface="Times New Roman"/>
+              </a:rPr>
+              <a:t>Σ</a:t>
+            </a:r>
+            <a:endParaRPr lang="de-DE" i="1" baseline="-25000" dirty="0">
+              <a:latin typeface="Times New Roman" pitchFamily="18" charset="0"/>
+              <a:cs typeface="Times New Roman" pitchFamily="18" charset="0"/>
+            </a:endParaRPr>
+          </a:p>
+        </p:txBody>
+      </p:sp>
+      <p:sp>
+        <p:nvSpPr>
+          <p:cNvPr id="108" name="Textfeld 107"/>
+          <p:cNvSpPr txBox="1"/>
+          <p:nvPr/>
+        </p:nvSpPr>
+        <p:spPr>
+          <a:xfrm>
+            <a:off x="4364941" y="1673913"/>
+            <a:ext cx="449162" cy="369332"/>
+          </a:xfrm>
+          <a:prstGeom prst="rect">
+            <a:avLst/>
+          </a:prstGeom>
+          <a:noFill/>
+        </p:spPr>
+        <p:txBody>
+          <a:bodyPr wrap="none" rtlCol="0">
+            <a:spAutoFit/>
+          </a:bodyPr>
+          <a:lstStyle/>
+          <a:p>
+            <a:r>
+              <a:rPr lang="de-DE" i="1" dirty="0" smtClean="0">
+                <a:latin typeface="Times New Roman" pitchFamily="18" charset="0"/>
+                <a:cs typeface="Times New Roman" pitchFamily="18" charset="0"/>
+              </a:rPr>
+              <a:t>C</a:t>
+            </a:r>
+            <a:r>
+              <a:rPr lang="de-DE" i="1" baseline="-25000" dirty="0" smtClean="0">
+                <a:latin typeface="Times New Roman" pitchFamily="18" charset="0"/>
+                <a:cs typeface="Times New Roman" pitchFamily="18" charset="0"/>
+              </a:rPr>
+              <a:t>G</a:t>
+            </a:r>
+            <a:endParaRPr lang="de-DE" i="1" baseline="-25000" dirty="0">
+              <a:latin typeface="Times New Roman" pitchFamily="18" charset="0"/>
+              <a:cs typeface="Times New Roman" pitchFamily="18" charset="0"/>
+            </a:endParaRPr>
+          </a:p>
+        </p:txBody>
+      </p:sp>
+      <p:sp>
+        <p:nvSpPr>
+          <p:cNvPr id="112" name="Textfeld 111"/>
+          <p:cNvSpPr txBox="1"/>
+          <p:nvPr/>
+        </p:nvSpPr>
+        <p:spPr>
+          <a:xfrm>
+            <a:off x="3443928" y="1700808"/>
+            <a:ext cx="696024" cy="1323439"/>
+          </a:xfrm>
+          <a:prstGeom prst="rect">
+            <a:avLst/>
+          </a:prstGeom>
+          <a:noFill/>
+        </p:spPr>
+        <p:txBody>
+          <a:bodyPr wrap="none" rtlCol="0">
+            <a:spAutoFit/>
+          </a:bodyPr>
+          <a:lstStyle/>
+          <a:p>
+            <a:r>
+              <a:rPr lang="de-DE" sz="8000" dirty="0" smtClean="0"/>
+              <a:t>=</a:t>
+            </a:r>
+            <a:endParaRPr lang="de-DE" dirty="0"/>
+          </a:p>
+        </p:txBody>
+      </p:sp>
+      <p:sp>
+        <p:nvSpPr>
+          <p:cNvPr id="113" name="Textfeld 112"/>
+          <p:cNvSpPr txBox="1"/>
+          <p:nvPr/>
+        </p:nvSpPr>
+        <p:spPr>
+          <a:xfrm>
+            <a:off x="1259632" y="980728"/>
+            <a:ext cx="367408" cy="338554"/>
+          </a:xfrm>
+          <a:prstGeom prst="rect">
+            <a:avLst/>
+          </a:prstGeom>
+          <a:noFill/>
+        </p:spPr>
+        <p:txBody>
+          <a:bodyPr wrap="none" rtlCol="0">
+            <a:spAutoFit/>
+          </a:bodyPr>
+          <a:lstStyle/>
+          <a:p>
+            <a:r>
+              <a:rPr lang="de-DE" sz="1600" dirty="0" smtClean="0">
+                <a:latin typeface="Arial" pitchFamily="34" charset="0"/>
+                <a:cs typeface="Arial" pitchFamily="34" charset="0"/>
+              </a:rPr>
+              <a:t>a)</a:t>
+            </a:r>
+            <a:endParaRPr lang="de-DE" sz="1600" baseline="-25000" dirty="0">
+              <a:latin typeface="Arial" pitchFamily="34" charset="0"/>
+              <a:cs typeface="Arial" pitchFamily="34" charset="0"/>
+            </a:endParaRPr>
+          </a:p>
+        </p:txBody>
+      </p:sp>
+      <p:sp>
+        <p:nvSpPr>
+          <p:cNvPr id="114" name="Textfeld 113"/>
+          <p:cNvSpPr txBox="1"/>
+          <p:nvPr/>
+        </p:nvSpPr>
+        <p:spPr>
+          <a:xfrm>
+            <a:off x="4139952" y="980728"/>
+            <a:ext cx="367408" cy="338554"/>
+          </a:xfrm>
+          <a:prstGeom prst="rect">
+            <a:avLst/>
+          </a:prstGeom>
+          <a:noFill/>
+        </p:spPr>
+        <p:txBody>
+          <a:bodyPr wrap="none" rtlCol="0">
+            <a:spAutoFit/>
+          </a:bodyPr>
+          <a:lstStyle/>
+          <a:p>
+            <a:r>
+              <a:rPr lang="de-DE" sz="1600" dirty="0" smtClean="0">
+                <a:latin typeface="Arial" pitchFamily="34" charset="0"/>
+                <a:cs typeface="Arial" pitchFamily="34" charset="0"/>
+              </a:rPr>
+              <a:t>b)</a:t>
+            </a:r>
+            <a:endParaRPr lang="de-DE" sz="1600" baseline="-25000" dirty="0">
+              <a:latin typeface="Arial" pitchFamily="34" charset="0"/>
+              <a:cs typeface="Arial" pitchFamily="34" charset="0"/>
             </a:endParaRPr>
           </a:p>
         </p:txBody>

</xml_diff>

<commit_message>
Final version of the introduction which has been sent to the reviewers.
</commit_message>
<xml_diff>
--- a/material/figures/introduction/cooper_pair_box.pptx
+++ b/material/figures/introduction/cooper_pair_box.pptx
@@ -7,6 +7,7 @@
   <p:sldIdLst>
     <p:sldId id="256" r:id="rId2"/>
     <p:sldId id="257" r:id="rId3"/>
+    <p:sldId id="258" r:id="rId4"/>
   </p:sldIdLst>
   <p:sldSz cx="9144000" cy="6858000" type="screen4x3"/>
   <p:notesSz cx="6858000" cy="9144000"/>
@@ -290,7 +291,7 @@
             <a:fld id="{E233F2FC-336D-4AEC-8E34-B26C5DCCE050}" type="datetimeFigureOut">
               <a:rPr lang="de-DE" smtClean="0"/>
               <a:pPr/>
-              <a:t>18.06.2012</a:t>
+              <a:t>03.07.2012</a:t>
             </a:fld>
             <a:endParaRPr lang="de-DE"/>
           </a:p>
@@ -457,7 +458,7 @@
             <a:fld id="{E233F2FC-336D-4AEC-8E34-B26C5DCCE050}" type="datetimeFigureOut">
               <a:rPr lang="de-DE" smtClean="0"/>
               <a:pPr/>
-              <a:t>18.06.2012</a:t>
+              <a:t>03.07.2012</a:t>
             </a:fld>
             <a:endParaRPr lang="de-DE"/>
           </a:p>
@@ -634,7 +635,7 @@
             <a:fld id="{E233F2FC-336D-4AEC-8E34-B26C5DCCE050}" type="datetimeFigureOut">
               <a:rPr lang="de-DE" smtClean="0"/>
               <a:pPr/>
-              <a:t>18.06.2012</a:t>
+              <a:t>03.07.2012</a:t>
             </a:fld>
             <a:endParaRPr lang="de-DE"/>
           </a:p>
@@ -801,7 +802,7 @@
             <a:fld id="{E233F2FC-336D-4AEC-8E34-B26C5DCCE050}" type="datetimeFigureOut">
               <a:rPr lang="de-DE" smtClean="0"/>
               <a:pPr/>
-              <a:t>18.06.2012</a:t>
+              <a:t>03.07.2012</a:t>
             </a:fld>
             <a:endParaRPr lang="de-DE"/>
           </a:p>
@@ -1044,7 +1045,7 @@
             <a:fld id="{E233F2FC-336D-4AEC-8E34-B26C5DCCE050}" type="datetimeFigureOut">
               <a:rPr lang="de-DE" smtClean="0"/>
               <a:pPr/>
-              <a:t>18.06.2012</a:t>
+              <a:t>03.07.2012</a:t>
             </a:fld>
             <a:endParaRPr lang="de-DE"/>
           </a:p>
@@ -1329,7 +1330,7 @@
             <a:fld id="{E233F2FC-336D-4AEC-8E34-B26C5DCCE050}" type="datetimeFigureOut">
               <a:rPr lang="de-DE" smtClean="0"/>
               <a:pPr/>
-              <a:t>18.06.2012</a:t>
+              <a:t>03.07.2012</a:t>
             </a:fld>
             <a:endParaRPr lang="de-DE"/>
           </a:p>
@@ -1748,7 +1749,7 @@
             <a:fld id="{E233F2FC-336D-4AEC-8E34-B26C5DCCE050}" type="datetimeFigureOut">
               <a:rPr lang="de-DE" smtClean="0"/>
               <a:pPr/>
-              <a:t>18.06.2012</a:t>
+              <a:t>03.07.2012</a:t>
             </a:fld>
             <a:endParaRPr lang="de-DE"/>
           </a:p>
@@ -1863,7 +1864,7 @@
             <a:fld id="{E233F2FC-336D-4AEC-8E34-B26C5DCCE050}" type="datetimeFigureOut">
               <a:rPr lang="de-DE" smtClean="0"/>
               <a:pPr/>
-              <a:t>18.06.2012</a:t>
+              <a:t>03.07.2012</a:t>
             </a:fld>
             <a:endParaRPr lang="de-DE"/>
           </a:p>
@@ -1955,7 +1956,7 @@
             <a:fld id="{E233F2FC-336D-4AEC-8E34-B26C5DCCE050}" type="datetimeFigureOut">
               <a:rPr lang="de-DE" smtClean="0"/>
               <a:pPr/>
-              <a:t>18.06.2012</a:t>
+              <a:t>03.07.2012</a:t>
             </a:fld>
             <a:endParaRPr lang="de-DE"/>
           </a:p>
@@ -2229,7 +2230,7 @@
             <a:fld id="{E233F2FC-336D-4AEC-8E34-B26C5DCCE050}" type="datetimeFigureOut">
               <a:rPr lang="de-DE" smtClean="0"/>
               <a:pPr/>
-              <a:t>18.06.2012</a:t>
+              <a:t>03.07.2012</a:t>
             </a:fld>
             <a:endParaRPr lang="de-DE"/>
           </a:p>
@@ -2479,7 +2480,7 @@
             <a:fld id="{E233F2FC-336D-4AEC-8E34-B26C5DCCE050}" type="datetimeFigureOut">
               <a:rPr lang="de-DE" smtClean="0"/>
               <a:pPr/>
-              <a:t>18.06.2012</a:t>
+              <a:t>03.07.2012</a:t>
             </a:fld>
             <a:endParaRPr lang="de-DE"/>
           </a:p>
@@ -2689,7 +2690,7 @@
             <a:fld id="{E233F2FC-336D-4AEC-8E34-B26C5DCCE050}" type="datetimeFigureOut">
               <a:rPr lang="de-DE" smtClean="0"/>
               <a:pPr/>
-              <a:t>18.06.2012</a:t>
+              <a:t>03.07.2012</a:t>
             </a:fld>
             <a:endParaRPr lang="de-DE"/>
           </a:p>
@@ -4191,7 +4192,7 @@
         <p:spPr>
           <a:xfrm>
             <a:off x="1628637" y="1673913"/>
-            <a:ext cx="449162" cy="369332"/>
+            <a:ext cx="415498" cy="369332"/>
           </a:xfrm>
           <a:prstGeom prst="rect">
             <a:avLst/>
@@ -4205,18 +4206,18 @@
           <a:lstStyle/>
           <a:p>
             <a:r>
-              <a:rPr lang="de-DE" i="1" dirty="0" smtClean="0">
+              <a:rPr lang="de-DE" i="1" dirty="0" err="1" smtClean="0">
                 <a:latin typeface="Times New Roman" pitchFamily="18" charset="0"/>
                 <a:cs typeface="Times New Roman" pitchFamily="18" charset="0"/>
               </a:rPr>
               <a:t>C</a:t>
             </a:r>
             <a:r>
-              <a:rPr lang="de-DE" i="1" baseline="-25000" dirty="0" smtClean="0">
+              <a:rPr lang="de-DE" i="1" baseline="-25000" dirty="0" err="1" smtClean="0">
                 <a:latin typeface="Times New Roman" pitchFamily="18" charset="0"/>
                 <a:cs typeface="Times New Roman" pitchFamily="18" charset="0"/>
               </a:rPr>
-              <a:t>G</a:t>
+              <a:t>g</a:t>
             </a:r>
             <a:endParaRPr lang="de-DE" i="1" baseline="-25000" dirty="0">
               <a:latin typeface="Times New Roman" pitchFamily="18" charset="0"/>
@@ -6130,6 +6131,1013 @@
               <a:latin typeface="Arial" pitchFamily="34" charset="0"/>
               <a:cs typeface="Arial" pitchFamily="34" charset="0"/>
             </a:endParaRPr>
+          </a:p>
+        </p:txBody>
+      </p:sp>
+    </p:spTree>
+  </p:cSld>
+  <p:clrMapOvr>
+    <a:masterClrMapping/>
+  </p:clrMapOvr>
+</p:sld>
+</file>
+
+<file path=ppt/slides/slide3.xml><?xml version="1.0" encoding="utf-8"?>
+<p:sld xmlns:a="http://schemas.openxmlformats.org/drawingml/2006/main" xmlns:r="http://schemas.openxmlformats.org/officeDocument/2006/relationships" xmlns:p="http://schemas.openxmlformats.org/presentationml/2006/main">
+  <p:cSld>
+    <p:spTree>
+      <p:nvGrpSpPr>
+        <p:cNvPr id="1" name=""/>
+        <p:cNvGrpSpPr/>
+        <p:nvPr/>
+      </p:nvGrpSpPr>
+      <p:grpSpPr>
+        <a:xfrm>
+          <a:off x="0" y="0"/>
+          <a:ext cx="0" cy="0"/>
+          <a:chOff x="0" y="0"/>
+          <a:chExt cx="0" cy="0"/>
+        </a:xfrm>
+      </p:grpSpPr>
+      <p:cxnSp>
+        <p:nvCxnSpPr>
+          <p:cNvPr id="40" name="Gerade Verbindung 39"/>
+          <p:cNvCxnSpPr/>
+          <p:nvPr/>
+        </p:nvCxnSpPr>
+        <p:spPr>
+          <a:xfrm>
+            <a:off x="2195736" y="1916832"/>
+            <a:ext cx="0" cy="216024"/>
+          </a:xfrm>
+          <a:prstGeom prst="line">
+            <a:avLst/>
+          </a:prstGeom>
+          <a:ln w="19050">
+            <a:solidFill>
+              <a:schemeClr val="tx1"/>
+            </a:solidFill>
+            <a:tailEnd type="oval"/>
+          </a:ln>
+        </p:spPr>
+        <p:style>
+          <a:lnRef idx="1">
+            <a:schemeClr val="accent1"/>
+          </a:lnRef>
+          <a:fillRef idx="0">
+            <a:schemeClr val="accent1"/>
+          </a:fillRef>
+          <a:effectRef idx="0">
+            <a:schemeClr val="accent1"/>
+          </a:effectRef>
+          <a:fontRef idx="minor">
+            <a:schemeClr val="tx1"/>
+          </a:fontRef>
+        </p:style>
+      </p:cxnSp>
+      <p:sp>
+        <p:nvSpPr>
+          <p:cNvPr id="41" name="Rechteck 40"/>
+          <p:cNvSpPr/>
+          <p:nvPr/>
+        </p:nvSpPr>
+        <p:spPr>
+          <a:xfrm>
+            <a:off x="1907704" y="2132856"/>
+            <a:ext cx="576064" cy="576064"/>
+          </a:xfrm>
+          <a:prstGeom prst="rect">
+            <a:avLst/>
+          </a:prstGeom>
+          <a:noFill/>
+          <a:ln w="19050">
+            <a:solidFill>
+              <a:schemeClr val="tx1"/>
+            </a:solidFill>
+          </a:ln>
+        </p:spPr>
+        <p:style>
+          <a:lnRef idx="2">
+            <a:schemeClr val="accent1">
+              <a:shade val="50000"/>
+            </a:schemeClr>
+          </a:lnRef>
+          <a:fillRef idx="1">
+            <a:schemeClr val="accent1"/>
+          </a:fillRef>
+          <a:effectRef idx="0">
+            <a:schemeClr val="accent1"/>
+          </a:effectRef>
+          <a:fontRef idx="minor">
+            <a:schemeClr val="lt1"/>
+          </a:fontRef>
+        </p:style>
+        <p:txBody>
+          <a:bodyPr rtlCol="0" anchor="ctr"/>
+          <a:lstStyle/>
+          <a:p>
+            <a:pPr algn="ctr"/>
+            <a:endParaRPr lang="de-DE"/>
+          </a:p>
+        </p:txBody>
+      </p:sp>
+      <p:cxnSp>
+        <p:nvCxnSpPr>
+          <p:cNvPr id="43" name="Gerade Verbindung 42"/>
+          <p:cNvCxnSpPr>
+            <a:stCxn id="41" idx="2"/>
+          </p:cNvCxnSpPr>
+          <p:nvPr/>
+        </p:nvCxnSpPr>
+        <p:spPr>
+          <a:xfrm>
+            <a:off x="2195736" y="2708920"/>
+            <a:ext cx="0" cy="360040"/>
+          </a:xfrm>
+          <a:prstGeom prst="line">
+            <a:avLst/>
+          </a:prstGeom>
+          <a:ln w="19050">
+            <a:solidFill>
+              <a:schemeClr val="tx1"/>
+            </a:solidFill>
+            <a:headEnd type="oval" w="med" len="med"/>
+            <a:tailEnd type="none" w="med" len="med"/>
+          </a:ln>
+        </p:spPr>
+        <p:style>
+          <a:lnRef idx="1">
+            <a:schemeClr val="accent1"/>
+          </a:lnRef>
+          <a:fillRef idx="0">
+            <a:schemeClr val="accent1"/>
+          </a:fillRef>
+          <a:effectRef idx="0">
+            <a:schemeClr val="accent1"/>
+          </a:effectRef>
+          <a:fontRef idx="minor">
+            <a:schemeClr val="tx1"/>
+          </a:fontRef>
+        </p:style>
+      </p:cxnSp>
+      <p:grpSp>
+        <p:nvGrpSpPr>
+          <p:cNvPr id="2" name="Gruppieren 43"/>
+          <p:cNvGrpSpPr/>
+          <p:nvPr/>
+        </p:nvGrpSpPr>
+        <p:grpSpPr>
+          <a:xfrm>
+            <a:off x="2375612" y="2312732"/>
+            <a:ext cx="216024" cy="216024"/>
+            <a:chOff x="2771800" y="2348880"/>
+            <a:chExt cx="288032" cy="288032"/>
+          </a:xfrm>
+        </p:grpSpPr>
+        <p:cxnSp>
+          <p:nvCxnSpPr>
+            <p:cNvPr id="45" name="Gerade Verbindung 44"/>
+            <p:cNvCxnSpPr/>
+            <p:nvPr/>
+          </p:nvCxnSpPr>
+          <p:spPr>
+            <a:xfrm>
+              <a:off x="2771800" y="2348880"/>
+              <a:ext cx="288032" cy="288032"/>
+            </a:xfrm>
+            <a:prstGeom prst="line">
+              <a:avLst/>
+            </a:prstGeom>
+            <a:ln w="19050">
+              <a:solidFill>
+                <a:schemeClr val="tx1"/>
+              </a:solidFill>
+            </a:ln>
+          </p:spPr>
+          <p:style>
+            <a:lnRef idx="1">
+              <a:schemeClr val="accent1"/>
+            </a:lnRef>
+            <a:fillRef idx="0">
+              <a:schemeClr val="accent1"/>
+            </a:fillRef>
+            <a:effectRef idx="0">
+              <a:schemeClr val="accent1"/>
+            </a:effectRef>
+            <a:fontRef idx="minor">
+              <a:schemeClr val="tx1"/>
+            </a:fontRef>
+          </p:style>
+        </p:cxnSp>
+        <p:cxnSp>
+          <p:nvCxnSpPr>
+            <p:cNvPr id="46" name="Gerade Verbindung 45"/>
+            <p:cNvCxnSpPr/>
+            <p:nvPr/>
+          </p:nvCxnSpPr>
+          <p:spPr>
+            <a:xfrm flipV="1">
+              <a:off x="2771800" y="2348880"/>
+              <a:ext cx="288032" cy="288032"/>
+            </a:xfrm>
+            <a:prstGeom prst="line">
+              <a:avLst/>
+            </a:prstGeom>
+            <a:ln w="19050">
+              <a:solidFill>
+                <a:schemeClr val="tx1"/>
+              </a:solidFill>
+            </a:ln>
+          </p:spPr>
+          <p:style>
+            <a:lnRef idx="1">
+              <a:schemeClr val="accent1"/>
+            </a:lnRef>
+            <a:fillRef idx="0">
+              <a:schemeClr val="accent1"/>
+            </a:fillRef>
+            <a:effectRef idx="0">
+              <a:schemeClr val="accent1"/>
+            </a:effectRef>
+            <a:fontRef idx="minor">
+              <a:schemeClr val="tx1"/>
+            </a:fontRef>
+          </p:style>
+        </p:cxnSp>
+      </p:grpSp>
+      <p:cxnSp>
+        <p:nvCxnSpPr>
+          <p:cNvPr id="52" name="Gerade Verbindung 51"/>
+          <p:cNvCxnSpPr/>
+          <p:nvPr/>
+        </p:nvCxnSpPr>
+        <p:spPr>
+          <a:xfrm>
+            <a:off x="2051720" y="1916832"/>
+            <a:ext cx="288032" cy="0"/>
+          </a:xfrm>
+          <a:prstGeom prst="line">
+            <a:avLst/>
+          </a:prstGeom>
+          <a:ln w="19050">
+            <a:solidFill>
+              <a:schemeClr val="tx1"/>
+            </a:solidFill>
+          </a:ln>
+        </p:spPr>
+        <p:style>
+          <a:lnRef idx="1">
+            <a:schemeClr val="accent1"/>
+          </a:lnRef>
+          <a:fillRef idx="0">
+            <a:schemeClr val="accent1"/>
+          </a:fillRef>
+          <a:effectRef idx="0">
+            <a:schemeClr val="accent1"/>
+          </a:effectRef>
+          <a:fontRef idx="minor">
+            <a:schemeClr val="tx1"/>
+          </a:fontRef>
+        </p:style>
+      </p:cxnSp>
+      <p:cxnSp>
+        <p:nvCxnSpPr>
+          <p:cNvPr id="53" name="Gerade Verbindung 52"/>
+          <p:cNvCxnSpPr/>
+          <p:nvPr/>
+        </p:nvCxnSpPr>
+        <p:spPr>
+          <a:xfrm>
+            <a:off x="2051720" y="1844824"/>
+            <a:ext cx="288032" cy="0"/>
+          </a:xfrm>
+          <a:prstGeom prst="line">
+            <a:avLst/>
+          </a:prstGeom>
+          <a:ln w="19050">
+            <a:solidFill>
+              <a:schemeClr val="tx1"/>
+            </a:solidFill>
+          </a:ln>
+        </p:spPr>
+        <p:style>
+          <a:lnRef idx="1">
+            <a:schemeClr val="accent1"/>
+          </a:lnRef>
+          <a:fillRef idx="0">
+            <a:schemeClr val="accent1"/>
+          </a:fillRef>
+          <a:effectRef idx="0">
+            <a:schemeClr val="accent1"/>
+          </a:effectRef>
+          <a:fontRef idx="minor">
+            <a:schemeClr val="tx1"/>
+          </a:fontRef>
+        </p:style>
+      </p:cxnSp>
+      <p:cxnSp>
+        <p:nvCxnSpPr>
+          <p:cNvPr id="54" name="Gerade Verbindung 53"/>
+          <p:cNvCxnSpPr/>
+          <p:nvPr/>
+        </p:nvCxnSpPr>
+        <p:spPr>
+          <a:xfrm flipH="1">
+            <a:off x="3131840" y="1628800"/>
+            <a:ext cx="9525" cy="1440160"/>
+          </a:xfrm>
+          <a:prstGeom prst="line">
+            <a:avLst/>
+          </a:prstGeom>
+          <a:ln w="19050">
+            <a:solidFill>
+              <a:schemeClr val="tx1"/>
+            </a:solidFill>
+            <a:headEnd type="none" w="med" len="med"/>
+            <a:tailEnd type="none" w="med" len="med"/>
+          </a:ln>
+        </p:spPr>
+        <p:style>
+          <a:lnRef idx="1">
+            <a:schemeClr val="accent1"/>
+          </a:lnRef>
+          <a:fillRef idx="0">
+            <a:schemeClr val="accent1"/>
+          </a:fillRef>
+          <a:effectRef idx="0">
+            <a:schemeClr val="accent1"/>
+          </a:effectRef>
+          <a:fontRef idx="minor">
+            <a:schemeClr val="tx1"/>
+          </a:fontRef>
+        </p:style>
+      </p:cxnSp>
+      <p:cxnSp>
+        <p:nvCxnSpPr>
+          <p:cNvPr id="59" name="Gerade Verbindung 58"/>
+          <p:cNvCxnSpPr/>
+          <p:nvPr/>
+        </p:nvCxnSpPr>
+        <p:spPr>
+          <a:xfrm>
+            <a:off x="2915816" y="3068960"/>
+            <a:ext cx="432048" cy="0"/>
+          </a:xfrm>
+          <a:prstGeom prst="line">
+            <a:avLst/>
+          </a:prstGeom>
+          <a:ln w="19050">
+            <a:solidFill>
+              <a:schemeClr val="tx1"/>
+            </a:solidFill>
+          </a:ln>
+        </p:spPr>
+        <p:style>
+          <a:lnRef idx="1">
+            <a:schemeClr val="accent1"/>
+          </a:lnRef>
+          <a:fillRef idx="0">
+            <a:schemeClr val="accent1"/>
+          </a:fillRef>
+          <a:effectRef idx="0">
+            <a:schemeClr val="accent1"/>
+          </a:effectRef>
+          <a:fontRef idx="minor">
+            <a:schemeClr val="tx1"/>
+          </a:fontRef>
+        </p:style>
+      </p:cxnSp>
+      <p:cxnSp>
+        <p:nvCxnSpPr>
+          <p:cNvPr id="60" name="Gerade Verbindung 59"/>
+          <p:cNvCxnSpPr/>
+          <p:nvPr/>
+        </p:nvCxnSpPr>
+        <p:spPr>
+          <a:xfrm flipH="1">
+            <a:off x="2987824" y="3140968"/>
+            <a:ext cx="288032" cy="0"/>
+          </a:xfrm>
+          <a:prstGeom prst="line">
+            <a:avLst/>
+          </a:prstGeom>
+          <a:ln w="19050">
+            <a:solidFill>
+              <a:schemeClr val="tx1"/>
+            </a:solidFill>
+          </a:ln>
+        </p:spPr>
+        <p:style>
+          <a:lnRef idx="1">
+            <a:schemeClr val="accent1"/>
+          </a:lnRef>
+          <a:fillRef idx="0">
+            <a:schemeClr val="accent1"/>
+          </a:fillRef>
+          <a:effectRef idx="0">
+            <a:schemeClr val="accent1"/>
+          </a:effectRef>
+          <a:fontRef idx="minor">
+            <a:schemeClr val="tx1"/>
+          </a:fontRef>
+        </p:style>
+      </p:cxnSp>
+      <p:cxnSp>
+        <p:nvCxnSpPr>
+          <p:cNvPr id="61" name="Gerade Verbindung 60"/>
+          <p:cNvCxnSpPr/>
+          <p:nvPr/>
+        </p:nvCxnSpPr>
+        <p:spPr>
+          <a:xfrm flipH="1">
+            <a:off x="3059832" y="3212976"/>
+            <a:ext cx="144016" cy="0"/>
+          </a:xfrm>
+          <a:prstGeom prst="line">
+            <a:avLst/>
+          </a:prstGeom>
+          <a:ln w="19050">
+            <a:solidFill>
+              <a:schemeClr val="tx1"/>
+            </a:solidFill>
+          </a:ln>
+        </p:spPr>
+        <p:style>
+          <a:lnRef idx="1">
+            <a:schemeClr val="accent1"/>
+          </a:lnRef>
+          <a:fillRef idx="0">
+            <a:schemeClr val="accent1"/>
+          </a:fillRef>
+          <a:effectRef idx="0">
+            <a:schemeClr val="accent1"/>
+          </a:effectRef>
+          <a:fontRef idx="minor">
+            <a:schemeClr val="tx1"/>
+          </a:fontRef>
+        </p:style>
+      </p:cxnSp>
+      <p:cxnSp>
+        <p:nvCxnSpPr>
+          <p:cNvPr id="65" name="Gerade Verbindung 64"/>
+          <p:cNvCxnSpPr/>
+          <p:nvPr/>
+        </p:nvCxnSpPr>
+        <p:spPr>
+          <a:xfrm flipV="1">
+            <a:off x="2195736" y="1628800"/>
+            <a:ext cx="0" cy="216024"/>
+          </a:xfrm>
+          <a:prstGeom prst="line">
+            <a:avLst/>
+          </a:prstGeom>
+          <a:ln w="19050">
+            <a:solidFill>
+              <a:schemeClr val="tx1"/>
+            </a:solidFill>
+          </a:ln>
+        </p:spPr>
+        <p:style>
+          <a:lnRef idx="1">
+            <a:schemeClr val="accent1"/>
+          </a:lnRef>
+          <a:fillRef idx="0">
+            <a:schemeClr val="accent1"/>
+          </a:fillRef>
+          <a:effectRef idx="0">
+            <a:schemeClr val="accent1"/>
+          </a:effectRef>
+          <a:fontRef idx="minor">
+            <a:schemeClr val="tx1"/>
+          </a:fontRef>
+        </p:style>
+      </p:cxnSp>
+      <p:sp>
+        <p:nvSpPr>
+          <p:cNvPr id="66" name="Ellipse 65"/>
+          <p:cNvSpPr/>
+          <p:nvPr/>
+        </p:nvSpPr>
+        <p:spPr>
+          <a:xfrm>
+            <a:off x="2490542" y="1448636"/>
+            <a:ext cx="360040" cy="360040"/>
+          </a:xfrm>
+          <a:prstGeom prst="ellipse">
+            <a:avLst/>
+          </a:prstGeom>
+          <a:noFill/>
+          <a:ln w="19050">
+            <a:solidFill>
+              <a:schemeClr val="tx1"/>
+            </a:solidFill>
+          </a:ln>
+        </p:spPr>
+        <p:style>
+          <a:lnRef idx="2">
+            <a:schemeClr val="accent1">
+              <a:shade val="50000"/>
+            </a:schemeClr>
+          </a:lnRef>
+          <a:fillRef idx="1">
+            <a:schemeClr val="accent1"/>
+          </a:fillRef>
+          <a:effectRef idx="0">
+            <a:schemeClr val="accent1"/>
+          </a:effectRef>
+          <a:fontRef idx="minor">
+            <a:schemeClr val="lt1"/>
+          </a:fontRef>
+        </p:style>
+        <p:txBody>
+          <a:bodyPr rtlCol="0" anchor="ctr"/>
+          <a:lstStyle/>
+          <a:p>
+            <a:pPr algn="ctr"/>
+            <a:endParaRPr lang="de-DE" sz="1400" i="1" baseline="-25000" dirty="0">
+              <a:solidFill>
+                <a:schemeClr val="tx1"/>
+              </a:solidFill>
+              <a:latin typeface="Times New Roman" pitchFamily="18" charset="0"/>
+              <a:cs typeface="Times New Roman" pitchFamily="18" charset="0"/>
+            </a:endParaRPr>
+          </a:p>
+        </p:txBody>
+      </p:sp>
+      <p:sp>
+        <p:nvSpPr>
+          <p:cNvPr id="67" name="Rechteck 66"/>
+          <p:cNvSpPr/>
+          <p:nvPr/>
+        </p:nvSpPr>
+        <p:spPr>
+          <a:xfrm>
+            <a:off x="2481719" y="1465039"/>
+            <a:ext cx="352981" cy="307777"/>
+          </a:xfrm>
+          <a:prstGeom prst="rect">
+            <a:avLst/>
+          </a:prstGeom>
+          <a:ln w="19050">
+            <a:noFill/>
+          </a:ln>
+        </p:spPr>
+        <p:txBody>
+          <a:bodyPr wrap="none">
+            <a:spAutoFit/>
+          </a:bodyPr>
+          <a:lstStyle/>
+          <a:p>
+            <a:pPr algn="ctr"/>
+            <a:r>
+              <a:rPr lang="de-DE" sz="1400" i="1" dirty="0" err="1" smtClean="0">
+                <a:solidFill>
+                  <a:schemeClr val="tx1"/>
+                </a:solidFill>
+                <a:latin typeface="Times New Roman" pitchFamily="18" charset="0"/>
+                <a:cs typeface="Times New Roman" pitchFamily="18" charset="0"/>
+              </a:rPr>
+              <a:t>V</a:t>
+            </a:r>
+            <a:r>
+              <a:rPr lang="de-DE" sz="1400" i="1" baseline="-25000" dirty="0" err="1" smtClean="0">
+                <a:solidFill>
+                  <a:schemeClr val="tx1"/>
+                </a:solidFill>
+                <a:latin typeface="Times New Roman" pitchFamily="18" charset="0"/>
+                <a:cs typeface="Times New Roman" pitchFamily="18" charset="0"/>
+              </a:rPr>
+              <a:t>g</a:t>
+            </a:r>
+            <a:endParaRPr lang="de-DE" sz="2000" i="1" baseline="-25000" dirty="0">
+              <a:solidFill>
+                <a:schemeClr val="tx1"/>
+              </a:solidFill>
+              <a:latin typeface="Times New Roman" pitchFamily="18" charset="0"/>
+              <a:cs typeface="Times New Roman" pitchFamily="18" charset="0"/>
+            </a:endParaRPr>
+          </a:p>
+        </p:txBody>
+      </p:sp>
+      <p:cxnSp>
+        <p:nvCxnSpPr>
+          <p:cNvPr id="68" name="Gerade Verbindung 67"/>
+          <p:cNvCxnSpPr/>
+          <p:nvPr/>
+        </p:nvCxnSpPr>
+        <p:spPr>
+          <a:xfrm>
+            <a:off x="2186771" y="1637438"/>
+            <a:ext cx="288032" cy="0"/>
+          </a:xfrm>
+          <a:prstGeom prst="line">
+            <a:avLst/>
+          </a:prstGeom>
+          <a:ln w="19050">
+            <a:solidFill>
+              <a:schemeClr val="tx1"/>
+            </a:solidFill>
+          </a:ln>
+        </p:spPr>
+        <p:style>
+          <a:lnRef idx="1">
+            <a:schemeClr val="accent1"/>
+          </a:lnRef>
+          <a:fillRef idx="0">
+            <a:schemeClr val="accent1"/>
+          </a:fillRef>
+          <a:effectRef idx="0">
+            <a:schemeClr val="accent1"/>
+          </a:effectRef>
+          <a:fontRef idx="minor">
+            <a:schemeClr val="tx1"/>
+          </a:fontRef>
+        </p:style>
+      </p:cxnSp>
+      <p:cxnSp>
+        <p:nvCxnSpPr>
+          <p:cNvPr id="69" name="Gerade Verbindung 68"/>
+          <p:cNvCxnSpPr/>
+          <p:nvPr/>
+        </p:nvCxnSpPr>
+        <p:spPr>
+          <a:xfrm flipH="1">
+            <a:off x="2862026" y="1637438"/>
+            <a:ext cx="288032" cy="0"/>
+          </a:xfrm>
+          <a:prstGeom prst="line">
+            <a:avLst/>
+          </a:prstGeom>
+          <a:ln w="19050">
+            <a:solidFill>
+              <a:schemeClr val="tx1"/>
+            </a:solidFill>
+          </a:ln>
+        </p:spPr>
+        <p:style>
+          <a:lnRef idx="1">
+            <a:schemeClr val="accent1"/>
+          </a:lnRef>
+          <a:fillRef idx="0">
+            <a:schemeClr val="accent1"/>
+          </a:fillRef>
+          <a:effectRef idx="0">
+            <a:schemeClr val="accent1"/>
+          </a:effectRef>
+          <a:fontRef idx="minor">
+            <a:schemeClr val="tx1"/>
+          </a:fontRef>
+        </p:style>
+      </p:cxnSp>
+      <p:cxnSp>
+        <p:nvCxnSpPr>
+          <p:cNvPr id="73" name="Gerade Verbindung 72"/>
+          <p:cNvCxnSpPr/>
+          <p:nvPr/>
+        </p:nvCxnSpPr>
+        <p:spPr>
+          <a:xfrm>
+            <a:off x="1763688" y="2462695"/>
+            <a:ext cx="288032" cy="0"/>
+          </a:xfrm>
+          <a:prstGeom prst="line">
+            <a:avLst/>
+          </a:prstGeom>
+          <a:ln w="19050">
+            <a:solidFill>
+              <a:schemeClr val="tx1"/>
+            </a:solidFill>
+            <a:prstDash val="solid"/>
+          </a:ln>
+        </p:spPr>
+        <p:style>
+          <a:lnRef idx="1">
+            <a:schemeClr val="accent1"/>
+          </a:lnRef>
+          <a:fillRef idx="0">
+            <a:schemeClr val="accent1"/>
+          </a:fillRef>
+          <a:effectRef idx="0">
+            <a:schemeClr val="accent1"/>
+          </a:effectRef>
+          <a:fontRef idx="minor">
+            <a:schemeClr val="tx1"/>
+          </a:fontRef>
+        </p:style>
+      </p:cxnSp>
+      <p:cxnSp>
+        <p:nvCxnSpPr>
+          <p:cNvPr id="74" name="Gerade Verbindung 73"/>
+          <p:cNvCxnSpPr/>
+          <p:nvPr/>
+        </p:nvCxnSpPr>
+        <p:spPr>
+          <a:xfrm>
+            <a:off x="1763688" y="2384740"/>
+            <a:ext cx="288032" cy="0"/>
+          </a:xfrm>
+          <a:prstGeom prst="line">
+            <a:avLst/>
+          </a:prstGeom>
+          <a:ln w="19050">
+            <a:solidFill>
+              <a:schemeClr val="tx1"/>
+            </a:solidFill>
+            <a:prstDash val="solid"/>
+          </a:ln>
+        </p:spPr>
+        <p:style>
+          <a:lnRef idx="1">
+            <a:schemeClr val="accent1"/>
+          </a:lnRef>
+          <a:fillRef idx="0">
+            <a:schemeClr val="accent1"/>
+          </a:fillRef>
+          <a:effectRef idx="0">
+            <a:schemeClr val="accent1"/>
+          </a:effectRef>
+          <a:fontRef idx="minor">
+            <a:schemeClr val="tx1"/>
+          </a:fontRef>
+        </p:style>
+      </p:cxnSp>
+      <p:cxnSp>
+        <p:nvCxnSpPr>
+          <p:cNvPr id="76" name="Gerade Verbindung 75"/>
+          <p:cNvCxnSpPr/>
+          <p:nvPr/>
+        </p:nvCxnSpPr>
+        <p:spPr>
+          <a:xfrm>
+            <a:off x="1979712" y="3068960"/>
+            <a:ext cx="432048" cy="0"/>
+          </a:xfrm>
+          <a:prstGeom prst="line">
+            <a:avLst/>
+          </a:prstGeom>
+          <a:ln w="19050">
+            <a:solidFill>
+              <a:schemeClr val="tx1"/>
+            </a:solidFill>
+          </a:ln>
+        </p:spPr>
+        <p:style>
+          <a:lnRef idx="1">
+            <a:schemeClr val="accent1"/>
+          </a:lnRef>
+          <a:fillRef idx="0">
+            <a:schemeClr val="accent1"/>
+          </a:fillRef>
+          <a:effectRef idx="0">
+            <a:schemeClr val="accent1"/>
+          </a:effectRef>
+          <a:fontRef idx="minor">
+            <a:schemeClr val="tx1"/>
+          </a:fontRef>
+        </p:style>
+      </p:cxnSp>
+      <p:cxnSp>
+        <p:nvCxnSpPr>
+          <p:cNvPr id="77" name="Gerade Verbindung 76"/>
+          <p:cNvCxnSpPr/>
+          <p:nvPr/>
+        </p:nvCxnSpPr>
+        <p:spPr>
+          <a:xfrm flipH="1">
+            <a:off x="2051720" y="3140968"/>
+            <a:ext cx="288032" cy="0"/>
+          </a:xfrm>
+          <a:prstGeom prst="line">
+            <a:avLst/>
+          </a:prstGeom>
+          <a:ln w="19050">
+            <a:solidFill>
+              <a:schemeClr val="tx1"/>
+            </a:solidFill>
+          </a:ln>
+        </p:spPr>
+        <p:style>
+          <a:lnRef idx="1">
+            <a:schemeClr val="accent1"/>
+          </a:lnRef>
+          <a:fillRef idx="0">
+            <a:schemeClr val="accent1"/>
+          </a:fillRef>
+          <a:effectRef idx="0">
+            <a:schemeClr val="accent1"/>
+          </a:effectRef>
+          <a:fontRef idx="minor">
+            <a:schemeClr val="tx1"/>
+          </a:fontRef>
+        </p:style>
+      </p:cxnSp>
+      <p:cxnSp>
+        <p:nvCxnSpPr>
+          <p:cNvPr id="78" name="Gerade Verbindung 77"/>
+          <p:cNvCxnSpPr/>
+          <p:nvPr/>
+        </p:nvCxnSpPr>
+        <p:spPr>
+          <a:xfrm flipH="1">
+            <a:off x="2123728" y="3212976"/>
+            <a:ext cx="144016" cy="0"/>
+          </a:xfrm>
+          <a:prstGeom prst="line">
+            <a:avLst/>
+          </a:prstGeom>
+          <a:ln w="19050">
+            <a:solidFill>
+              <a:schemeClr val="tx1"/>
+            </a:solidFill>
+          </a:ln>
+        </p:spPr>
+        <p:style>
+          <a:lnRef idx="1">
+            <a:schemeClr val="accent1"/>
+          </a:lnRef>
+          <a:fillRef idx="0">
+            <a:schemeClr val="accent1"/>
+          </a:fillRef>
+          <a:effectRef idx="0">
+            <a:schemeClr val="accent1"/>
+          </a:effectRef>
+          <a:fontRef idx="minor">
+            <a:schemeClr val="tx1"/>
+          </a:fontRef>
+        </p:style>
+      </p:cxnSp>
+      <p:sp>
+        <p:nvSpPr>
+          <p:cNvPr id="79" name="Textfeld 78"/>
+          <p:cNvSpPr txBox="1"/>
+          <p:nvPr/>
+        </p:nvSpPr>
+        <p:spPr>
+          <a:xfrm>
+            <a:off x="1331640" y="2204864"/>
+            <a:ext cx="429926" cy="369332"/>
+          </a:xfrm>
+          <a:prstGeom prst="rect">
+            <a:avLst/>
+          </a:prstGeom>
+          <a:noFill/>
+        </p:spPr>
+        <p:txBody>
+          <a:bodyPr wrap="none" rtlCol="0">
+            <a:spAutoFit/>
+          </a:bodyPr>
+          <a:lstStyle/>
+          <a:p>
+            <a:r>
+              <a:rPr lang="de-DE" i="1" dirty="0" smtClean="0">
+                <a:latin typeface="Times New Roman" pitchFamily="18" charset="0"/>
+                <a:cs typeface="Times New Roman" pitchFamily="18" charset="0"/>
+              </a:rPr>
+              <a:t>C</a:t>
+            </a:r>
+            <a:r>
+              <a:rPr lang="el-GR" i="1" baseline="-25000" dirty="0" smtClean="0">
+                <a:latin typeface="Times New Roman"/>
+                <a:cs typeface="Times New Roman"/>
+              </a:rPr>
+              <a:t>Σ</a:t>
+            </a:r>
+            <a:endParaRPr lang="de-DE" i="1" baseline="-25000" dirty="0">
+              <a:latin typeface="Times New Roman" pitchFamily="18" charset="0"/>
+              <a:cs typeface="Times New Roman" pitchFamily="18" charset="0"/>
+            </a:endParaRPr>
+          </a:p>
+        </p:txBody>
+      </p:sp>
+      <p:sp>
+        <p:nvSpPr>
+          <p:cNvPr id="80" name="Textfeld 79"/>
+          <p:cNvSpPr txBox="1"/>
+          <p:nvPr/>
+        </p:nvSpPr>
+        <p:spPr>
+          <a:xfrm>
+            <a:off x="2555776" y="2204864"/>
+            <a:ext cx="394660" cy="369332"/>
+          </a:xfrm>
+          <a:prstGeom prst="rect">
+            <a:avLst/>
+          </a:prstGeom>
+          <a:noFill/>
+        </p:spPr>
+        <p:txBody>
+          <a:bodyPr wrap="none" rtlCol="0">
+            <a:spAutoFit/>
+          </a:bodyPr>
+          <a:lstStyle/>
+          <a:p>
+            <a:r>
+              <a:rPr lang="de-DE" i="1" dirty="0" smtClean="0">
+                <a:latin typeface="Times New Roman" pitchFamily="18" charset="0"/>
+                <a:cs typeface="Times New Roman" pitchFamily="18" charset="0"/>
+              </a:rPr>
+              <a:t>E</a:t>
+            </a:r>
+            <a:r>
+              <a:rPr lang="de-DE" i="1" baseline="-25000" dirty="0" smtClean="0">
+                <a:latin typeface="Times New Roman" pitchFamily="18" charset="0"/>
+                <a:cs typeface="Times New Roman" pitchFamily="18" charset="0"/>
+              </a:rPr>
+              <a:t>J</a:t>
+            </a:r>
+            <a:endParaRPr lang="de-DE" i="1" baseline="-25000" dirty="0">
+              <a:latin typeface="Times New Roman" pitchFamily="18" charset="0"/>
+              <a:cs typeface="Times New Roman" pitchFamily="18" charset="0"/>
+            </a:endParaRPr>
+          </a:p>
+        </p:txBody>
+      </p:sp>
+      <p:sp>
+        <p:nvSpPr>
+          <p:cNvPr id="81" name="Textfeld 80"/>
+          <p:cNvSpPr txBox="1"/>
+          <p:nvPr/>
+        </p:nvSpPr>
+        <p:spPr>
+          <a:xfrm>
+            <a:off x="1628637" y="1673913"/>
+            <a:ext cx="415498" cy="369332"/>
+          </a:xfrm>
+          <a:prstGeom prst="rect">
+            <a:avLst/>
+          </a:prstGeom>
+          <a:noFill/>
+        </p:spPr>
+        <p:txBody>
+          <a:bodyPr wrap="none" rtlCol="0">
+            <a:spAutoFit/>
+          </a:bodyPr>
+          <a:lstStyle/>
+          <a:p>
+            <a:r>
+              <a:rPr lang="de-DE" i="1" dirty="0" err="1" smtClean="0">
+                <a:latin typeface="Times New Roman" pitchFamily="18" charset="0"/>
+                <a:cs typeface="Times New Roman" pitchFamily="18" charset="0"/>
+              </a:rPr>
+              <a:t>C</a:t>
+            </a:r>
+            <a:r>
+              <a:rPr lang="de-DE" i="1" u="sng" baseline="-25000" dirty="0" err="1" smtClean="0">
+                <a:latin typeface="Times New Roman" pitchFamily="18" charset="0"/>
+                <a:cs typeface="Times New Roman" pitchFamily="18" charset="0"/>
+              </a:rPr>
+              <a:t>g</a:t>
+            </a:r>
+            <a:endParaRPr lang="de-DE" i="1" u="sng" baseline="-25000" dirty="0">
+              <a:latin typeface="Times New Roman" pitchFamily="18" charset="0"/>
+              <a:cs typeface="Times New Roman" pitchFamily="18" charset="0"/>
+            </a:endParaRPr>
+          </a:p>
+        </p:txBody>
+      </p:sp>
+      <p:sp>
+        <p:nvSpPr>
+          <p:cNvPr id="82" name="Rechteck 81"/>
+          <p:cNvSpPr/>
+          <p:nvPr/>
+        </p:nvSpPr>
+        <p:spPr>
+          <a:xfrm>
+            <a:off x="1763599" y="2393132"/>
+            <a:ext cx="288032" cy="60357"/>
+          </a:xfrm>
+          <a:prstGeom prst="rect">
+            <a:avLst/>
+          </a:prstGeom>
+          <a:solidFill>
+            <a:schemeClr val="bg1"/>
+          </a:solidFill>
+          <a:ln>
+            <a:noFill/>
+          </a:ln>
+        </p:spPr>
+        <p:style>
+          <a:lnRef idx="2">
+            <a:schemeClr val="accent1">
+              <a:shade val="50000"/>
+            </a:schemeClr>
+          </a:lnRef>
+          <a:fillRef idx="1">
+            <a:schemeClr val="accent1"/>
+          </a:fillRef>
+          <a:effectRef idx="0">
+            <a:schemeClr val="accent1"/>
+          </a:effectRef>
+          <a:fontRef idx="minor">
+            <a:schemeClr val="lt1"/>
+          </a:fontRef>
+        </p:style>
+        <p:txBody>
+          <a:bodyPr rtlCol="0" anchor="ctr"/>
+          <a:lstStyle/>
+          <a:p>
+            <a:pPr algn="ctr"/>
+            <a:endParaRPr lang="de-DE"/>
           </a:p>
         </p:txBody>
       </p:sp>

</xml_diff>

<commit_message>
More work on the theory section.
</commit_message>
<xml_diff>
--- a/material/figures/introduction/cooper_pair_box.pptx
+++ b/material/figures/introduction/cooper_pair_box.pptx
@@ -6,8 +6,9 @@
   </p:sldMasterIdLst>
   <p:sldIdLst>
     <p:sldId id="256" r:id="rId2"/>
-    <p:sldId id="257" r:id="rId3"/>
-    <p:sldId id="258" r:id="rId4"/>
+    <p:sldId id="259" r:id="rId3"/>
+    <p:sldId id="257" r:id="rId4"/>
+    <p:sldId id="258" r:id="rId5"/>
   </p:sldIdLst>
   <p:sldSz cx="9144000" cy="6858000" type="screen4x3"/>
   <p:notesSz cx="6858000" cy="9144000"/>
@@ -291,7 +292,7 @@
             <a:fld id="{E233F2FC-336D-4AEC-8E34-B26C5DCCE050}" type="datetimeFigureOut">
               <a:rPr lang="de-DE" smtClean="0"/>
               <a:pPr/>
-              <a:t>11.07.2012</a:t>
+              <a:t>13.07.2012</a:t>
             </a:fld>
             <a:endParaRPr lang="de-DE"/>
           </a:p>
@@ -458,7 +459,7 @@
             <a:fld id="{E233F2FC-336D-4AEC-8E34-B26C5DCCE050}" type="datetimeFigureOut">
               <a:rPr lang="de-DE" smtClean="0"/>
               <a:pPr/>
-              <a:t>11.07.2012</a:t>
+              <a:t>13.07.2012</a:t>
             </a:fld>
             <a:endParaRPr lang="de-DE"/>
           </a:p>
@@ -635,7 +636,7 @@
             <a:fld id="{E233F2FC-336D-4AEC-8E34-B26C5DCCE050}" type="datetimeFigureOut">
               <a:rPr lang="de-DE" smtClean="0"/>
               <a:pPr/>
-              <a:t>11.07.2012</a:t>
+              <a:t>13.07.2012</a:t>
             </a:fld>
             <a:endParaRPr lang="de-DE"/>
           </a:p>
@@ -802,7 +803,7 @@
             <a:fld id="{E233F2FC-336D-4AEC-8E34-B26C5DCCE050}" type="datetimeFigureOut">
               <a:rPr lang="de-DE" smtClean="0"/>
               <a:pPr/>
-              <a:t>11.07.2012</a:t>
+              <a:t>13.07.2012</a:t>
             </a:fld>
             <a:endParaRPr lang="de-DE"/>
           </a:p>
@@ -1045,7 +1046,7 @@
             <a:fld id="{E233F2FC-336D-4AEC-8E34-B26C5DCCE050}" type="datetimeFigureOut">
               <a:rPr lang="de-DE" smtClean="0"/>
               <a:pPr/>
-              <a:t>11.07.2012</a:t>
+              <a:t>13.07.2012</a:t>
             </a:fld>
             <a:endParaRPr lang="de-DE"/>
           </a:p>
@@ -1330,7 +1331,7 @@
             <a:fld id="{E233F2FC-336D-4AEC-8E34-B26C5DCCE050}" type="datetimeFigureOut">
               <a:rPr lang="de-DE" smtClean="0"/>
               <a:pPr/>
-              <a:t>11.07.2012</a:t>
+              <a:t>13.07.2012</a:t>
             </a:fld>
             <a:endParaRPr lang="de-DE"/>
           </a:p>
@@ -1749,7 +1750,7 @@
             <a:fld id="{E233F2FC-336D-4AEC-8E34-B26C5DCCE050}" type="datetimeFigureOut">
               <a:rPr lang="de-DE" smtClean="0"/>
               <a:pPr/>
-              <a:t>11.07.2012</a:t>
+              <a:t>13.07.2012</a:t>
             </a:fld>
             <a:endParaRPr lang="de-DE"/>
           </a:p>
@@ -1864,7 +1865,7 @@
             <a:fld id="{E233F2FC-336D-4AEC-8E34-B26C5DCCE050}" type="datetimeFigureOut">
               <a:rPr lang="de-DE" smtClean="0"/>
               <a:pPr/>
-              <a:t>11.07.2012</a:t>
+              <a:t>13.07.2012</a:t>
             </a:fld>
             <a:endParaRPr lang="de-DE"/>
           </a:p>
@@ -1956,7 +1957,7 @@
             <a:fld id="{E233F2FC-336D-4AEC-8E34-B26C5DCCE050}" type="datetimeFigureOut">
               <a:rPr lang="de-DE" smtClean="0"/>
               <a:pPr/>
-              <a:t>11.07.2012</a:t>
+              <a:t>13.07.2012</a:t>
             </a:fld>
             <a:endParaRPr lang="de-DE"/>
           </a:p>
@@ -2230,7 +2231,7 @@
             <a:fld id="{E233F2FC-336D-4AEC-8E34-B26C5DCCE050}" type="datetimeFigureOut">
               <a:rPr lang="de-DE" smtClean="0"/>
               <a:pPr/>
-              <a:t>11.07.2012</a:t>
+              <a:t>13.07.2012</a:t>
             </a:fld>
             <a:endParaRPr lang="de-DE"/>
           </a:p>
@@ -2480,7 +2481,7 @@
             <a:fld id="{E233F2FC-336D-4AEC-8E34-B26C5DCCE050}" type="datetimeFigureOut">
               <a:rPr lang="de-DE" smtClean="0"/>
               <a:pPr/>
-              <a:t>11.07.2012</a:t>
+              <a:t>13.07.2012</a:t>
             </a:fld>
             <a:endParaRPr lang="de-DE"/>
           </a:p>
@@ -2690,7 +2691,7 @@
             <a:fld id="{E233F2FC-336D-4AEC-8E34-B26C5DCCE050}" type="datetimeFigureOut">
               <a:rPr lang="de-DE" smtClean="0"/>
               <a:pPr/>
-              <a:t>11.07.2012</a:t>
+              <a:t>13.07.2012</a:t>
             </a:fld>
             <a:endParaRPr lang="de-DE"/>
           </a:p>
@@ -6562,6 +6563,4045 @@
       </p:grpSpPr>
       <p:cxnSp>
         <p:nvCxnSpPr>
+          <p:cNvPr id="5" name="Gerade Verbindung 4"/>
+          <p:cNvCxnSpPr/>
+          <p:nvPr/>
+        </p:nvCxnSpPr>
+        <p:spPr>
+          <a:xfrm>
+            <a:off x="2609566" y="1922968"/>
+            <a:ext cx="0" cy="936104"/>
+          </a:xfrm>
+          <a:prstGeom prst="line">
+            <a:avLst/>
+          </a:prstGeom>
+          <a:ln w="19050">
+            <a:solidFill>
+              <a:schemeClr val="tx1"/>
+            </a:solidFill>
+            <a:headEnd type="none" w="med" len="med"/>
+            <a:tailEnd type="none" w="med" len="med"/>
+          </a:ln>
+        </p:spPr>
+        <p:style>
+          <a:lnRef idx="1">
+            <a:schemeClr val="accent1"/>
+          </a:lnRef>
+          <a:fillRef idx="0">
+            <a:schemeClr val="accent1"/>
+          </a:fillRef>
+          <a:effectRef idx="0">
+            <a:schemeClr val="accent1"/>
+          </a:effectRef>
+          <a:fontRef idx="minor">
+            <a:schemeClr val="tx1"/>
+          </a:fontRef>
+        </p:style>
+      </p:cxnSp>
+      <p:grpSp>
+        <p:nvGrpSpPr>
+          <p:cNvPr id="2" name="Gruppieren 21"/>
+          <p:cNvGrpSpPr/>
+          <p:nvPr/>
+        </p:nvGrpSpPr>
+        <p:grpSpPr>
+          <a:xfrm>
+            <a:off x="2502658" y="2318868"/>
+            <a:ext cx="216024" cy="216024"/>
+            <a:chOff x="2771800" y="2348880"/>
+            <a:chExt cx="288032" cy="288032"/>
+          </a:xfrm>
+        </p:grpSpPr>
+        <p:cxnSp>
+          <p:nvCxnSpPr>
+            <p:cNvPr id="23" name="Gerade Verbindung 22"/>
+            <p:cNvCxnSpPr/>
+            <p:nvPr/>
+          </p:nvCxnSpPr>
+          <p:spPr>
+            <a:xfrm>
+              <a:off x="2771800" y="2348880"/>
+              <a:ext cx="288032" cy="288032"/>
+            </a:xfrm>
+            <a:prstGeom prst="line">
+              <a:avLst/>
+            </a:prstGeom>
+            <a:ln w="19050">
+              <a:solidFill>
+                <a:schemeClr val="tx1"/>
+              </a:solidFill>
+            </a:ln>
+          </p:spPr>
+          <p:style>
+            <a:lnRef idx="1">
+              <a:schemeClr val="accent1"/>
+            </a:lnRef>
+            <a:fillRef idx="0">
+              <a:schemeClr val="accent1"/>
+            </a:fillRef>
+            <a:effectRef idx="0">
+              <a:schemeClr val="accent1"/>
+            </a:effectRef>
+            <a:fontRef idx="minor">
+              <a:schemeClr val="tx1"/>
+            </a:fontRef>
+          </p:style>
+        </p:cxnSp>
+        <p:cxnSp>
+          <p:nvCxnSpPr>
+            <p:cNvPr id="24" name="Gerade Verbindung 23"/>
+            <p:cNvCxnSpPr/>
+            <p:nvPr/>
+          </p:nvCxnSpPr>
+          <p:spPr>
+            <a:xfrm flipV="1">
+              <a:off x="2771800" y="2348880"/>
+              <a:ext cx="288032" cy="288032"/>
+            </a:xfrm>
+            <a:prstGeom prst="line">
+              <a:avLst/>
+            </a:prstGeom>
+            <a:ln w="19050">
+              <a:solidFill>
+                <a:schemeClr val="tx1"/>
+              </a:solidFill>
+            </a:ln>
+          </p:spPr>
+          <p:style>
+            <a:lnRef idx="1">
+              <a:schemeClr val="accent1"/>
+            </a:lnRef>
+            <a:fillRef idx="0">
+              <a:schemeClr val="accent1"/>
+            </a:fillRef>
+            <a:effectRef idx="0">
+              <a:schemeClr val="accent1"/>
+            </a:effectRef>
+            <a:fontRef idx="minor">
+              <a:schemeClr val="tx1"/>
+            </a:fontRef>
+          </p:style>
+        </p:cxnSp>
+      </p:grpSp>
+      <p:cxnSp>
+        <p:nvCxnSpPr>
+          <p:cNvPr id="26" name="Gerade Verbindung 25"/>
+          <p:cNvCxnSpPr/>
+          <p:nvPr/>
+        </p:nvCxnSpPr>
+        <p:spPr>
+          <a:xfrm>
+            <a:off x="2465550" y="1922968"/>
+            <a:ext cx="288032" cy="0"/>
+          </a:xfrm>
+          <a:prstGeom prst="line">
+            <a:avLst/>
+          </a:prstGeom>
+          <a:ln w="19050">
+            <a:solidFill>
+              <a:schemeClr val="tx1"/>
+            </a:solidFill>
+          </a:ln>
+        </p:spPr>
+        <p:style>
+          <a:lnRef idx="1">
+            <a:schemeClr val="accent1"/>
+          </a:lnRef>
+          <a:fillRef idx="0">
+            <a:schemeClr val="accent1"/>
+          </a:fillRef>
+          <a:effectRef idx="0">
+            <a:schemeClr val="accent1"/>
+          </a:effectRef>
+          <a:fontRef idx="minor">
+            <a:schemeClr val="tx1"/>
+          </a:fontRef>
+        </p:style>
+      </p:cxnSp>
+      <p:cxnSp>
+        <p:nvCxnSpPr>
+          <p:cNvPr id="27" name="Gerade Verbindung 26"/>
+          <p:cNvCxnSpPr/>
+          <p:nvPr/>
+        </p:nvCxnSpPr>
+        <p:spPr>
+          <a:xfrm>
+            <a:off x="2465550" y="1850960"/>
+            <a:ext cx="288032" cy="0"/>
+          </a:xfrm>
+          <a:prstGeom prst="line">
+            <a:avLst/>
+          </a:prstGeom>
+          <a:ln w="19050">
+            <a:solidFill>
+              <a:schemeClr val="tx1"/>
+            </a:solidFill>
+          </a:ln>
+        </p:spPr>
+        <p:style>
+          <a:lnRef idx="1">
+            <a:schemeClr val="accent1"/>
+          </a:lnRef>
+          <a:fillRef idx="0">
+            <a:schemeClr val="accent1"/>
+          </a:fillRef>
+          <a:effectRef idx="0">
+            <a:schemeClr val="accent1"/>
+          </a:effectRef>
+          <a:fontRef idx="minor">
+            <a:schemeClr val="tx1"/>
+          </a:fontRef>
+        </p:style>
+      </p:cxnSp>
+      <p:cxnSp>
+        <p:nvCxnSpPr>
+          <p:cNvPr id="28" name="Gerade Verbindung 27"/>
+          <p:cNvCxnSpPr/>
+          <p:nvPr/>
+        </p:nvCxnSpPr>
+        <p:spPr>
+          <a:xfrm>
+            <a:off x="3552650" y="1634936"/>
+            <a:ext cx="9416" cy="1227933"/>
+          </a:xfrm>
+          <a:prstGeom prst="line">
+            <a:avLst/>
+          </a:prstGeom>
+          <a:ln w="19050">
+            <a:solidFill>
+              <a:schemeClr val="tx1"/>
+            </a:solidFill>
+            <a:headEnd type="none" w="med" len="med"/>
+            <a:tailEnd type="none" w="med" len="med"/>
+          </a:ln>
+        </p:spPr>
+        <p:style>
+          <a:lnRef idx="1">
+            <a:schemeClr val="accent1"/>
+          </a:lnRef>
+          <a:fillRef idx="0">
+            <a:schemeClr val="accent1"/>
+          </a:fillRef>
+          <a:effectRef idx="0">
+            <a:schemeClr val="accent1"/>
+          </a:effectRef>
+          <a:fontRef idx="minor">
+            <a:schemeClr val="tx1"/>
+          </a:fontRef>
+        </p:style>
+      </p:cxnSp>
+      <p:cxnSp>
+        <p:nvCxnSpPr>
+          <p:cNvPr id="33" name="Gerade Verbindung 32"/>
+          <p:cNvCxnSpPr/>
+          <p:nvPr/>
+        </p:nvCxnSpPr>
+        <p:spPr>
+          <a:xfrm flipV="1">
+            <a:off x="2609566" y="1634936"/>
+            <a:ext cx="0" cy="216024"/>
+          </a:xfrm>
+          <a:prstGeom prst="line">
+            <a:avLst/>
+          </a:prstGeom>
+          <a:ln w="19050">
+            <a:solidFill>
+              <a:schemeClr val="tx1"/>
+            </a:solidFill>
+            <a:tailEnd type="oval"/>
+          </a:ln>
+        </p:spPr>
+        <p:style>
+          <a:lnRef idx="1">
+            <a:schemeClr val="accent1"/>
+          </a:lnRef>
+          <a:fillRef idx="0">
+            <a:schemeClr val="accent1"/>
+          </a:fillRef>
+          <a:effectRef idx="0">
+            <a:schemeClr val="accent1"/>
+          </a:effectRef>
+          <a:fontRef idx="minor">
+            <a:schemeClr val="tx1"/>
+          </a:fontRef>
+        </p:style>
+      </p:cxnSp>
+      <p:sp>
+        <p:nvSpPr>
+          <p:cNvPr id="34" name="Ellipse 33"/>
+          <p:cNvSpPr/>
+          <p:nvPr/>
+        </p:nvSpPr>
+        <p:spPr>
+          <a:xfrm>
+            <a:off x="2904372" y="1454772"/>
+            <a:ext cx="360040" cy="360040"/>
+          </a:xfrm>
+          <a:prstGeom prst="ellipse">
+            <a:avLst/>
+          </a:prstGeom>
+          <a:noFill/>
+          <a:ln w="19050">
+            <a:solidFill>
+              <a:schemeClr val="tx1"/>
+            </a:solidFill>
+          </a:ln>
+        </p:spPr>
+        <p:style>
+          <a:lnRef idx="2">
+            <a:schemeClr val="accent1">
+              <a:shade val="50000"/>
+            </a:schemeClr>
+          </a:lnRef>
+          <a:fillRef idx="1">
+            <a:schemeClr val="accent1"/>
+          </a:fillRef>
+          <a:effectRef idx="0">
+            <a:schemeClr val="accent1"/>
+          </a:effectRef>
+          <a:fontRef idx="minor">
+            <a:schemeClr val="lt1"/>
+          </a:fontRef>
+        </p:style>
+        <p:txBody>
+          <a:bodyPr rtlCol="0" anchor="ctr"/>
+          <a:lstStyle/>
+          <a:p>
+            <a:pPr algn="ctr"/>
+            <a:endParaRPr lang="de-DE" sz="1400" i="1" baseline="-25000" dirty="0">
+              <a:solidFill>
+                <a:schemeClr val="tx1"/>
+              </a:solidFill>
+              <a:latin typeface="Times New Roman" pitchFamily="18" charset="0"/>
+              <a:cs typeface="Times New Roman" pitchFamily="18" charset="0"/>
+            </a:endParaRPr>
+          </a:p>
+        </p:txBody>
+      </p:sp>
+      <p:sp>
+        <p:nvSpPr>
+          <p:cNvPr id="35" name="Rechteck 34"/>
+          <p:cNvSpPr/>
+          <p:nvPr/>
+        </p:nvSpPr>
+        <p:spPr>
+          <a:xfrm>
+            <a:off x="2895549" y="1471175"/>
+            <a:ext cx="352981" cy="307777"/>
+          </a:xfrm>
+          <a:prstGeom prst="rect">
+            <a:avLst/>
+          </a:prstGeom>
+          <a:ln w="19050">
+            <a:noFill/>
+          </a:ln>
+        </p:spPr>
+        <p:txBody>
+          <a:bodyPr wrap="none">
+            <a:spAutoFit/>
+          </a:bodyPr>
+          <a:lstStyle/>
+          <a:p>
+            <a:pPr algn="ctr"/>
+            <a:r>
+              <a:rPr lang="de-DE" sz="1400" i="1" dirty="0" err="1" smtClean="0">
+                <a:solidFill>
+                  <a:schemeClr val="tx1"/>
+                </a:solidFill>
+                <a:latin typeface="Times New Roman" pitchFamily="18" charset="0"/>
+                <a:cs typeface="Times New Roman" pitchFamily="18" charset="0"/>
+              </a:rPr>
+              <a:t>V</a:t>
+            </a:r>
+            <a:r>
+              <a:rPr lang="de-DE" sz="1400" i="1" baseline="-25000" dirty="0" err="1" smtClean="0">
+                <a:solidFill>
+                  <a:schemeClr val="tx1"/>
+                </a:solidFill>
+                <a:latin typeface="Times New Roman" pitchFamily="18" charset="0"/>
+                <a:cs typeface="Times New Roman" pitchFamily="18" charset="0"/>
+              </a:rPr>
+              <a:t>g</a:t>
+            </a:r>
+            <a:endParaRPr lang="de-DE" sz="2000" i="1" baseline="-25000" dirty="0">
+              <a:solidFill>
+                <a:schemeClr val="tx1"/>
+              </a:solidFill>
+              <a:latin typeface="Times New Roman" pitchFamily="18" charset="0"/>
+              <a:cs typeface="Times New Roman" pitchFamily="18" charset="0"/>
+            </a:endParaRPr>
+          </a:p>
+        </p:txBody>
+      </p:sp>
+      <p:cxnSp>
+        <p:nvCxnSpPr>
+          <p:cNvPr id="37" name="Gerade Verbindung 36"/>
+          <p:cNvCxnSpPr/>
+          <p:nvPr/>
+        </p:nvCxnSpPr>
+        <p:spPr>
+          <a:xfrm>
+            <a:off x="2607581" y="1629614"/>
+            <a:ext cx="288032" cy="0"/>
+          </a:xfrm>
+          <a:prstGeom prst="line">
+            <a:avLst/>
+          </a:prstGeom>
+          <a:ln w="19050">
+            <a:solidFill>
+              <a:schemeClr val="tx1"/>
+            </a:solidFill>
+          </a:ln>
+        </p:spPr>
+        <p:style>
+          <a:lnRef idx="1">
+            <a:schemeClr val="accent1"/>
+          </a:lnRef>
+          <a:fillRef idx="0">
+            <a:schemeClr val="accent1"/>
+          </a:fillRef>
+          <a:effectRef idx="0">
+            <a:schemeClr val="accent1"/>
+          </a:effectRef>
+          <a:fontRef idx="minor">
+            <a:schemeClr val="tx1"/>
+          </a:fontRef>
+        </p:style>
+      </p:cxnSp>
+      <p:cxnSp>
+        <p:nvCxnSpPr>
+          <p:cNvPr id="42" name="Gerade Verbindung 41"/>
+          <p:cNvCxnSpPr/>
+          <p:nvPr/>
+        </p:nvCxnSpPr>
+        <p:spPr>
+          <a:xfrm flipH="1">
+            <a:off x="3275856" y="1629614"/>
+            <a:ext cx="288032" cy="0"/>
+          </a:xfrm>
+          <a:prstGeom prst="line">
+            <a:avLst/>
+          </a:prstGeom>
+          <a:ln w="19050">
+            <a:solidFill>
+              <a:schemeClr val="tx1"/>
+            </a:solidFill>
+          </a:ln>
+        </p:spPr>
+        <p:style>
+          <a:lnRef idx="1">
+            <a:schemeClr val="accent1"/>
+          </a:lnRef>
+          <a:fillRef idx="0">
+            <a:schemeClr val="accent1"/>
+          </a:fillRef>
+          <a:effectRef idx="0">
+            <a:schemeClr val="accent1"/>
+          </a:effectRef>
+          <a:fontRef idx="minor">
+            <a:schemeClr val="tx1"/>
+          </a:fontRef>
+        </p:style>
+      </p:cxnSp>
+      <p:cxnSp>
+        <p:nvCxnSpPr>
+          <p:cNvPr id="49" name="Gerade Verbindung 48"/>
+          <p:cNvCxnSpPr/>
+          <p:nvPr/>
+        </p:nvCxnSpPr>
+        <p:spPr>
+          <a:xfrm flipH="1">
+            <a:off x="2177518" y="2138992"/>
+            <a:ext cx="432048" cy="0"/>
+          </a:xfrm>
+          <a:prstGeom prst="line">
+            <a:avLst/>
+          </a:prstGeom>
+          <a:ln w="19050">
+            <a:solidFill>
+              <a:schemeClr val="tx1"/>
+            </a:solidFill>
+            <a:prstDash val="sysDot"/>
+          </a:ln>
+        </p:spPr>
+        <p:style>
+          <a:lnRef idx="1">
+            <a:schemeClr val="accent1"/>
+          </a:lnRef>
+          <a:fillRef idx="0">
+            <a:schemeClr val="accent1"/>
+          </a:fillRef>
+          <a:effectRef idx="0">
+            <a:schemeClr val="accent1"/>
+          </a:effectRef>
+          <a:fontRef idx="minor">
+            <a:schemeClr val="tx1"/>
+          </a:fontRef>
+        </p:style>
+      </p:cxnSp>
+      <p:cxnSp>
+        <p:nvCxnSpPr>
+          <p:cNvPr id="51" name="Gerade Verbindung 50"/>
+          <p:cNvCxnSpPr/>
+          <p:nvPr/>
+        </p:nvCxnSpPr>
+        <p:spPr>
+          <a:xfrm flipH="1">
+            <a:off x="2177518" y="2715056"/>
+            <a:ext cx="432048" cy="0"/>
+          </a:xfrm>
+          <a:prstGeom prst="line">
+            <a:avLst/>
+          </a:prstGeom>
+          <a:ln w="19050">
+            <a:solidFill>
+              <a:schemeClr val="tx1"/>
+            </a:solidFill>
+            <a:prstDash val="sysDot"/>
+          </a:ln>
+        </p:spPr>
+        <p:style>
+          <a:lnRef idx="1">
+            <a:schemeClr val="accent1"/>
+          </a:lnRef>
+          <a:fillRef idx="0">
+            <a:schemeClr val="accent1"/>
+          </a:fillRef>
+          <a:effectRef idx="0">
+            <a:schemeClr val="accent1"/>
+          </a:effectRef>
+          <a:fontRef idx="minor">
+            <a:schemeClr val="tx1"/>
+          </a:fontRef>
+        </p:style>
+      </p:cxnSp>
+      <p:cxnSp>
+        <p:nvCxnSpPr>
+          <p:cNvPr id="55" name="Gerade Verbindung 54"/>
+          <p:cNvCxnSpPr/>
+          <p:nvPr/>
+        </p:nvCxnSpPr>
+        <p:spPr>
+          <a:xfrm>
+            <a:off x="2177518" y="2138992"/>
+            <a:ext cx="0" cy="216024"/>
+          </a:xfrm>
+          <a:prstGeom prst="line">
+            <a:avLst/>
+          </a:prstGeom>
+          <a:ln w="19050">
+            <a:solidFill>
+              <a:schemeClr val="tx1"/>
+            </a:solidFill>
+            <a:prstDash val="sysDot"/>
+          </a:ln>
+        </p:spPr>
+        <p:style>
+          <a:lnRef idx="1">
+            <a:schemeClr val="accent1"/>
+          </a:lnRef>
+          <a:fillRef idx="0">
+            <a:schemeClr val="accent1"/>
+          </a:fillRef>
+          <a:effectRef idx="0">
+            <a:schemeClr val="accent1"/>
+          </a:effectRef>
+          <a:fontRef idx="minor">
+            <a:schemeClr val="tx1"/>
+          </a:fontRef>
+        </p:style>
+      </p:cxnSp>
+      <p:cxnSp>
+        <p:nvCxnSpPr>
+          <p:cNvPr id="56" name="Gerade Verbindung 55"/>
+          <p:cNvCxnSpPr/>
+          <p:nvPr/>
+        </p:nvCxnSpPr>
+        <p:spPr>
+          <a:xfrm>
+            <a:off x="2042467" y="2489779"/>
+            <a:ext cx="288032" cy="0"/>
+          </a:xfrm>
+          <a:prstGeom prst="line">
+            <a:avLst/>
+          </a:prstGeom>
+          <a:ln w="19050">
+            <a:solidFill>
+              <a:schemeClr val="tx1"/>
+            </a:solidFill>
+            <a:prstDash val="solid"/>
+          </a:ln>
+        </p:spPr>
+        <p:style>
+          <a:lnRef idx="1">
+            <a:schemeClr val="accent1"/>
+          </a:lnRef>
+          <a:fillRef idx="0">
+            <a:schemeClr val="accent1"/>
+          </a:fillRef>
+          <a:effectRef idx="0">
+            <a:schemeClr val="accent1"/>
+          </a:effectRef>
+          <a:fontRef idx="minor">
+            <a:schemeClr val="tx1"/>
+          </a:fontRef>
+        </p:style>
+      </p:cxnSp>
+      <p:cxnSp>
+        <p:nvCxnSpPr>
+          <p:cNvPr id="57" name="Gerade Verbindung 56"/>
+          <p:cNvCxnSpPr/>
+          <p:nvPr/>
+        </p:nvCxnSpPr>
+        <p:spPr>
+          <a:xfrm>
+            <a:off x="2042467" y="2381911"/>
+            <a:ext cx="288032" cy="0"/>
+          </a:xfrm>
+          <a:prstGeom prst="line">
+            <a:avLst/>
+          </a:prstGeom>
+          <a:ln w="19050">
+            <a:solidFill>
+              <a:schemeClr val="tx1"/>
+            </a:solidFill>
+            <a:prstDash val="solid"/>
+          </a:ln>
+        </p:spPr>
+        <p:style>
+          <a:lnRef idx="1">
+            <a:schemeClr val="accent1"/>
+          </a:lnRef>
+          <a:fillRef idx="0">
+            <a:schemeClr val="accent1"/>
+          </a:fillRef>
+          <a:effectRef idx="0">
+            <a:schemeClr val="accent1"/>
+          </a:effectRef>
+          <a:fontRef idx="minor">
+            <a:schemeClr val="tx1"/>
+          </a:fontRef>
+        </p:style>
+      </p:cxnSp>
+      <p:cxnSp>
+        <p:nvCxnSpPr>
+          <p:cNvPr id="58" name="Gerade Verbindung 57"/>
+          <p:cNvCxnSpPr/>
+          <p:nvPr/>
+        </p:nvCxnSpPr>
+        <p:spPr>
+          <a:xfrm>
+            <a:off x="2177518" y="2499032"/>
+            <a:ext cx="0" cy="216024"/>
+          </a:xfrm>
+          <a:prstGeom prst="line">
+            <a:avLst/>
+          </a:prstGeom>
+          <a:ln w="19050">
+            <a:solidFill>
+              <a:schemeClr val="tx1"/>
+            </a:solidFill>
+            <a:prstDash val="sysDot"/>
+          </a:ln>
+        </p:spPr>
+        <p:style>
+          <a:lnRef idx="1">
+            <a:schemeClr val="accent1"/>
+          </a:lnRef>
+          <a:fillRef idx="0">
+            <a:schemeClr val="accent1"/>
+          </a:fillRef>
+          <a:effectRef idx="0">
+            <a:schemeClr val="accent1"/>
+          </a:effectRef>
+          <a:fontRef idx="minor">
+            <a:schemeClr val="tx1"/>
+          </a:fontRef>
+        </p:style>
+      </p:cxnSp>
+      <p:cxnSp>
+        <p:nvCxnSpPr>
+          <p:cNvPr id="62" name="Gerade Verbindung 61"/>
+          <p:cNvCxnSpPr/>
+          <p:nvPr/>
+        </p:nvCxnSpPr>
+        <p:spPr>
+          <a:xfrm>
+            <a:off x="2897598" y="3075096"/>
+            <a:ext cx="432048" cy="0"/>
+          </a:xfrm>
+          <a:prstGeom prst="line">
+            <a:avLst/>
+          </a:prstGeom>
+          <a:ln w="19050">
+            <a:solidFill>
+              <a:schemeClr val="tx1"/>
+            </a:solidFill>
+          </a:ln>
+        </p:spPr>
+        <p:style>
+          <a:lnRef idx="1">
+            <a:schemeClr val="accent1"/>
+          </a:lnRef>
+          <a:fillRef idx="0">
+            <a:schemeClr val="accent1"/>
+          </a:fillRef>
+          <a:effectRef idx="0">
+            <a:schemeClr val="accent1"/>
+          </a:effectRef>
+          <a:fontRef idx="minor">
+            <a:schemeClr val="tx1"/>
+          </a:fontRef>
+        </p:style>
+      </p:cxnSp>
+      <p:cxnSp>
+        <p:nvCxnSpPr>
+          <p:cNvPr id="63" name="Gerade Verbindung 62"/>
+          <p:cNvCxnSpPr/>
+          <p:nvPr/>
+        </p:nvCxnSpPr>
+        <p:spPr>
+          <a:xfrm flipH="1">
+            <a:off x="2969606" y="3147104"/>
+            <a:ext cx="288032" cy="0"/>
+          </a:xfrm>
+          <a:prstGeom prst="line">
+            <a:avLst/>
+          </a:prstGeom>
+          <a:ln w="19050">
+            <a:solidFill>
+              <a:schemeClr val="tx1"/>
+            </a:solidFill>
+          </a:ln>
+        </p:spPr>
+        <p:style>
+          <a:lnRef idx="1">
+            <a:schemeClr val="accent1"/>
+          </a:lnRef>
+          <a:fillRef idx="0">
+            <a:schemeClr val="accent1"/>
+          </a:fillRef>
+          <a:effectRef idx="0">
+            <a:schemeClr val="accent1"/>
+          </a:effectRef>
+          <a:fontRef idx="minor">
+            <a:schemeClr val="tx1"/>
+          </a:fontRef>
+        </p:style>
+      </p:cxnSp>
+      <p:cxnSp>
+        <p:nvCxnSpPr>
+          <p:cNvPr id="64" name="Gerade Verbindung 63"/>
+          <p:cNvCxnSpPr/>
+          <p:nvPr/>
+        </p:nvCxnSpPr>
+        <p:spPr>
+          <a:xfrm flipH="1">
+            <a:off x="3041614" y="3219112"/>
+            <a:ext cx="144016" cy="0"/>
+          </a:xfrm>
+          <a:prstGeom prst="line">
+            <a:avLst/>
+          </a:prstGeom>
+          <a:ln w="19050">
+            <a:solidFill>
+              <a:schemeClr val="tx1"/>
+            </a:solidFill>
+          </a:ln>
+        </p:spPr>
+        <p:style>
+          <a:lnRef idx="1">
+            <a:schemeClr val="accent1"/>
+          </a:lnRef>
+          <a:fillRef idx="0">
+            <a:schemeClr val="accent1"/>
+          </a:fillRef>
+          <a:effectRef idx="0">
+            <a:schemeClr val="accent1"/>
+          </a:effectRef>
+          <a:fontRef idx="minor">
+            <a:schemeClr val="tx1"/>
+          </a:fontRef>
+        </p:style>
+      </p:cxnSp>
+      <p:sp>
+        <p:nvSpPr>
+          <p:cNvPr id="32" name="Textfeld 31"/>
+          <p:cNvSpPr txBox="1"/>
+          <p:nvPr/>
+        </p:nvSpPr>
+        <p:spPr>
+          <a:xfrm>
+            <a:off x="6300192" y="2226350"/>
+            <a:ext cx="429926" cy="369332"/>
+          </a:xfrm>
+          <a:prstGeom prst="rect">
+            <a:avLst/>
+          </a:prstGeom>
+          <a:noFill/>
+        </p:spPr>
+        <p:txBody>
+          <a:bodyPr wrap="none" rtlCol="0">
+            <a:spAutoFit/>
+          </a:bodyPr>
+          <a:lstStyle/>
+          <a:p>
+            <a:r>
+              <a:rPr lang="de-DE" i="1" dirty="0" smtClean="0">
+                <a:latin typeface="Times New Roman" pitchFamily="18" charset="0"/>
+                <a:cs typeface="Times New Roman" pitchFamily="18" charset="0"/>
+              </a:rPr>
+              <a:t>C</a:t>
+            </a:r>
+            <a:r>
+              <a:rPr lang="el-GR" i="1" baseline="-25000" dirty="0" smtClean="0">
+                <a:latin typeface="Times New Roman"/>
+                <a:cs typeface="Times New Roman"/>
+              </a:rPr>
+              <a:t>Σ</a:t>
+            </a:r>
+            <a:endParaRPr lang="de-DE" i="1" baseline="-25000" dirty="0">
+              <a:latin typeface="Times New Roman" pitchFamily="18" charset="0"/>
+              <a:cs typeface="Times New Roman" pitchFamily="18" charset="0"/>
+            </a:endParaRPr>
+          </a:p>
+        </p:txBody>
+      </p:sp>
+      <p:sp>
+        <p:nvSpPr>
+          <p:cNvPr id="36" name="Textfeld 35"/>
+          <p:cNvSpPr txBox="1"/>
+          <p:nvPr/>
+        </p:nvSpPr>
+        <p:spPr>
+          <a:xfrm>
+            <a:off x="2725662" y="2224960"/>
+            <a:ext cx="394660" cy="369332"/>
+          </a:xfrm>
+          <a:prstGeom prst="rect">
+            <a:avLst/>
+          </a:prstGeom>
+          <a:noFill/>
+        </p:spPr>
+        <p:txBody>
+          <a:bodyPr wrap="none" rtlCol="0">
+            <a:spAutoFit/>
+          </a:bodyPr>
+          <a:lstStyle/>
+          <a:p>
+            <a:r>
+              <a:rPr lang="de-DE" i="1" dirty="0" smtClean="0">
+                <a:latin typeface="Times New Roman" pitchFamily="18" charset="0"/>
+                <a:cs typeface="Times New Roman" pitchFamily="18" charset="0"/>
+              </a:rPr>
+              <a:t>E</a:t>
+            </a:r>
+            <a:r>
+              <a:rPr lang="de-DE" i="1" baseline="-25000" dirty="0" smtClean="0">
+                <a:latin typeface="Times New Roman" pitchFamily="18" charset="0"/>
+                <a:cs typeface="Times New Roman" pitchFamily="18" charset="0"/>
+              </a:rPr>
+              <a:t>J</a:t>
+            </a:r>
+            <a:endParaRPr lang="de-DE" i="1" baseline="-25000" dirty="0">
+              <a:latin typeface="Times New Roman" pitchFamily="18" charset="0"/>
+              <a:cs typeface="Times New Roman" pitchFamily="18" charset="0"/>
+            </a:endParaRPr>
+          </a:p>
+        </p:txBody>
+      </p:sp>
+      <p:sp>
+        <p:nvSpPr>
+          <p:cNvPr id="38" name="Textfeld 37"/>
+          <p:cNvSpPr txBox="1"/>
+          <p:nvPr/>
+        </p:nvSpPr>
+        <p:spPr>
+          <a:xfrm>
+            <a:off x="2042467" y="1680049"/>
+            <a:ext cx="415498" cy="369332"/>
+          </a:xfrm>
+          <a:prstGeom prst="rect">
+            <a:avLst/>
+          </a:prstGeom>
+          <a:noFill/>
+        </p:spPr>
+        <p:txBody>
+          <a:bodyPr wrap="none" rtlCol="0">
+            <a:spAutoFit/>
+          </a:bodyPr>
+          <a:lstStyle/>
+          <a:p>
+            <a:r>
+              <a:rPr lang="de-DE" i="1" dirty="0" err="1" smtClean="0">
+                <a:latin typeface="Times New Roman" pitchFamily="18" charset="0"/>
+                <a:cs typeface="Times New Roman" pitchFamily="18" charset="0"/>
+              </a:rPr>
+              <a:t>C</a:t>
+            </a:r>
+            <a:r>
+              <a:rPr lang="de-DE" i="1" baseline="-25000" dirty="0" err="1" smtClean="0">
+                <a:latin typeface="Times New Roman" pitchFamily="18" charset="0"/>
+                <a:cs typeface="Times New Roman" pitchFamily="18" charset="0"/>
+              </a:rPr>
+              <a:t>g</a:t>
+            </a:r>
+            <a:endParaRPr lang="de-DE" i="1" baseline="-25000" dirty="0">
+              <a:latin typeface="Times New Roman" pitchFamily="18" charset="0"/>
+              <a:cs typeface="Times New Roman" pitchFamily="18" charset="0"/>
+            </a:endParaRPr>
+          </a:p>
+        </p:txBody>
+      </p:sp>
+      <p:cxnSp>
+        <p:nvCxnSpPr>
+          <p:cNvPr id="39" name="Gerade Verbindung 38"/>
+          <p:cNvCxnSpPr/>
+          <p:nvPr/>
+        </p:nvCxnSpPr>
+        <p:spPr>
+          <a:xfrm>
+            <a:off x="5076056" y="1916832"/>
+            <a:ext cx="0" cy="216024"/>
+          </a:xfrm>
+          <a:prstGeom prst="line">
+            <a:avLst/>
+          </a:prstGeom>
+          <a:ln w="19050">
+            <a:solidFill>
+              <a:schemeClr val="tx1"/>
+            </a:solidFill>
+            <a:tailEnd type="oval"/>
+          </a:ln>
+        </p:spPr>
+        <p:style>
+          <a:lnRef idx="1">
+            <a:schemeClr val="accent1"/>
+          </a:lnRef>
+          <a:fillRef idx="0">
+            <a:schemeClr val="accent1"/>
+          </a:fillRef>
+          <a:effectRef idx="0">
+            <a:schemeClr val="accent1"/>
+          </a:effectRef>
+          <a:fontRef idx="minor">
+            <a:schemeClr val="tx1"/>
+          </a:fontRef>
+        </p:style>
+      </p:cxnSp>
+      <p:sp>
+        <p:nvSpPr>
+          <p:cNvPr id="40" name="Rechteck 39"/>
+          <p:cNvSpPr/>
+          <p:nvPr/>
+        </p:nvSpPr>
+        <p:spPr>
+          <a:xfrm>
+            <a:off x="4788024" y="2132856"/>
+            <a:ext cx="576064" cy="576064"/>
+          </a:xfrm>
+          <a:prstGeom prst="rect">
+            <a:avLst/>
+          </a:prstGeom>
+          <a:noFill/>
+          <a:ln w="19050">
+            <a:solidFill>
+              <a:schemeClr val="tx1"/>
+            </a:solidFill>
+          </a:ln>
+        </p:spPr>
+        <p:style>
+          <a:lnRef idx="2">
+            <a:schemeClr val="accent1">
+              <a:shade val="50000"/>
+            </a:schemeClr>
+          </a:lnRef>
+          <a:fillRef idx="1">
+            <a:schemeClr val="accent1"/>
+          </a:fillRef>
+          <a:effectRef idx="0">
+            <a:schemeClr val="accent1"/>
+          </a:effectRef>
+          <a:fontRef idx="minor">
+            <a:schemeClr val="lt1"/>
+          </a:fontRef>
+        </p:style>
+        <p:txBody>
+          <a:bodyPr rtlCol="0" anchor="ctr"/>
+          <a:lstStyle/>
+          <a:p>
+            <a:pPr algn="ctr"/>
+            <a:endParaRPr lang="de-DE"/>
+          </a:p>
+        </p:txBody>
+      </p:sp>
+      <p:grpSp>
+        <p:nvGrpSpPr>
+          <p:cNvPr id="3" name="Gruppieren 42"/>
+          <p:cNvGrpSpPr/>
+          <p:nvPr/>
+        </p:nvGrpSpPr>
+        <p:grpSpPr>
+          <a:xfrm>
+            <a:off x="5255932" y="2312732"/>
+            <a:ext cx="216024" cy="216024"/>
+            <a:chOff x="2771800" y="2348880"/>
+            <a:chExt cx="288032" cy="288032"/>
+          </a:xfrm>
+        </p:grpSpPr>
+        <p:cxnSp>
+          <p:nvCxnSpPr>
+            <p:cNvPr id="44" name="Gerade Verbindung 43"/>
+            <p:cNvCxnSpPr/>
+            <p:nvPr/>
+          </p:nvCxnSpPr>
+          <p:spPr>
+            <a:xfrm>
+              <a:off x="2771800" y="2348880"/>
+              <a:ext cx="288032" cy="288032"/>
+            </a:xfrm>
+            <a:prstGeom prst="line">
+              <a:avLst/>
+            </a:prstGeom>
+            <a:ln w="19050">
+              <a:solidFill>
+                <a:schemeClr val="tx1"/>
+              </a:solidFill>
+            </a:ln>
+          </p:spPr>
+          <p:style>
+            <a:lnRef idx="1">
+              <a:schemeClr val="accent1"/>
+            </a:lnRef>
+            <a:fillRef idx="0">
+              <a:schemeClr val="accent1"/>
+            </a:fillRef>
+            <a:effectRef idx="0">
+              <a:schemeClr val="accent1"/>
+            </a:effectRef>
+            <a:fontRef idx="minor">
+              <a:schemeClr val="tx1"/>
+            </a:fontRef>
+          </p:style>
+        </p:cxnSp>
+        <p:cxnSp>
+          <p:nvCxnSpPr>
+            <p:cNvPr id="45" name="Gerade Verbindung 44"/>
+            <p:cNvCxnSpPr/>
+            <p:nvPr/>
+          </p:nvCxnSpPr>
+          <p:spPr>
+            <a:xfrm flipV="1">
+              <a:off x="2771800" y="2348880"/>
+              <a:ext cx="288032" cy="288032"/>
+            </a:xfrm>
+            <a:prstGeom prst="line">
+              <a:avLst/>
+            </a:prstGeom>
+            <a:ln w="19050">
+              <a:solidFill>
+                <a:schemeClr val="tx1"/>
+              </a:solidFill>
+            </a:ln>
+          </p:spPr>
+          <p:style>
+            <a:lnRef idx="1">
+              <a:schemeClr val="accent1"/>
+            </a:lnRef>
+            <a:fillRef idx="0">
+              <a:schemeClr val="accent1"/>
+            </a:fillRef>
+            <a:effectRef idx="0">
+              <a:schemeClr val="accent1"/>
+            </a:effectRef>
+            <a:fontRef idx="minor">
+              <a:schemeClr val="tx1"/>
+            </a:fontRef>
+          </p:style>
+        </p:cxnSp>
+      </p:grpSp>
+      <p:grpSp>
+        <p:nvGrpSpPr>
+          <p:cNvPr id="4" name="Gruppieren 45"/>
+          <p:cNvGrpSpPr/>
+          <p:nvPr/>
+        </p:nvGrpSpPr>
+        <p:grpSpPr>
+          <a:xfrm>
+            <a:off x="4679868" y="2312732"/>
+            <a:ext cx="216024" cy="216024"/>
+            <a:chOff x="2771800" y="2348880"/>
+            <a:chExt cx="288032" cy="288032"/>
+          </a:xfrm>
+        </p:grpSpPr>
+        <p:cxnSp>
+          <p:nvCxnSpPr>
+            <p:cNvPr id="47" name="Gerade Verbindung 46"/>
+            <p:cNvCxnSpPr/>
+            <p:nvPr/>
+          </p:nvCxnSpPr>
+          <p:spPr>
+            <a:xfrm>
+              <a:off x="2771800" y="2348880"/>
+              <a:ext cx="288032" cy="288032"/>
+            </a:xfrm>
+            <a:prstGeom prst="line">
+              <a:avLst/>
+            </a:prstGeom>
+            <a:ln w="19050">
+              <a:solidFill>
+                <a:schemeClr val="tx1"/>
+              </a:solidFill>
+            </a:ln>
+          </p:spPr>
+          <p:style>
+            <a:lnRef idx="1">
+              <a:schemeClr val="accent1"/>
+            </a:lnRef>
+            <a:fillRef idx="0">
+              <a:schemeClr val="accent1"/>
+            </a:fillRef>
+            <a:effectRef idx="0">
+              <a:schemeClr val="accent1"/>
+            </a:effectRef>
+            <a:fontRef idx="minor">
+              <a:schemeClr val="tx1"/>
+            </a:fontRef>
+          </p:style>
+        </p:cxnSp>
+        <p:cxnSp>
+          <p:nvCxnSpPr>
+            <p:cNvPr id="48" name="Gerade Verbindung 47"/>
+            <p:cNvCxnSpPr/>
+            <p:nvPr/>
+          </p:nvCxnSpPr>
+          <p:spPr>
+            <a:xfrm flipV="1">
+              <a:off x="2771800" y="2348880"/>
+              <a:ext cx="288032" cy="288032"/>
+            </a:xfrm>
+            <a:prstGeom prst="line">
+              <a:avLst/>
+            </a:prstGeom>
+            <a:ln w="19050">
+              <a:solidFill>
+                <a:schemeClr val="tx1"/>
+              </a:solidFill>
+            </a:ln>
+          </p:spPr>
+          <p:style>
+            <a:lnRef idx="1">
+              <a:schemeClr val="accent1"/>
+            </a:lnRef>
+            <a:fillRef idx="0">
+              <a:schemeClr val="accent1"/>
+            </a:fillRef>
+            <a:effectRef idx="0">
+              <a:schemeClr val="accent1"/>
+            </a:effectRef>
+            <a:fontRef idx="minor">
+              <a:schemeClr val="tx1"/>
+            </a:fontRef>
+          </p:style>
+        </p:cxnSp>
+      </p:grpSp>
+      <p:cxnSp>
+        <p:nvCxnSpPr>
+          <p:cNvPr id="50" name="Gerade Verbindung 49"/>
+          <p:cNvCxnSpPr/>
+          <p:nvPr/>
+        </p:nvCxnSpPr>
+        <p:spPr>
+          <a:xfrm>
+            <a:off x="4932040" y="1916832"/>
+            <a:ext cx="288032" cy="0"/>
+          </a:xfrm>
+          <a:prstGeom prst="line">
+            <a:avLst/>
+          </a:prstGeom>
+          <a:ln w="19050">
+            <a:solidFill>
+              <a:schemeClr val="tx1"/>
+            </a:solidFill>
+          </a:ln>
+        </p:spPr>
+        <p:style>
+          <a:lnRef idx="1">
+            <a:schemeClr val="accent1"/>
+          </a:lnRef>
+          <a:fillRef idx="0">
+            <a:schemeClr val="accent1"/>
+          </a:fillRef>
+          <a:effectRef idx="0">
+            <a:schemeClr val="accent1"/>
+          </a:effectRef>
+          <a:fontRef idx="minor">
+            <a:schemeClr val="tx1"/>
+          </a:fontRef>
+        </p:style>
+      </p:cxnSp>
+      <p:cxnSp>
+        <p:nvCxnSpPr>
+          <p:cNvPr id="52" name="Gerade Verbindung 51"/>
+          <p:cNvCxnSpPr/>
+          <p:nvPr/>
+        </p:nvCxnSpPr>
+        <p:spPr>
+          <a:xfrm>
+            <a:off x="4932040" y="1844824"/>
+            <a:ext cx="288032" cy="0"/>
+          </a:xfrm>
+          <a:prstGeom prst="line">
+            <a:avLst/>
+          </a:prstGeom>
+          <a:ln w="19050">
+            <a:solidFill>
+              <a:schemeClr val="tx1"/>
+            </a:solidFill>
+          </a:ln>
+        </p:spPr>
+        <p:style>
+          <a:lnRef idx="1">
+            <a:schemeClr val="accent1"/>
+          </a:lnRef>
+          <a:fillRef idx="0">
+            <a:schemeClr val="accent1"/>
+          </a:fillRef>
+          <a:effectRef idx="0">
+            <a:schemeClr val="accent1"/>
+          </a:effectRef>
+          <a:fontRef idx="minor">
+            <a:schemeClr val="tx1"/>
+          </a:fontRef>
+        </p:style>
+      </p:cxnSp>
+      <p:cxnSp>
+        <p:nvCxnSpPr>
+          <p:cNvPr id="53" name="Gerade Verbindung 52"/>
+          <p:cNvCxnSpPr/>
+          <p:nvPr/>
+        </p:nvCxnSpPr>
+        <p:spPr>
+          <a:xfrm>
+            <a:off x="6012160" y="1628800"/>
+            <a:ext cx="0" cy="1296144"/>
+          </a:xfrm>
+          <a:prstGeom prst="line">
+            <a:avLst/>
+          </a:prstGeom>
+          <a:ln w="19050">
+            <a:solidFill>
+              <a:schemeClr val="tx1"/>
+            </a:solidFill>
+            <a:headEnd type="none" w="med" len="med"/>
+            <a:tailEnd type="none" w="med" len="med"/>
+          </a:ln>
+        </p:spPr>
+        <p:style>
+          <a:lnRef idx="1">
+            <a:schemeClr val="accent1"/>
+          </a:lnRef>
+          <a:fillRef idx="0">
+            <a:schemeClr val="accent1"/>
+          </a:fillRef>
+          <a:effectRef idx="0">
+            <a:schemeClr val="accent1"/>
+          </a:effectRef>
+          <a:fontRef idx="minor">
+            <a:schemeClr val="tx1"/>
+          </a:fontRef>
+        </p:style>
+      </p:cxnSp>
+      <p:cxnSp>
+        <p:nvCxnSpPr>
+          <p:cNvPr id="61" name="Gerade Verbindung 60"/>
+          <p:cNvCxnSpPr/>
+          <p:nvPr/>
+        </p:nvCxnSpPr>
+        <p:spPr>
+          <a:xfrm flipV="1">
+            <a:off x="5076056" y="1628800"/>
+            <a:ext cx="0" cy="216024"/>
+          </a:xfrm>
+          <a:prstGeom prst="line">
+            <a:avLst/>
+          </a:prstGeom>
+          <a:ln w="19050">
+            <a:solidFill>
+              <a:schemeClr val="tx1"/>
+            </a:solidFill>
+            <a:tailEnd type="oval"/>
+          </a:ln>
+        </p:spPr>
+        <p:style>
+          <a:lnRef idx="1">
+            <a:schemeClr val="accent1"/>
+          </a:lnRef>
+          <a:fillRef idx="0">
+            <a:schemeClr val="accent1"/>
+          </a:fillRef>
+          <a:effectRef idx="0">
+            <a:schemeClr val="accent1"/>
+          </a:effectRef>
+          <a:fontRef idx="minor">
+            <a:schemeClr val="tx1"/>
+          </a:fontRef>
+        </p:style>
+      </p:cxnSp>
+      <p:sp>
+        <p:nvSpPr>
+          <p:cNvPr id="65" name="Ellipse 64"/>
+          <p:cNvSpPr/>
+          <p:nvPr/>
+        </p:nvSpPr>
+        <p:spPr>
+          <a:xfrm>
+            <a:off x="5370862" y="1448636"/>
+            <a:ext cx="360040" cy="360040"/>
+          </a:xfrm>
+          <a:prstGeom prst="ellipse">
+            <a:avLst/>
+          </a:prstGeom>
+          <a:noFill/>
+          <a:ln w="19050">
+            <a:solidFill>
+              <a:schemeClr val="tx1"/>
+            </a:solidFill>
+          </a:ln>
+        </p:spPr>
+        <p:style>
+          <a:lnRef idx="2">
+            <a:schemeClr val="accent1">
+              <a:shade val="50000"/>
+            </a:schemeClr>
+          </a:lnRef>
+          <a:fillRef idx="1">
+            <a:schemeClr val="accent1"/>
+          </a:fillRef>
+          <a:effectRef idx="0">
+            <a:schemeClr val="accent1"/>
+          </a:effectRef>
+          <a:fontRef idx="minor">
+            <a:schemeClr val="lt1"/>
+          </a:fontRef>
+        </p:style>
+        <p:txBody>
+          <a:bodyPr rtlCol="0" anchor="ctr"/>
+          <a:lstStyle/>
+          <a:p>
+            <a:pPr algn="ctr"/>
+            <a:endParaRPr lang="de-DE" sz="1400" i="1" baseline="-25000" dirty="0">
+              <a:solidFill>
+                <a:schemeClr val="tx1"/>
+              </a:solidFill>
+              <a:latin typeface="Times New Roman" pitchFamily="18" charset="0"/>
+              <a:cs typeface="Times New Roman" pitchFamily="18" charset="0"/>
+            </a:endParaRPr>
+          </a:p>
+        </p:txBody>
+      </p:sp>
+      <p:sp>
+        <p:nvSpPr>
+          <p:cNvPr id="66" name="Rechteck 65"/>
+          <p:cNvSpPr/>
+          <p:nvPr/>
+        </p:nvSpPr>
+        <p:spPr>
+          <a:xfrm>
+            <a:off x="5362039" y="1465039"/>
+            <a:ext cx="352981" cy="307777"/>
+          </a:xfrm>
+          <a:prstGeom prst="rect">
+            <a:avLst/>
+          </a:prstGeom>
+          <a:ln w="19050">
+            <a:noFill/>
+          </a:ln>
+        </p:spPr>
+        <p:txBody>
+          <a:bodyPr wrap="none">
+            <a:spAutoFit/>
+          </a:bodyPr>
+          <a:lstStyle/>
+          <a:p>
+            <a:pPr algn="ctr"/>
+            <a:r>
+              <a:rPr lang="de-DE" sz="1400" i="1" dirty="0" err="1" smtClean="0">
+                <a:solidFill>
+                  <a:schemeClr val="tx1"/>
+                </a:solidFill>
+                <a:latin typeface="Times New Roman" pitchFamily="18" charset="0"/>
+                <a:cs typeface="Times New Roman" pitchFamily="18" charset="0"/>
+              </a:rPr>
+              <a:t>V</a:t>
+            </a:r>
+            <a:r>
+              <a:rPr lang="de-DE" sz="1400" i="1" baseline="-25000" dirty="0" err="1" smtClean="0">
+                <a:solidFill>
+                  <a:schemeClr val="tx1"/>
+                </a:solidFill>
+                <a:latin typeface="Times New Roman" pitchFamily="18" charset="0"/>
+                <a:cs typeface="Times New Roman" pitchFamily="18" charset="0"/>
+              </a:rPr>
+              <a:t>g</a:t>
+            </a:r>
+            <a:endParaRPr lang="de-DE" sz="2000" i="1" baseline="-25000" dirty="0">
+              <a:solidFill>
+                <a:schemeClr val="tx1"/>
+              </a:solidFill>
+              <a:latin typeface="Times New Roman" pitchFamily="18" charset="0"/>
+              <a:cs typeface="Times New Roman" pitchFamily="18" charset="0"/>
+            </a:endParaRPr>
+          </a:p>
+        </p:txBody>
+      </p:sp>
+      <p:cxnSp>
+        <p:nvCxnSpPr>
+          <p:cNvPr id="67" name="Gerade Verbindung 66"/>
+          <p:cNvCxnSpPr/>
+          <p:nvPr/>
+        </p:nvCxnSpPr>
+        <p:spPr>
+          <a:xfrm>
+            <a:off x="5067091" y="1623478"/>
+            <a:ext cx="288032" cy="0"/>
+          </a:xfrm>
+          <a:prstGeom prst="line">
+            <a:avLst/>
+          </a:prstGeom>
+          <a:ln w="19050">
+            <a:solidFill>
+              <a:schemeClr val="tx1"/>
+            </a:solidFill>
+          </a:ln>
+        </p:spPr>
+        <p:style>
+          <a:lnRef idx="1">
+            <a:schemeClr val="accent1"/>
+          </a:lnRef>
+          <a:fillRef idx="0">
+            <a:schemeClr val="accent1"/>
+          </a:fillRef>
+          <a:effectRef idx="0">
+            <a:schemeClr val="accent1"/>
+          </a:effectRef>
+          <a:fontRef idx="minor">
+            <a:schemeClr val="tx1"/>
+          </a:fontRef>
+        </p:style>
+      </p:cxnSp>
+      <p:cxnSp>
+        <p:nvCxnSpPr>
+          <p:cNvPr id="68" name="Gerade Verbindung 67"/>
+          <p:cNvCxnSpPr>
+            <a:endCxn id="65" idx="6"/>
+          </p:cNvCxnSpPr>
+          <p:nvPr/>
+        </p:nvCxnSpPr>
+        <p:spPr>
+          <a:xfrm flipH="1" flipV="1">
+            <a:off x="5730902" y="1628656"/>
+            <a:ext cx="281258" cy="144"/>
+          </a:xfrm>
+          <a:prstGeom prst="line">
+            <a:avLst/>
+          </a:prstGeom>
+          <a:ln w="19050">
+            <a:solidFill>
+              <a:schemeClr val="tx1"/>
+            </a:solidFill>
+          </a:ln>
+        </p:spPr>
+        <p:style>
+          <a:lnRef idx="1">
+            <a:schemeClr val="accent1"/>
+          </a:lnRef>
+          <a:fillRef idx="0">
+            <a:schemeClr val="accent1"/>
+          </a:fillRef>
+          <a:effectRef idx="0">
+            <a:schemeClr val="accent1"/>
+          </a:effectRef>
+          <a:fontRef idx="minor">
+            <a:schemeClr val="tx1"/>
+          </a:fontRef>
+        </p:style>
+      </p:cxnSp>
+      <p:cxnSp>
+        <p:nvCxnSpPr>
+          <p:cNvPr id="69" name="Gerade Verbindung 68"/>
+          <p:cNvCxnSpPr/>
+          <p:nvPr/>
+        </p:nvCxnSpPr>
+        <p:spPr>
+          <a:xfrm flipH="1">
+            <a:off x="4355976" y="2132856"/>
+            <a:ext cx="432048" cy="0"/>
+          </a:xfrm>
+          <a:prstGeom prst="line">
+            <a:avLst/>
+          </a:prstGeom>
+          <a:ln w="19050">
+            <a:solidFill>
+              <a:schemeClr val="tx1"/>
+            </a:solidFill>
+            <a:prstDash val="sysDot"/>
+          </a:ln>
+        </p:spPr>
+        <p:style>
+          <a:lnRef idx="1">
+            <a:schemeClr val="accent1"/>
+          </a:lnRef>
+          <a:fillRef idx="0">
+            <a:schemeClr val="accent1"/>
+          </a:fillRef>
+          <a:effectRef idx="0">
+            <a:schemeClr val="accent1"/>
+          </a:effectRef>
+          <a:fontRef idx="minor">
+            <a:schemeClr val="tx1"/>
+          </a:fontRef>
+        </p:style>
+      </p:cxnSp>
+      <p:cxnSp>
+        <p:nvCxnSpPr>
+          <p:cNvPr id="70" name="Gerade Verbindung 69"/>
+          <p:cNvCxnSpPr/>
+          <p:nvPr/>
+        </p:nvCxnSpPr>
+        <p:spPr>
+          <a:xfrm flipH="1">
+            <a:off x="4355976" y="2708920"/>
+            <a:ext cx="432048" cy="0"/>
+          </a:xfrm>
+          <a:prstGeom prst="line">
+            <a:avLst/>
+          </a:prstGeom>
+          <a:ln w="19050">
+            <a:solidFill>
+              <a:schemeClr val="tx1"/>
+            </a:solidFill>
+            <a:prstDash val="sysDot"/>
+          </a:ln>
+        </p:spPr>
+        <p:style>
+          <a:lnRef idx="1">
+            <a:schemeClr val="accent1"/>
+          </a:lnRef>
+          <a:fillRef idx="0">
+            <a:schemeClr val="accent1"/>
+          </a:fillRef>
+          <a:effectRef idx="0">
+            <a:schemeClr val="accent1"/>
+          </a:effectRef>
+          <a:fontRef idx="minor">
+            <a:schemeClr val="tx1"/>
+          </a:fontRef>
+        </p:style>
+      </p:cxnSp>
+      <p:cxnSp>
+        <p:nvCxnSpPr>
+          <p:cNvPr id="71" name="Gerade Verbindung 70"/>
+          <p:cNvCxnSpPr/>
+          <p:nvPr/>
+        </p:nvCxnSpPr>
+        <p:spPr>
+          <a:xfrm>
+            <a:off x="4355976" y="2132856"/>
+            <a:ext cx="0" cy="216024"/>
+          </a:xfrm>
+          <a:prstGeom prst="line">
+            <a:avLst/>
+          </a:prstGeom>
+          <a:ln w="19050">
+            <a:solidFill>
+              <a:schemeClr val="tx1"/>
+            </a:solidFill>
+            <a:prstDash val="sysDot"/>
+          </a:ln>
+        </p:spPr>
+        <p:style>
+          <a:lnRef idx="1">
+            <a:schemeClr val="accent1"/>
+          </a:lnRef>
+          <a:fillRef idx="0">
+            <a:schemeClr val="accent1"/>
+          </a:fillRef>
+          <a:effectRef idx="0">
+            <a:schemeClr val="accent1"/>
+          </a:effectRef>
+          <a:fontRef idx="minor">
+            <a:schemeClr val="tx1"/>
+          </a:fontRef>
+        </p:style>
+      </p:cxnSp>
+      <p:cxnSp>
+        <p:nvCxnSpPr>
+          <p:cNvPr id="72" name="Gerade Verbindung 71"/>
+          <p:cNvCxnSpPr/>
+          <p:nvPr/>
+        </p:nvCxnSpPr>
+        <p:spPr>
+          <a:xfrm>
+            <a:off x="4220925" y="2474351"/>
+            <a:ext cx="288032" cy="0"/>
+          </a:xfrm>
+          <a:prstGeom prst="line">
+            <a:avLst/>
+          </a:prstGeom>
+          <a:ln w="19050">
+            <a:solidFill>
+              <a:schemeClr val="tx1"/>
+            </a:solidFill>
+            <a:prstDash val="solid"/>
+          </a:ln>
+        </p:spPr>
+        <p:style>
+          <a:lnRef idx="1">
+            <a:schemeClr val="accent1"/>
+          </a:lnRef>
+          <a:fillRef idx="0">
+            <a:schemeClr val="accent1"/>
+          </a:fillRef>
+          <a:effectRef idx="0">
+            <a:schemeClr val="accent1"/>
+          </a:effectRef>
+          <a:fontRef idx="minor">
+            <a:schemeClr val="tx1"/>
+          </a:fontRef>
+        </p:style>
+      </p:cxnSp>
+      <p:cxnSp>
+        <p:nvCxnSpPr>
+          <p:cNvPr id="73" name="Gerade Verbindung 72"/>
+          <p:cNvCxnSpPr/>
+          <p:nvPr/>
+        </p:nvCxnSpPr>
+        <p:spPr>
+          <a:xfrm>
+            <a:off x="4220925" y="2366483"/>
+            <a:ext cx="288032" cy="0"/>
+          </a:xfrm>
+          <a:prstGeom prst="line">
+            <a:avLst/>
+          </a:prstGeom>
+          <a:ln w="19050">
+            <a:solidFill>
+              <a:schemeClr val="tx1"/>
+            </a:solidFill>
+            <a:prstDash val="solid"/>
+          </a:ln>
+        </p:spPr>
+        <p:style>
+          <a:lnRef idx="1">
+            <a:schemeClr val="accent1"/>
+          </a:lnRef>
+          <a:fillRef idx="0">
+            <a:schemeClr val="accent1"/>
+          </a:fillRef>
+          <a:effectRef idx="0">
+            <a:schemeClr val="accent1"/>
+          </a:effectRef>
+          <a:fontRef idx="minor">
+            <a:schemeClr val="tx1"/>
+          </a:fontRef>
+        </p:style>
+      </p:cxnSp>
+      <p:cxnSp>
+        <p:nvCxnSpPr>
+          <p:cNvPr id="74" name="Gerade Verbindung 73"/>
+          <p:cNvCxnSpPr/>
+          <p:nvPr/>
+        </p:nvCxnSpPr>
+        <p:spPr>
+          <a:xfrm>
+            <a:off x="4355976" y="2492896"/>
+            <a:ext cx="0" cy="216024"/>
+          </a:xfrm>
+          <a:prstGeom prst="line">
+            <a:avLst/>
+          </a:prstGeom>
+          <a:ln w="19050">
+            <a:solidFill>
+              <a:schemeClr val="tx1"/>
+            </a:solidFill>
+            <a:prstDash val="sysDot"/>
+          </a:ln>
+        </p:spPr>
+        <p:style>
+          <a:lnRef idx="1">
+            <a:schemeClr val="accent1"/>
+          </a:lnRef>
+          <a:fillRef idx="0">
+            <a:schemeClr val="accent1"/>
+          </a:fillRef>
+          <a:effectRef idx="0">
+            <a:schemeClr val="accent1"/>
+          </a:effectRef>
+          <a:fontRef idx="minor">
+            <a:schemeClr val="tx1"/>
+          </a:fontRef>
+        </p:style>
+      </p:cxnSp>
+      <p:sp>
+        <p:nvSpPr>
+          <p:cNvPr id="78" name="Textfeld 77"/>
+          <p:cNvSpPr txBox="1"/>
+          <p:nvPr/>
+        </p:nvSpPr>
+        <p:spPr>
+          <a:xfrm>
+            <a:off x="3779912" y="2195572"/>
+            <a:ext cx="429926" cy="369332"/>
+          </a:xfrm>
+          <a:prstGeom prst="rect">
+            <a:avLst/>
+          </a:prstGeom>
+          <a:noFill/>
+        </p:spPr>
+        <p:txBody>
+          <a:bodyPr wrap="none" rtlCol="0">
+            <a:spAutoFit/>
+          </a:bodyPr>
+          <a:lstStyle/>
+          <a:p>
+            <a:r>
+              <a:rPr lang="de-DE" i="1" dirty="0" smtClean="0">
+                <a:latin typeface="Times New Roman" pitchFamily="18" charset="0"/>
+                <a:cs typeface="Times New Roman" pitchFamily="18" charset="0"/>
+              </a:rPr>
+              <a:t>C</a:t>
+            </a:r>
+            <a:r>
+              <a:rPr lang="el-GR" i="1" baseline="-25000" dirty="0" smtClean="0">
+                <a:latin typeface="Times New Roman"/>
+                <a:cs typeface="Times New Roman"/>
+              </a:rPr>
+              <a:t>Σ</a:t>
+            </a:r>
+            <a:endParaRPr lang="de-DE" i="1" baseline="-25000" dirty="0">
+              <a:latin typeface="Times New Roman" pitchFamily="18" charset="0"/>
+              <a:cs typeface="Times New Roman" pitchFamily="18" charset="0"/>
+            </a:endParaRPr>
+          </a:p>
+        </p:txBody>
+      </p:sp>
+      <p:sp>
+        <p:nvSpPr>
+          <p:cNvPr id="79" name="Textfeld 78"/>
+          <p:cNvSpPr txBox="1"/>
+          <p:nvPr/>
+        </p:nvSpPr>
+        <p:spPr>
+          <a:xfrm>
+            <a:off x="5436096" y="2204864"/>
+            <a:ext cx="394660" cy="369332"/>
+          </a:xfrm>
+          <a:prstGeom prst="rect">
+            <a:avLst/>
+          </a:prstGeom>
+          <a:noFill/>
+        </p:spPr>
+        <p:txBody>
+          <a:bodyPr wrap="none" rtlCol="0">
+            <a:spAutoFit/>
+          </a:bodyPr>
+          <a:lstStyle/>
+          <a:p>
+            <a:r>
+              <a:rPr lang="de-DE" i="1" dirty="0" smtClean="0">
+                <a:latin typeface="Times New Roman" pitchFamily="18" charset="0"/>
+                <a:cs typeface="Times New Roman" pitchFamily="18" charset="0"/>
+              </a:rPr>
+              <a:t>E</a:t>
+            </a:r>
+            <a:r>
+              <a:rPr lang="de-DE" i="1" baseline="-25000" dirty="0" smtClean="0">
+                <a:latin typeface="Times New Roman" pitchFamily="18" charset="0"/>
+                <a:cs typeface="Times New Roman" pitchFamily="18" charset="0"/>
+              </a:rPr>
+              <a:t>J</a:t>
+            </a:r>
+            <a:endParaRPr lang="de-DE" i="1" baseline="-25000" dirty="0">
+              <a:latin typeface="Times New Roman" pitchFamily="18" charset="0"/>
+              <a:cs typeface="Times New Roman" pitchFamily="18" charset="0"/>
+            </a:endParaRPr>
+          </a:p>
+        </p:txBody>
+      </p:sp>
+      <p:sp>
+        <p:nvSpPr>
+          <p:cNvPr id="80" name="Textfeld 79"/>
+          <p:cNvSpPr txBox="1"/>
+          <p:nvPr/>
+        </p:nvSpPr>
+        <p:spPr>
+          <a:xfrm>
+            <a:off x="4508957" y="1673913"/>
+            <a:ext cx="415498" cy="369332"/>
+          </a:xfrm>
+          <a:prstGeom prst="rect">
+            <a:avLst/>
+          </a:prstGeom>
+          <a:noFill/>
+        </p:spPr>
+        <p:txBody>
+          <a:bodyPr wrap="none" rtlCol="0">
+            <a:spAutoFit/>
+          </a:bodyPr>
+          <a:lstStyle/>
+          <a:p>
+            <a:r>
+              <a:rPr lang="de-DE" i="1" dirty="0" err="1" smtClean="0">
+                <a:latin typeface="Times New Roman" pitchFamily="18" charset="0"/>
+                <a:cs typeface="Times New Roman" pitchFamily="18" charset="0"/>
+              </a:rPr>
+              <a:t>C</a:t>
+            </a:r>
+            <a:r>
+              <a:rPr lang="de-DE" i="1" baseline="-25000" dirty="0" err="1" smtClean="0">
+                <a:latin typeface="Times New Roman" pitchFamily="18" charset="0"/>
+                <a:cs typeface="Times New Roman" pitchFamily="18" charset="0"/>
+              </a:rPr>
+              <a:t>g</a:t>
+            </a:r>
+            <a:endParaRPr lang="de-DE" i="1" baseline="-25000" dirty="0">
+              <a:latin typeface="Times New Roman" pitchFamily="18" charset="0"/>
+              <a:cs typeface="Times New Roman" pitchFamily="18" charset="0"/>
+            </a:endParaRPr>
+          </a:p>
+        </p:txBody>
+      </p:sp>
+      <p:sp>
+        <p:nvSpPr>
+          <p:cNvPr id="116" name="Textfeld 115"/>
+          <p:cNvSpPr txBox="1"/>
+          <p:nvPr/>
+        </p:nvSpPr>
+        <p:spPr>
+          <a:xfrm>
+            <a:off x="1888254" y="1074222"/>
+            <a:ext cx="367408" cy="338554"/>
+          </a:xfrm>
+          <a:prstGeom prst="rect">
+            <a:avLst/>
+          </a:prstGeom>
+          <a:noFill/>
+        </p:spPr>
+        <p:txBody>
+          <a:bodyPr wrap="none" rtlCol="0">
+            <a:spAutoFit/>
+          </a:bodyPr>
+          <a:lstStyle/>
+          <a:p>
+            <a:r>
+              <a:rPr lang="de-DE" sz="1600" dirty="0" smtClean="0">
+                <a:latin typeface="Arial" pitchFamily="34" charset="0"/>
+                <a:cs typeface="Arial" pitchFamily="34" charset="0"/>
+              </a:rPr>
+              <a:t>a)</a:t>
+            </a:r>
+            <a:endParaRPr lang="de-DE" sz="1600" baseline="-25000" dirty="0">
+              <a:latin typeface="Arial" pitchFamily="34" charset="0"/>
+              <a:cs typeface="Arial" pitchFamily="34" charset="0"/>
+            </a:endParaRPr>
+          </a:p>
+        </p:txBody>
+      </p:sp>
+      <p:sp>
+        <p:nvSpPr>
+          <p:cNvPr id="117" name="Textfeld 116"/>
+          <p:cNvSpPr txBox="1"/>
+          <p:nvPr/>
+        </p:nvSpPr>
+        <p:spPr>
+          <a:xfrm>
+            <a:off x="4636640" y="1074222"/>
+            <a:ext cx="367408" cy="338554"/>
+          </a:xfrm>
+          <a:prstGeom prst="rect">
+            <a:avLst/>
+          </a:prstGeom>
+          <a:noFill/>
+        </p:spPr>
+        <p:txBody>
+          <a:bodyPr wrap="none" rtlCol="0">
+            <a:spAutoFit/>
+          </a:bodyPr>
+          <a:lstStyle/>
+          <a:p>
+            <a:r>
+              <a:rPr lang="de-DE" sz="1600" dirty="0" smtClean="0">
+                <a:latin typeface="Arial" pitchFamily="34" charset="0"/>
+                <a:cs typeface="Arial" pitchFamily="34" charset="0"/>
+              </a:rPr>
+              <a:t>b)</a:t>
+            </a:r>
+            <a:endParaRPr lang="de-DE" sz="1600" baseline="-25000" dirty="0">
+              <a:latin typeface="Arial" pitchFamily="34" charset="0"/>
+              <a:cs typeface="Arial" pitchFamily="34" charset="0"/>
+            </a:endParaRPr>
+          </a:p>
+        </p:txBody>
+      </p:sp>
+      <p:sp>
+        <p:nvSpPr>
+          <p:cNvPr id="118" name="Ellipse 117"/>
+          <p:cNvSpPr/>
+          <p:nvPr/>
+        </p:nvSpPr>
+        <p:spPr>
+          <a:xfrm>
+            <a:off x="2588626" y="2127240"/>
+            <a:ext cx="45719" cy="45719"/>
+          </a:xfrm>
+          <a:prstGeom prst="ellipse">
+            <a:avLst/>
+          </a:prstGeom>
+          <a:solidFill>
+            <a:schemeClr val="tx1"/>
+          </a:solidFill>
+          <a:ln>
+            <a:solidFill>
+              <a:schemeClr val="tx1"/>
+            </a:solidFill>
+          </a:ln>
+        </p:spPr>
+        <p:style>
+          <a:lnRef idx="2">
+            <a:schemeClr val="accent1">
+              <a:shade val="50000"/>
+            </a:schemeClr>
+          </a:lnRef>
+          <a:fillRef idx="1">
+            <a:schemeClr val="accent1"/>
+          </a:fillRef>
+          <a:effectRef idx="0">
+            <a:schemeClr val="accent1"/>
+          </a:effectRef>
+          <a:fontRef idx="minor">
+            <a:schemeClr val="lt1"/>
+          </a:fontRef>
+        </p:style>
+        <p:txBody>
+          <a:bodyPr rtlCol="0" anchor="ctr"/>
+          <a:lstStyle/>
+          <a:p>
+            <a:pPr algn="ctr"/>
+            <a:endParaRPr lang="de-DE"/>
+          </a:p>
+        </p:txBody>
+      </p:sp>
+      <p:sp>
+        <p:nvSpPr>
+          <p:cNvPr id="120" name="Textfeld 119"/>
+          <p:cNvSpPr txBox="1"/>
+          <p:nvPr/>
+        </p:nvSpPr>
+        <p:spPr>
+          <a:xfrm>
+            <a:off x="2968776" y="2552982"/>
+            <a:ext cx="288862" cy="338554"/>
+          </a:xfrm>
+          <a:prstGeom prst="rect">
+            <a:avLst/>
+          </a:prstGeom>
+          <a:noFill/>
+        </p:spPr>
+        <p:txBody>
+          <a:bodyPr wrap="none" rtlCol="0">
+            <a:spAutoFit/>
+          </a:bodyPr>
+          <a:lstStyle/>
+          <a:p>
+            <a:r>
+              <a:rPr lang="de-DE" sz="1600" dirty="0" smtClean="0"/>
+              <a:t>0</a:t>
+            </a:r>
+            <a:endParaRPr lang="de-DE" sz="1600" dirty="0"/>
+          </a:p>
+        </p:txBody>
+      </p:sp>
+      <p:sp>
+        <p:nvSpPr>
+          <p:cNvPr id="121" name="Textfeld 120"/>
+          <p:cNvSpPr txBox="1"/>
+          <p:nvPr/>
+        </p:nvSpPr>
+        <p:spPr>
+          <a:xfrm>
+            <a:off x="2574666" y="1971828"/>
+            <a:ext cx="288862" cy="338554"/>
+          </a:xfrm>
+          <a:prstGeom prst="rect">
+            <a:avLst/>
+          </a:prstGeom>
+          <a:noFill/>
+        </p:spPr>
+        <p:txBody>
+          <a:bodyPr wrap="none" rtlCol="0">
+            <a:spAutoFit/>
+          </a:bodyPr>
+          <a:lstStyle/>
+          <a:p>
+            <a:r>
+              <a:rPr lang="de-DE" sz="1600" dirty="0" smtClean="0"/>
+              <a:t>1</a:t>
+            </a:r>
+            <a:endParaRPr lang="de-DE" sz="1600" dirty="0"/>
+          </a:p>
+        </p:txBody>
+      </p:sp>
+      <p:sp>
+        <p:nvSpPr>
+          <p:cNvPr id="122" name="Textfeld 121"/>
+          <p:cNvSpPr txBox="1"/>
+          <p:nvPr/>
+        </p:nvSpPr>
+        <p:spPr>
+          <a:xfrm>
+            <a:off x="2472530" y="1318984"/>
+            <a:ext cx="288862" cy="338554"/>
+          </a:xfrm>
+          <a:prstGeom prst="rect">
+            <a:avLst/>
+          </a:prstGeom>
+          <a:noFill/>
+        </p:spPr>
+        <p:txBody>
+          <a:bodyPr wrap="none" rtlCol="0">
+            <a:spAutoFit/>
+          </a:bodyPr>
+          <a:lstStyle/>
+          <a:p>
+            <a:r>
+              <a:rPr lang="de-DE" sz="1600" dirty="0" smtClean="0"/>
+              <a:t>2</a:t>
+            </a:r>
+            <a:endParaRPr lang="de-DE" sz="1600" dirty="0"/>
+          </a:p>
+        </p:txBody>
+      </p:sp>
+      <p:grpSp>
+        <p:nvGrpSpPr>
+          <p:cNvPr id="106" name="Gruppieren 105"/>
+          <p:cNvGrpSpPr/>
+          <p:nvPr/>
+        </p:nvGrpSpPr>
+        <p:grpSpPr>
+          <a:xfrm>
+            <a:off x="5339804" y="2852936"/>
+            <a:ext cx="456332" cy="571292"/>
+            <a:chOff x="5148064" y="4513892"/>
+            <a:chExt cx="456332" cy="571292"/>
+          </a:xfrm>
+        </p:grpSpPr>
+        <p:cxnSp>
+          <p:nvCxnSpPr>
+            <p:cNvPr id="41" name="Gerade Verbindung 40"/>
+            <p:cNvCxnSpPr/>
+            <p:nvPr/>
+          </p:nvCxnSpPr>
+          <p:spPr>
+            <a:xfrm>
+              <a:off x="5364088" y="4581128"/>
+              <a:ext cx="0" cy="360040"/>
+            </a:xfrm>
+            <a:prstGeom prst="line">
+              <a:avLst/>
+            </a:prstGeom>
+            <a:ln w="19050">
+              <a:solidFill>
+                <a:schemeClr val="tx1"/>
+              </a:solidFill>
+              <a:headEnd type="oval" w="med" len="med"/>
+              <a:tailEnd type="none" w="med" len="med"/>
+            </a:ln>
+          </p:spPr>
+          <p:style>
+            <a:lnRef idx="1">
+              <a:schemeClr val="accent1"/>
+            </a:lnRef>
+            <a:fillRef idx="0">
+              <a:schemeClr val="accent1"/>
+            </a:fillRef>
+            <a:effectRef idx="0">
+              <a:schemeClr val="accent1"/>
+            </a:effectRef>
+            <a:fontRef idx="minor">
+              <a:schemeClr val="tx1"/>
+            </a:fontRef>
+          </p:style>
+        </p:cxnSp>
+        <p:cxnSp>
+          <p:nvCxnSpPr>
+            <p:cNvPr id="75" name="Gerade Verbindung 74"/>
+            <p:cNvCxnSpPr/>
+            <p:nvPr/>
+          </p:nvCxnSpPr>
+          <p:spPr>
+            <a:xfrm>
+              <a:off x="5148064" y="4941168"/>
+              <a:ext cx="432048" cy="0"/>
+            </a:xfrm>
+            <a:prstGeom prst="line">
+              <a:avLst/>
+            </a:prstGeom>
+            <a:ln w="19050">
+              <a:solidFill>
+                <a:schemeClr val="tx1"/>
+              </a:solidFill>
+            </a:ln>
+          </p:spPr>
+          <p:style>
+            <a:lnRef idx="1">
+              <a:schemeClr val="accent1"/>
+            </a:lnRef>
+            <a:fillRef idx="0">
+              <a:schemeClr val="accent1"/>
+            </a:fillRef>
+            <a:effectRef idx="0">
+              <a:schemeClr val="accent1"/>
+            </a:effectRef>
+            <a:fontRef idx="minor">
+              <a:schemeClr val="tx1"/>
+            </a:fontRef>
+          </p:style>
+        </p:cxnSp>
+        <p:cxnSp>
+          <p:nvCxnSpPr>
+            <p:cNvPr id="76" name="Gerade Verbindung 75"/>
+            <p:cNvCxnSpPr/>
+            <p:nvPr/>
+          </p:nvCxnSpPr>
+          <p:spPr>
+            <a:xfrm flipH="1">
+              <a:off x="5220072" y="5013176"/>
+              <a:ext cx="288032" cy="0"/>
+            </a:xfrm>
+            <a:prstGeom prst="line">
+              <a:avLst/>
+            </a:prstGeom>
+            <a:ln w="19050">
+              <a:solidFill>
+                <a:schemeClr val="tx1"/>
+              </a:solidFill>
+            </a:ln>
+          </p:spPr>
+          <p:style>
+            <a:lnRef idx="1">
+              <a:schemeClr val="accent1"/>
+            </a:lnRef>
+            <a:fillRef idx="0">
+              <a:schemeClr val="accent1"/>
+            </a:fillRef>
+            <a:effectRef idx="0">
+              <a:schemeClr val="accent1"/>
+            </a:effectRef>
+            <a:fontRef idx="minor">
+              <a:schemeClr val="tx1"/>
+            </a:fontRef>
+          </p:style>
+        </p:cxnSp>
+        <p:cxnSp>
+          <p:nvCxnSpPr>
+            <p:cNvPr id="77" name="Gerade Verbindung 76"/>
+            <p:cNvCxnSpPr/>
+            <p:nvPr/>
+          </p:nvCxnSpPr>
+          <p:spPr>
+            <a:xfrm flipH="1">
+              <a:off x="5292080" y="5085184"/>
+              <a:ext cx="144016" cy="0"/>
+            </a:xfrm>
+            <a:prstGeom prst="line">
+              <a:avLst/>
+            </a:prstGeom>
+            <a:ln w="19050">
+              <a:solidFill>
+                <a:schemeClr val="tx1"/>
+              </a:solidFill>
+            </a:ln>
+          </p:spPr>
+          <p:style>
+            <a:lnRef idx="1">
+              <a:schemeClr val="accent1"/>
+            </a:lnRef>
+            <a:fillRef idx="0">
+              <a:schemeClr val="accent1"/>
+            </a:fillRef>
+            <a:effectRef idx="0">
+              <a:schemeClr val="accent1"/>
+            </a:effectRef>
+            <a:fontRef idx="minor">
+              <a:schemeClr val="tx1"/>
+            </a:fontRef>
+          </p:style>
+        </p:cxnSp>
+        <p:sp>
+          <p:nvSpPr>
+            <p:cNvPr id="123" name="Textfeld 122"/>
+            <p:cNvSpPr txBox="1"/>
+            <p:nvPr/>
+          </p:nvSpPr>
+          <p:spPr>
+            <a:xfrm>
+              <a:off x="5315534" y="4513892"/>
+              <a:ext cx="288862" cy="338554"/>
+            </a:xfrm>
+            <a:prstGeom prst="rect">
+              <a:avLst/>
+            </a:prstGeom>
+            <a:noFill/>
+          </p:spPr>
+          <p:txBody>
+            <a:bodyPr wrap="none" rtlCol="0">
+              <a:spAutoFit/>
+            </a:bodyPr>
+            <a:lstStyle/>
+            <a:p>
+              <a:r>
+                <a:rPr lang="de-DE" sz="1600" dirty="0" smtClean="0"/>
+                <a:t>0</a:t>
+              </a:r>
+              <a:endParaRPr lang="de-DE" sz="1600" dirty="0"/>
+            </a:p>
+          </p:txBody>
+        </p:sp>
+      </p:grpSp>
+      <p:sp>
+        <p:nvSpPr>
+          <p:cNvPr id="124" name="Textfeld 123"/>
+          <p:cNvSpPr txBox="1"/>
+          <p:nvPr/>
+        </p:nvSpPr>
+        <p:spPr>
+          <a:xfrm>
+            <a:off x="5011422" y="1870130"/>
+            <a:ext cx="288862" cy="338554"/>
+          </a:xfrm>
+          <a:prstGeom prst="rect">
+            <a:avLst/>
+          </a:prstGeom>
+          <a:noFill/>
+        </p:spPr>
+        <p:txBody>
+          <a:bodyPr wrap="none" rtlCol="0">
+            <a:spAutoFit/>
+          </a:bodyPr>
+          <a:lstStyle/>
+          <a:p>
+            <a:r>
+              <a:rPr lang="de-DE" sz="1600" dirty="0" smtClean="0"/>
+              <a:t>1</a:t>
+            </a:r>
+            <a:endParaRPr lang="de-DE" sz="1600" dirty="0"/>
+          </a:p>
+        </p:txBody>
+      </p:sp>
+      <p:sp>
+        <p:nvSpPr>
+          <p:cNvPr id="125" name="Textfeld 124"/>
+          <p:cNvSpPr txBox="1"/>
+          <p:nvPr/>
+        </p:nvSpPr>
+        <p:spPr>
+          <a:xfrm>
+            <a:off x="4939020" y="1324600"/>
+            <a:ext cx="288862" cy="338554"/>
+          </a:xfrm>
+          <a:prstGeom prst="rect">
+            <a:avLst/>
+          </a:prstGeom>
+          <a:noFill/>
+        </p:spPr>
+        <p:txBody>
+          <a:bodyPr wrap="none" rtlCol="0">
+            <a:spAutoFit/>
+          </a:bodyPr>
+          <a:lstStyle/>
+          <a:p>
+            <a:r>
+              <a:rPr lang="de-DE" sz="1600" dirty="0" smtClean="0"/>
+              <a:t>2</a:t>
+            </a:r>
+            <a:endParaRPr lang="de-DE" sz="1600" dirty="0"/>
+          </a:p>
+        </p:txBody>
+      </p:sp>
+      <p:cxnSp>
+        <p:nvCxnSpPr>
+          <p:cNvPr id="82" name="Gerade Verbindung 81"/>
+          <p:cNvCxnSpPr/>
+          <p:nvPr/>
+        </p:nvCxnSpPr>
+        <p:spPr>
+          <a:xfrm>
+            <a:off x="2615702" y="2852936"/>
+            <a:ext cx="936104" cy="0"/>
+          </a:xfrm>
+          <a:prstGeom prst="line">
+            <a:avLst/>
+          </a:prstGeom>
+          <a:ln w="19050">
+            <a:solidFill>
+              <a:schemeClr val="tx1"/>
+            </a:solidFill>
+          </a:ln>
+        </p:spPr>
+        <p:style>
+          <a:lnRef idx="1">
+            <a:schemeClr val="accent1"/>
+          </a:lnRef>
+          <a:fillRef idx="0">
+            <a:schemeClr val="accent1"/>
+          </a:fillRef>
+          <a:effectRef idx="0">
+            <a:schemeClr val="accent1"/>
+          </a:effectRef>
+          <a:fontRef idx="minor">
+            <a:schemeClr val="tx1"/>
+          </a:fontRef>
+        </p:style>
+      </p:cxnSp>
+      <p:cxnSp>
+        <p:nvCxnSpPr>
+          <p:cNvPr id="87" name="Gerade Verbindung 86"/>
+          <p:cNvCxnSpPr/>
+          <p:nvPr/>
+        </p:nvCxnSpPr>
+        <p:spPr>
+          <a:xfrm>
+            <a:off x="3113622" y="2859072"/>
+            <a:ext cx="0" cy="216024"/>
+          </a:xfrm>
+          <a:prstGeom prst="line">
+            <a:avLst/>
+          </a:prstGeom>
+          <a:ln w="19050">
+            <a:solidFill>
+              <a:schemeClr val="tx1"/>
+            </a:solidFill>
+            <a:headEnd type="oval"/>
+          </a:ln>
+        </p:spPr>
+        <p:style>
+          <a:lnRef idx="1">
+            <a:schemeClr val="accent1"/>
+          </a:lnRef>
+          <a:fillRef idx="0">
+            <a:schemeClr val="accent1"/>
+          </a:fillRef>
+          <a:effectRef idx="0">
+            <a:schemeClr val="accent1"/>
+          </a:effectRef>
+          <a:fontRef idx="minor">
+            <a:schemeClr val="tx1"/>
+          </a:fontRef>
+        </p:style>
+      </p:cxnSp>
+      <p:cxnSp>
+        <p:nvCxnSpPr>
+          <p:cNvPr id="103" name="Gerade Verbindung 102"/>
+          <p:cNvCxnSpPr>
+            <a:stCxn id="40" idx="2"/>
+          </p:cNvCxnSpPr>
+          <p:nvPr/>
+        </p:nvCxnSpPr>
+        <p:spPr>
+          <a:xfrm>
+            <a:off x="5076056" y="2708920"/>
+            <a:ext cx="0" cy="216024"/>
+          </a:xfrm>
+          <a:prstGeom prst="line">
+            <a:avLst/>
+          </a:prstGeom>
+          <a:ln w="19050">
+            <a:solidFill>
+              <a:schemeClr val="tx1"/>
+            </a:solidFill>
+          </a:ln>
+        </p:spPr>
+        <p:style>
+          <a:lnRef idx="1">
+            <a:schemeClr val="accent1"/>
+          </a:lnRef>
+          <a:fillRef idx="0">
+            <a:schemeClr val="accent1"/>
+          </a:fillRef>
+          <a:effectRef idx="0">
+            <a:schemeClr val="accent1"/>
+          </a:effectRef>
+          <a:fontRef idx="minor">
+            <a:schemeClr val="tx1"/>
+          </a:fontRef>
+        </p:style>
+      </p:cxnSp>
+      <p:cxnSp>
+        <p:nvCxnSpPr>
+          <p:cNvPr id="105" name="Gerade Verbindung 104"/>
+          <p:cNvCxnSpPr/>
+          <p:nvPr/>
+        </p:nvCxnSpPr>
+        <p:spPr>
+          <a:xfrm>
+            <a:off x="5076056" y="2924944"/>
+            <a:ext cx="936104" cy="0"/>
+          </a:xfrm>
+          <a:prstGeom prst="line">
+            <a:avLst/>
+          </a:prstGeom>
+          <a:ln w="19050">
+            <a:solidFill>
+              <a:schemeClr val="tx1"/>
+            </a:solidFill>
+          </a:ln>
+        </p:spPr>
+        <p:style>
+          <a:lnRef idx="1">
+            <a:schemeClr val="accent1"/>
+          </a:lnRef>
+          <a:fillRef idx="0">
+            <a:schemeClr val="accent1"/>
+          </a:fillRef>
+          <a:effectRef idx="0">
+            <a:schemeClr val="accent1"/>
+          </a:effectRef>
+          <a:fontRef idx="minor">
+            <a:schemeClr val="tx1"/>
+          </a:fontRef>
+        </p:style>
+      </p:cxnSp>
+      <p:sp>
+        <p:nvSpPr>
+          <p:cNvPr id="139" name="Bogen 138"/>
+          <p:cNvSpPr/>
+          <p:nvPr/>
+        </p:nvSpPr>
+        <p:spPr>
+          <a:xfrm>
+            <a:off x="4913506" y="2245982"/>
+            <a:ext cx="329150" cy="341506"/>
+          </a:xfrm>
+          <a:prstGeom prst="arc">
+            <a:avLst>
+              <a:gd name="adj1" fmla="val 16200000"/>
+              <a:gd name="adj2" fmla="val 13631433"/>
+            </a:avLst>
+          </a:prstGeom>
+          <a:ln>
+            <a:solidFill>
+              <a:srgbClr val="FF0000"/>
+            </a:solidFill>
+            <a:headEnd type="none" w="med" len="med"/>
+            <a:tailEnd type="triangle" w="med" len="med"/>
+          </a:ln>
+        </p:spPr>
+        <p:style>
+          <a:lnRef idx="1">
+            <a:schemeClr val="accent1"/>
+          </a:lnRef>
+          <a:fillRef idx="0">
+            <a:schemeClr val="accent1"/>
+          </a:fillRef>
+          <a:effectRef idx="0">
+            <a:schemeClr val="accent1"/>
+          </a:effectRef>
+          <a:fontRef idx="minor">
+            <a:schemeClr val="tx1"/>
+          </a:fontRef>
+        </p:style>
+        <p:txBody>
+          <a:bodyPr rtlCol="0" anchor="ctr"/>
+          <a:lstStyle/>
+          <a:p>
+            <a:pPr algn="ctr"/>
+            <a:endParaRPr lang="de-DE"/>
+          </a:p>
+        </p:txBody>
+      </p:sp>
+      <p:sp>
+        <p:nvSpPr>
+          <p:cNvPr id="140" name="Textfeld 139"/>
+          <p:cNvSpPr txBox="1"/>
+          <p:nvPr/>
+        </p:nvSpPr>
+        <p:spPr>
+          <a:xfrm>
+            <a:off x="4860032" y="2269483"/>
+            <a:ext cx="420308" cy="276999"/>
+          </a:xfrm>
+          <a:prstGeom prst="rect">
+            <a:avLst/>
+          </a:prstGeom>
+          <a:noFill/>
+        </p:spPr>
+        <p:txBody>
+          <a:bodyPr wrap="none" rtlCol="0">
+            <a:spAutoFit/>
+          </a:bodyPr>
+          <a:lstStyle/>
+          <a:p>
+            <a:r>
+              <a:rPr lang="el-GR" sz="1200" i="1" dirty="0" smtClean="0">
+                <a:latin typeface="Times New Roman" pitchFamily="18" charset="0"/>
+                <a:cs typeface="Times New Roman" pitchFamily="18" charset="0"/>
+              </a:rPr>
+              <a:t>Φ</a:t>
+            </a:r>
+            <a:r>
+              <a:rPr lang="de-DE" sz="1200" i="1" baseline="-25000" dirty="0" smtClean="0">
+                <a:latin typeface="Times New Roman" pitchFamily="18" charset="0"/>
+                <a:cs typeface="Times New Roman" pitchFamily="18" charset="0"/>
+              </a:rPr>
+              <a:t>ext</a:t>
+            </a:r>
+          </a:p>
+        </p:txBody>
+      </p:sp>
+      <p:sp>
+        <p:nvSpPr>
+          <p:cNvPr id="166" name="Textfeld 165"/>
+          <p:cNvSpPr txBox="1"/>
+          <p:nvPr/>
+        </p:nvSpPr>
+        <p:spPr>
+          <a:xfrm>
+            <a:off x="6868888" y="1052736"/>
+            <a:ext cx="356188" cy="338554"/>
+          </a:xfrm>
+          <a:prstGeom prst="rect">
+            <a:avLst/>
+          </a:prstGeom>
+          <a:noFill/>
+        </p:spPr>
+        <p:txBody>
+          <a:bodyPr wrap="none" rtlCol="0">
+            <a:spAutoFit/>
+          </a:bodyPr>
+          <a:lstStyle/>
+          <a:p>
+            <a:r>
+              <a:rPr lang="de-DE" sz="1600" dirty="0" smtClean="0">
+                <a:latin typeface="Arial" pitchFamily="34" charset="0"/>
+                <a:cs typeface="Arial" pitchFamily="34" charset="0"/>
+              </a:rPr>
+              <a:t>c</a:t>
+            </a:r>
+            <a:r>
+              <a:rPr lang="de-DE" sz="1600" dirty="0" smtClean="0">
+                <a:latin typeface="Arial" pitchFamily="34" charset="0"/>
+                <a:cs typeface="Arial" pitchFamily="34" charset="0"/>
+              </a:rPr>
+              <a:t>)</a:t>
+            </a:r>
+            <a:endParaRPr lang="de-DE" sz="1600" baseline="-25000" dirty="0">
+              <a:latin typeface="Arial" pitchFamily="34" charset="0"/>
+              <a:cs typeface="Arial" pitchFamily="34" charset="0"/>
+            </a:endParaRPr>
+          </a:p>
+        </p:txBody>
+      </p:sp>
+      <p:cxnSp>
+        <p:nvCxnSpPr>
+          <p:cNvPr id="184" name="Gerade Verbindung 183"/>
+          <p:cNvCxnSpPr/>
+          <p:nvPr/>
+        </p:nvCxnSpPr>
+        <p:spPr>
+          <a:xfrm>
+            <a:off x="7596336" y="1916832"/>
+            <a:ext cx="0" cy="216024"/>
+          </a:xfrm>
+          <a:prstGeom prst="line">
+            <a:avLst/>
+          </a:prstGeom>
+          <a:ln w="19050">
+            <a:solidFill>
+              <a:schemeClr val="tx1"/>
+            </a:solidFill>
+            <a:tailEnd type="oval"/>
+          </a:ln>
+        </p:spPr>
+        <p:style>
+          <a:lnRef idx="1">
+            <a:schemeClr val="accent1"/>
+          </a:lnRef>
+          <a:fillRef idx="0">
+            <a:schemeClr val="accent1"/>
+          </a:fillRef>
+          <a:effectRef idx="0">
+            <a:schemeClr val="accent1"/>
+          </a:effectRef>
+          <a:fontRef idx="minor">
+            <a:schemeClr val="tx1"/>
+          </a:fontRef>
+        </p:style>
+      </p:cxnSp>
+      <p:sp>
+        <p:nvSpPr>
+          <p:cNvPr id="185" name="Rechteck 184"/>
+          <p:cNvSpPr/>
+          <p:nvPr/>
+        </p:nvSpPr>
+        <p:spPr>
+          <a:xfrm>
+            <a:off x="7308304" y="2132856"/>
+            <a:ext cx="576064" cy="576064"/>
+          </a:xfrm>
+          <a:prstGeom prst="rect">
+            <a:avLst/>
+          </a:prstGeom>
+          <a:noFill/>
+          <a:ln w="19050">
+            <a:solidFill>
+              <a:schemeClr val="tx1"/>
+            </a:solidFill>
+          </a:ln>
+        </p:spPr>
+        <p:style>
+          <a:lnRef idx="2">
+            <a:schemeClr val="accent1">
+              <a:shade val="50000"/>
+            </a:schemeClr>
+          </a:lnRef>
+          <a:fillRef idx="1">
+            <a:schemeClr val="accent1"/>
+          </a:fillRef>
+          <a:effectRef idx="0">
+            <a:schemeClr val="accent1"/>
+          </a:effectRef>
+          <a:fontRef idx="minor">
+            <a:schemeClr val="lt1"/>
+          </a:fontRef>
+        </p:style>
+        <p:txBody>
+          <a:bodyPr rtlCol="0" anchor="ctr"/>
+          <a:lstStyle/>
+          <a:p>
+            <a:pPr algn="ctr"/>
+            <a:endParaRPr lang="de-DE"/>
+          </a:p>
+        </p:txBody>
+      </p:sp>
+      <p:grpSp>
+        <p:nvGrpSpPr>
+          <p:cNvPr id="186" name="Gruppieren 42"/>
+          <p:cNvGrpSpPr/>
+          <p:nvPr/>
+        </p:nvGrpSpPr>
+        <p:grpSpPr>
+          <a:xfrm>
+            <a:off x="7776212" y="2312732"/>
+            <a:ext cx="216024" cy="216024"/>
+            <a:chOff x="2771800" y="2348880"/>
+            <a:chExt cx="288032" cy="288032"/>
+          </a:xfrm>
+        </p:grpSpPr>
+        <p:cxnSp>
+          <p:nvCxnSpPr>
+            <p:cNvPr id="187" name="Gerade Verbindung 186"/>
+            <p:cNvCxnSpPr/>
+            <p:nvPr/>
+          </p:nvCxnSpPr>
+          <p:spPr>
+            <a:xfrm>
+              <a:off x="2771800" y="2348880"/>
+              <a:ext cx="288032" cy="288032"/>
+            </a:xfrm>
+            <a:prstGeom prst="line">
+              <a:avLst/>
+            </a:prstGeom>
+            <a:ln w="19050">
+              <a:solidFill>
+                <a:schemeClr val="tx1"/>
+              </a:solidFill>
+            </a:ln>
+          </p:spPr>
+          <p:style>
+            <a:lnRef idx="1">
+              <a:schemeClr val="accent1"/>
+            </a:lnRef>
+            <a:fillRef idx="0">
+              <a:schemeClr val="accent1"/>
+            </a:fillRef>
+            <a:effectRef idx="0">
+              <a:schemeClr val="accent1"/>
+            </a:effectRef>
+            <a:fontRef idx="minor">
+              <a:schemeClr val="tx1"/>
+            </a:fontRef>
+          </p:style>
+        </p:cxnSp>
+        <p:cxnSp>
+          <p:nvCxnSpPr>
+            <p:cNvPr id="188" name="Gerade Verbindung 187"/>
+            <p:cNvCxnSpPr/>
+            <p:nvPr/>
+          </p:nvCxnSpPr>
+          <p:spPr>
+            <a:xfrm flipV="1">
+              <a:off x="2771800" y="2348880"/>
+              <a:ext cx="288032" cy="288032"/>
+            </a:xfrm>
+            <a:prstGeom prst="line">
+              <a:avLst/>
+            </a:prstGeom>
+            <a:ln w="19050">
+              <a:solidFill>
+                <a:schemeClr val="tx1"/>
+              </a:solidFill>
+            </a:ln>
+          </p:spPr>
+          <p:style>
+            <a:lnRef idx="1">
+              <a:schemeClr val="accent1"/>
+            </a:lnRef>
+            <a:fillRef idx="0">
+              <a:schemeClr val="accent1"/>
+            </a:fillRef>
+            <a:effectRef idx="0">
+              <a:schemeClr val="accent1"/>
+            </a:effectRef>
+            <a:fontRef idx="minor">
+              <a:schemeClr val="tx1"/>
+            </a:fontRef>
+          </p:style>
+        </p:cxnSp>
+      </p:grpSp>
+      <p:grpSp>
+        <p:nvGrpSpPr>
+          <p:cNvPr id="189" name="Gruppieren 45"/>
+          <p:cNvGrpSpPr/>
+          <p:nvPr/>
+        </p:nvGrpSpPr>
+        <p:grpSpPr>
+          <a:xfrm>
+            <a:off x="7200148" y="2312732"/>
+            <a:ext cx="216024" cy="216024"/>
+            <a:chOff x="2771800" y="2348880"/>
+            <a:chExt cx="288032" cy="288032"/>
+          </a:xfrm>
+        </p:grpSpPr>
+        <p:cxnSp>
+          <p:nvCxnSpPr>
+            <p:cNvPr id="190" name="Gerade Verbindung 189"/>
+            <p:cNvCxnSpPr/>
+            <p:nvPr/>
+          </p:nvCxnSpPr>
+          <p:spPr>
+            <a:xfrm>
+              <a:off x="2771800" y="2348880"/>
+              <a:ext cx="288032" cy="288032"/>
+            </a:xfrm>
+            <a:prstGeom prst="line">
+              <a:avLst/>
+            </a:prstGeom>
+            <a:ln w="19050">
+              <a:solidFill>
+                <a:schemeClr val="tx1"/>
+              </a:solidFill>
+            </a:ln>
+          </p:spPr>
+          <p:style>
+            <a:lnRef idx="1">
+              <a:schemeClr val="accent1"/>
+            </a:lnRef>
+            <a:fillRef idx="0">
+              <a:schemeClr val="accent1"/>
+            </a:fillRef>
+            <a:effectRef idx="0">
+              <a:schemeClr val="accent1"/>
+            </a:effectRef>
+            <a:fontRef idx="minor">
+              <a:schemeClr val="tx1"/>
+            </a:fontRef>
+          </p:style>
+        </p:cxnSp>
+        <p:cxnSp>
+          <p:nvCxnSpPr>
+            <p:cNvPr id="191" name="Gerade Verbindung 190"/>
+            <p:cNvCxnSpPr/>
+            <p:nvPr/>
+          </p:nvCxnSpPr>
+          <p:spPr>
+            <a:xfrm flipV="1">
+              <a:off x="2771800" y="2348880"/>
+              <a:ext cx="288032" cy="288032"/>
+            </a:xfrm>
+            <a:prstGeom prst="line">
+              <a:avLst/>
+            </a:prstGeom>
+            <a:ln w="19050">
+              <a:solidFill>
+                <a:schemeClr val="tx1"/>
+              </a:solidFill>
+            </a:ln>
+          </p:spPr>
+          <p:style>
+            <a:lnRef idx="1">
+              <a:schemeClr val="accent1"/>
+            </a:lnRef>
+            <a:fillRef idx="0">
+              <a:schemeClr val="accent1"/>
+            </a:fillRef>
+            <a:effectRef idx="0">
+              <a:schemeClr val="accent1"/>
+            </a:effectRef>
+            <a:fontRef idx="minor">
+              <a:schemeClr val="tx1"/>
+            </a:fontRef>
+          </p:style>
+        </p:cxnSp>
+      </p:grpSp>
+      <p:cxnSp>
+        <p:nvCxnSpPr>
+          <p:cNvPr id="192" name="Gerade Verbindung 191"/>
+          <p:cNvCxnSpPr/>
+          <p:nvPr/>
+        </p:nvCxnSpPr>
+        <p:spPr>
+          <a:xfrm>
+            <a:off x="7452320" y="1916832"/>
+            <a:ext cx="288032" cy="0"/>
+          </a:xfrm>
+          <a:prstGeom prst="line">
+            <a:avLst/>
+          </a:prstGeom>
+          <a:ln w="19050">
+            <a:solidFill>
+              <a:schemeClr val="tx1"/>
+            </a:solidFill>
+          </a:ln>
+        </p:spPr>
+        <p:style>
+          <a:lnRef idx="1">
+            <a:schemeClr val="accent1"/>
+          </a:lnRef>
+          <a:fillRef idx="0">
+            <a:schemeClr val="accent1"/>
+          </a:fillRef>
+          <a:effectRef idx="0">
+            <a:schemeClr val="accent1"/>
+          </a:effectRef>
+          <a:fontRef idx="minor">
+            <a:schemeClr val="tx1"/>
+          </a:fontRef>
+        </p:style>
+      </p:cxnSp>
+      <p:cxnSp>
+        <p:nvCxnSpPr>
+          <p:cNvPr id="193" name="Gerade Verbindung 192"/>
+          <p:cNvCxnSpPr/>
+          <p:nvPr/>
+        </p:nvCxnSpPr>
+        <p:spPr>
+          <a:xfrm>
+            <a:off x="7452320" y="1844824"/>
+            <a:ext cx="288032" cy="0"/>
+          </a:xfrm>
+          <a:prstGeom prst="line">
+            <a:avLst/>
+          </a:prstGeom>
+          <a:ln w="19050">
+            <a:solidFill>
+              <a:schemeClr val="tx1"/>
+            </a:solidFill>
+          </a:ln>
+        </p:spPr>
+        <p:style>
+          <a:lnRef idx="1">
+            <a:schemeClr val="accent1"/>
+          </a:lnRef>
+          <a:fillRef idx="0">
+            <a:schemeClr val="accent1"/>
+          </a:fillRef>
+          <a:effectRef idx="0">
+            <a:schemeClr val="accent1"/>
+          </a:effectRef>
+          <a:fontRef idx="minor">
+            <a:schemeClr val="tx1"/>
+          </a:fontRef>
+        </p:style>
+      </p:cxnSp>
+      <p:cxnSp>
+        <p:nvCxnSpPr>
+          <p:cNvPr id="194" name="Gerade Verbindung 193"/>
+          <p:cNvCxnSpPr/>
+          <p:nvPr/>
+        </p:nvCxnSpPr>
+        <p:spPr>
+          <a:xfrm>
+            <a:off x="8532440" y="1628800"/>
+            <a:ext cx="0" cy="1677670"/>
+          </a:xfrm>
+          <a:prstGeom prst="line">
+            <a:avLst/>
+          </a:prstGeom>
+          <a:ln w="19050">
+            <a:solidFill>
+              <a:schemeClr val="tx1"/>
+            </a:solidFill>
+            <a:headEnd type="none" w="med" len="med"/>
+            <a:tailEnd type="none" w="med" len="med"/>
+          </a:ln>
+        </p:spPr>
+        <p:style>
+          <a:lnRef idx="1">
+            <a:schemeClr val="accent1"/>
+          </a:lnRef>
+          <a:fillRef idx="0">
+            <a:schemeClr val="accent1"/>
+          </a:fillRef>
+          <a:effectRef idx="0">
+            <a:schemeClr val="accent1"/>
+          </a:effectRef>
+          <a:fontRef idx="minor">
+            <a:schemeClr val="tx1"/>
+          </a:fontRef>
+        </p:style>
+      </p:cxnSp>
+      <p:cxnSp>
+        <p:nvCxnSpPr>
+          <p:cNvPr id="195" name="Gerade Verbindung 194"/>
+          <p:cNvCxnSpPr/>
+          <p:nvPr/>
+        </p:nvCxnSpPr>
+        <p:spPr>
+          <a:xfrm flipV="1">
+            <a:off x="7596336" y="1628800"/>
+            <a:ext cx="0" cy="216024"/>
+          </a:xfrm>
+          <a:prstGeom prst="line">
+            <a:avLst/>
+          </a:prstGeom>
+          <a:ln w="19050">
+            <a:solidFill>
+              <a:schemeClr val="tx1"/>
+            </a:solidFill>
+            <a:tailEnd type="oval"/>
+          </a:ln>
+        </p:spPr>
+        <p:style>
+          <a:lnRef idx="1">
+            <a:schemeClr val="accent1"/>
+          </a:lnRef>
+          <a:fillRef idx="0">
+            <a:schemeClr val="accent1"/>
+          </a:fillRef>
+          <a:effectRef idx="0">
+            <a:schemeClr val="accent1"/>
+          </a:effectRef>
+          <a:fontRef idx="minor">
+            <a:schemeClr val="tx1"/>
+          </a:fontRef>
+        </p:style>
+      </p:cxnSp>
+      <p:sp>
+        <p:nvSpPr>
+          <p:cNvPr id="196" name="Ellipse 195"/>
+          <p:cNvSpPr/>
+          <p:nvPr/>
+        </p:nvSpPr>
+        <p:spPr>
+          <a:xfrm>
+            <a:off x="7891142" y="1448636"/>
+            <a:ext cx="360040" cy="360040"/>
+          </a:xfrm>
+          <a:prstGeom prst="ellipse">
+            <a:avLst/>
+          </a:prstGeom>
+          <a:noFill/>
+          <a:ln w="19050">
+            <a:solidFill>
+              <a:schemeClr val="tx1"/>
+            </a:solidFill>
+          </a:ln>
+        </p:spPr>
+        <p:style>
+          <a:lnRef idx="2">
+            <a:schemeClr val="accent1">
+              <a:shade val="50000"/>
+            </a:schemeClr>
+          </a:lnRef>
+          <a:fillRef idx="1">
+            <a:schemeClr val="accent1"/>
+          </a:fillRef>
+          <a:effectRef idx="0">
+            <a:schemeClr val="accent1"/>
+          </a:effectRef>
+          <a:fontRef idx="minor">
+            <a:schemeClr val="lt1"/>
+          </a:fontRef>
+        </p:style>
+        <p:txBody>
+          <a:bodyPr rtlCol="0" anchor="ctr"/>
+          <a:lstStyle/>
+          <a:p>
+            <a:pPr algn="ctr"/>
+            <a:endParaRPr lang="de-DE" sz="1400" i="1" baseline="-25000" dirty="0">
+              <a:solidFill>
+                <a:schemeClr val="tx1"/>
+              </a:solidFill>
+              <a:latin typeface="Times New Roman" pitchFamily="18" charset="0"/>
+              <a:cs typeface="Times New Roman" pitchFamily="18" charset="0"/>
+            </a:endParaRPr>
+          </a:p>
+        </p:txBody>
+      </p:sp>
+      <p:sp>
+        <p:nvSpPr>
+          <p:cNvPr id="197" name="Rechteck 196"/>
+          <p:cNvSpPr/>
+          <p:nvPr/>
+        </p:nvSpPr>
+        <p:spPr>
+          <a:xfrm>
+            <a:off x="7882319" y="1465039"/>
+            <a:ext cx="352981" cy="307777"/>
+          </a:xfrm>
+          <a:prstGeom prst="rect">
+            <a:avLst/>
+          </a:prstGeom>
+          <a:ln w="19050">
+            <a:noFill/>
+          </a:ln>
+        </p:spPr>
+        <p:txBody>
+          <a:bodyPr wrap="none">
+            <a:spAutoFit/>
+          </a:bodyPr>
+          <a:lstStyle/>
+          <a:p>
+            <a:pPr algn="ctr"/>
+            <a:r>
+              <a:rPr lang="de-DE" sz="1400" i="1" dirty="0" err="1" smtClean="0">
+                <a:solidFill>
+                  <a:schemeClr val="tx1"/>
+                </a:solidFill>
+                <a:latin typeface="Times New Roman" pitchFamily="18" charset="0"/>
+                <a:cs typeface="Times New Roman" pitchFamily="18" charset="0"/>
+              </a:rPr>
+              <a:t>V</a:t>
+            </a:r>
+            <a:r>
+              <a:rPr lang="de-DE" sz="1400" i="1" baseline="-25000" dirty="0" err="1" smtClean="0">
+                <a:solidFill>
+                  <a:schemeClr val="tx1"/>
+                </a:solidFill>
+                <a:latin typeface="Times New Roman" pitchFamily="18" charset="0"/>
+                <a:cs typeface="Times New Roman" pitchFamily="18" charset="0"/>
+              </a:rPr>
+              <a:t>g</a:t>
+            </a:r>
+            <a:endParaRPr lang="de-DE" sz="2000" i="1" baseline="-25000" dirty="0">
+              <a:solidFill>
+                <a:schemeClr val="tx1"/>
+              </a:solidFill>
+              <a:latin typeface="Times New Roman" pitchFamily="18" charset="0"/>
+              <a:cs typeface="Times New Roman" pitchFamily="18" charset="0"/>
+            </a:endParaRPr>
+          </a:p>
+        </p:txBody>
+      </p:sp>
+      <p:cxnSp>
+        <p:nvCxnSpPr>
+          <p:cNvPr id="198" name="Gerade Verbindung 197"/>
+          <p:cNvCxnSpPr/>
+          <p:nvPr/>
+        </p:nvCxnSpPr>
+        <p:spPr>
+          <a:xfrm>
+            <a:off x="7587371" y="1623478"/>
+            <a:ext cx="288032" cy="0"/>
+          </a:xfrm>
+          <a:prstGeom prst="line">
+            <a:avLst/>
+          </a:prstGeom>
+          <a:ln w="19050">
+            <a:solidFill>
+              <a:schemeClr val="tx1"/>
+            </a:solidFill>
+          </a:ln>
+        </p:spPr>
+        <p:style>
+          <a:lnRef idx="1">
+            <a:schemeClr val="accent1"/>
+          </a:lnRef>
+          <a:fillRef idx="0">
+            <a:schemeClr val="accent1"/>
+          </a:fillRef>
+          <a:effectRef idx="0">
+            <a:schemeClr val="accent1"/>
+          </a:effectRef>
+          <a:fontRef idx="minor">
+            <a:schemeClr val="tx1"/>
+          </a:fontRef>
+        </p:style>
+      </p:cxnSp>
+      <p:cxnSp>
+        <p:nvCxnSpPr>
+          <p:cNvPr id="199" name="Gerade Verbindung 198"/>
+          <p:cNvCxnSpPr>
+            <a:endCxn id="196" idx="6"/>
+          </p:cNvCxnSpPr>
+          <p:nvPr/>
+        </p:nvCxnSpPr>
+        <p:spPr>
+          <a:xfrm flipH="1" flipV="1">
+            <a:off x="8251182" y="1628656"/>
+            <a:ext cx="281258" cy="144"/>
+          </a:xfrm>
+          <a:prstGeom prst="line">
+            <a:avLst/>
+          </a:prstGeom>
+          <a:ln w="19050">
+            <a:solidFill>
+              <a:schemeClr val="tx1"/>
+            </a:solidFill>
+          </a:ln>
+        </p:spPr>
+        <p:style>
+          <a:lnRef idx="1">
+            <a:schemeClr val="accent1"/>
+          </a:lnRef>
+          <a:fillRef idx="0">
+            <a:schemeClr val="accent1"/>
+          </a:fillRef>
+          <a:effectRef idx="0">
+            <a:schemeClr val="accent1"/>
+          </a:effectRef>
+          <a:fontRef idx="minor">
+            <a:schemeClr val="tx1"/>
+          </a:fontRef>
+        </p:style>
+      </p:cxnSp>
+      <p:cxnSp>
+        <p:nvCxnSpPr>
+          <p:cNvPr id="200" name="Gerade Verbindung 199"/>
+          <p:cNvCxnSpPr/>
+          <p:nvPr/>
+        </p:nvCxnSpPr>
+        <p:spPr>
+          <a:xfrm flipH="1">
+            <a:off x="6876256" y="2132856"/>
+            <a:ext cx="432048" cy="0"/>
+          </a:xfrm>
+          <a:prstGeom prst="line">
+            <a:avLst/>
+          </a:prstGeom>
+          <a:ln w="19050">
+            <a:solidFill>
+              <a:schemeClr val="tx1"/>
+            </a:solidFill>
+            <a:prstDash val="sysDot"/>
+          </a:ln>
+        </p:spPr>
+        <p:style>
+          <a:lnRef idx="1">
+            <a:schemeClr val="accent1"/>
+          </a:lnRef>
+          <a:fillRef idx="0">
+            <a:schemeClr val="accent1"/>
+          </a:fillRef>
+          <a:effectRef idx="0">
+            <a:schemeClr val="accent1"/>
+          </a:effectRef>
+          <a:fontRef idx="minor">
+            <a:schemeClr val="tx1"/>
+          </a:fontRef>
+        </p:style>
+      </p:cxnSp>
+      <p:cxnSp>
+        <p:nvCxnSpPr>
+          <p:cNvPr id="201" name="Gerade Verbindung 200"/>
+          <p:cNvCxnSpPr/>
+          <p:nvPr/>
+        </p:nvCxnSpPr>
+        <p:spPr>
+          <a:xfrm flipH="1">
+            <a:off x="6876256" y="2708920"/>
+            <a:ext cx="432048" cy="0"/>
+          </a:xfrm>
+          <a:prstGeom prst="line">
+            <a:avLst/>
+          </a:prstGeom>
+          <a:ln w="19050">
+            <a:solidFill>
+              <a:schemeClr val="tx1"/>
+            </a:solidFill>
+            <a:prstDash val="sysDot"/>
+          </a:ln>
+        </p:spPr>
+        <p:style>
+          <a:lnRef idx="1">
+            <a:schemeClr val="accent1"/>
+          </a:lnRef>
+          <a:fillRef idx="0">
+            <a:schemeClr val="accent1"/>
+          </a:fillRef>
+          <a:effectRef idx="0">
+            <a:schemeClr val="accent1"/>
+          </a:effectRef>
+          <a:fontRef idx="minor">
+            <a:schemeClr val="tx1"/>
+          </a:fontRef>
+        </p:style>
+      </p:cxnSp>
+      <p:cxnSp>
+        <p:nvCxnSpPr>
+          <p:cNvPr id="202" name="Gerade Verbindung 201"/>
+          <p:cNvCxnSpPr/>
+          <p:nvPr/>
+        </p:nvCxnSpPr>
+        <p:spPr>
+          <a:xfrm>
+            <a:off x="6876256" y="2132856"/>
+            <a:ext cx="0" cy="216024"/>
+          </a:xfrm>
+          <a:prstGeom prst="line">
+            <a:avLst/>
+          </a:prstGeom>
+          <a:ln w="19050">
+            <a:solidFill>
+              <a:schemeClr val="tx1"/>
+            </a:solidFill>
+            <a:prstDash val="sysDot"/>
+          </a:ln>
+        </p:spPr>
+        <p:style>
+          <a:lnRef idx="1">
+            <a:schemeClr val="accent1"/>
+          </a:lnRef>
+          <a:fillRef idx="0">
+            <a:schemeClr val="accent1"/>
+          </a:fillRef>
+          <a:effectRef idx="0">
+            <a:schemeClr val="accent1"/>
+          </a:effectRef>
+          <a:fontRef idx="minor">
+            <a:schemeClr val="tx1"/>
+          </a:fontRef>
+        </p:style>
+      </p:cxnSp>
+      <p:cxnSp>
+        <p:nvCxnSpPr>
+          <p:cNvPr id="203" name="Gerade Verbindung 202"/>
+          <p:cNvCxnSpPr/>
+          <p:nvPr/>
+        </p:nvCxnSpPr>
+        <p:spPr>
+          <a:xfrm>
+            <a:off x="6741205" y="2474351"/>
+            <a:ext cx="288032" cy="0"/>
+          </a:xfrm>
+          <a:prstGeom prst="line">
+            <a:avLst/>
+          </a:prstGeom>
+          <a:ln w="19050">
+            <a:solidFill>
+              <a:schemeClr val="tx1"/>
+            </a:solidFill>
+            <a:prstDash val="solid"/>
+          </a:ln>
+        </p:spPr>
+        <p:style>
+          <a:lnRef idx="1">
+            <a:schemeClr val="accent1"/>
+          </a:lnRef>
+          <a:fillRef idx="0">
+            <a:schemeClr val="accent1"/>
+          </a:fillRef>
+          <a:effectRef idx="0">
+            <a:schemeClr val="accent1"/>
+          </a:effectRef>
+          <a:fontRef idx="minor">
+            <a:schemeClr val="tx1"/>
+          </a:fontRef>
+        </p:style>
+      </p:cxnSp>
+      <p:cxnSp>
+        <p:nvCxnSpPr>
+          <p:cNvPr id="204" name="Gerade Verbindung 203"/>
+          <p:cNvCxnSpPr/>
+          <p:nvPr/>
+        </p:nvCxnSpPr>
+        <p:spPr>
+          <a:xfrm>
+            <a:off x="6741205" y="2366483"/>
+            <a:ext cx="288032" cy="0"/>
+          </a:xfrm>
+          <a:prstGeom prst="line">
+            <a:avLst/>
+          </a:prstGeom>
+          <a:ln w="19050">
+            <a:solidFill>
+              <a:schemeClr val="tx1"/>
+            </a:solidFill>
+            <a:prstDash val="solid"/>
+          </a:ln>
+        </p:spPr>
+        <p:style>
+          <a:lnRef idx="1">
+            <a:schemeClr val="accent1"/>
+          </a:lnRef>
+          <a:fillRef idx="0">
+            <a:schemeClr val="accent1"/>
+          </a:fillRef>
+          <a:effectRef idx="0">
+            <a:schemeClr val="accent1"/>
+          </a:effectRef>
+          <a:fontRef idx="minor">
+            <a:schemeClr val="tx1"/>
+          </a:fontRef>
+        </p:style>
+      </p:cxnSp>
+      <p:cxnSp>
+        <p:nvCxnSpPr>
+          <p:cNvPr id="205" name="Gerade Verbindung 204"/>
+          <p:cNvCxnSpPr/>
+          <p:nvPr/>
+        </p:nvCxnSpPr>
+        <p:spPr>
+          <a:xfrm>
+            <a:off x="6876256" y="2492896"/>
+            <a:ext cx="0" cy="216024"/>
+          </a:xfrm>
+          <a:prstGeom prst="line">
+            <a:avLst/>
+          </a:prstGeom>
+          <a:ln w="19050">
+            <a:solidFill>
+              <a:schemeClr val="tx1"/>
+            </a:solidFill>
+            <a:prstDash val="sysDot"/>
+          </a:ln>
+        </p:spPr>
+        <p:style>
+          <a:lnRef idx="1">
+            <a:schemeClr val="accent1"/>
+          </a:lnRef>
+          <a:fillRef idx="0">
+            <a:schemeClr val="accent1"/>
+          </a:fillRef>
+          <a:effectRef idx="0">
+            <a:schemeClr val="accent1"/>
+          </a:effectRef>
+          <a:fontRef idx="minor">
+            <a:schemeClr val="tx1"/>
+          </a:fontRef>
+        </p:style>
+      </p:cxnSp>
+      <p:sp>
+        <p:nvSpPr>
+          <p:cNvPr id="206" name="Textfeld 205"/>
+          <p:cNvSpPr txBox="1"/>
+          <p:nvPr/>
+        </p:nvSpPr>
+        <p:spPr>
+          <a:xfrm>
+            <a:off x="1610419" y="2211000"/>
+            <a:ext cx="429926" cy="369332"/>
+          </a:xfrm>
+          <a:prstGeom prst="rect">
+            <a:avLst/>
+          </a:prstGeom>
+          <a:noFill/>
+        </p:spPr>
+        <p:txBody>
+          <a:bodyPr wrap="none" rtlCol="0">
+            <a:spAutoFit/>
+          </a:bodyPr>
+          <a:lstStyle/>
+          <a:p>
+            <a:r>
+              <a:rPr lang="de-DE" i="1" dirty="0" smtClean="0">
+                <a:latin typeface="Times New Roman" pitchFamily="18" charset="0"/>
+                <a:cs typeface="Times New Roman" pitchFamily="18" charset="0"/>
+              </a:rPr>
+              <a:t>C</a:t>
+            </a:r>
+            <a:r>
+              <a:rPr lang="el-GR" i="1" baseline="-25000" dirty="0" smtClean="0">
+                <a:latin typeface="Times New Roman"/>
+                <a:cs typeface="Times New Roman"/>
+              </a:rPr>
+              <a:t>Σ</a:t>
+            </a:r>
+            <a:endParaRPr lang="de-DE" i="1" baseline="-25000" dirty="0">
+              <a:latin typeface="Times New Roman" pitchFamily="18" charset="0"/>
+              <a:cs typeface="Times New Roman" pitchFamily="18" charset="0"/>
+            </a:endParaRPr>
+          </a:p>
+        </p:txBody>
+      </p:sp>
+      <p:sp>
+        <p:nvSpPr>
+          <p:cNvPr id="207" name="Textfeld 206"/>
+          <p:cNvSpPr txBox="1"/>
+          <p:nvPr/>
+        </p:nvSpPr>
+        <p:spPr>
+          <a:xfrm>
+            <a:off x="7956376" y="2204864"/>
+            <a:ext cx="394660" cy="369332"/>
+          </a:xfrm>
+          <a:prstGeom prst="rect">
+            <a:avLst/>
+          </a:prstGeom>
+          <a:noFill/>
+        </p:spPr>
+        <p:txBody>
+          <a:bodyPr wrap="none" rtlCol="0">
+            <a:spAutoFit/>
+          </a:bodyPr>
+          <a:lstStyle/>
+          <a:p>
+            <a:r>
+              <a:rPr lang="de-DE" i="1" dirty="0" smtClean="0">
+                <a:latin typeface="Times New Roman" pitchFamily="18" charset="0"/>
+                <a:cs typeface="Times New Roman" pitchFamily="18" charset="0"/>
+              </a:rPr>
+              <a:t>E</a:t>
+            </a:r>
+            <a:r>
+              <a:rPr lang="de-DE" i="1" baseline="-25000" dirty="0" smtClean="0">
+                <a:latin typeface="Times New Roman" pitchFamily="18" charset="0"/>
+                <a:cs typeface="Times New Roman" pitchFamily="18" charset="0"/>
+              </a:rPr>
+              <a:t>J</a:t>
+            </a:r>
+            <a:endParaRPr lang="de-DE" i="1" baseline="-25000" dirty="0">
+              <a:latin typeface="Times New Roman" pitchFamily="18" charset="0"/>
+              <a:cs typeface="Times New Roman" pitchFamily="18" charset="0"/>
+            </a:endParaRPr>
+          </a:p>
+        </p:txBody>
+      </p:sp>
+      <p:sp>
+        <p:nvSpPr>
+          <p:cNvPr id="208" name="Textfeld 207"/>
+          <p:cNvSpPr txBox="1"/>
+          <p:nvPr/>
+        </p:nvSpPr>
+        <p:spPr>
+          <a:xfrm>
+            <a:off x="7029237" y="1673913"/>
+            <a:ext cx="415498" cy="369332"/>
+          </a:xfrm>
+          <a:prstGeom prst="rect">
+            <a:avLst/>
+          </a:prstGeom>
+          <a:noFill/>
+        </p:spPr>
+        <p:txBody>
+          <a:bodyPr wrap="none" rtlCol="0">
+            <a:spAutoFit/>
+          </a:bodyPr>
+          <a:lstStyle/>
+          <a:p>
+            <a:r>
+              <a:rPr lang="de-DE" i="1" dirty="0" err="1" smtClean="0">
+                <a:latin typeface="Times New Roman" pitchFamily="18" charset="0"/>
+                <a:cs typeface="Times New Roman" pitchFamily="18" charset="0"/>
+              </a:rPr>
+              <a:t>C</a:t>
+            </a:r>
+            <a:r>
+              <a:rPr lang="de-DE" i="1" baseline="-25000" dirty="0" err="1" smtClean="0">
+                <a:latin typeface="Times New Roman" pitchFamily="18" charset="0"/>
+                <a:cs typeface="Times New Roman" pitchFamily="18" charset="0"/>
+              </a:rPr>
+              <a:t>g</a:t>
+            </a:r>
+            <a:endParaRPr lang="de-DE" i="1" baseline="-25000" dirty="0">
+              <a:latin typeface="Times New Roman" pitchFamily="18" charset="0"/>
+              <a:cs typeface="Times New Roman" pitchFamily="18" charset="0"/>
+            </a:endParaRPr>
+          </a:p>
+        </p:txBody>
+      </p:sp>
+      <p:grpSp>
+        <p:nvGrpSpPr>
+          <p:cNvPr id="209" name="Gruppieren 208"/>
+          <p:cNvGrpSpPr/>
+          <p:nvPr/>
+        </p:nvGrpSpPr>
+        <p:grpSpPr>
+          <a:xfrm>
+            <a:off x="7860084" y="3239234"/>
+            <a:ext cx="456332" cy="571292"/>
+            <a:chOff x="5148064" y="4513892"/>
+            <a:chExt cx="456332" cy="571292"/>
+          </a:xfrm>
+        </p:grpSpPr>
+        <p:cxnSp>
+          <p:nvCxnSpPr>
+            <p:cNvPr id="210" name="Gerade Verbindung 209"/>
+            <p:cNvCxnSpPr/>
+            <p:nvPr/>
+          </p:nvCxnSpPr>
+          <p:spPr>
+            <a:xfrm>
+              <a:off x="5364088" y="4581128"/>
+              <a:ext cx="0" cy="360040"/>
+            </a:xfrm>
+            <a:prstGeom prst="line">
+              <a:avLst/>
+            </a:prstGeom>
+            <a:ln w="19050">
+              <a:solidFill>
+                <a:schemeClr val="tx1"/>
+              </a:solidFill>
+              <a:headEnd type="oval" w="med" len="med"/>
+              <a:tailEnd type="none" w="med" len="med"/>
+            </a:ln>
+          </p:spPr>
+          <p:style>
+            <a:lnRef idx="1">
+              <a:schemeClr val="accent1"/>
+            </a:lnRef>
+            <a:fillRef idx="0">
+              <a:schemeClr val="accent1"/>
+            </a:fillRef>
+            <a:effectRef idx="0">
+              <a:schemeClr val="accent1"/>
+            </a:effectRef>
+            <a:fontRef idx="minor">
+              <a:schemeClr val="tx1"/>
+            </a:fontRef>
+          </p:style>
+        </p:cxnSp>
+        <p:cxnSp>
+          <p:nvCxnSpPr>
+            <p:cNvPr id="211" name="Gerade Verbindung 210"/>
+            <p:cNvCxnSpPr/>
+            <p:nvPr/>
+          </p:nvCxnSpPr>
+          <p:spPr>
+            <a:xfrm>
+              <a:off x="5148064" y="4941168"/>
+              <a:ext cx="432048" cy="0"/>
+            </a:xfrm>
+            <a:prstGeom prst="line">
+              <a:avLst/>
+            </a:prstGeom>
+            <a:ln w="19050">
+              <a:solidFill>
+                <a:schemeClr val="tx1"/>
+              </a:solidFill>
+            </a:ln>
+          </p:spPr>
+          <p:style>
+            <a:lnRef idx="1">
+              <a:schemeClr val="accent1"/>
+            </a:lnRef>
+            <a:fillRef idx="0">
+              <a:schemeClr val="accent1"/>
+            </a:fillRef>
+            <a:effectRef idx="0">
+              <a:schemeClr val="accent1"/>
+            </a:effectRef>
+            <a:fontRef idx="minor">
+              <a:schemeClr val="tx1"/>
+            </a:fontRef>
+          </p:style>
+        </p:cxnSp>
+        <p:cxnSp>
+          <p:nvCxnSpPr>
+            <p:cNvPr id="212" name="Gerade Verbindung 211"/>
+            <p:cNvCxnSpPr/>
+            <p:nvPr/>
+          </p:nvCxnSpPr>
+          <p:spPr>
+            <a:xfrm flipH="1">
+              <a:off x="5220072" y="5013176"/>
+              <a:ext cx="288032" cy="0"/>
+            </a:xfrm>
+            <a:prstGeom prst="line">
+              <a:avLst/>
+            </a:prstGeom>
+            <a:ln w="19050">
+              <a:solidFill>
+                <a:schemeClr val="tx1"/>
+              </a:solidFill>
+            </a:ln>
+          </p:spPr>
+          <p:style>
+            <a:lnRef idx="1">
+              <a:schemeClr val="accent1"/>
+            </a:lnRef>
+            <a:fillRef idx="0">
+              <a:schemeClr val="accent1"/>
+            </a:fillRef>
+            <a:effectRef idx="0">
+              <a:schemeClr val="accent1"/>
+            </a:effectRef>
+            <a:fontRef idx="minor">
+              <a:schemeClr val="tx1"/>
+            </a:fontRef>
+          </p:style>
+        </p:cxnSp>
+        <p:cxnSp>
+          <p:nvCxnSpPr>
+            <p:cNvPr id="213" name="Gerade Verbindung 212"/>
+            <p:cNvCxnSpPr/>
+            <p:nvPr/>
+          </p:nvCxnSpPr>
+          <p:spPr>
+            <a:xfrm flipH="1">
+              <a:off x="5292080" y="5085184"/>
+              <a:ext cx="144016" cy="0"/>
+            </a:xfrm>
+            <a:prstGeom prst="line">
+              <a:avLst/>
+            </a:prstGeom>
+            <a:ln w="19050">
+              <a:solidFill>
+                <a:schemeClr val="tx1"/>
+              </a:solidFill>
+            </a:ln>
+          </p:spPr>
+          <p:style>
+            <a:lnRef idx="1">
+              <a:schemeClr val="accent1"/>
+            </a:lnRef>
+            <a:fillRef idx="0">
+              <a:schemeClr val="accent1"/>
+            </a:fillRef>
+            <a:effectRef idx="0">
+              <a:schemeClr val="accent1"/>
+            </a:effectRef>
+            <a:fontRef idx="minor">
+              <a:schemeClr val="tx1"/>
+            </a:fontRef>
+          </p:style>
+        </p:cxnSp>
+        <p:sp>
+          <p:nvSpPr>
+            <p:cNvPr id="214" name="Textfeld 213"/>
+            <p:cNvSpPr txBox="1"/>
+            <p:nvPr/>
+          </p:nvSpPr>
+          <p:spPr>
+            <a:xfrm>
+              <a:off x="5315534" y="4513892"/>
+              <a:ext cx="288862" cy="338554"/>
+            </a:xfrm>
+            <a:prstGeom prst="rect">
+              <a:avLst/>
+            </a:prstGeom>
+            <a:noFill/>
+          </p:spPr>
+          <p:txBody>
+            <a:bodyPr wrap="none" rtlCol="0">
+              <a:spAutoFit/>
+            </a:bodyPr>
+            <a:lstStyle/>
+            <a:p>
+              <a:r>
+                <a:rPr lang="de-DE" sz="1600" dirty="0" smtClean="0"/>
+                <a:t>0</a:t>
+              </a:r>
+              <a:endParaRPr lang="de-DE" sz="1600" dirty="0"/>
+            </a:p>
+          </p:txBody>
+        </p:sp>
+      </p:grpSp>
+      <p:sp>
+        <p:nvSpPr>
+          <p:cNvPr id="215" name="Textfeld 214"/>
+          <p:cNvSpPr txBox="1"/>
+          <p:nvPr/>
+        </p:nvSpPr>
+        <p:spPr>
+          <a:xfrm>
+            <a:off x="7531702" y="1870130"/>
+            <a:ext cx="288862" cy="338554"/>
+          </a:xfrm>
+          <a:prstGeom prst="rect">
+            <a:avLst/>
+          </a:prstGeom>
+          <a:noFill/>
+        </p:spPr>
+        <p:txBody>
+          <a:bodyPr wrap="none" rtlCol="0">
+            <a:spAutoFit/>
+          </a:bodyPr>
+          <a:lstStyle/>
+          <a:p>
+            <a:r>
+              <a:rPr lang="de-DE" sz="1600" dirty="0" smtClean="0"/>
+              <a:t>1</a:t>
+            </a:r>
+            <a:endParaRPr lang="de-DE" sz="1600" dirty="0"/>
+          </a:p>
+        </p:txBody>
+      </p:sp>
+      <p:sp>
+        <p:nvSpPr>
+          <p:cNvPr id="216" name="Textfeld 215"/>
+          <p:cNvSpPr txBox="1"/>
+          <p:nvPr/>
+        </p:nvSpPr>
+        <p:spPr>
+          <a:xfrm>
+            <a:off x="7459300" y="1324600"/>
+            <a:ext cx="288862" cy="338554"/>
+          </a:xfrm>
+          <a:prstGeom prst="rect">
+            <a:avLst/>
+          </a:prstGeom>
+          <a:noFill/>
+        </p:spPr>
+        <p:txBody>
+          <a:bodyPr wrap="none" rtlCol="0">
+            <a:spAutoFit/>
+          </a:bodyPr>
+          <a:lstStyle/>
+          <a:p>
+            <a:r>
+              <a:rPr lang="de-DE" sz="1600" dirty="0" smtClean="0"/>
+              <a:t>2</a:t>
+            </a:r>
+            <a:endParaRPr lang="de-DE" sz="1600" dirty="0"/>
+          </a:p>
+        </p:txBody>
+      </p:sp>
+      <p:cxnSp>
+        <p:nvCxnSpPr>
+          <p:cNvPr id="217" name="Gerade Verbindung 216"/>
+          <p:cNvCxnSpPr>
+            <a:stCxn id="185" idx="2"/>
+          </p:cNvCxnSpPr>
+          <p:nvPr/>
+        </p:nvCxnSpPr>
+        <p:spPr>
+          <a:xfrm>
+            <a:off x="7596336" y="2708920"/>
+            <a:ext cx="0" cy="216024"/>
+          </a:xfrm>
+          <a:prstGeom prst="line">
+            <a:avLst/>
+          </a:prstGeom>
+          <a:ln w="19050">
+            <a:solidFill>
+              <a:schemeClr val="tx1"/>
+            </a:solidFill>
+          </a:ln>
+        </p:spPr>
+        <p:style>
+          <a:lnRef idx="1">
+            <a:schemeClr val="accent1"/>
+          </a:lnRef>
+          <a:fillRef idx="0">
+            <a:schemeClr val="accent1"/>
+          </a:fillRef>
+          <a:effectRef idx="0">
+            <a:schemeClr val="accent1"/>
+          </a:effectRef>
+          <a:fontRef idx="minor">
+            <a:schemeClr val="tx1"/>
+          </a:fontRef>
+        </p:style>
+      </p:cxnSp>
+      <p:cxnSp>
+        <p:nvCxnSpPr>
+          <p:cNvPr id="218" name="Gerade Verbindung 217"/>
+          <p:cNvCxnSpPr/>
+          <p:nvPr/>
+        </p:nvCxnSpPr>
+        <p:spPr>
+          <a:xfrm>
+            <a:off x="7596336" y="3306470"/>
+            <a:ext cx="936104" cy="0"/>
+          </a:xfrm>
+          <a:prstGeom prst="line">
+            <a:avLst/>
+          </a:prstGeom>
+          <a:ln w="19050">
+            <a:solidFill>
+              <a:schemeClr val="tx1"/>
+            </a:solidFill>
+          </a:ln>
+        </p:spPr>
+        <p:style>
+          <a:lnRef idx="1">
+            <a:schemeClr val="accent1"/>
+          </a:lnRef>
+          <a:fillRef idx="0">
+            <a:schemeClr val="accent1"/>
+          </a:fillRef>
+          <a:effectRef idx="0">
+            <a:schemeClr val="accent1"/>
+          </a:effectRef>
+          <a:fontRef idx="minor">
+            <a:schemeClr val="tx1"/>
+          </a:fontRef>
+        </p:style>
+      </p:cxnSp>
+      <p:sp>
+        <p:nvSpPr>
+          <p:cNvPr id="219" name="Bogen 218"/>
+          <p:cNvSpPr/>
+          <p:nvPr/>
+        </p:nvSpPr>
+        <p:spPr>
+          <a:xfrm>
+            <a:off x="7433786" y="2245982"/>
+            <a:ext cx="329150" cy="341506"/>
+          </a:xfrm>
+          <a:prstGeom prst="arc">
+            <a:avLst>
+              <a:gd name="adj1" fmla="val 16200000"/>
+              <a:gd name="adj2" fmla="val 13631433"/>
+            </a:avLst>
+          </a:prstGeom>
+          <a:ln>
+            <a:solidFill>
+              <a:srgbClr val="FF0000"/>
+            </a:solidFill>
+            <a:headEnd type="none" w="med" len="med"/>
+            <a:tailEnd type="triangle" w="med" len="med"/>
+          </a:ln>
+        </p:spPr>
+        <p:style>
+          <a:lnRef idx="1">
+            <a:schemeClr val="accent1"/>
+          </a:lnRef>
+          <a:fillRef idx="0">
+            <a:schemeClr val="accent1"/>
+          </a:fillRef>
+          <a:effectRef idx="0">
+            <a:schemeClr val="accent1"/>
+          </a:effectRef>
+          <a:fontRef idx="minor">
+            <a:schemeClr val="tx1"/>
+          </a:fontRef>
+        </p:style>
+        <p:txBody>
+          <a:bodyPr rtlCol="0" anchor="ctr"/>
+          <a:lstStyle/>
+          <a:p>
+            <a:pPr algn="ctr"/>
+            <a:endParaRPr lang="de-DE"/>
+          </a:p>
+        </p:txBody>
+      </p:sp>
+      <p:sp>
+        <p:nvSpPr>
+          <p:cNvPr id="220" name="Textfeld 219"/>
+          <p:cNvSpPr txBox="1"/>
+          <p:nvPr/>
+        </p:nvSpPr>
+        <p:spPr>
+          <a:xfrm>
+            <a:off x="7380312" y="2269483"/>
+            <a:ext cx="420308" cy="276999"/>
+          </a:xfrm>
+          <a:prstGeom prst="rect">
+            <a:avLst/>
+          </a:prstGeom>
+          <a:noFill/>
+        </p:spPr>
+        <p:txBody>
+          <a:bodyPr wrap="none" rtlCol="0">
+            <a:spAutoFit/>
+          </a:bodyPr>
+          <a:lstStyle/>
+          <a:p>
+            <a:r>
+              <a:rPr lang="el-GR" sz="1200" i="1" dirty="0" smtClean="0">
+                <a:latin typeface="Times New Roman" pitchFamily="18" charset="0"/>
+                <a:cs typeface="Times New Roman" pitchFamily="18" charset="0"/>
+              </a:rPr>
+              <a:t>Φ</a:t>
+            </a:r>
+            <a:r>
+              <a:rPr lang="de-DE" sz="1200" i="1" baseline="-25000" dirty="0" smtClean="0">
+                <a:latin typeface="Times New Roman" pitchFamily="18" charset="0"/>
+                <a:cs typeface="Times New Roman" pitchFamily="18" charset="0"/>
+              </a:rPr>
+              <a:t>ext</a:t>
+            </a:r>
+          </a:p>
+        </p:txBody>
+      </p:sp>
+      <p:cxnSp>
+        <p:nvCxnSpPr>
+          <p:cNvPr id="221" name="Gerade Verbindung 220"/>
+          <p:cNvCxnSpPr/>
+          <p:nvPr/>
+        </p:nvCxnSpPr>
+        <p:spPr>
+          <a:xfrm>
+            <a:off x="7452320" y="3006082"/>
+            <a:ext cx="288032" cy="0"/>
+          </a:xfrm>
+          <a:prstGeom prst="line">
+            <a:avLst/>
+          </a:prstGeom>
+          <a:ln w="19050">
+            <a:solidFill>
+              <a:schemeClr val="tx1"/>
+            </a:solidFill>
+          </a:ln>
+        </p:spPr>
+        <p:style>
+          <a:lnRef idx="1">
+            <a:schemeClr val="accent1"/>
+          </a:lnRef>
+          <a:fillRef idx="0">
+            <a:schemeClr val="accent1"/>
+          </a:fillRef>
+          <a:effectRef idx="0">
+            <a:schemeClr val="accent1"/>
+          </a:effectRef>
+          <a:fontRef idx="minor">
+            <a:schemeClr val="tx1"/>
+          </a:fontRef>
+        </p:style>
+      </p:cxnSp>
+      <p:cxnSp>
+        <p:nvCxnSpPr>
+          <p:cNvPr id="222" name="Gerade Verbindung 221"/>
+          <p:cNvCxnSpPr/>
+          <p:nvPr/>
+        </p:nvCxnSpPr>
+        <p:spPr>
+          <a:xfrm>
+            <a:off x="7452320" y="2934074"/>
+            <a:ext cx="288032" cy="0"/>
+          </a:xfrm>
+          <a:prstGeom prst="line">
+            <a:avLst/>
+          </a:prstGeom>
+          <a:ln w="19050">
+            <a:solidFill>
+              <a:schemeClr val="tx1"/>
+            </a:solidFill>
+          </a:ln>
+        </p:spPr>
+        <p:style>
+          <a:lnRef idx="1">
+            <a:schemeClr val="accent1"/>
+          </a:lnRef>
+          <a:fillRef idx="0">
+            <a:schemeClr val="accent1"/>
+          </a:fillRef>
+          <a:effectRef idx="0">
+            <a:schemeClr val="accent1"/>
+          </a:effectRef>
+          <a:fontRef idx="minor">
+            <a:schemeClr val="tx1"/>
+          </a:fontRef>
+        </p:style>
+      </p:cxnSp>
+      <p:cxnSp>
+        <p:nvCxnSpPr>
+          <p:cNvPr id="223" name="Gerade Verbindung 222"/>
+          <p:cNvCxnSpPr/>
+          <p:nvPr/>
+        </p:nvCxnSpPr>
+        <p:spPr>
+          <a:xfrm>
+            <a:off x="7596336" y="3018438"/>
+            <a:ext cx="0" cy="288032"/>
+          </a:xfrm>
+          <a:prstGeom prst="line">
+            <a:avLst/>
+          </a:prstGeom>
+          <a:ln w="19050">
+            <a:solidFill>
+              <a:schemeClr val="tx1"/>
+            </a:solidFill>
+          </a:ln>
+        </p:spPr>
+        <p:style>
+          <a:lnRef idx="1">
+            <a:schemeClr val="accent1"/>
+          </a:lnRef>
+          <a:fillRef idx="0">
+            <a:schemeClr val="accent1"/>
+          </a:fillRef>
+          <a:effectRef idx="0">
+            <a:schemeClr val="accent1"/>
+          </a:effectRef>
+          <a:fontRef idx="minor">
+            <a:schemeClr val="tx1"/>
+          </a:fontRef>
+        </p:style>
+      </p:cxnSp>
+      <p:cxnSp>
+        <p:nvCxnSpPr>
+          <p:cNvPr id="225" name="Gerade Verbindung mit Pfeil 224"/>
+          <p:cNvCxnSpPr/>
+          <p:nvPr/>
+        </p:nvCxnSpPr>
+        <p:spPr>
+          <a:xfrm flipV="1">
+            <a:off x="2546523" y="2211817"/>
+            <a:ext cx="126418" cy="431232"/>
+          </a:xfrm>
+          <a:prstGeom prst="straightConnector1">
+            <a:avLst/>
+          </a:prstGeom>
+          <a:ln>
+            <a:solidFill>
+              <a:schemeClr val="tx1"/>
+            </a:solidFill>
+            <a:tailEnd type="arrow"/>
+          </a:ln>
+        </p:spPr>
+        <p:style>
+          <a:lnRef idx="1">
+            <a:schemeClr val="accent1"/>
+          </a:lnRef>
+          <a:fillRef idx="0">
+            <a:schemeClr val="accent1"/>
+          </a:fillRef>
+          <a:effectRef idx="0">
+            <a:schemeClr val="accent1"/>
+          </a:effectRef>
+          <a:fontRef idx="minor">
+            <a:schemeClr val="tx1"/>
+          </a:fontRef>
+        </p:style>
+      </p:cxnSp>
+    </p:spTree>
+  </p:cSld>
+  <p:clrMapOvr>
+    <a:masterClrMapping/>
+  </p:clrMapOvr>
+  <p:timing>
+    <p:tnLst>
+      <p:par>
+        <p:cTn id="1" dur="indefinite" restart="never" nodeType="tmRoot"/>
+      </p:par>
+    </p:tnLst>
+  </p:timing>
+</p:sld>
+</file>
+
+<file path=ppt/slides/slide3.xml><?xml version="1.0" encoding="utf-8"?>
+<p:sld xmlns:a="http://schemas.openxmlformats.org/drawingml/2006/main" xmlns:r="http://schemas.openxmlformats.org/officeDocument/2006/relationships" xmlns:p="http://schemas.openxmlformats.org/presentationml/2006/main">
+  <p:cSld>
+    <p:spTree>
+      <p:nvGrpSpPr>
+        <p:cNvPr id="1" name=""/>
+        <p:cNvGrpSpPr/>
+        <p:nvPr/>
+      </p:nvGrpSpPr>
+      <p:grpSpPr>
+        <a:xfrm>
+          <a:off x="0" y="0"/>
+          <a:ext cx="0" cy="0"/>
+          <a:chOff x="0" y="0"/>
+          <a:chExt cx="0" cy="0"/>
+        </a:xfrm>
+      </p:grpSpPr>
+      <p:cxnSp>
+        <p:nvCxnSpPr>
           <p:cNvPr id="84" name="Gerade Verbindung 83"/>
           <p:cNvCxnSpPr/>
           <p:nvPr/>
@@ -8448,10 +12488,17 @@
   <p:clrMapOvr>
     <a:masterClrMapping/>
   </p:clrMapOvr>
+  <p:timing>
+    <p:tnLst>
+      <p:par>
+        <p:cTn id="1" dur="indefinite" restart="never" nodeType="tmRoot"/>
+      </p:par>
+    </p:tnLst>
+  </p:timing>
 </p:sld>
 </file>
 
-<file path=ppt/slides/slide3.xml><?xml version="1.0" encoding="utf-8"?>
+<file path=ppt/slides/slide4.xml><?xml version="1.0" encoding="utf-8"?>
 <p:sld xmlns:a="http://schemas.openxmlformats.org/drawingml/2006/main" xmlns:r="http://schemas.openxmlformats.org/officeDocument/2006/relationships" xmlns:p="http://schemas.openxmlformats.org/presentationml/2006/main">
   <p:cSld>
     <p:spTree>

</xml_diff>

<commit_message>
Worked on the theory and processor design sections.
</commit_message>
<xml_diff>
--- a/material/figures/introduction/cooper_pair_box.pptx
+++ b/material/figures/introduction/cooper_pair_box.pptx
@@ -292,7 +292,7 @@
             <a:fld id="{E233F2FC-336D-4AEC-8E34-B26C5DCCE050}" type="datetimeFigureOut">
               <a:rPr lang="de-DE" smtClean="0"/>
               <a:pPr/>
-              <a:t>13.07.2012</a:t>
+              <a:t>16.07.2012</a:t>
             </a:fld>
             <a:endParaRPr lang="de-DE"/>
           </a:p>
@@ -459,7 +459,7 @@
             <a:fld id="{E233F2FC-336D-4AEC-8E34-B26C5DCCE050}" type="datetimeFigureOut">
               <a:rPr lang="de-DE" smtClean="0"/>
               <a:pPr/>
-              <a:t>13.07.2012</a:t>
+              <a:t>16.07.2012</a:t>
             </a:fld>
             <a:endParaRPr lang="de-DE"/>
           </a:p>
@@ -636,7 +636,7 @@
             <a:fld id="{E233F2FC-336D-4AEC-8E34-B26C5DCCE050}" type="datetimeFigureOut">
               <a:rPr lang="de-DE" smtClean="0"/>
               <a:pPr/>
-              <a:t>13.07.2012</a:t>
+              <a:t>16.07.2012</a:t>
             </a:fld>
             <a:endParaRPr lang="de-DE"/>
           </a:p>
@@ -803,7 +803,7 @@
             <a:fld id="{E233F2FC-336D-4AEC-8E34-B26C5DCCE050}" type="datetimeFigureOut">
               <a:rPr lang="de-DE" smtClean="0"/>
               <a:pPr/>
-              <a:t>13.07.2012</a:t>
+              <a:t>16.07.2012</a:t>
             </a:fld>
             <a:endParaRPr lang="de-DE"/>
           </a:p>
@@ -1046,7 +1046,7 @@
             <a:fld id="{E233F2FC-336D-4AEC-8E34-B26C5DCCE050}" type="datetimeFigureOut">
               <a:rPr lang="de-DE" smtClean="0"/>
               <a:pPr/>
-              <a:t>13.07.2012</a:t>
+              <a:t>16.07.2012</a:t>
             </a:fld>
             <a:endParaRPr lang="de-DE"/>
           </a:p>
@@ -1331,7 +1331,7 @@
             <a:fld id="{E233F2FC-336D-4AEC-8E34-B26C5DCCE050}" type="datetimeFigureOut">
               <a:rPr lang="de-DE" smtClean="0"/>
               <a:pPr/>
-              <a:t>13.07.2012</a:t>
+              <a:t>16.07.2012</a:t>
             </a:fld>
             <a:endParaRPr lang="de-DE"/>
           </a:p>
@@ -1750,7 +1750,7 @@
             <a:fld id="{E233F2FC-336D-4AEC-8E34-B26C5DCCE050}" type="datetimeFigureOut">
               <a:rPr lang="de-DE" smtClean="0"/>
               <a:pPr/>
-              <a:t>13.07.2012</a:t>
+              <a:t>16.07.2012</a:t>
             </a:fld>
             <a:endParaRPr lang="de-DE"/>
           </a:p>
@@ -1865,7 +1865,7 @@
             <a:fld id="{E233F2FC-336D-4AEC-8E34-B26C5DCCE050}" type="datetimeFigureOut">
               <a:rPr lang="de-DE" smtClean="0"/>
               <a:pPr/>
-              <a:t>13.07.2012</a:t>
+              <a:t>16.07.2012</a:t>
             </a:fld>
             <a:endParaRPr lang="de-DE"/>
           </a:p>
@@ -1957,7 +1957,7 @@
             <a:fld id="{E233F2FC-336D-4AEC-8E34-B26C5DCCE050}" type="datetimeFigureOut">
               <a:rPr lang="de-DE" smtClean="0"/>
               <a:pPr/>
-              <a:t>13.07.2012</a:t>
+              <a:t>16.07.2012</a:t>
             </a:fld>
             <a:endParaRPr lang="de-DE"/>
           </a:p>
@@ -2231,7 +2231,7 @@
             <a:fld id="{E233F2FC-336D-4AEC-8E34-B26C5DCCE050}" type="datetimeFigureOut">
               <a:rPr lang="de-DE" smtClean="0"/>
               <a:pPr/>
-              <a:t>13.07.2012</a:t>
+              <a:t>16.07.2012</a:t>
             </a:fld>
             <a:endParaRPr lang="de-DE"/>
           </a:p>
@@ -2481,7 +2481,7 @@
             <a:fld id="{E233F2FC-336D-4AEC-8E34-B26C5DCCE050}" type="datetimeFigureOut">
               <a:rPr lang="de-DE" smtClean="0"/>
               <a:pPr/>
-              <a:t>13.07.2012</a:t>
+              <a:t>16.07.2012</a:t>
             </a:fld>
             <a:endParaRPr lang="de-DE"/>
           </a:p>
@@ -2691,7 +2691,7 @@
             <a:fld id="{E233F2FC-336D-4AEC-8E34-B26C5DCCE050}" type="datetimeFigureOut">
               <a:rPr lang="de-DE" smtClean="0"/>
               <a:pPr/>
-              <a:t>13.07.2012</a:t>
+              <a:t>16.07.2012</a:t>
             </a:fld>
             <a:endParaRPr lang="de-DE"/>
           </a:p>
@@ -9028,8 +9028,8 @@
         </p:nvSpPr>
         <p:spPr>
           <a:xfrm>
-            <a:off x="4860032" y="2269483"/>
-            <a:ext cx="420308" cy="276999"/>
+            <a:off x="4810330" y="2229464"/>
+            <a:ext cx="500458" cy="338554"/>
           </a:xfrm>
           <a:prstGeom prst="rect">
             <a:avLst/>
@@ -9043,14 +9043,14 @@
           <a:lstStyle/>
           <a:p>
             <a:r>
-              <a:rPr lang="el-GR" sz="1200" i="1" dirty="0" smtClean="0">
+              <a:rPr lang="el-GR" sz="1600" i="1" dirty="0" smtClean="0">
                 <a:latin typeface="Times New Roman" pitchFamily="18" charset="0"/>
                 <a:cs typeface="Times New Roman" pitchFamily="18" charset="0"/>
               </a:rPr>
               <a:t>Φ</a:t>
             </a:r>
             <a:r>
-              <a:rPr lang="de-DE" sz="1200" i="1" baseline="-25000" dirty="0" smtClean="0">
+              <a:rPr lang="de-DE" sz="1600" i="1" baseline="-25000" dirty="0" smtClean="0">
                 <a:latin typeface="Times New Roman" pitchFamily="18" charset="0"/>
                 <a:cs typeface="Times New Roman" pitchFamily="18" charset="0"/>
               </a:rPr>
@@ -9086,14 +9086,7 @@
                 <a:latin typeface="Arial" pitchFamily="34" charset="0"/>
                 <a:cs typeface="Arial" pitchFamily="34" charset="0"/>
               </a:rPr>
-              <a:t>c</a:t>
-            </a:r>
-            <a:r>
-              <a:rPr lang="de-DE" sz="1600" dirty="0" smtClean="0">
-                <a:latin typeface="Arial" pitchFamily="34" charset="0"/>
-                <a:cs typeface="Arial" pitchFamily="34" charset="0"/>
-              </a:rPr>
-              <a:t>)</a:t>
+              <a:t>c)</a:t>
             </a:r>
             <a:endParaRPr lang="de-DE" sz="1600" baseline="-25000" dirty="0">
               <a:latin typeface="Arial" pitchFamily="34" charset="0"/>
@@ -10288,6 +10281,7 @@
             <a:solidFill>
               <a:schemeClr val="tx1"/>
             </a:solidFill>
+            <a:headEnd type="oval"/>
           </a:ln>
         </p:spPr>
         <p:style>
@@ -10396,8 +10390,8 @@
         </p:nvSpPr>
         <p:spPr>
           <a:xfrm>
-            <a:off x="7380312" y="2269483"/>
-            <a:ext cx="420308" cy="276999"/>
+            <a:off x="7322912" y="2232583"/>
+            <a:ext cx="500458" cy="338554"/>
           </a:xfrm>
           <a:prstGeom prst="rect">
             <a:avLst/>
@@ -10411,14 +10405,14 @@
           <a:lstStyle/>
           <a:p>
             <a:r>
-              <a:rPr lang="el-GR" sz="1200" i="1" dirty="0" smtClean="0">
+              <a:rPr lang="el-GR" sz="1600" i="1" dirty="0" smtClean="0">
                 <a:latin typeface="Times New Roman" pitchFamily="18" charset="0"/>
                 <a:cs typeface="Times New Roman" pitchFamily="18" charset="0"/>
               </a:rPr>
               <a:t>Φ</a:t>
             </a:r>
             <a:r>
-              <a:rPr lang="de-DE" sz="1200" i="1" baseline="-25000" dirty="0" smtClean="0">
+              <a:rPr lang="de-DE" sz="1600" i="1" baseline="-25000" dirty="0" smtClean="0">
                 <a:latin typeface="Times New Roman" pitchFamily="18" charset="0"/>
                 <a:cs typeface="Times New Roman" pitchFamily="18" charset="0"/>
               </a:rPr>
@@ -10532,42 +10526,36 @@
           </a:fontRef>
         </p:style>
       </p:cxnSp>
-      <p:cxnSp>
-        <p:nvCxnSpPr>
-          <p:cNvPr id="225" name="Gerade Verbindung mit Pfeil 224"/>
-          <p:cNvCxnSpPr/>
-          <p:nvPr/>
-        </p:nvCxnSpPr>
-        <p:spPr>
-          <a:xfrm flipV="1">
-            <a:off x="2546523" y="2211817"/>
-            <a:ext cx="126418" cy="431232"/>
-          </a:xfrm>
-          <a:prstGeom prst="straightConnector1">
-            <a:avLst/>
-          </a:prstGeom>
-          <a:ln>
-            <a:solidFill>
-              <a:schemeClr val="tx1"/>
-            </a:solidFill>
-            <a:tailEnd type="arrow"/>
-          </a:ln>
-        </p:spPr>
-        <p:style>
-          <a:lnRef idx="1">
-            <a:schemeClr val="accent1"/>
-          </a:lnRef>
-          <a:fillRef idx="0">
-            <a:schemeClr val="accent1"/>
-          </a:fillRef>
-          <a:effectRef idx="0">
-            <a:schemeClr val="accent1"/>
-          </a:effectRef>
-          <a:fontRef idx="minor">
-            <a:schemeClr val="tx1"/>
-          </a:fontRef>
-        </p:style>
-      </p:cxnSp>
+      <p:sp>
+        <p:nvSpPr>
+          <p:cNvPr id="113" name="Textfeld 112"/>
+          <p:cNvSpPr txBox="1"/>
+          <p:nvPr/>
+        </p:nvSpPr>
+        <p:spPr>
+          <a:xfrm>
+            <a:off x="7538106" y="2641012"/>
+            <a:ext cx="288862" cy="338554"/>
+          </a:xfrm>
+          <a:prstGeom prst="rect">
+            <a:avLst/>
+          </a:prstGeom>
+          <a:noFill/>
+        </p:spPr>
+        <p:txBody>
+          <a:bodyPr wrap="none" rtlCol="0">
+            <a:spAutoFit/>
+          </a:bodyPr>
+          <a:lstStyle/>
+          <a:p>
+            <a:r>
+              <a:rPr lang="de-DE" sz="1600" dirty="0" smtClean="0"/>
+              <a:t>3</a:t>
+            </a:r>
+            <a:endParaRPr lang="de-DE" sz="1600" dirty="0"/>
+          </a:p>
+        </p:txBody>
+      </p:sp>
     </p:spTree>
   </p:cSld>
   <p:clrMapOvr>

</xml_diff>

<commit_message>
New version of the theory section.
</commit_message>
<xml_diff>
--- a/material/figures/introduction/cooper_pair_box.pptx
+++ b/material/figures/introduction/cooper_pair_box.pptx
@@ -10553,6 +10553,49 @@
               <a:t>3</a:t>
             </a:r>
             <a:endParaRPr lang="de-DE" sz="1600" dirty="0"/>
+          </a:p>
+        </p:txBody>
+      </p:sp>
+      <p:sp>
+        <p:nvSpPr>
+          <p:cNvPr id="114" name="Textfeld 113"/>
+          <p:cNvSpPr txBox="1"/>
+          <p:nvPr/>
+        </p:nvSpPr>
+        <p:spPr>
+          <a:xfrm>
+            <a:off x="7058766" y="2771636"/>
+            <a:ext cx="449162" cy="369332"/>
+          </a:xfrm>
+          <a:prstGeom prst="rect">
+            <a:avLst/>
+          </a:prstGeom>
+          <a:noFill/>
+        </p:spPr>
+        <p:txBody>
+          <a:bodyPr wrap="none" rtlCol="0">
+            <a:spAutoFit/>
+          </a:bodyPr>
+          <a:lstStyle/>
+          <a:p>
+            <a:r>
+              <a:rPr lang="de-DE" i="1" dirty="0" smtClean="0">
+                <a:latin typeface="Times New Roman" pitchFamily="18" charset="0"/>
+                <a:cs typeface="Times New Roman" pitchFamily="18" charset="0"/>
+              </a:rPr>
+              <a:t>C</a:t>
+            </a:r>
+            <a:r>
+              <a:rPr lang="de-DE" i="1" baseline="-25000" dirty="0" smtClean="0">
+                <a:latin typeface="Times New Roman" pitchFamily="18" charset="0"/>
+                <a:cs typeface="Times New Roman" pitchFamily="18" charset="0"/>
+              </a:rPr>
+              <a:t>G</a:t>
+            </a:r>
+            <a:endParaRPr lang="de-DE" i="1" baseline="-25000" dirty="0">
+              <a:latin typeface="Times New Roman" pitchFamily="18" charset="0"/>
+              <a:cs typeface="Times New Roman" pitchFamily="18" charset="0"/>
+            </a:endParaRPr>
           </a:p>
         </p:txBody>
       </p:sp>

</xml_diff>

<commit_message>
Worked on the processor design section.
</commit_message>
<xml_diff>
--- a/material/figures/introduction/cooper_pair_box.pptx
+++ b/material/figures/introduction/cooper_pair_box.pptx
@@ -292,7 +292,7 @@
             <a:fld id="{E233F2FC-336D-4AEC-8E34-B26C5DCCE050}" type="datetimeFigureOut">
               <a:rPr lang="de-DE" smtClean="0"/>
               <a:pPr/>
-              <a:t>23.07.2012</a:t>
+              <a:t>25.07.2012</a:t>
             </a:fld>
             <a:endParaRPr lang="de-DE"/>
           </a:p>
@@ -459,7 +459,7 @@
             <a:fld id="{E233F2FC-336D-4AEC-8E34-B26C5DCCE050}" type="datetimeFigureOut">
               <a:rPr lang="de-DE" smtClean="0"/>
               <a:pPr/>
-              <a:t>23.07.2012</a:t>
+              <a:t>25.07.2012</a:t>
             </a:fld>
             <a:endParaRPr lang="de-DE"/>
           </a:p>
@@ -636,7 +636,7 @@
             <a:fld id="{E233F2FC-336D-4AEC-8E34-B26C5DCCE050}" type="datetimeFigureOut">
               <a:rPr lang="de-DE" smtClean="0"/>
               <a:pPr/>
-              <a:t>23.07.2012</a:t>
+              <a:t>25.07.2012</a:t>
             </a:fld>
             <a:endParaRPr lang="de-DE"/>
           </a:p>
@@ -803,7 +803,7 @@
             <a:fld id="{E233F2FC-336D-4AEC-8E34-B26C5DCCE050}" type="datetimeFigureOut">
               <a:rPr lang="de-DE" smtClean="0"/>
               <a:pPr/>
-              <a:t>23.07.2012</a:t>
+              <a:t>25.07.2012</a:t>
             </a:fld>
             <a:endParaRPr lang="de-DE"/>
           </a:p>
@@ -1046,7 +1046,7 @@
             <a:fld id="{E233F2FC-336D-4AEC-8E34-B26C5DCCE050}" type="datetimeFigureOut">
               <a:rPr lang="de-DE" smtClean="0"/>
               <a:pPr/>
-              <a:t>23.07.2012</a:t>
+              <a:t>25.07.2012</a:t>
             </a:fld>
             <a:endParaRPr lang="de-DE"/>
           </a:p>
@@ -1331,7 +1331,7 @@
             <a:fld id="{E233F2FC-336D-4AEC-8E34-B26C5DCCE050}" type="datetimeFigureOut">
               <a:rPr lang="de-DE" smtClean="0"/>
               <a:pPr/>
-              <a:t>23.07.2012</a:t>
+              <a:t>25.07.2012</a:t>
             </a:fld>
             <a:endParaRPr lang="de-DE"/>
           </a:p>
@@ -1750,7 +1750,7 @@
             <a:fld id="{E233F2FC-336D-4AEC-8E34-B26C5DCCE050}" type="datetimeFigureOut">
               <a:rPr lang="de-DE" smtClean="0"/>
               <a:pPr/>
-              <a:t>23.07.2012</a:t>
+              <a:t>25.07.2012</a:t>
             </a:fld>
             <a:endParaRPr lang="de-DE"/>
           </a:p>
@@ -1865,7 +1865,7 @@
             <a:fld id="{E233F2FC-336D-4AEC-8E34-B26C5DCCE050}" type="datetimeFigureOut">
               <a:rPr lang="de-DE" smtClean="0"/>
               <a:pPr/>
-              <a:t>23.07.2012</a:t>
+              <a:t>25.07.2012</a:t>
             </a:fld>
             <a:endParaRPr lang="de-DE"/>
           </a:p>
@@ -1957,7 +1957,7 @@
             <a:fld id="{E233F2FC-336D-4AEC-8E34-B26C5DCCE050}" type="datetimeFigureOut">
               <a:rPr lang="de-DE" smtClean="0"/>
               <a:pPr/>
-              <a:t>23.07.2012</a:t>
+              <a:t>25.07.2012</a:t>
             </a:fld>
             <a:endParaRPr lang="de-DE"/>
           </a:p>
@@ -2231,7 +2231,7 @@
             <a:fld id="{E233F2FC-336D-4AEC-8E34-B26C5DCCE050}" type="datetimeFigureOut">
               <a:rPr lang="de-DE" smtClean="0"/>
               <a:pPr/>
-              <a:t>23.07.2012</a:t>
+              <a:t>25.07.2012</a:t>
             </a:fld>
             <a:endParaRPr lang="de-DE"/>
           </a:p>
@@ -2481,7 +2481,7 @@
             <a:fld id="{E233F2FC-336D-4AEC-8E34-B26C5DCCE050}" type="datetimeFigureOut">
               <a:rPr lang="de-DE" smtClean="0"/>
               <a:pPr/>
-              <a:t>23.07.2012</a:t>
+              <a:t>25.07.2012</a:t>
             </a:fld>
             <a:endParaRPr lang="de-DE"/>
           </a:p>
@@ -2691,7 +2691,7 @@
             <a:fld id="{E233F2FC-336D-4AEC-8E34-B26C5DCCE050}" type="datetimeFigureOut">
               <a:rPr lang="de-DE" smtClean="0"/>
               <a:pPr/>
-              <a:t>23.07.2012</a:t>
+              <a:t>25.07.2012</a:t>
             </a:fld>
             <a:endParaRPr lang="de-DE"/>
           </a:p>
@@ -12546,6 +12546,98 @@
           <a:chExt cx="0" cy="0"/>
         </a:xfrm>
       </p:grpSpPr>
+      <p:sp>
+        <p:nvSpPr>
+          <p:cNvPr id="31" name="Rechteck 30"/>
+          <p:cNvSpPr/>
+          <p:nvPr/>
+        </p:nvSpPr>
+        <p:spPr>
+          <a:xfrm>
+            <a:off x="3627696" y="2128756"/>
+            <a:ext cx="576064" cy="720080"/>
+          </a:xfrm>
+          <a:prstGeom prst="rect">
+            <a:avLst/>
+          </a:prstGeom>
+          <a:noFill/>
+          <a:ln w="19050">
+            <a:solidFill>
+              <a:schemeClr val="tx1"/>
+            </a:solidFill>
+          </a:ln>
+        </p:spPr>
+        <p:style>
+          <a:lnRef idx="2">
+            <a:schemeClr val="accent1">
+              <a:shade val="50000"/>
+            </a:schemeClr>
+          </a:lnRef>
+          <a:fillRef idx="1">
+            <a:schemeClr val="accent1"/>
+          </a:fillRef>
+          <a:effectRef idx="0">
+            <a:schemeClr val="accent1"/>
+          </a:effectRef>
+          <a:fontRef idx="minor">
+            <a:schemeClr val="lt1"/>
+          </a:fontRef>
+        </p:style>
+        <p:txBody>
+          <a:bodyPr rtlCol="0" anchor="ctr"/>
+          <a:lstStyle/>
+          <a:p>
+            <a:pPr algn="ctr"/>
+            <a:endParaRPr lang="de-DE"/>
+          </a:p>
+        </p:txBody>
+      </p:sp>
+      <p:sp>
+        <p:nvSpPr>
+          <p:cNvPr id="57" name="Rechteck 56"/>
+          <p:cNvSpPr/>
+          <p:nvPr/>
+        </p:nvSpPr>
+        <p:spPr>
+          <a:xfrm>
+            <a:off x="3555688" y="2265748"/>
+            <a:ext cx="104807" cy="422347"/>
+          </a:xfrm>
+          <a:prstGeom prst="rect">
+            <a:avLst/>
+          </a:prstGeom>
+          <a:solidFill>
+            <a:schemeClr val="bg1"/>
+          </a:solidFill>
+          <a:ln>
+            <a:noFill/>
+          </a:ln>
+        </p:spPr>
+        <p:style>
+          <a:lnRef idx="2">
+            <a:schemeClr val="accent1">
+              <a:shade val="50000"/>
+            </a:schemeClr>
+          </a:lnRef>
+          <a:fillRef idx="1">
+            <a:schemeClr val="accent1"/>
+          </a:fillRef>
+          <a:effectRef idx="0">
+            <a:schemeClr val="accent1"/>
+          </a:effectRef>
+          <a:fontRef idx="minor">
+            <a:schemeClr val="lt1"/>
+          </a:fontRef>
+        </p:style>
+        <p:txBody>
+          <a:bodyPr rtlCol="0" anchor="ctr"/>
+          <a:lstStyle/>
+          <a:p>
+            <a:pPr algn="ctr"/>
+            <a:endParaRPr lang="de-DE"/>
+          </a:p>
+        </p:txBody>
+      </p:sp>
       <p:cxnSp>
         <p:nvCxnSpPr>
           <p:cNvPr id="40" name="Gerade Verbindung 39"/>
@@ -12582,9 +12674,1812 @@
           </a:fontRef>
         </p:style>
       </p:cxnSp>
+      <p:cxnSp>
+        <p:nvCxnSpPr>
+          <p:cNvPr id="43" name="Gerade Verbindung 42"/>
+          <p:cNvCxnSpPr/>
+          <p:nvPr/>
+        </p:nvCxnSpPr>
+        <p:spPr>
+          <a:xfrm>
+            <a:off x="2195736" y="2708920"/>
+            <a:ext cx="0" cy="360040"/>
+          </a:xfrm>
+          <a:prstGeom prst="line">
+            <a:avLst/>
+          </a:prstGeom>
+          <a:ln w="19050">
+            <a:solidFill>
+              <a:schemeClr val="tx1"/>
+            </a:solidFill>
+            <a:headEnd type="oval" w="med" len="med"/>
+            <a:tailEnd type="none" w="med" len="med"/>
+          </a:ln>
+        </p:spPr>
+        <p:style>
+          <a:lnRef idx="1">
+            <a:schemeClr val="accent1"/>
+          </a:lnRef>
+          <a:fillRef idx="0">
+            <a:schemeClr val="accent1"/>
+          </a:fillRef>
+          <a:effectRef idx="0">
+            <a:schemeClr val="accent1"/>
+          </a:effectRef>
+          <a:fontRef idx="minor">
+            <a:schemeClr val="tx1"/>
+          </a:fontRef>
+        </p:style>
+      </p:cxnSp>
+      <p:cxnSp>
+        <p:nvCxnSpPr>
+          <p:cNvPr id="52" name="Gerade Verbindung 51"/>
+          <p:cNvCxnSpPr/>
+          <p:nvPr/>
+        </p:nvCxnSpPr>
+        <p:spPr>
+          <a:xfrm>
+            <a:off x="2051720" y="1916832"/>
+            <a:ext cx="288032" cy="0"/>
+          </a:xfrm>
+          <a:prstGeom prst="line">
+            <a:avLst/>
+          </a:prstGeom>
+          <a:ln w="19050">
+            <a:solidFill>
+              <a:schemeClr val="tx1"/>
+            </a:solidFill>
+          </a:ln>
+        </p:spPr>
+        <p:style>
+          <a:lnRef idx="1">
+            <a:schemeClr val="accent1"/>
+          </a:lnRef>
+          <a:fillRef idx="0">
+            <a:schemeClr val="accent1"/>
+          </a:fillRef>
+          <a:effectRef idx="0">
+            <a:schemeClr val="accent1"/>
+          </a:effectRef>
+          <a:fontRef idx="minor">
+            <a:schemeClr val="tx1"/>
+          </a:fontRef>
+        </p:style>
+      </p:cxnSp>
+      <p:cxnSp>
+        <p:nvCxnSpPr>
+          <p:cNvPr id="53" name="Gerade Verbindung 52"/>
+          <p:cNvCxnSpPr/>
+          <p:nvPr/>
+        </p:nvCxnSpPr>
+        <p:spPr>
+          <a:xfrm>
+            <a:off x="2051720" y="1844824"/>
+            <a:ext cx="288032" cy="0"/>
+          </a:xfrm>
+          <a:prstGeom prst="line">
+            <a:avLst/>
+          </a:prstGeom>
+          <a:ln w="19050">
+            <a:solidFill>
+              <a:schemeClr val="tx1"/>
+            </a:solidFill>
+          </a:ln>
+        </p:spPr>
+        <p:style>
+          <a:lnRef idx="1">
+            <a:schemeClr val="accent1"/>
+          </a:lnRef>
+          <a:fillRef idx="0">
+            <a:schemeClr val="accent1"/>
+          </a:fillRef>
+          <a:effectRef idx="0">
+            <a:schemeClr val="accent1"/>
+          </a:effectRef>
+          <a:fontRef idx="minor">
+            <a:schemeClr val="tx1"/>
+          </a:fontRef>
+        </p:style>
+      </p:cxnSp>
+      <p:cxnSp>
+        <p:nvCxnSpPr>
+          <p:cNvPr id="54" name="Gerade Verbindung 53"/>
+          <p:cNvCxnSpPr/>
+          <p:nvPr/>
+        </p:nvCxnSpPr>
+        <p:spPr>
+          <a:xfrm flipH="1">
+            <a:off x="1115616" y="1628800"/>
+            <a:ext cx="9525" cy="1440160"/>
+          </a:xfrm>
+          <a:prstGeom prst="line">
+            <a:avLst/>
+          </a:prstGeom>
+          <a:ln w="19050">
+            <a:solidFill>
+              <a:schemeClr val="tx1"/>
+            </a:solidFill>
+            <a:headEnd type="none" w="med" len="med"/>
+            <a:tailEnd type="none" w="med" len="med"/>
+          </a:ln>
+        </p:spPr>
+        <p:style>
+          <a:lnRef idx="1">
+            <a:schemeClr val="accent1"/>
+          </a:lnRef>
+          <a:fillRef idx="0">
+            <a:schemeClr val="accent1"/>
+          </a:fillRef>
+          <a:effectRef idx="0">
+            <a:schemeClr val="accent1"/>
+          </a:effectRef>
+          <a:fontRef idx="minor">
+            <a:schemeClr val="tx1"/>
+          </a:fontRef>
+        </p:style>
+      </p:cxnSp>
+      <p:cxnSp>
+        <p:nvCxnSpPr>
+          <p:cNvPr id="59" name="Gerade Verbindung 58"/>
+          <p:cNvCxnSpPr/>
+          <p:nvPr/>
+        </p:nvCxnSpPr>
+        <p:spPr>
+          <a:xfrm>
+            <a:off x="899592" y="3068960"/>
+            <a:ext cx="432048" cy="0"/>
+          </a:xfrm>
+          <a:prstGeom prst="line">
+            <a:avLst/>
+          </a:prstGeom>
+          <a:ln w="19050">
+            <a:solidFill>
+              <a:schemeClr val="tx1"/>
+            </a:solidFill>
+          </a:ln>
+        </p:spPr>
+        <p:style>
+          <a:lnRef idx="1">
+            <a:schemeClr val="accent1"/>
+          </a:lnRef>
+          <a:fillRef idx="0">
+            <a:schemeClr val="accent1"/>
+          </a:fillRef>
+          <a:effectRef idx="0">
+            <a:schemeClr val="accent1"/>
+          </a:effectRef>
+          <a:fontRef idx="minor">
+            <a:schemeClr val="tx1"/>
+          </a:fontRef>
+        </p:style>
+      </p:cxnSp>
+      <p:cxnSp>
+        <p:nvCxnSpPr>
+          <p:cNvPr id="60" name="Gerade Verbindung 59"/>
+          <p:cNvCxnSpPr/>
+          <p:nvPr/>
+        </p:nvCxnSpPr>
+        <p:spPr>
+          <a:xfrm flipH="1">
+            <a:off x="971600" y="3140968"/>
+            <a:ext cx="288032" cy="0"/>
+          </a:xfrm>
+          <a:prstGeom prst="line">
+            <a:avLst/>
+          </a:prstGeom>
+          <a:ln w="19050">
+            <a:solidFill>
+              <a:schemeClr val="tx1"/>
+            </a:solidFill>
+          </a:ln>
+        </p:spPr>
+        <p:style>
+          <a:lnRef idx="1">
+            <a:schemeClr val="accent1"/>
+          </a:lnRef>
+          <a:fillRef idx="0">
+            <a:schemeClr val="accent1"/>
+          </a:fillRef>
+          <a:effectRef idx="0">
+            <a:schemeClr val="accent1"/>
+          </a:effectRef>
+          <a:fontRef idx="minor">
+            <a:schemeClr val="tx1"/>
+          </a:fontRef>
+        </p:style>
+      </p:cxnSp>
+      <p:cxnSp>
+        <p:nvCxnSpPr>
+          <p:cNvPr id="61" name="Gerade Verbindung 60"/>
+          <p:cNvCxnSpPr/>
+          <p:nvPr/>
+        </p:nvCxnSpPr>
+        <p:spPr>
+          <a:xfrm flipH="1">
+            <a:off x="1043608" y="3212976"/>
+            <a:ext cx="144016" cy="0"/>
+          </a:xfrm>
+          <a:prstGeom prst="line">
+            <a:avLst/>
+          </a:prstGeom>
+          <a:ln w="19050">
+            <a:solidFill>
+              <a:schemeClr val="tx1"/>
+            </a:solidFill>
+          </a:ln>
+        </p:spPr>
+        <p:style>
+          <a:lnRef idx="1">
+            <a:schemeClr val="accent1"/>
+          </a:lnRef>
+          <a:fillRef idx="0">
+            <a:schemeClr val="accent1"/>
+          </a:fillRef>
+          <a:effectRef idx="0">
+            <a:schemeClr val="accent1"/>
+          </a:effectRef>
+          <a:fontRef idx="minor">
+            <a:schemeClr val="tx1"/>
+          </a:fontRef>
+        </p:style>
+      </p:cxnSp>
+      <p:cxnSp>
+        <p:nvCxnSpPr>
+          <p:cNvPr id="65" name="Gerade Verbindung 64"/>
+          <p:cNvCxnSpPr/>
+          <p:nvPr/>
+        </p:nvCxnSpPr>
+        <p:spPr>
+          <a:xfrm flipV="1">
+            <a:off x="2195736" y="1628800"/>
+            <a:ext cx="0" cy="216024"/>
+          </a:xfrm>
+          <a:prstGeom prst="line">
+            <a:avLst/>
+          </a:prstGeom>
+          <a:ln w="19050">
+            <a:solidFill>
+              <a:schemeClr val="tx1"/>
+            </a:solidFill>
+          </a:ln>
+        </p:spPr>
+        <p:style>
+          <a:lnRef idx="1">
+            <a:schemeClr val="accent1"/>
+          </a:lnRef>
+          <a:fillRef idx="0">
+            <a:schemeClr val="accent1"/>
+          </a:fillRef>
+          <a:effectRef idx="0">
+            <a:schemeClr val="accent1"/>
+          </a:effectRef>
+          <a:fontRef idx="minor">
+            <a:schemeClr val="tx1"/>
+          </a:fontRef>
+        </p:style>
+      </p:cxnSp>
+      <p:cxnSp>
+        <p:nvCxnSpPr>
+          <p:cNvPr id="68" name="Gerade Verbindung 67"/>
+          <p:cNvCxnSpPr/>
+          <p:nvPr/>
+        </p:nvCxnSpPr>
+        <p:spPr>
+          <a:xfrm>
+            <a:off x="1115616" y="1637438"/>
+            <a:ext cx="288032" cy="0"/>
+          </a:xfrm>
+          <a:prstGeom prst="line">
+            <a:avLst/>
+          </a:prstGeom>
+          <a:ln w="19050">
+            <a:solidFill>
+              <a:schemeClr val="tx1"/>
+            </a:solidFill>
+          </a:ln>
+        </p:spPr>
+        <p:style>
+          <a:lnRef idx="1">
+            <a:schemeClr val="accent1"/>
+          </a:lnRef>
+          <a:fillRef idx="0">
+            <a:schemeClr val="accent1"/>
+          </a:fillRef>
+          <a:effectRef idx="0">
+            <a:schemeClr val="accent1"/>
+          </a:effectRef>
+          <a:fontRef idx="minor">
+            <a:schemeClr val="tx1"/>
+          </a:fontRef>
+        </p:style>
+      </p:cxnSp>
+      <p:cxnSp>
+        <p:nvCxnSpPr>
+          <p:cNvPr id="69" name="Gerade Verbindung 68"/>
+          <p:cNvCxnSpPr/>
+          <p:nvPr/>
+        </p:nvCxnSpPr>
+        <p:spPr>
+          <a:xfrm flipH="1">
+            <a:off x="1910287" y="1637438"/>
+            <a:ext cx="288032" cy="0"/>
+          </a:xfrm>
+          <a:prstGeom prst="line">
+            <a:avLst/>
+          </a:prstGeom>
+          <a:ln w="19050">
+            <a:solidFill>
+              <a:schemeClr val="tx1"/>
+            </a:solidFill>
+          </a:ln>
+        </p:spPr>
+        <p:style>
+          <a:lnRef idx="1">
+            <a:schemeClr val="accent1"/>
+          </a:lnRef>
+          <a:fillRef idx="0">
+            <a:schemeClr val="accent1"/>
+          </a:fillRef>
+          <a:effectRef idx="0">
+            <a:schemeClr val="accent1"/>
+          </a:effectRef>
+          <a:fontRef idx="minor">
+            <a:schemeClr val="tx1"/>
+          </a:fontRef>
+        </p:style>
+      </p:cxnSp>
+      <p:cxnSp>
+        <p:nvCxnSpPr>
+          <p:cNvPr id="76" name="Gerade Verbindung 75"/>
+          <p:cNvCxnSpPr/>
+          <p:nvPr/>
+        </p:nvCxnSpPr>
+        <p:spPr>
+          <a:xfrm>
+            <a:off x="1979712" y="3068960"/>
+            <a:ext cx="432048" cy="0"/>
+          </a:xfrm>
+          <a:prstGeom prst="line">
+            <a:avLst/>
+          </a:prstGeom>
+          <a:ln w="19050">
+            <a:solidFill>
+              <a:schemeClr val="tx1"/>
+            </a:solidFill>
+          </a:ln>
+        </p:spPr>
+        <p:style>
+          <a:lnRef idx="1">
+            <a:schemeClr val="accent1"/>
+          </a:lnRef>
+          <a:fillRef idx="0">
+            <a:schemeClr val="accent1"/>
+          </a:fillRef>
+          <a:effectRef idx="0">
+            <a:schemeClr val="accent1"/>
+          </a:effectRef>
+          <a:fontRef idx="minor">
+            <a:schemeClr val="tx1"/>
+          </a:fontRef>
+        </p:style>
+      </p:cxnSp>
+      <p:cxnSp>
+        <p:nvCxnSpPr>
+          <p:cNvPr id="77" name="Gerade Verbindung 76"/>
+          <p:cNvCxnSpPr/>
+          <p:nvPr/>
+        </p:nvCxnSpPr>
+        <p:spPr>
+          <a:xfrm flipH="1">
+            <a:off x="2051720" y="3140968"/>
+            <a:ext cx="288032" cy="0"/>
+          </a:xfrm>
+          <a:prstGeom prst="line">
+            <a:avLst/>
+          </a:prstGeom>
+          <a:ln w="19050">
+            <a:solidFill>
+              <a:schemeClr val="tx1"/>
+            </a:solidFill>
+          </a:ln>
+        </p:spPr>
+        <p:style>
+          <a:lnRef idx="1">
+            <a:schemeClr val="accent1"/>
+          </a:lnRef>
+          <a:fillRef idx="0">
+            <a:schemeClr val="accent1"/>
+          </a:fillRef>
+          <a:effectRef idx="0">
+            <a:schemeClr val="accent1"/>
+          </a:effectRef>
+          <a:fontRef idx="minor">
+            <a:schemeClr val="tx1"/>
+          </a:fontRef>
+        </p:style>
+      </p:cxnSp>
+      <p:cxnSp>
+        <p:nvCxnSpPr>
+          <p:cNvPr id="78" name="Gerade Verbindung 77"/>
+          <p:cNvCxnSpPr/>
+          <p:nvPr/>
+        </p:nvCxnSpPr>
+        <p:spPr>
+          <a:xfrm flipH="1">
+            <a:off x="2123728" y="3212976"/>
+            <a:ext cx="144016" cy="0"/>
+          </a:xfrm>
+          <a:prstGeom prst="line">
+            <a:avLst/>
+          </a:prstGeom>
+          <a:ln w="19050">
+            <a:solidFill>
+              <a:schemeClr val="tx1"/>
+            </a:solidFill>
+          </a:ln>
+        </p:spPr>
+        <p:style>
+          <a:lnRef idx="1">
+            <a:schemeClr val="accent1"/>
+          </a:lnRef>
+          <a:fillRef idx="0">
+            <a:schemeClr val="accent1"/>
+          </a:fillRef>
+          <a:effectRef idx="0">
+            <a:schemeClr val="accent1"/>
+          </a:effectRef>
+          <a:fontRef idx="minor">
+            <a:schemeClr val="tx1"/>
+          </a:fontRef>
+        </p:style>
+      </p:cxnSp>
       <p:sp>
         <p:nvSpPr>
-          <p:cNvPr id="41" name="Rechteck 40"/>
+          <p:cNvPr id="81" name="Textfeld 80"/>
+          <p:cNvSpPr txBox="1"/>
+          <p:nvPr/>
+        </p:nvSpPr>
+        <p:spPr>
+          <a:xfrm>
+            <a:off x="2195736" y="1484784"/>
+            <a:ext cx="415498" cy="369332"/>
+          </a:xfrm>
+          <a:prstGeom prst="rect">
+            <a:avLst/>
+          </a:prstGeom>
+          <a:noFill/>
+        </p:spPr>
+        <p:txBody>
+          <a:bodyPr wrap="none" rtlCol="0">
+            <a:spAutoFit/>
+          </a:bodyPr>
+          <a:lstStyle/>
+          <a:p>
+            <a:r>
+              <a:rPr lang="de-DE" i="1" dirty="0" err="1" smtClean="0">
+                <a:latin typeface="Times New Roman" pitchFamily="18" charset="0"/>
+                <a:cs typeface="Times New Roman" pitchFamily="18" charset="0"/>
+              </a:rPr>
+              <a:t>C</a:t>
+            </a:r>
+            <a:r>
+              <a:rPr lang="de-DE" i="1" baseline="-25000" dirty="0" err="1" smtClean="0">
+                <a:latin typeface="Times New Roman" pitchFamily="18" charset="0"/>
+                <a:cs typeface="Times New Roman" pitchFamily="18" charset="0"/>
+              </a:rPr>
+              <a:t>g</a:t>
+            </a:r>
+            <a:endParaRPr lang="de-DE" i="1" baseline="-25000" dirty="0">
+              <a:latin typeface="Times New Roman" pitchFamily="18" charset="0"/>
+              <a:cs typeface="Times New Roman" pitchFamily="18" charset="0"/>
+            </a:endParaRPr>
+          </a:p>
+        </p:txBody>
+      </p:sp>
+      <p:grpSp>
+        <p:nvGrpSpPr>
+          <p:cNvPr id="30" name="Gruppieren 29"/>
+          <p:cNvGrpSpPr/>
+          <p:nvPr/>
+        </p:nvGrpSpPr>
+        <p:grpSpPr>
+          <a:xfrm rot="5400000">
+            <a:off x="1586023" y="1374418"/>
+            <a:ext cx="144016" cy="508765"/>
+            <a:chOff x="795868" y="2200155"/>
+            <a:chExt cx="144016" cy="508765"/>
+          </a:xfrm>
+        </p:grpSpPr>
+        <p:sp>
+          <p:nvSpPr>
+            <p:cNvPr id="28" name="Rechteck 27"/>
+            <p:cNvSpPr/>
+            <p:nvPr/>
+          </p:nvSpPr>
+          <p:spPr>
+            <a:xfrm>
+              <a:off x="827584" y="2204864"/>
+              <a:ext cx="72008" cy="504056"/>
+            </a:xfrm>
+            <a:prstGeom prst="rect">
+              <a:avLst/>
+            </a:prstGeom>
+            <a:solidFill>
+              <a:schemeClr val="bg1"/>
+            </a:solidFill>
+            <a:ln>
+              <a:noFill/>
+            </a:ln>
+          </p:spPr>
+          <p:style>
+            <a:lnRef idx="2">
+              <a:schemeClr val="accent1">
+                <a:shade val="50000"/>
+              </a:schemeClr>
+            </a:lnRef>
+            <a:fillRef idx="1">
+              <a:schemeClr val="accent1"/>
+            </a:fillRef>
+            <a:effectRef idx="0">
+              <a:schemeClr val="accent1"/>
+            </a:effectRef>
+            <a:fontRef idx="minor">
+              <a:schemeClr val="lt1"/>
+            </a:fontRef>
+          </p:style>
+          <p:txBody>
+            <a:bodyPr rtlCol="0" anchor="ctr"/>
+            <a:lstStyle/>
+            <a:p>
+              <a:pPr algn="ctr"/>
+              <a:endParaRPr lang="de-DE"/>
+            </a:p>
+          </p:txBody>
+        </p:sp>
+        <p:sp>
+          <p:nvSpPr>
+            <p:cNvPr id="29" name="Freihandform 28"/>
+            <p:cNvSpPr/>
+            <p:nvPr/>
+          </p:nvSpPr>
+          <p:spPr>
+            <a:xfrm>
+              <a:off x="795868" y="2200155"/>
+              <a:ext cx="144016" cy="503479"/>
+            </a:xfrm>
+            <a:custGeom>
+              <a:avLst/>
+              <a:gdLst>
+                <a:gd name="connsiteX0" fmla="*/ 110997 w 221994"/>
+                <a:gd name="connsiteY0" fmla="*/ 0 h 486271"/>
+                <a:gd name="connsiteX1" fmla="*/ 221994 w 221994"/>
+                <a:gd name="connsiteY1" fmla="*/ 84569 h 486271"/>
+                <a:gd name="connsiteX2" fmla="*/ 15857 w 221994"/>
+                <a:gd name="connsiteY2" fmla="*/ 179709 h 486271"/>
+                <a:gd name="connsiteX3" fmla="*/ 221994 w 221994"/>
+                <a:gd name="connsiteY3" fmla="*/ 258992 h 486271"/>
+                <a:gd name="connsiteX4" fmla="*/ 31714 w 221994"/>
+                <a:gd name="connsiteY4" fmla="*/ 322419 h 486271"/>
+                <a:gd name="connsiteX5" fmla="*/ 200851 w 221994"/>
+                <a:gd name="connsiteY5" fmla="*/ 396416 h 486271"/>
+                <a:gd name="connsiteX6" fmla="*/ 0 w 221994"/>
+                <a:gd name="connsiteY6" fmla="*/ 449272 h 486271"/>
+                <a:gd name="connsiteX7" fmla="*/ 121568 w 221994"/>
+                <a:gd name="connsiteY7" fmla="*/ 486271 h 486271"/>
+                <a:gd name="connsiteX0" fmla="*/ 110997 w 221994"/>
+                <a:gd name="connsiteY0" fmla="*/ 0 h 576064"/>
+                <a:gd name="connsiteX1" fmla="*/ 221994 w 221994"/>
+                <a:gd name="connsiteY1" fmla="*/ 84569 h 576064"/>
+                <a:gd name="connsiteX2" fmla="*/ 15857 w 221994"/>
+                <a:gd name="connsiteY2" fmla="*/ 179709 h 576064"/>
+                <a:gd name="connsiteX3" fmla="*/ 221994 w 221994"/>
+                <a:gd name="connsiteY3" fmla="*/ 258992 h 576064"/>
+                <a:gd name="connsiteX4" fmla="*/ 31714 w 221994"/>
+                <a:gd name="connsiteY4" fmla="*/ 322419 h 576064"/>
+                <a:gd name="connsiteX5" fmla="*/ 200851 w 221994"/>
+                <a:gd name="connsiteY5" fmla="*/ 396416 h 576064"/>
+                <a:gd name="connsiteX6" fmla="*/ 0 w 221994"/>
+                <a:gd name="connsiteY6" fmla="*/ 449272 h 576064"/>
+                <a:gd name="connsiteX7" fmla="*/ 144016 w 221994"/>
+                <a:gd name="connsiteY7" fmla="*/ 576064 h 576064"/>
+                <a:gd name="connsiteX0" fmla="*/ 110997 w 221994"/>
+                <a:gd name="connsiteY0" fmla="*/ 0 h 576064"/>
+                <a:gd name="connsiteX1" fmla="*/ 221994 w 221994"/>
+                <a:gd name="connsiteY1" fmla="*/ 84569 h 576064"/>
+                <a:gd name="connsiteX2" fmla="*/ 15857 w 221994"/>
+                <a:gd name="connsiteY2" fmla="*/ 179709 h 576064"/>
+                <a:gd name="connsiteX3" fmla="*/ 221994 w 221994"/>
+                <a:gd name="connsiteY3" fmla="*/ 258992 h 576064"/>
+                <a:gd name="connsiteX4" fmla="*/ 31714 w 221994"/>
+                <a:gd name="connsiteY4" fmla="*/ 322419 h 576064"/>
+                <a:gd name="connsiteX5" fmla="*/ 200851 w 221994"/>
+                <a:gd name="connsiteY5" fmla="*/ 396416 h 576064"/>
+                <a:gd name="connsiteX6" fmla="*/ 0 w 221994"/>
+                <a:gd name="connsiteY6" fmla="*/ 504055 h 576064"/>
+                <a:gd name="connsiteX7" fmla="*/ 144016 w 221994"/>
+                <a:gd name="connsiteY7" fmla="*/ 576064 h 576064"/>
+                <a:gd name="connsiteX0" fmla="*/ 110997 w 221994"/>
+                <a:gd name="connsiteY0" fmla="*/ 0 h 576064"/>
+                <a:gd name="connsiteX1" fmla="*/ 221994 w 221994"/>
+                <a:gd name="connsiteY1" fmla="*/ 84569 h 576064"/>
+                <a:gd name="connsiteX2" fmla="*/ 15857 w 221994"/>
+                <a:gd name="connsiteY2" fmla="*/ 179709 h 576064"/>
+                <a:gd name="connsiteX3" fmla="*/ 221994 w 221994"/>
+                <a:gd name="connsiteY3" fmla="*/ 258992 h 576064"/>
+                <a:gd name="connsiteX4" fmla="*/ 31714 w 221994"/>
+                <a:gd name="connsiteY4" fmla="*/ 322419 h 576064"/>
+                <a:gd name="connsiteX5" fmla="*/ 216024 w 221994"/>
+                <a:gd name="connsiteY5" fmla="*/ 432047 h 576064"/>
+                <a:gd name="connsiteX6" fmla="*/ 0 w 221994"/>
+                <a:gd name="connsiteY6" fmla="*/ 504055 h 576064"/>
+                <a:gd name="connsiteX7" fmla="*/ 144016 w 221994"/>
+                <a:gd name="connsiteY7" fmla="*/ 576064 h 576064"/>
+                <a:gd name="connsiteX0" fmla="*/ 110997 w 221994"/>
+                <a:gd name="connsiteY0" fmla="*/ 0 h 576064"/>
+                <a:gd name="connsiteX1" fmla="*/ 221994 w 221994"/>
+                <a:gd name="connsiteY1" fmla="*/ 84569 h 576064"/>
+                <a:gd name="connsiteX2" fmla="*/ 15857 w 221994"/>
+                <a:gd name="connsiteY2" fmla="*/ 179709 h 576064"/>
+                <a:gd name="connsiteX3" fmla="*/ 221994 w 221994"/>
+                <a:gd name="connsiteY3" fmla="*/ 258992 h 576064"/>
+                <a:gd name="connsiteX4" fmla="*/ 0 w 221994"/>
+                <a:gd name="connsiteY4" fmla="*/ 432047 h 576064"/>
+                <a:gd name="connsiteX5" fmla="*/ 31714 w 221994"/>
+                <a:gd name="connsiteY5" fmla="*/ 322419 h 576064"/>
+                <a:gd name="connsiteX6" fmla="*/ 216024 w 221994"/>
+                <a:gd name="connsiteY6" fmla="*/ 432047 h 576064"/>
+                <a:gd name="connsiteX7" fmla="*/ 0 w 221994"/>
+                <a:gd name="connsiteY7" fmla="*/ 504055 h 576064"/>
+                <a:gd name="connsiteX8" fmla="*/ 144016 w 221994"/>
+                <a:gd name="connsiteY8" fmla="*/ 576064 h 576064"/>
+                <a:gd name="connsiteX0" fmla="*/ 110997 w 221994"/>
+                <a:gd name="connsiteY0" fmla="*/ 0 h 576064"/>
+                <a:gd name="connsiteX1" fmla="*/ 221994 w 221994"/>
+                <a:gd name="connsiteY1" fmla="*/ 84569 h 576064"/>
+                <a:gd name="connsiteX2" fmla="*/ 15857 w 221994"/>
+                <a:gd name="connsiteY2" fmla="*/ 179709 h 576064"/>
+                <a:gd name="connsiteX3" fmla="*/ 221994 w 221994"/>
+                <a:gd name="connsiteY3" fmla="*/ 258992 h 576064"/>
+                <a:gd name="connsiteX4" fmla="*/ 0 w 221994"/>
+                <a:gd name="connsiteY4" fmla="*/ 360039 h 576064"/>
+                <a:gd name="connsiteX5" fmla="*/ 31714 w 221994"/>
+                <a:gd name="connsiteY5" fmla="*/ 322419 h 576064"/>
+                <a:gd name="connsiteX6" fmla="*/ 216024 w 221994"/>
+                <a:gd name="connsiteY6" fmla="*/ 432047 h 576064"/>
+                <a:gd name="connsiteX7" fmla="*/ 0 w 221994"/>
+                <a:gd name="connsiteY7" fmla="*/ 504055 h 576064"/>
+                <a:gd name="connsiteX8" fmla="*/ 144016 w 221994"/>
+                <a:gd name="connsiteY8" fmla="*/ 576064 h 576064"/>
+                <a:gd name="connsiteX0" fmla="*/ 110997 w 221994"/>
+                <a:gd name="connsiteY0" fmla="*/ 0 h 576064"/>
+                <a:gd name="connsiteX1" fmla="*/ 221994 w 221994"/>
+                <a:gd name="connsiteY1" fmla="*/ 84569 h 576064"/>
+                <a:gd name="connsiteX2" fmla="*/ 15857 w 221994"/>
+                <a:gd name="connsiteY2" fmla="*/ 179709 h 576064"/>
+                <a:gd name="connsiteX3" fmla="*/ 221994 w 221994"/>
+                <a:gd name="connsiteY3" fmla="*/ 258992 h 576064"/>
+                <a:gd name="connsiteX4" fmla="*/ 31714 w 221994"/>
+                <a:gd name="connsiteY4" fmla="*/ 322419 h 576064"/>
+                <a:gd name="connsiteX5" fmla="*/ 216024 w 221994"/>
+                <a:gd name="connsiteY5" fmla="*/ 432047 h 576064"/>
+                <a:gd name="connsiteX6" fmla="*/ 0 w 221994"/>
+                <a:gd name="connsiteY6" fmla="*/ 504055 h 576064"/>
+                <a:gd name="connsiteX7" fmla="*/ 144016 w 221994"/>
+                <a:gd name="connsiteY7" fmla="*/ 576064 h 576064"/>
+                <a:gd name="connsiteX0" fmla="*/ 110997 w 221994"/>
+                <a:gd name="connsiteY0" fmla="*/ 0 h 576064"/>
+                <a:gd name="connsiteX1" fmla="*/ 221994 w 221994"/>
+                <a:gd name="connsiteY1" fmla="*/ 84569 h 576064"/>
+                <a:gd name="connsiteX2" fmla="*/ 15857 w 221994"/>
+                <a:gd name="connsiteY2" fmla="*/ 179709 h 576064"/>
+                <a:gd name="connsiteX3" fmla="*/ 221994 w 221994"/>
+                <a:gd name="connsiteY3" fmla="*/ 258992 h 576064"/>
+                <a:gd name="connsiteX4" fmla="*/ 0 w 221994"/>
+                <a:gd name="connsiteY4" fmla="*/ 360039 h 576064"/>
+                <a:gd name="connsiteX5" fmla="*/ 216024 w 221994"/>
+                <a:gd name="connsiteY5" fmla="*/ 432047 h 576064"/>
+                <a:gd name="connsiteX6" fmla="*/ 0 w 221994"/>
+                <a:gd name="connsiteY6" fmla="*/ 504055 h 576064"/>
+                <a:gd name="connsiteX7" fmla="*/ 144016 w 221994"/>
+                <a:gd name="connsiteY7" fmla="*/ 576064 h 576064"/>
+                <a:gd name="connsiteX0" fmla="*/ 110997 w 221994"/>
+                <a:gd name="connsiteY0" fmla="*/ 0 h 576064"/>
+                <a:gd name="connsiteX1" fmla="*/ 221994 w 221994"/>
+                <a:gd name="connsiteY1" fmla="*/ 84569 h 576064"/>
+                <a:gd name="connsiteX2" fmla="*/ 15857 w 221994"/>
+                <a:gd name="connsiteY2" fmla="*/ 179709 h 576064"/>
+                <a:gd name="connsiteX3" fmla="*/ 216024 w 221994"/>
+                <a:gd name="connsiteY3" fmla="*/ 288031 h 576064"/>
+                <a:gd name="connsiteX4" fmla="*/ 0 w 221994"/>
+                <a:gd name="connsiteY4" fmla="*/ 360039 h 576064"/>
+                <a:gd name="connsiteX5" fmla="*/ 216024 w 221994"/>
+                <a:gd name="connsiteY5" fmla="*/ 432047 h 576064"/>
+                <a:gd name="connsiteX6" fmla="*/ 0 w 221994"/>
+                <a:gd name="connsiteY6" fmla="*/ 504055 h 576064"/>
+                <a:gd name="connsiteX7" fmla="*/ 144016 w 221994"/>
+                <a:gd name="connsiteY7" fmla="*/ 576064 h 576064"/>
+                <a:gd name="connsiteX0" fmla="*/ 110997 w 221994"/>
+                <a:gd name="connsiteY0" fmla="*/ 0 h 576064"/>
+                <a:gd name="connsiteX1" fmla="*/ 221994 w 221994"/>
+                <a:gd name="connsiteY1" fmla="*/ 84569 h 576064"/>
+                <a:gd name="connsiteX2" fmla="*/ 0 w 221994"/>
+                <a:gd name="connsiteY2" fmla="*/ 216023 h 576064"/>
+                <a:gd name="connsiteX3" fmla="*/ 216024 w 221994"/>
+                <a:gd name="connsiteY3" fmla="*/ 288031 h 576064"/>
+                <a:gd name="connsiteX4" fmla="*/ 0 w 221994"/>
+                <a:gd name="connsiteY4" fmla="*/ 360039 h 576064"/>
+                <a:gd name="connsiteX5" fmla="*/ 216024 w 221994"/>
+                <a:gd name="connsiteY5" fmla="*/ 432047 h 576064"/>
+                <a:gd name="connsiteX6" fmla="*/ 0 w 221994"/>
+                <a:gd name="connsiteY6" fmla="*/ 504055 h 576064"/>
+                <a:gd name="connsiteX7" fmla="*/ 144016 w 221994"/>
+                <a:gd name="connsiteY7" fmla="*/ 576064 h 576064"/>
+                <a:gd name="connsiteX0" fmla="*/ 110997 w 216024"/>
+                <a:gd name="connsiteY0" fmla="*/ 0 h 576064"/>
+                <a:gd name="connsiteX1" fmla="*/ 216024 w 216024"/>
+                <a:gd name="connsiteY1" fmla="*/ 144015 h 576064"/>
+                <a:gd name="connsiteX2" fmla="*/ 0 w 216024"/>
+                <a:gd name="connsiteY2" fmla="*/ 216023 h 576064"/>
+                <a:gd name="connsiteX3" fmla="*/ 216024 w 216024"/>
+                <a:gd name="connsiteY3" fmla="*/ 288031 h 576064"/>
+                <a:gd name="connsiteX4" fmla="*/ 0 w 216024"/>
+                <a:gd name="connsiteY4" fmla="*/ 360039 h 576064"/>
+                <a:gd name="connsiteX5" fmla="*/ 216024 w 216024"/>
+                <a:gd name="connsiteY5" fmla="*/ 432047 h 576064"/>
+                <a:gd name="connsiteX6" fmla="*/ 0 w 216024"/>
+                <a:gd name="connsiteY6" fmla="*/ 504055 h 576064"/>
+                <a:gd name="connsiteX7" fmla="*/ 144016 w 216024"/>
+                <a:gd name="connsiteY7" fmla="*/ 576064 h 576064"/>
+                <a:gd name="connsiteX0" fmla="*/ 72008 w 216024"/>
+                <a:gd name="connsiteY0" fmla="*/ 0 h 504057"/>
+                <a:gd name="connsiteX1" fmla="*/ 216024 w 216024"/>
+                <a:gd name="connsiteY1" fmla="*/ 72008 h 504057"/>
+                <a:gd name="connsiteX2" fmla="*/ 0 w 216024"/>
+                <a:gd name="connsiteY2" fmla="*/ 144016 h 504057"/>
+                <a:gd name="connsiteX3" fmla="*/ 216024 w 216024"/>
+                <a:gd name="connsiteY3" fmla="*/ 216024 h 504057"/>
+                <a:gd name="connsiteX4" fmla="*/ 0 w 216024"/>
+                <a:gd name="connsiteY4" fmla="*/ 288032 h 504057"/>
+                <a:gd name="connsiteX5" fmla="*/ 216024 w 216024"/>
+                <a:gd name="connsiteY5" fmla="*/ 360040 h 504057"/>
+                <a:gd name="connsiteX6" fmla="*/ 0 w 216024"/>
+                <a:gd name="connsiteY6" fmla="*/ 432048 h 504057"/>
+                <a:gd name="connsiteX7" fmla="*/ 144016 w 216024"/>
+                <a:gd name="connsiteY7" fmla="*/ 504057 h 504057"/>
+                <a:gd name="connsiteX0" fmla="*/ 72008 w 216024"/>
+                <a:gd name="connsiteY0" fmla="*/ 0 h 504056"/>
+                <a:gd name="connsiteX1" fmla="*/ 216024 w 216024"/>
+                <a:gd name="connsiteY1" fmla="*/ 72008 h 504056"/>
+                <a:gd name="connsiteX2" fmla="*/ 0 w 216024"/>
+                <a:gd name="connsiteY2" fmla="*/ 144016 h 504056"/>
+                <a:gd name="connsiteX3" fmla="*/ 216024 w 216024"/>
+                <a:gd name="connsiteY3" fmla="*/ 216024 h 504056"/>
+                <a:gd name="connsiteX4" fmla="*/ 0 w 216024"/>
+                <a:gd name="connsiteY4" fmla="*/ 288032 h 504056"/>
+                <a:gd name="connsiteX5" fmla="*/ 216024 w 216024"/>
+                <a:gd name="connsiteY5" fmla="*/ 360040 h 504056"/>
+                <a:gd name="connsiteX6" fmla="*/ 0 w 216024"/>
+                <a:gd name="connsiteY6" fmla="*/ 432048 h 504056"/>
+                <a:gd name="connsiteX7" fmla="*/ 144016 w 216024"/>
+                <a:gd name="connsiteY7" fmla="*/ 504056 h 504056"/>
+                <a:gd name="connsiteX0" fmla="*/ 72008 w 216024"/>
+                <a:gd name="connsiteY0" fmla="*/ 0 h 504056"/>
+                <a:gd name="connsiteX1" fmla="*/ 115941 w 216024"/>
+                <a:gd name="connsiteY1" fmla="*/ 0 h 504056"/>
+                <a:gd name="connsiteX2" fmla="*/ 216024 w 216024"/>
+                <a:gd name="connsiteY2" fmla="*/ 72008 h 504056"/>
+                <a:gd name="connsiteX3" fmla="*/ 0 w 216024"/>
+                <a:gd name="connsiteY3" fmla="*/ 144016 h 504056"/>
+                <a:gd name="connsiteX4" fmla="*/ 216024 w 216024"/>
+                <a:gd name="connsiteY4" fmla="*/ 216024 h 504056"/>
+                <a:gd name="connsiteX5" fmla="*/ 0 w 216024"/>
+                <a:gd name="connsiteY5" fmla="*/ 288032 h 504056"/>
+                <a:gd name="connsiteX6" fmla="*/ 216024 w 216024"/>
+                <a:gd name="connsiteY6" fmla="*/ 360040 h 504056"/>
+                <a:gd name="connsiteX7" fmla="*/ 0 w 216024"/>
+                <a:gd name="connsiteY7" fmla="*/ 432048 h 504056"/>
+                <a:gd name="connsiteX8" fmla="*/ 144016 w 216024"/>
+                <a:gd name="connsiteY8" fmla="*/ 504056 h 504056"/>
+                <a:gd name="connsiteX0" fmla="*/ 72008 w 216024"/>
+                <a:gd name="connsiteY0" fmla="*/ 0 h 504056"/>
+                <a:gd name="connsiteX1" fmla="*/ 115577 w 216024"/>
+                <a:gd name="connsiteY1" fmla="*/ 577 h 504056"/>
+                <a:gd name="connsiteX2" fmla="*/ 216024 w 216024"/>
+                <a:gd name="connsiteY2" fmla="*/ 72008 h 504056"/>
+                <a:gd name="connsiteX3" fmla="*/ 0 w 216024"/>
+                <a:gd name="connsiteY3" fmla="*/ 144016 h 504056"/>
+                <a:gd name="connsiteX4" fmla="*/ 216024 w 216024"/>
+                <a:gd name="connsiteY4" fmla="*/ 216024 h 504056"/>
+                <a:gd name="connsiteX5" fmla="*/ 0 w 216024"/>
+                <a:gd name="connsiteY5" fmla="*/ 288032 h 504056"/>
+                <a:gd name="connsiteX6" fmla="*/ 216024 w 216024"/>
+                <a:gd name="connsiteY6" fmla="*/ 360040 h 504056"/>
+                <a:gd name="connsiteX7" fmla="*/ 0 w 216024"/>
+                <a:gd name="connsiteY7" fmla="*/ 432048 h 504056"/>
+                <a:gd name="connsiteX8" fmla="*/ 144016 w 216024"/>
+                <a:gd name="connsiteY8" fmla="*/ 504056 h 504056"/>
+                <a:gd name="connsiteX0" fmla="*/ 72008 w 216024"/>
+                <a:gd name="connsiteY0" fmla="*/ 0 h 504056"/>
+                <a:gd name="connsiteX1" fmla="*/ 115577 w 216024"/>
+                <a:gd name="connsiteY1" fmla="*/ 577 h 504056"/>
+                <a:gd name="connsiteX2" fmla="*/ 216024 w 216024"/>
+                <a:gd name="connsiteY2" fmla="*/ 72008 h 504056"/>
+                <a:gd name="connsiteX3" fmla="*/ 0 w 216024"/>
+                <a:gd name="connsiteY3" fmla="*/ 144016 h 504056"/>
+                <a:gd name="connsiteX4" fmla="*/ 216024 w 216024"/>
+                <a:gd name="connsiteY4" fmla="*/ 216024 h 504056"/>
+                <a:gd name="connsiteX5" fmla="*/ 0 w 216024"/>
+                <a:gd name="connsiteY5" fmla="*/ 288032 h 504056"/>
+                <a:gd name="connsiteX6" fmla="*/ 216024 w 216024"/>
+                <a:gd name="connsiteY6" fmla="*/ 360040 h 504056"/>
+                <a:gd name="connsiteX7" fmla="*/ 0 w 216024"/>
+                <a:gd name="connsiteY7" fmla="*/ 432048 h 504056"/>
+                <a:gd name="connsiteX8" fmla="*/ 120233 w 216024"/>
+                <a:gd name="connsiteY8" fmla="*/ 504056 h 504056"/>
+                <a:gd name="connsiteX0" fmla="*/ 115577 w 216024"/>
+                <a:gd name="connsiteY0" fmla="*/ 0 h 503479"/>
+                <a:gd name="connsiteX1" fmla="*/ 216024 w 216024"/>
+                <a:gd name="connsiteY1" fmla="*/ 71431 h 503479"/>
+                <a:gd name="connsiteX2" fmla="*/ 0 w 216024"/>
+                <a:gd name="connsiteY2" fmla="*/ 143439 h 503479"/>
+                <a:gd name="connsiteX3" fmla="*/ 216024 w 216024"/>
+                <a:gd name="connsiteY3" fmla="*/ 215447 h 503479"/>
+                <a:gd name="connsiteX4" fmla="*/ 0 w 216024"/>
+                <a:gd name="connsiteY4" fmla="*/ 287455 h 503479"/>
+                <a:gd name="connsiteX5" fmla="*/ 216024 w 216024"/>
+                <a:gd name="connsiteY5" fmla="*/ 359463 h 503479"/>
+                <a:gd name="connsiteX6" fmla="*/ 0 w 216024"/>
+                <a:gd name="connsiteY6" fmla="*/ 431471 h 503479"/>
+                <a:gd name="connsiteX7" fmla="*/ 120233 w 216024"/>
+                <a:gd name="connsiteY7" fmla="*/ 503479 h 503479"/>
+              </a:gdLst>
+              <a:ahLst/>
+              <a:cxnLst>
+                <a:cxn ang="0">
+                  <a:pos x="connsiteX0" y="connsiteY0"/>
+                </a:cxn>
+                <a:cxn ang="0">
+                  <a:pos x="connsiteX1" y="connsiteY1"/>
+                </a:cxn>
+                <a:cxn ang="0">
+                  <a:pos x="connsiteX2" y="connsiteY2"/>
+                </a:cxn>
+                <a:cxn ang="0">
+                  <a:pos x="connsiteX3" y="connsiteY3"/>
+                </a:cxn>
+                <a:cxn ang="0">
+                  <a:pos x="connsiteX4" y="connsiteY4"/>
+                </a:cxn>
+                <a:cxn ang="0">
+                  <a:pos x="connsiteX5" y="connsiteY5"/>
+                </a:cxn>
+                <a:cxn ang="0">
+                  <a:pos x="connsiteX6" y="connsiteY6"/>
+                </a:cxn>
+                <a:cxn ang="0">
+                  <a:pos x="connsiteX7" y="connsiteY7"/>
+                </a:cxn>
+              </a:cxnLst>
+              <a:rect l="l" t="t" r="r" b="b"/>
+              <a:pathLst>
+                <a:path w="216024" h="503479">
+                  <a:moveTo>
+                    <a:pt x="115577" y="0"/>
+                  </a:moveTo>
+                  <a:lnTo>
+                    <a:pt x="216024" y="71431"/>
+                  </a:lnTo>
+                  <a:lnTo>
+                    <a:pt x="0" y="143439"/>
+                  </a:lnTo>
+                  <a:lnTo>
+                    <a:pt x="216024" y="215447"/>
+                  </a:lnTo>
+                  <a:lnTo>
+                    <a:pt x="0" y="287455"/>
+                  </a:lnTo>
+                  <a:lnTo>
+                    <a:pt x="216024" y="359463"/>
+                  </a:lnTo>
+                  <a:lnTo>
+                    <a:pt x="0" y="431471"/>
+                  </a:lnTo>
+                  <a:lnTo>
+                    <a:pt x="120233" y="503479"/>
+                  </a:lnTo>
+                </a:path>
+              </a:pathLst>
+            </a:custGeom>
+            <a:ln w="28575">
+              <a:solidFill>
+                <a:schemeClr val="tx1"/>
+              </a:solidFill>
+            </a:ln>
+          </p:spPr>
+          <p:style>
+            <a:lnRef idx="1">
+              <a:schemeClr val="accent1"/>
+            </a:lnRef>
+            <a:fillRef idx="0">
+              <a:schemeClr val="accent1"/>
+            </a:fillRef>
+            <a:effectRef idx="0">
+              <a:schemeClr val="accent1"/>
+            </a:effectRef>
+            <a:fontRef idx="minor">
+              <a:schemeClr val="tx1"/>
+            </a:fontRef>
+          </p:style>
+          <p:txBody>
+            <a:bodyPr rtlCol="0" anchor="ctr"/>
+            <a:lstStyle/>
+            <a:p>
+              <a:pPr algn="ctr"/>
+              <a:endParaRPr lang="de-DE"/>
+            </a:p>
+          </p:txBody>
+        </p:sp>
+      </p:grpSp>
+      <p:sp>
+        <p:nvSpPr>
+          <p:cNvPr id="42" name="Textfeld 41"/>
+          <p:cNvSpPr txBox="1"/>
+          <p:nvPr/>
+        </p:nvSpPr>
+        <p:spPr>
+          <a:xfrm>
+            <a:off x="3563888" y="2276872"/>
+            <a:ext cx="399468" cy="369332"/>
+          </a:xfrm>
+          <a:prstGeom prst="rect">
+            <a:avLst/>
+          </a:prstGeom>
+          <a:noFill/>
+        </p:spPr>
+        <p:txBody>
+          <a:bodyPr wrap="none" rtlCol="0">
+            <a:spAutoFit/>
+          </a:bodyPr>
+          <a:lstStyle/>
+          <a:p>
+            <a:pPr algn="r"/>
+            <a:r>
+              <a:rPr lang="de-DE" i="1" dirty="0" err="1" smtClean="0">
+                <a:latin typeface="Times New Roman" pitchFamily="18" charset="0"/>
+                <a:cs typeface="Times New Roman" pitchFamily="18" charset="0"/>
+              </a:rPr>
+              <a:t>L</a:t>
+            </a:r>
+            <a:r>
+              <a:rPr lang="de-DE" i="1" baseline="-25000" dirty="0" err="1" smtClean="0">
+                <a:latin typeface="Times New Roman" pitchFamily="18" charset="0"/>
+                <a:cs typeface="Times New Roman" pitchFamily="18" charset="0"/>
+              </a:rPr>
+              <a:t>fl</a:t>
+            </a:r>
+            <a:endParaRPr lang="de-DE" i="1" baseline="-25000" dirty="0">
+              <a:latin typeface="Times New Roman" pitchFamily="18" charset="0"/>
+              <a:cs typeface="Times New Roman" pitchFamily="18" charset="0"/>
+            </a:endParaRPr>
+          </a:p>
+        </p:txBody>
+      </p:sp>
+      <p:grpSp>
+        <p:nvGrpSpPr>
+          <p:cNvPr id="47" name="Gruppieren 26"/>
+          <p:cNvGrpSpPr/>
+          <p:nvPr/>
+        </p:nvGrpSpPr>
+        <p:grpSpPr>
+          <a:xfrm flipH="1">
+            <a:off x="3551588" y="2272772"/>
+            <a:ext cx="156407" cy="407237"/>
+            <a:chOff x="3263465" y="1394775"/>
+            <a:chExt cx="384822" cy="1577366"/>
+          </a:xfrm>
+        </p:grpSpPr>
+        <p:sp>
+          <p:nvSpPr>
+            <p:cNvPr id="50" name="Bogen 49"/>
+            <p:cNvSpPr/>
+            <p:nvPr/>
+          </p:nvSpPr>
+          <p:spPr>
+            <a:xfrm rot="11021761" flipH="1" flipV="1">
+              <a:off x="3263465" y="1394775"/>
+              <a:ext cx="360040" cy="396044"/>
+            </a:xfrm>
+            <a:prstGeom prst="arc">
+              <a:avLst>
+                <a:gd name="adj1" fmla="val 15538480"/>
+                <a:gd name="adj2" fmla="val 5376446"/>
+              </a:avLst>
+            </a:prstGeom>
+            <a:ln w="19050">
+              <a:solidFill>
+                <a:schemeClr val="tx1"/>
+              </a:solidFill>
+            </a:ln>
+          </p:spPr>
+          <p:style>
+            <a:lnRef idx="1">
+              <a:schemeClr val="accent1"/>
+            </a:lnRef>
+            <a:fillRef idx="0">
+              <a:schemeClr val="accent1"/>
+            </a:fillRef>
+            <a:effectRef idx="0">
+              <a:schemeClr val="accent1"/>
+            </a:effectRef>
+            <a:fontRef idx="minor">
+              <a:schemeClr val="tx1"/>
+            </a:fontRef>
+          </p:style>
+          <p:txBody>
+            <a:bodyPr rtlCol="0" anchor="ctr"/>
+            <a:lstStyle/>
+            <a:p>
+              <a:pPr algn="r"/>
+              <a:endParaRPr lang="de-DE" dirty="0"/>
+            </a:p>
+          </p:txBody>
+        </p:sp>
+        <p:sp>
+          <p:nvSpPr>
+            <p:cNvPr id="51" name="Bogen 50"/>
+            <p:cNvSpPr/>
+            <p:nvPr/>
+          </p:nvSpPr>
+          <p:spPr>
+            <a:xfrm rot="11021761" flipH="1" flipV="1">
+              <a:off x="3288246" y="1784010"/>
+              <a:ext cx="360040" cy="396044"/>
+            </a:xfrm>
+            <a:prstGeom prst="arc">
+              <a:avLst>
+                <a:gd name="adj1" fmla="val 15538480"/>
+                <a:gd name="adj2" fmla="val 5376446"/>
+              </a:avLst>
+            </a:prstGeom>
+            <a:ln w="19050">
+              <a:solidFill>
+                <a:schemeClr val="tx1"/>
+              </a:solidFill>
+            </a:ln>
+          </p:spPr>
+          <p:style>
+            <a:lnRef idx="1">
+              <a:schemeClr val="accent1"/>
+            </a:lnRef>
+            <a:fillRef idx="0">
+              <a:schemeClr val="accent1"/>
+            </a:fillRef>
+            <a:effectRef idx="0">
+              <a:schemeClr val="accent1"/>
+            </a:effectRef>
+            <a:fontRef idx="minor">
+              <a:schemeClr val="tx1"/>
+            </a:fontRef>
+          </p:style>
+          <p:txBody>
+            <a:bodyPr rtlCol="0" anchor="ctr"/>
+            <a:lstStyle/>
+            <a:p>
+              <a:pPr algn="r"/>
+              <a:endParaRPr lang="de-DE" dirty="0"/>
+            </a:p>
+          </p:txBody>
+        </p:sp>
+        <p:sp>
+          <p:nvSpPr>
+            <p:cNvPr id="55" name="Bogen 54"/>
+            <p:cNvSpPr/>
+            <p:nvPr/>
+          </p:nvSpPr>
+          <p:spPr>
+            <a:xfrm rot="11021761" flipH="1" flipV="1">
+              <a:off x="3288247" y="2170945"/>
+              <a:ext cx="360040" cy="396044"/>
+            </a:xfrm>
+            <a:prstGeom prst="arc">
+              <a:avLst>
+                <a:gd name="adj1" fmla="val 15538480"/>
+                <a:gd name="adj2" fmla="val 5376446"/>
+              </a:avLst>
+            </a:prstGeom>
+            <a:ln w="19050">
+              <a:solidFill>
+                <a:schemeClr val="tx1"/>
+              </a:solidFill>
+            </a:ln>
+          </p:spPr>
+          <p:style>
+            <a:lnRef idx="1">
+              <a:schemeClr val="accent1"/>
+            </a:lnRef>
+            <a:fillRef idx="0">
+              <a:schemeClr val="accent1"/>
+            </a:fillRef>
+            <a:effectRef idx="0">
+              <a:schemeClr val="accent1"/>
+            </a:effectRef>
+            <a:fontRef idx="minor">
+              <a:schemeClr val="tx1"/>
+            </a:fontRef>
+          </p:style>
+          <p:txBody>
+            <a:bodyPr rtlCol="0" anchor="ctr"/>
+            <a:lstStyle/>
+            <a:p>
+              <a:pPr algn="r"/>
+              <a:endParaRPr lang="de-DE" dirty="0"/>
+            </a:p>
+          </p:txBody>
+        </p:sp>
+        <p:sp>
+          <p:nvSpPr>
+            <p:cNvPr id="56" name="Bogen 55"/>
+            <p:cNvSpPr/>
+            <p:nvPr/>
+          </p:nvSpPr>
+          <p:spPr>
+            <a:xfrm rot="11021761" flipH="1" flipV="1">
+              <a:off x="3288247" y="2576097"/>
+              <a:ext cx="360040" cy="396044"/>
+            </a:xfrm>
+            <a:prstGeom prst="arc">
+              <a:avLst>
+                <a:gd name="adj1" fmla="val 15538480"/>
+                <a:gd name="adj2" fmla="val 5376446"/>
+              </a:avLst>
+            </a:prstGeom>
+            <a:ln w="19050">
+              <a:solidFill>
+                <a:schemeClr val="tx1"/>
+              </a:solidFill>
+            </a:ln>
+          </p:spPr>
+          <p:style>
+            <a:lnRef idx="1">
+              <a:schemeClr val="accent1"/>
+            </a:lnRef>
+            <a:fillRef idx="0">
+              <a:schemeClr val="accent1"/>
+            </a:fillRef>
+            <a:effectRef idx="0">
+              <a:schemeClr val="accent1"/>
+            </a:effectRef>
+            <a:fontRef idx="minor">
+              <a:schemeClr val="tx1"/>
+            </a:fontRef>
+          </p:style>
+          <p:txBody>
+            <a:bodyPr rtlCol="0" anchor="ctr"/>
+            <a:lstStyle/>
+            <a:p>
+              <a:pPr algn="r"/>
+              <a:endParaRPr lang="de-DE" dirty="0"/>
+            </a:p>
+          </p:txBody>
+        </p:sp>
+      </p:grpSp>
+      <p:grpSp>
+        <p:nvGrpSpPr>
+          <p:cNvPr id="58" name="Gruppieren 57"/>
+          <p:cNvGrpSpPr/>
+          <p:nvPr/>
+        </p:nvGrpSpPr>
+        <p:grpSpPr>
+          <a:xfrm rot="10800000">
+            <a:off x="4131752" y="2200764"/>
+            <a:ext cx="144016" cy="508765"/>
+            <a:chOff x="795868" y="2200155"/>
+            <a:chExt cx="144016" cy="508765"/>
+          </a:xfrm>
+        </p:grpSpPr>
+        <p:sp>
+          <p:nvSpPr>
+            <p:cNvPr id="62" name="Rechteck 61"/>
+            <p:cNvSpPr/>
+            <p:nvPr/>
+          </p:nvSpPr>
+          <p:spPr>
+            <a:xfrm>
+              <a:off x="827584" y="2204864"/>
+              <a:ext cx="72008" cy="504056"/>
+            </a:xfrm>
+            <a:prstGeom prst="rect">
+              <a:avLst/>
+            </a:prstGeom>
+            <a:solidFill>
+              <a:schemeClr val="bg1"/>
+            </a:solidFill>
+            <a:ln>
+              <a:noFill/>
+            </a:ln>
+          </p:spPr>
+          <p:style>
+            <a:lnRef idx="2">
+              <a:schemeClr val="accent1">
+                <a:shade val="50000"/>
+              </a:schemeClr>
+            </a:lnRef>
+            <a:fillRef idx="1">
+              <a:schemeClr val="accent1"/>
+            </a:fillRef>
+            <a:effectRef idx="0">
+              <a:schemeClr val="accent1"/>
+            </a:effectRef>
+            <a:fontRef idx="minor">
+              <a:schemeClr val="lt1"/>
+            </a:fontRef>
+          </p:style>
+          <p:txBody>
+            <a:bodyPr rtlCol="0" anchor="ctr"/>
+            <a:lstStyle/>
+            <a:p>
+              <a:pPr algn="ctr"/>
+              <a:endParaRPr lang="de-DE"/>
+            </a:p>
+          </p:txBody>
+        </p:sp>
+        <p:sp>
+          <p:nvSpPr>
+            <p:cNvPr id="63" name="Freihandform 62"/>
+            <p:cNvSpPr/>
+            <p:nvPr/>
+          </p:nvSpPr>
+          <p:spPr>
+            <a:xfrm>
+              <a:off x="795868" y="2200155"/>
+              <a:ext cx="144016" cy="503479"/>
+            </a:xfrm>
+            <a:custGeom>
+              <a:avLst/>
+              <a:gdLst>
+                <a:gd name="connsiteX0" fmla="*/ 110997 w 221994"/>
+                <a:gd name="connsiteY0" fmla="*/ 0 h 486271"/>
+                <a:gd name="connsiteX1" fmla="*/ 221994 w 221994"/>
+                <a:gd name="connsiteY1" fmla="*/ 84569 h 486271"/>
+                <a:gd name="connsiteX2" fmla="*/ 15857 w 221994"/>
+                <a:gd name="connsiteY2" fmla="*/ 179709 h 486271"/>
+                <a:gd name="connsiteX3" fmla="*/ 221994 w 221994"/>
+                <a:gd name="connsiteY3" fmla="*/ 258992 h 486271"/>
+                <a:gd name="connsiteX4" fmla="*/ 31714 w 221994"/>
+                <a:gd name="connsiteY4" fmla="*/ 322419 h 486271"/>
+                <a:gd name="connsiteX5" fmla="*/ 200851 w 221994"/>
+                <a:gd name="connsiteY5" fmla="*/ 396416 h 486271"/>
+                <a:gd name="connsiteX6" fmla="*/ 0 w 221994"/>
+                <a:gd name="connsiteY6" fmla="*/ 449272 h 486271"/>
+                <a:gd name="connsiteX7" fmla="*/ 121568 w 221994"/>
+                <a:gd name="connsiteY7" fmla="*/ 486271 h 486271"/>
+                <a:gd name="connsiteX0" fmla="*/ 110997 w 221994"/>
+                <a:gd name="connsiteY0" fmla="*/ 0 h 576064"/>
+                <a:gd name="connsiteX1" fmla="*/ 221994 w 221994"/>
+                <a:gd name="connsiteY1" fmla="*/ 84569 h 576064"/>
+                <a:gd name="connsiteX2" fmla="*/ 15857 w 221994"/>
+                <a:gd name="connsiteY2" fmla="*/ 179709 h 576064"/>
+                <a:gd name="connsiteX3" fmla="*/ 221994 w 221994"/>
+                <a:gd name="connsiteY3" fmla="*/ 258992 h 576064"/>
+                <a:gd name="connsiteX4" fmla="*/ 31714 w 221994"/>
+                <a:gd name="connsiteY4" fmla="*/ 322419 h 576064"/>
+                <a:gd name="connsiteX5" fmla="*/ 200851 w 221994"/>
+                <a:gd name="connsiteY5" fmla="*/ 396416 h 576064"/>
+                <a:gd name="connsiteX6" fmla="*/ 0 w 221994"/>
+                <a:gd name="connsiteY6" fmla="*/ 449272 h 576064"/>
+                <a:gd name="connsiteX7" fmla="*/ 144016 w 221994"/>
+                <a:gd name="connsiteY7" fmla="*/ 576064 h 576064"/>
+                <a:gd name="connsiteX0" fmla="*/ 110997 w 221994"/>
+                <a:gd name="connsiteY0" fmla="*/ 0 h 576064"/>
+                <a:gd name="connsiteX1" fmla="*/ 221994 w 221994"/>
+                <a:gd name="connsiteY1" fmla="*/ 84569 h 576064"/>
+                <a:gd name="connsiteX2" fmla="*/ 15857 w 221994"/>
+                <a:gd name="connsiteY2" fmla="*/ 179709 h 576064"/>
+                <a:gd name="connsiteX3" fmla="*/ 221994 w 221994"/>
+                <a:gd name="connsiteY3" fmla="*/ 258992 h 576064"/>
+                <a:gd name="connsiteX4" fmla="*/ 31714 w 221994"/>
+                <a:gd name="connsiteY4" fmla="*/ 322419 h 576064"/>
+                <a:gd name="connsiteX5" fmla="*/ 200851 w 221994"/>
+                <a:gd name="connsiteY5" fmla="*/ 396416 h 576064"/>
+                <a:gd name="connsiteX6" fmla="*/ 0 w 221994"/>
+                <a:gd name="connsiteY6" fmla="*/ 504055 h 576064"/>
+                <a:gd name="connsiteX7" fmla="*/ 144016 w 221994"/>
+                <a:gd name="connsiteY7" fmla="*/ 576064 h 576064"/>
+                <a:gd name="connsiteX0" fmla="*/ 110997 w 221994"/>
+                <a:gd name="connsiteY0" fmla="*/ 0 h 576064"/>
+                <a:gd name="connsiteX1" fmla="*/ 221994 w 221994"/>
+                <a:gd name="connsiteY1" fmla="*/ 84569 h 576064"/>
+                <a:gd name="connsiteX2" fmla="*/ 15857 w 221994"/>
+                <a:gd name="connsiteY2" fmla="*/ 179709 h 576064"/>
+                <a:gd name="connsiteX3" fmla="*/ 221994 w 221994"/>
+                <a:gd name="connsiteY3" fmla="*/ 258992 h 576064"/>
+                <a:gd name="connsiteX4" fmla="*/ 31714 w 221994"/>
+                <a:gd name="connsiteY4" fmla="*/ 322419 h 576064"/>
+                <a:gd name="connsiteX5" fmla="*/ 216024 w 221994"/>
+                <a:gd name="connsiteY5" fmla="*/ 432047 h 576064"/>
+                <a:gd name="connsiteX6" fmla="*/ 0 w 221994"/>
+                <a:gd name="connsiteY6" fmla="*/ 504055 h 576064"/>
+                <a:gd name="connsiteX7" fmla="*/ 144016 w 221994"/>
+                <a:gd name="connsiteY7" fmla="*/ 576064 h 576064"/>
+                <a:gd name="connsiteX0" fmla="*/ 110997 w 221994"/>
+                <a:gd name="connsiteY0" fmla="*/ 0 h 576064"/>
+                <a:gd name="connsiteX1" fmla="*/ 221994 w 221994"/>
+                <a:gd name="connsiteY1" fmla="*/ 84569 h 576064"/>
+                <a:gd name="connsiteX2" fmla="*/ 15857 w 221994"/>
+                <a:gd name="connsiteY2" fmla="*/ 179709 h 576064"/>
+                <a:gd name="connsiteX3" fmla="*/ 221994 w 221994"/>
+                <a:gd name="connsiteY3" fmla="*/ 258992 h 576064"/>
+                <a:gd name="connsiteX4" fmla="*/ 0 w 221994"/>
+                <a:gd name="connsiteY4" fmla="*/ 432047 h 576064"/>
+                <a:gd name="connsiteX5" fmla="*/ 31714 w 221994"/>
+                <a:gd name="connsiteY5" fmla="*/ 322419 h 576064"/>
+                <a:gd name="connsiteX6" fmla="*/ 216024 w 221994"/>
+                <a:gd name="connsiteY6" fmla="*/ 432047 h 576064"/>
+                <a:gd name="connsiteX7" fmla="*/ 0 w 221994"/>
+                <a:gd name="connsiteY7" fmla="*/ 504055 h 576064"/>
+                <a:gd name="connsiteX8" fmla="*/ 144016 w 221994"/>
+                <a:gd name="connsiteY8" fmla="*/ 576064 h 576064"/>
+                <a:gd name="connsiteX0" fmla="*/ 110997 w 221994"/>
+                <a:gd name="connsiteY0" fmla="*/ 0 h 576064"/>
+                <a:gd name="connsiteX1" fmla="*/ 221994 w 221994"/>
+                <a:gd name="connsiteY1" fmla="*/ 84569 h 576064"/>
+                <a:gd name="connsiteX2" fmla="*/ 15857 w 221994"/>
+                <a:gd name="connsiteY2" fmla="*/ 179709 h 576064"/>
+                <a:gd name="connsiteX3" fmla="*/ 221994 w 221994"/>
+                <a:gd name="connsiteY3" fmla="*/ 258992 h 576064"/>
+                <a:gd name="connsiteX4" fmla="*/ 0 w 221994"/>
+                <a:gd name="connsiteY4" fmla="*/ 360039 h 576064"/>
+                <a:gd name="connsiteX5" fmla="*/ 31714 w 221994"/>
+                <a:gd name="connsiteY5" fmla="*/ 322419 h 576064"/>
+                <a:gd name="connsiteX6" fmla="*/ 216024 w 221994"/>
+                <a:gd name="connsiteY6" fmla="*/ 432047 h 576064"/>
+                <a:gd name="connsiteX7" fmla="*/ 0 w 221994"/>
+                <a:gd name="connsiteY7" fmla="*/ 504055 h 576064"/>
+                <a:gd name="connsiteX8" fmla="*/ 144016 w 221994"/>
+                <a:gd name="connsiteY8" fmla="*/ 576064 h 576064"/>
+                <a:gd name="connsiteX0" fmla="*/ 110997 w 221994"/>
+                <a:gd name="connsiteY0" fmla="*/ 0 h 576064"/>
+                <a:gd name="connsiteX1" fmla="*/ 221994 w 221994"/>
+                <a:gd name="connsiteY1" fmla="*/ 84569 h 576064"/>
+                <a:gd name="connsiteX2" fmla="*/ 15857 w 221994"/>
+                <a:gd name="connsiteY2" fmla="*/ 179709 h 576064"/>
+                <a:gd name="connsiteX3" fmla="*/ 221994 w 221994"/>
+                <a:gd name="connsiteY3" fmla="*/ 258992 h 576064"/>
+                <a:gd name="connsiteX4" fmla="*/ 31714 w 221994"/>
+                <a:gd name="connsiteY4" fmla="*/ 322419 h 576064"/>
+                <a:gd name="connsiteX5" fmla="*/ 216024 w 221994"/>
+                <a:gd name="connsiteY5" fmla="*/ 432047 h 576064"/>
+                <a:gd name="connsiteX6" fmla="*/ 0 w 221994"/>
+                <a:gd name="connsiteY6" fmla="*/ 504055 h 576064"/>
+                <a:gd name="connsiteX7" fmla="*/ 144016 w 221994"/>
+                <a:gd name="connsiteY7" fmla="*/ 576064 h 576064"/>
+                <a:gd name="connsiteX0" fmla="*/ 110997 w 221994"/>
+                <a:gd name="connsiteY0" fmla="*/ 0 h 576064"/>
+                <a:gd name="connsiteX1" fmla="*/ 221994 w 221994"/>
+                <a:gd name="connsiteY1" fmla="*/ 84569 h 576064"/>
+                <a:gd name="connsiteX2" fmla="*/ 15857 w 221994"/>
+                <a:gd name="connsiteY2" fmla="*/ 179709 h 576064"/>
+                <a:gd name="connsiteX3" fmla="*/ 221994 w 221994"/>
+                <a:gd name="connsiteY3" fmla="*/ 258992 h 576064"/>
+                <a:gd name="connsiteX4" fmla="*/ 0 w 221994"/>
+                <a:gd name="connsiteY4" fmla="*/ 360039 h 576064"/>
+                <a:gd name="connsiteX5" fmla="*/ 216024 w 221994"/>
+                <a:gd name="connsiteY5" fmla="*/ 432047 h 576064"/>
+                <a:gd name="connsiteX6" fmla="*/ 0 w 221994"/>
+                <a:gd name="connsiteY6" fmla="*/ 504055 h 576064"/>
+                <a:gd name="connsiteX7" fmla="*/ 144016 w 221994"/>
+                <a:gd name="connsiteY7" fmla="*/ 576064 h 576064"/>
+                <a:gd name="connsiteX0" fmla="*/ 110997 w 221994"/>
+                <a:gd name="connsiteY0" fmla="*/ 0 h 576064"/>
+                <a:gd name="connsiteX1" fmla="*/ 221994 w 221994"/>
+                <a:gd name="connsiteY1" fmla="*/ 84569 h 576064"/>
+                <a:gd name="connsiteX2" fmla="*/ 15857 w 221994"/>
+                <a:gd name="connsiteY2" fmla="*/ 179709 h 576064"/>
+                <a:gd name="connsiteX3" fmla="*/ 216024 w 221994"/>
+                <a:gd name="connsiteY3" fmla="*/ 288031 h 576064"/>
+                <a:gd name="connsiteX4" fmla="*/ 0 w 221994"/>
+                <a:gd name="connsiteY4" fmla="*/ 360039 h 576064"/>
+                <a:gd name="connsiteX5" fmla="*/ 216024 w 221994"/>
+                <a:gd name="connsiteY5" fmla="*/ 432047 h 576064"/>
+                <a:gd name="connsiteX6" fmla="*/ 0 w 221994"/>
+                <a:gd name="connsiteY6" fmla="*/ 504055 h 576064"/>
+                <a:gd name="connsiteX7" fmla="*/ 144016 w 221994"/>
+                <a:gd name="connsiteY7" fmla="*/ 576064 h 576064"/>
+                <a:gd name="connsiteX0" fmla="*/ 110997 w 221994"/>
+                <a:gd name="connsiteY0" fmla="*/ 0 h 576064"/>
+                <a:gd name="connsiteX1" fmla="*/ 221994 w 221994"/>
+                <a:gd name="connsiteY1" fmla="*/ 84569 h 576064"/>
+                <a:gd name="connsiteX2" fmla="*/ 0 w 221994"/>
+                <a:gd name="connsiteY2" fmla="*/ 216023 h 576064"/>
+                <a:gd name="connsiteX3" fmla="*/ 216024 w 221994"/>
+                <a:gd name="connsiteY3" fmla="*/ 288031 h 576064"/>
+                <a:gd name="connsiteX4" fmla="*/ 0 w 221994"/>
+                <a:gd name="connsiteY4" fmla="*/ 360039 h 576064"/>
+                <a:gd name="connsiteX5" fmla="*/ 216024 w 221994"/>
+                <a:gd name="connsiteY5" fmla="*/ 432047 h 576064"/>
+                <a:gd name="connsiteX6" fmla="*/ 0 w 221994"/>
+                <a:gd name="connsiteY6" fmla="*/ 504055 h 576064"/>
+                <a:gd name="connsiteX7" fmla="*/ 144016 w 221994"/>
+                <a:gd name="connsiteY7" fmla="*/ 576064 h 576064"/>
+                <a:gd name="connsiteX0" fmla="*/ 110997 w 216024"/>
+                <a:gd name="connsiteY0" fmla="*/ 0 h 576064"/>
+                <a:gd name="connsiteX1" fmla="*/ 216024 w 216024"/>
+                <a:gd name="connsiteY1" fmla="*/ 144015 h 576064"/>
+                <a:gd name="connsiteX2" fmla="*/ 0 w 216024"/>
+                <a:gd name="connsiteY2" fmla="*/ 216023 h 576064"/>
+                <a:gd name="connsiteX3" fmla="*/ 216024 w 216024"/>
+                <a:gd name="connsiteY3" fmla="*/ 288031 h 576064"/>
+                <a:gd name="connsiteX4" fmla="*/ 0 w 216024"/>
+                <a:gd name="connsiteY4" fmla="*/ 360039 h 576064"/>
+                <a:gd name="connsiteX5" fmla="*/ 216024 w 216024"/>
+                <a:gd name="connsiteY5" fmla="*/ 432047 h 576064"/>
+                <a:gd name="connsiteX6" fmla="*/ 0 w 216024"/>
+                <a:gd name="connsiteY6" fmla="*/ 504055 h 576064"/>
+                <a:gd name="connsiteX7" fmla="*/ 144016 w 216024"/>
+                <a:gd name="connsiteY7" fmla="*/ 576064 h 576064"/>
+                <a:gd name="connsiteX0" fmla="*/ 72008 w 216024"/>
+                <a:gd name="connsiteY0" fmla="*/ 0 h 504057"/>
+                <a:gd name="connsiteX1" fmla="*/ 216024 w 216024"/>
+                <a:gd name="connsiteY1" fmla="*/ 72008 h 504057"/>
+                <a:gd name="connsiteX2" fmla="*/ 0 w 216024"/>
+                <a:gd name="connsiteY2" fmla="*/ 144016 h 504057"/>
+                <a:gd name="connsiteX3" fmla="*/ 216024 w 216024"/>
+                <a:gd name="connsiteY3" fmla="*/ 216024 h 504057"/>
+                <a:gd name="connsiteX4" fmla="*/ 0 w 216024"/>
+                <a:gd name="connsiteY4" fmla="*/ 288032 h 504057"/>
+                <a:gd name="connsiteX5" fmla="*/ 216024 w 216024"/>
+                <a:gd name="connsiteY5" fmla="*/ 360040 h 504057"/>
+                <a:gd name="connsiteX6" fmla="*/ 0 w 216024"/>
+                <a:gd name="connsiteY6" fmla="*/ 432048 h 504057"/>
+                <a:gd name="connsiteX7" fmla="*/ 144016 w 216024"/>
+                <a:gd name="connsiteY7" fmla="*/ 504057 h 504057"/>
+                <a:gd name="connsiteX0" fmla="*/ 72008 w 216024"/>
+                <a:gd name="connsiteY0" fmla="*/ 0 h 504056"/>
+                <a:gd name="connsiteX1" fmla="*/ 216024 w 216024"/>
+                <a:gd name="connsiteY1" fmla="*/ 72008 h 504056"/>
+                <a:gd name="connsiteX2" fmla="*/ 0 w 216024"/>
+                <a:gd name="connsiteY2" fmla="*/ 144016 h 504056"/>
+                <a:gd name="connsiteX3" fmla="*/ 216024 w 216024"/>
+                <a:gd name="connsiteY3" fmla="*/ 216024 h 504056"/>
+                <a:gd name="connsiteX4" fmla="*/ 0 w 216024"/>
+                <a:gd name="connsiteY4" fmla="*/ 288032 h 504056"/>
+                <a:gd name="connsiteX5" fmla="*/ 216024 w 216024"/>
+                <a:gd name="connsiteY5" fmla="*/ 360040 h 504056"/>
+                <a:gd name="connsiteX6" fmla="*/ 0 w 216024"/>
+                <a:gd name="connsiteY6" fmla="*/ 432048 h 504056"/>
+                <a:gd name="connsiteX7" fmla="*/ 144016 w 216024"/>
+                <a:gd name="connsiteY7" fmla="*/ 504056 h 504056"/>
+                <a:gd name="connsiteX0" fmla="*/ 72008 w 216024"/>
+                <a:gd name="connsiteY0" fmla="*/ 0 h 504056"/>
+                <a:gd name="connsiteX1" fmla="*/ 115941 w 216024"/>
+                <a:gd name="connsiteY1" fmla="*/ 0 h 504056"/>
+                <a:gd name="connsiteX2" fmla="*/ 216024 w 216024"/>
+                <a:gd name="connsiteY2" fmla="*/ 72008 h 504056"/>
+                <a:gd name="connsiteX3" fmla="*/ 0 w 216024"/>
+                <a:gd name="connsiteY3" fmla="*/ 144016 h 504056"/>
+                <a:gd name="connsiteX4" fmla="*/ 216024 w 216024"/>
+                <a:gd name="connsiteY4" fmla="*/ 216024 h 504056"/>
+                <a:gd name="connsiteX5" fmla="*/ 0 w 216024"/>
+                <a:gd name="connsiteY5" fmla="*/ 288032 h 504056"/>
+                <a:gd name="connsiteX6" fmla="*/ 216024 w 216024"/>
+                <a:gd name="connsiteY6" fmla="*/ 360040 h 504056"/>
+                <a:gd name="connsiteX7" fmla="*/ 0 w 216024"/>
+                <a:gd name="connsiteY7" fmla="*/ 432048 h 504056"/>
+                <a:gd name="connsiteX8" fmla="*/ 144016 w 216024"/>
+                <a:gd name="connsiteY8" fmla="*/ 504056 h 504056"/>
+                <a:gd name="connsiteX0" fmla="*/ 72008 w 216024"/>
+                <a:gd name="connsiteY0" fmla="*/ 0 h 504056"/>
+                <a:gd name="connsiteX1" fmla="*/ 115577 w 216024"/>
+                <a:gd name="connsiteY1" fmla="*/ 577 h 504056"/>
+                <a:gd name="connsiteX2" fmla="*/ 216024 w 216024"/>
+                <a:gd name="connsiteY2" fmla="*/ 72008 h 504056"/>
+                <a:gd name="connsiteX3" fmla="*/ 0 w 216024"/>
+                <a:gd name="connsiteY3" fmla="*/ 144016 h 504056"/>
+                <a:gd name="connsiteX4" fmla="*/ 216024 w 216024"/>
+                <a:gd name="connsiteY4" fmla="*/ 216024 h 504056"/>
+                <a:gd name="connsiteX5" fmla="*/ 0 w 216024"/>
+                <a:gd name="connsiteY5" fmla="*/ 288032 h 504056"/>
+                <a:gd name="connsiteX6" fmla="*/ 216024 w 216024"/>
+                <a:gd name="connsiteY6" fmla="*/ 360040 h 504056"/>
+                <a:gd name="connsiteX7" fmla="*/ 0 w 216024"/>
+                <a:gd name="connsiteY7" fmla="*/ 432048 h 504056"/>
+                <a:gd name="connsiteX8" fmla="*/ 144016 w 216024"/>
+                <a:gd name="connsiteY8" fmla="*/ 504056 h 504056"/>
+                <a:gd name="connsiteX0" fmla="*/ 72008 w 216024"/>
+                <a:gd name="connsiteY0" fmla="*/ 0 h 504056"/>
+                <a:gd name="connsiteX1" fmla="*/ 115577 w 216024"/>
+                <a:gd name="connsiteY1" fmla="*/ 577 h 504056"/>
+                <a:gd name="connsiteX2" fmla="*/ 216024 w 216024"/>
+                <a:gd name="connsiteY2" fmla="*/ 72008 h 504056"/>
+                <a:gd name="connsiteX3" fmla="*/ 0 w 216024"/>
+                <a:gd name="connsiteY3" fmla="*/ 144016 h 504056"/>
+                <a:gd name="connsiteX4" fmla="*/ 216024 w 216024"/>
+                <a:gd name="connsiteY4" fmla="*/ 216024 h 504056"/>
+                <a:gd name="connsiteX5" fmla="*/ 0 w 216024"/>
+                <a:gd name="connsiteY5" fmla="*/ 288032 h 504056"/>
+                <a:gd name="connsiteX6" fmla="*/ 216024 w 216024"/>
+                <a:gd name="connsiteY6" fmla="*/ 360040 h 504056"/>
+                <a:gd name="connsiteX7" fmla="*/ 0 w 216024"/>
+                <a:gd name="connsiteY7" fmla="*/ 432048 h 504056"/>
+                <a:gd name="connsiteX8" fmla="*/ 120233 w 216024"/>
+                <a:gd name="connsiteY8" fmla="*/ 504056 h 504056"/>
+                <a:gd name="connsiteX0" fmla="*/ 115577 w 216024"/>
+                <a:gd name="connsiteY0" fmla="*/ 0 h 503479"/>
+                <a:gd name="connsiteX1" fmla="*/ 216024 w 216024"/>
+                <a:gd name="connsiteY1" fmla="*/ 71431 h 503479"/>
+                <a:gd name="connsiteX2" fmla="*/ 0 w 216024"/>
+                <a:gd name="connsiteY2" fmla="*/ 143439 h 503479"/>
+                <a:gd name="connsiteX3" fmla="*/ 216024 w 216024"/>
+                <a:gd name="connsiteY3" fmla="*/ 215447 h 503479"/>
+                <a:gd name="connsiteX4" fmla="*/ 0 w 216024"/>
+                <a:gd name="connsiteY4" fmla="*/ 287455 h 503479"/>
+                <a:gd name="connsiteX5" fmla="*/ 216024 w 216024"/>
+                <a:gd name="connsiteY5" fmla="*/ 359463 h 503479"/>
+                <a:gd name="connsiteX6" fmla="*/ 0 w 216024"/>
+                <a:gd name="connsiteY6" fmla="*/ 431471 h 503479"/>
+                <a:gd name="connsiteX7" fmla="*/ 120233 w 216024"/>
+                <a:gd name="connsiteY7" fmla="*/ 503479 h 503479"/>
+              </a:gdLst>
+              <a:ahLst/>
+              <a:cxnLst>
+                <a:cxn ang="0">
+                  <a:pos x="connsiteX0" y="connsiteY0"/>
+                </a:cxn>
+                <a:cxn ang="0">
+                  <a:pos x="connsiteX1" y="connsiteY1"/>
+                </a:cxn>
+                <a:cxn ang="0">
+                  <a:pos x="connsiteX2" y="connsiteY2"/>
+                </a:cxn>
+                <a:cxn ang="0">
+                  <a:pos x="connsiteX3" y="connsiteY3"/>
+                </a:cxn>
+                <a:cxn ang="0">
+                  <a:pos x="connsiteX4" y="connsiteY4"/>
+                </a:cxn>
+                <a:cxn ang="0">
+                  <a:pos x="connsiteX5" y="connsiteY5"/>
+                </a:cxn>
+                <a:cxn ang="0">
+                  <a:pos x="connsiteX6" y="connsiteY6"/>
+                </a:cxn>
+                <a:cxn ang="0">
+                  <a:pos x="connsiteX7" y="connsiteY7"/>
+                </a:cxn>
+              </a:cxnLst>
+              <a:rect l="l" t="t" r="r" b="b"/>
+              <a:pathLst>
+                <a:path w="216024" h="503479">
+                  <a:moveTo>
+                    <a:pt x="115577" y="0"/>
+                  </a:moveTo>
+                  <a:lnTo>
+                    <a:pt x="216024" y="71431"/>
+                  </a:lnTo>
+                  <a:lnTo>
+                    <a:pt x="0" y="143439"/>
+                  </a:lnTo>
+                  <a:lnTo>
+                    <a:pt x="216024" y="215447"/>
+                  </a:lnTo>
+                  <a:lnTo>
+                    <a:pt x="0" y="287455"/>
+                  </a:lnTo>
+                  <a:lnTo>
+                    <a:pt x="216024" y="359463"/>
+                  </a:lnTo>
+                  <a:lnTo>
+                    <a:pt x="0" y="431471"/>
+                  </a:lnTo>
+                  <a:lnTo>
+                    <a:pt x="120233" y="503479"/>
+                  </a:lnTo>
+                </a:path>
+              </a:pathLst>
+            </a:custGeom>
+            <a:ln w="28575">
+              <a:solidFill>
+                <a:schemeClr val="tx1"/>
+              </a:solidFill>
+            </a:ln>
+          </p:spPr>
+          <p:style>
+            <a:lnRef idx="1">
+              <a:schemeClr val="accent1"/>
+            </a:lnRef>
+            <a:fillRef idx="0">
+              <a:schemeClr val="accent1"/>
+            </a:fillRef>
+            <a:effectRef idx="0">
+              <a:schemeClr val="accent1"/>
+            </a:effectRef>
+            <a:fontRef idx="minor">
+              <a:schemeClr val="tx1"/>
+            </a:fontRef>
+          </p:style>
+          <p:txBody>
+            <a:bodyPr rtlCol="0" anchor="ctr"/>
+            <a:lstStyle/>
+            <a:p>
+              <a:pPr algn="ctr"/>
+              <a:endParaRPr lang="de-DE"/>
+            </a:p>
+          </p:txBody>
+        </p:sp>
+      </p:grpSp>
+      <p:sp>
+        <p:nvSpPr>
+          <p:cNvPr id="64" name="Textfeld 63"/>
+          <p:cNvSpPr txBox="1"/>
+          <p:nvPr/>
+        </p:nvSpPr>
+        <p:spPr>
+          <a:xfrm>
+            <a:off x="4275768" y="2272772"/>
+            <a:ext cx="399468" cy="369332"/>
+          </a:xfrm>
+          <a:prstGeom prst="rect">
+            <a:avLst/>
+          </a:prstGeom>
+          <a:noFill/>
+        </p:spPr>
+        <p:txBody>
+          <a:bodyPr wrap="none" rtlCol="0">
+            <a:spAutoFit/>
+          </a:bodyPr>
+          <a:lstStyle/>
+          <a:p>
+            <a:r>
+              <a:rPr lang="de-DE" i="1" dirty="0" err="1" smtClean="0">
+                <a:latin typeface="Times New Roman" pitchFamily="18" charset="0"/>
+                <a:cs typeface="Times New Roman" pitchFamily="18" charset="0"/>
+              </a:rPr>
+              <a:t>Z</a:t>
+            </a:r>
+            <a:r>
+              <a:rPr lang="de-DE" i="1" baseline="-25000" dirty="0" err="1" smtClean="0">
+                <a:latin typeface="Times New Roman" pitchFamily="18" charset="0"/>
+                <a:cs typeface="Times New Roman" pitchFamily="18" charset="0"/>
+              </a:rPr>
+              <a:t>fl</a:t>
+            </a:r>
+            <a:endParaRPr lang="de-DE" i="1" baseline="-25000" dirty="0">
+              <a:latin typeface="Times New Roman" pitchFamily="18" charset="0"/>
+              <a:cs typeface="Times New Roman" pitchFamily="18" charset="0"/>
+            </a:endParaRPr>
+          </a:p>
+        </p:txBody>
+      </p:sp>
+      <p:sp>
+        <p:nvSpPr>
+          <p:cNvPr id="70" name="Textfeld 69"/>
+          <p:cNvSpPr txBox="1"/>
+          <p:nvPr/>
+        </p:nvSpPr>
+        <p:spPr>
+          <a:xfrm>
+            <a:off x="1475656" y="1115452"/>
+            <a:ext cx="389850" cy="369332"/>
+          </a:xfrm>
+          <a:prstGeom prst="rect">
+            <a:avLst/>
+          </a:prstGeom>
+          <a:noFill/>
+        </p:spPr>
+        <p:txBody>
+          <a:bodyPr wrap="none" rtlCol="0">
+            <a:spAutoFit/>
+          </a:bodyPr>
+          <a:lstStyle/>
+          <a:p>
+            <a:r>
+              <a:rPr lang="de-DE" i="1" dirty="0" err="1" smtClean="0">
+                <a:latin typeface="Times New Roman" pitchFamily="18" charset="0"/>
+                <a:cs typeface="Times New Roman" pitchFamily="18" charset="0"/>
+              </a:rPr>
+              <a:t>Z</a:t>
+            </a:r>
+            <a:r>
+              <a:rPr lang="de-DE" i="1" baseline="-25000" dirty="0" err="1" smtClean="0">
+                <a:latin typeface="Times New Roman" pitchFamily="18" charset="0"/>
+                <a:cs typeface="Times New Roman" pitchFamily="18" charset="0"/>
+              </a:rPr>
+              <a:t>g</a:t>
+            </a:r>
+            <a:endParaRPr lang="de-DE" i="1" baseline="-25000" dirty="0">
+              <a:latin typeface="Times New Roman" pitchFamily="18" charset="0"/>
+              <a:cs typeface="Times New Roman" pitchFamily="18" charset="0"/>
+            </a:endParaRPr>
+          </a:p>
+        </p:txBody>
+      </p:sp>
+      <p:sp>
+        <p:nvSpPr>
+          <p:cNvPr id="71" name="Bogen 70"/>
+          <p:cNvSpPr/>
+          <p:nvPr/>
+        </p:nvSpPr>
+        <p:spPr>
+          <a:xfrm>
+            <a:off x="2267744" y="1916832"/>
+            <a:ext cx="1656184" cy="936104"/>
+          </a:xfrm>
+          <a:prstGeom prst="arc">
+            <a:avLst>
+              <a:gd name="adj1" fmla="val 11139607"/>
+              <a:gd name="adj2" fmla="val 21359046"/>
+            </a:avLst>
+          </a:prstGeom>
+          <a:ln w="19050">
+            <a:solidFill>
+              <a:schemeClr val="tx1"/>
+            </a:solidFill>
+            <a:headEnd type="triangle" w="med" len="med"/>
+            <a:tailEnd type="triangle" w="med" len="med"/>
+          </a:ln>
+        </p:spPr>
+        <p:style>
+          <a:lnRef idx="1">
+            <a:schemeClr val="accent1"/>
+          </a:lnRef>
+          <a:fillRef idx="0">
+            <a:schemeClr val="accent1"/>
+          </a:fillRef>
+          <a:effectRef idx="0">
+            <a:schemeClr val="accent1"/>
+          </a:effectRef>
+          <a:fontRef idx="minor">
+            <a:schemeClr val="tx1"/>
+          </a:fontRef>
+        </p:style>
+        <p:txBody>
+          <a:bodyPr rtlCol="0" anchor="ctr"/>
+          <a:lstStyle/>
+          <a:p>
+            <a:pPr algn="ctr"/>
+            <a:endParaRPr lang="de-DE"/>
+          </a:p>
+        </p:txBody>
+      </p:sp>
+      <p:sp>
+        <p:nvSpPr>
+          <p:cNvPr id="72" name="Textfeld 71"/>
+          <p:cNvSpPr txBox="1"/>
+          <p:nvPr/>
+        </p:nvSpPr>
+        <p:spPr>
+          <a:xfrm>
+            <a:off x="2864308" y="1607208"/>
+            <a:ext cx="377026" cy="369332"/>
+          </a:xfrm>
+          <a:prstGeom prst="rect">
+            <a:avLst/>
+          </a:prstGeom>
+          <a:noFill/>
+        </p:spPr>
+        <p:txBody>
+          <a:bodyPr wrap="none" rtlCol="0">
+            <a:spAutoFit/>
+          </a:bodyPr>
+          <a:lstStyle/>
+          <a:p>
+            <a:r>
+              <a:rPr lang="de-DE" i="1" dirty="0" smtClean="0">
+                <a:latin typeface="Times New Roman" pitchFamily="18" charset="0"/>
+                <a:cs typeface="Times New Roman" pitchFamily="18" charset="0"/>
+              </a:rPr>
+              <a:t>M</a:t>
+            </a:r>
+            <a:endParaRPr lang="de-DE" i="1" u="sng" baseline="-25000" dirty="0">
+              <a:latin typeface="Times New Roman" pitchFamily="18" charset="0"/>
+              <a:cs typeface="Times New Roman" pitchFamily="18" charset="0"/>
+            </a:endParaRPr>
+          </a:p>
+        </p:txBody>
+      </p:sp>
+      <p:sp>
+        <p:nvSpPr>
+          <p:cNvPr id="75" name="Rechteck 74"/>
           <p:cNvSpPr/>
           <p:nvPr/>
         </p:nvSpPr>
@@ -12628,48 +14523,9 @@
           </a:p>
         </p:txBody>
       </p:sp>
-      <p:cxnSp>
-        <p:nvCxnSpPr>
-          <p:cNvPr id="43" name="Gerade Verbindung 42"/>
-          <p:cNvCxnSpPr>
-            <a:stCxn id="41" idx="2"/>
-          </p:cNvCxnSpPr>
-          <p:nvPr/>
-        </p:nvCxnSpPr>
-        <p:spPr>
-          <a:xfrm>
-            <a:off x="2195736" y="2708920"/>
-            <a:ext cx="0" cy="360040"/>
-          </a:xfrm>
-          <a:prstGeom prst="line">
-            <a:avLst/>
-          </a:prstGeom>
-          <a:ln w="19050">
-            <a:solidFill>
-              <a:schemeClr val="tx1"/>
-            </a:solidFill>
-            <a:headEnd type="oval" w="med" len="med"/>
-            <a:tailEnd type="none" w="med" len="med"/>
-          </a:ln>
-        </p:spPr>
-        <p:style>
-          <a:lnRef idx="1">
-            <a:schemeClr val="accent1"/>
-          </a:lnRef>
-          <a:fillRef idx="0">
-            <a:schemeClr val="accent1"/>
-          </a:fillRef>
-          <a:effectRef idx="0">
-            <a:schemeClr val="accent1"/>
-          </a:effectRef>
-          <a:fontRef idx="minor">
-            <a:schemeClr val="tx1"/>
-          </a:fontRef>
-        </p:style>
-      </p:cxnSp>
       <p:grpSp>
         <p:nvGrpSpPr>
-          <p:cNvPr id="2" name="Gruppieren 43"/>
+          <p:cNvPr id="83" name="Gruppieren 42"/>
           <p:cNvGrpSpPr/>
           <p:nvPr/>
         </p:nvGrpSpPr>
@@ -12683,7 +14539,7 @@
         </p:grpSpPr>
         <p:cxnSp>
           <p:nvCxnSpPr>
-            <p:cNvPr id="45" name="Gerade Verbindung 44"/>
+            <p:cNvPr id="84" name="Gerade Verbindung 83"/>
             <p:cNvCxnSpPr/>
             <p:nvPr/>
           </p:nvCxnSpPr>
@@ -12718,7 +14574,7 @@
         </p:cxnSp>
         <p:cxnSp>
           <p:nvCxnSpPr>
-            <p:cNvPr id="46" name="Gerade Verbindung 45"/>
+            <p:cNvPr id="85" name="Gerade Verbindung 84"/>
             <p:cNvCxnSpPr/>
             <p:nvPr/>
           </p:nvCxnSpPr>
@@ -12752,16 +14608,101 @@
           </p:style>
         </p:cxnSp>
       </p:grpSp>
+      <p:grpSp>
+        <p:nvGrpSpPr>
+          <p:cNvPr id="86" name="Gruppieren 45"/>
+          <p:cNvGrpSpPr/>
+          <p:nvPr/>
+        </p:nvGrpSpPr>
+        <p:grpSpPr>
+          <a:xfrm>
+            <a:off x="1799548" y="2312732"/>
+            <a:ext cx="216024" cy="216024"/>
+            <a:chOff x="2771800" y="2348880"/>
+            <a:chExt cx="288032" cy="288032"/>
+          </a:xfrm>
+        </p:grpSpPr>
+        <p:cxnSp>
+          <p:nvCxnSpPr>
+            <p:cNvPr id="87" name="Gerade Verbindung 86"/>
+            <p:cNvCxnSpPr/>
+            <p:nvPr/>
+          </p:nvCxnSpPr>
+          <p:spPr>
+            <a:xfrm>
+              <a:off x="2771800" y="2348880"/>
+              <a:ext cx="288032" cy="288032"/>
+            </a:xfrm>
+            <a:prstGeom prst="line">
+              <a:avLst/>
+            </a:prstGeom>
+            <a:ln w="19050">
+              <a:solidFill>
+                <a:schemeClr val="tx1"/>
+              </a:solidFill>
+            </a:ln>
+          </p:spPr>
+          <p:style>
+            <a:lnRef idx="1">
+              <a:schemeClr val="accent1"/>
+            </a:lnRef>
+            <a:fillRef idx="0">
+              <a:schemeClr val="accent1"/>
+            </a:fillRef>
+            <a:effectRef idx="0">
+              <a:schemeClr val="accent1"/>
+            </a:effectRef>
+            <a:fontRef idx="minor">
+              <a:schemeClr val="tx1"/>
+            </a:fontRef>
+          </p:style>
+        </p:cxnSp>
+        <p:cxnSp>
+          <p:nvCxnSpPr>
+            <p:cNvPr id="88" name="Gerade Verbindung 87"/>
+            <p:cNvCxnSpPr/>
+            <p:nvPr/>
+          </p:nvCxnSpPr>
+          <p:spPr>
+            <a:xfrm flipV="1">
+              <a:off x="2771800" y="2348880"/>
+              <a:ext cx="288032" cy="288032"/>
+            </a:xfrm>
+            <a:prstGeom prst="line">
+              <a:avLst/>
+            </a:prstGeom>
+            <a:ln w="19050">
+              <a:solidFill>
+                <a:schemeClr val="tx1"/>
+              </a:solidFill>
+            </a:ln>
+          </p:spPr>
+          <p:style>
+            <a:lnRef idx="1">
+              <a:schemeClr val="accent1"/>
+            </a:lnRef>
+            <a:fillRef idx="0">
+              <a:schemeClr val="accent1"/>
+            </a:fillRef>
+            <a:effectRef idx="0">
+              <a:schemeClr val="accent1"/>
+            </a:effectRef>
+            <a:fontRef idx="minor">
+              <a:schemeClr val="tx1"/>
+            </a:fontRef>
+          </p:style>
+        </p:cxnSp>
+      </p:grpSp>
       <p:cxnSp>
         <p:nvCxnSpPr>
-          <p:cNvPr id="52" name="Gerade Verbindung 51"/>
+          <p:cNvPr id="89" name="Gerade Verbindung 88"/>
           <p:cNvCxnSpPr/>
           <p:nvPr/>
         </p:nvCxnSpPr>
         <p:spPr>
-          <a:xfrm>
-            <a:off x="2051720" y="1916832"/>
-            <a:ext cx="288032" cy="0"/>
+          <a:xfrm flipH="1">
+            <a:off x="1475656" y="2132856"/>
+            <a:ext cx="432048" cy="0"/>
           </a:xfrm>
           <a:prstGeom prst="line">
             <a:avLst/>
@@ -12770,6 +14711,7 @@
             <a:solidFill>
               <a:schemeClr val="tx1"/>
             </a:solidFill>
+            <a:prstDash val="sysDot"/>
           </a:ln>
         </p:spPr>
         <p:style>
@@ -12789,14 +14731,14 @@
       </p:cxnSp>
       <p:cxnSp>
         <p:nvCxnSpPr>
-          <p:cNvPr id="53" name="Gerade Verbindung 52"/>
+          <p:cNvPr id="90" name="Gerade Verbindung 89"/>
           <p:cNvCxnSpPr/>
           <p:nvPr/>
         </p:nvCxnSpPr>
         <p:spPr>
-          <a:xfrm>
-            <a:off x="2051720" y="1844824"/>
-            <a:ext cx="288032" cy="0"/>
+          <a:xfrm flipH="1">
+            <a:off x="1475656" y="2708920"/>
+            <a:ext cx="432048" cy="0"/>
           </a:xfrm>
           <a:prstGeom prst="line">
             <a:avLst/>
@@ -12805,6 +14747,7 @@
             <a:solidFill>
               <a:schemeClr val="tx1"/>
             </a:solidFill>
+            <a:prstDash val="sysDot"/>
           </a:ln>
         </p:spPr>
         <p:style>
@@ -12824,14 +14767,14 @@
       </p:cxnSp>
       <p:cxnSp>
         <p:nvCxnSpPr>
-          <p:cNvPr id="54" name="Gerade Verbindung 53"/>
+          <p:cNvPr id="91" name="Gerade Verbindung 90"/>
           <p:cNvCxnSpPr/>
           <p:nvPr/>
         </p:nvCxnSpPr>
         <p:spPr>
-          <a:xfrm flipH="1">
-            <a:off x="3131840" y="1628800"/>
-            <a:ext cx="9525" cy="1440160"/>
+          <a:xfrm>
+            <a:off x="1475656" y="2132856"/>
+            <a:ext cx="0" cy="216024"/>
           </a:xfrm>
           <a:prstGeom prst="line">
             <a:avLst/>
@@ -12840,8 +14783,7 @@
             <a:solidFill>
               <a:schemeClr val="tx1"/>
             </a:solidFill>
-            <a:headEnd type="none" w="med" len="med"/>
-            <a:tailEnd type="none" w="med" len="med"/>
+            <a:prstDash val="sysDot"/>
           </a:ln>
         </p:spPr>
         <p:style>
@@ -12861,14 +14803,14 @@
       </p:cxnSp>
       <p:cxnSp>
         <p:nvCxnSpPr>
-          <p:cNvPr id="59" name="Gerade Verbindung 58"/>
+          <p:cNvPr id="92" name="Gerade Verbindung 91"/>
           <p:cNvCxnSpPr/>
           <p:nvPr/>
         </p:nvCxnSpPr>
         <p:spPr>
           <a:xfrm>
-            <a:off x="2915816" y="3068960"/>
-            <a:ext cx="432048" cy="0"/>
+            <a:off x="1340605" y="2474351"/>
+            <a:ext cx="288032" cy="0"/>
           </a:xfrm>
           <a:prstGeom prst="line">
             <a:avLst/>
@@ -12877,6 +14819,7 @@
             <a:solidFill>
               <a:schemeClr val="tx1"/>
             </a:solidFill>
+            <a:prstDash val="solid"/>
           </a:ln>
         </p:spPr>
         <p:style>
@@ -12896,13 +14839,13 @@
       </p:cxnSp>
       <p:cxnSp>
         <p:nvCxnSpPr>
-          <p:cNvPr id="60" name="Gerade Verbindung 59"/>
+          <p:cNvPr id="93" name="Gerade Verbindung 92"/>
           <p:cNvCxnSpPr/>
           <p:nvPr/>
         </p:nvCxnSpPr>
         <p:spPr>
-          <a:xfrm flipH="1">
-            <a:off x="2987824" y="3140968"/>
+          <a:xfrm>
+            <a:off x="1340605" y="2366483"/>
             <a:ext cx="288032" cy="0"/>
           </a:xfrm>
           <a:prstGeom prst="line">
@@ -12912,6 +14855,7 @@
             <a:solidFill>
               <a:schemeClr val="tx1"/>
             </a:solidFill>
+            <a:prstDash val="solid"/>
           </a:ln>
         </p:spPr>
         <p:style>
@@ -12931,14 +14875,14 @@
       </p:cxnSp>
       <p:cxnSp>
         <p:nvCxnSpPr>
-          <p:cNvPr id="61" name="Gerade Verbindung 60"/>
+          <p:cNvPr id="94" name="Gerade Verbindung 93"/>
           <p:cNvCxnSpPr/>
           <p:nvPr/>
         </p:nvCxnSpPr>
         <p:spPr>
-          <a:xfrm flipH="1">
-            <a:off x="3059832" y="3212976"/>
-            <a:ext cx="144016" cy="0"/>
+          <a:xfrm>
+            <a:off x="1475656" y="2492896"/>
+            <a:ext cx="0" cy="216024"/>
           </a:xfrm>
           <a:prstGeom prst="line">
             <a:avLst/>
@@ -12947,41 +14891,7 @@
             <a:solidFill>
               <a:schemeClr val="tx1"/>
             </a:solidFill>
-          </a:ln>
-        </p:spPr>
-        <p:style>
-          <a:lnRef idx="1">
-            <a:schemeClr val="accent1"/>
-          </a:lnRef>
-          <a:fillRef idx="0">
-            <a:schemeClr val="accent1"/>
-          </a:fillRef>
-          <a:effectRef idx="0">
-            <a:schemeClr val="accent1"/>
-          </a:effectRef>
-          <a:fontRef idx="minor">
-            <a:schemeClr val="tx1"/>
-          </a:fontRef>
-        </p:style>
-      </p:cxnSp>
-      <p:cxnSp>
-        <p:nvCxnSpPr>
-          <p:cNvPr id="65" name="Gerade Verbindung 64"/>
-          <p:cNvCxnSpPr/>
-          <p:nvPr/>
-        </p:nvCxnSpPr>
-        <p:spPr>
-          <a:xfrm flipV="1">
-            <a:off x="2195736" y="1628800"/>
-            <a:ext cx="0" cy="216024"/>
-          </a:xfrm>
-          <a:prstGeom prst="line">
-            <a:avLst/>
-          </a:prstGeom>
-          <a:ln w="19050">
-            <a:solidFill>
-              <a:schemeClr val="tx1"/>
-            </a:solidFill>
+            <a:prstDash val="sysDot"/>
           </a:ln>
         </p:spPr>
         <p:style>
@@ -13001,368 +14911,14 @@
       </p:cxnSp>
       <p:sp>
         <p:nvSpPr>
-          <p:cNvPr id="66" name="Ellipse 65"/>
-          <p:cNvSpPr/>
+          <p:cNvPr id="95" name="Textfeld 94"/>
+          <p:cNvSpPr txBox="1"/>
           <p:nvPr/>
         </p:nvSpPr>
         <p:spPr>
           <a:xfrm>
-            <a:off x="2490542" y="1448636"/>
-            <a:ext cx="360040" cy="360040"/>
-          </a:xfrm>
-          <a:prstGeom prst="ellipse">
-            <a:avLst/>
-          </a:prstGeom>
-          <a:noFill/>
-          <a:ln w="19050">
-            <a:solidFill>
-              <a:schemeClr val="tx1"/>
-            </a:solidFill>
-          </a:ln>
-        </p:spPr>
-        <p:style>
-          <a:lnRef idx="2">
-            <a:schemeClr val="accent1">
-              <a:shade val="50000"/>
-            </a:schemeClr>
-          </a:lnRef>
-          <a:fillRef idx="1">
-            <a:schemeClr val="accent1"/>
-          </a:fillRef>
-          <a:effectRef idx="0">
-            <a:schemeClr val="accent1"/>
-          </a:effectRef>
-          <a:fontRef idx="minor">
-            <a:schemeClr val="lt1"/>
-          </a:fontRef>
-        </p:style>
-        <p:txBody>
-          <a:bodyPr rtlCol="0" anchor="ctr"/>
-          <a:lstStyle/>
-          <a:p>
-            <a:pPr algn="ctr"/>
-            <a:endParaRPr lang="de-DE" sz="1400" i="1" baseline="-25000" dirty="0">
-              <a:solidFill>
-                <a:schemeClr val="tx1"/>
-              </a:solidFill>
-              <a:latin typeface="Times New Roman" pitchFamily="18" charset="0"/>
-              <a:cs typeface="Times New Roman" pitchFamily="18" charset="0"/>
-            </a:endParaRPr>
-          </a:p>
-        </p:txBody>
-      </p:sp>
-      <p:sp>
-        <p:nvSpPr>
-          <p:cNvPr id="67" name="Rechteck 66"/>
-          <p:cNvSpPr/>
-          <p:nvPr/>
-        </p:nvSpPr>
-        <p:spPr>
-          <a:xfrm>
-            <a:off x="2481719" y="1465039"/>
-            <a:ext cx="352981" cy="307777"/>
-          </a:xfrm>
-          <a:prstGeom prst="rect">
-            <a:avLst/>
-          </a:prstGeom>
-          <a:ln w="19050">
-            <a:noFill/>
-          </a:ln>
-        </p:spPr>
-        <p:txBody>
-          <a:bodyPr wrap="none">
-            <a:spAutoFit/>
-          </a:bodyPr>
-          <a:lstStyle/>
-          <a:p>
-            <a:pPr algn="ctr"/>
-            <a:r>
-              <a:rPr lang="de-DE" sz="1400" i="1" dirty="0" err="1" smtClean="0">
-                <a:solidFill>
-                  <a:schemeClr val="tx1"/>
-                </a:solidFill>
-                <a:latin typeface="Times New Roman" pitchFamily="18" charset="0"/>
-                <a:cs typeface="Times New Roman" pitchFamily="18" charset="0"/>
-              </a:rPr>
-              <a:t>V</a:t>
-            </a:r>
-            <a:r>
-              <a:rPr lang="de-DE" sz="1400" i="1" baseline="-25000" dirty="0" err="1" smtClean="0">
-                <a:solidFill>
-                  <a:schemeClr val="tx1"/>
-                </a:solidFill>
-                <a:latin typeface="Times New Roman" pitchFamily="18" charset="0"/>
-                <a:cs typeface="Times New Roman" pitchFamily="18" charset="0"/>
-              </a:rPr>
-              <a:t>g</a:t>
-            </a:r>
-            <a:endParaRPr lang="de-DE" sz="2000" i="1" baseline="-25000" dirty="0">
-              <a:solidFill>
-                <a:schemeClr val="tx1"/>
-              </a:solidFill>
-              <a:latin typeface="Times New Roman" pitchFamily="18" charset="0"/>
-              <a:cs typeface="Times New Roman" pitchFamily="18" charset="0"/>
-            </a:endParaRPr>
-          </a:p>
-        </p:txBody>
-      </p:sp>
-      <p:cxnSp>
-        <p:nvCxnSpPr>
-          <p:cNvPr id="68" name="Gerade Verbindung 67"/>
-          <p:cNvCxnSpPr/>
-          <p:nvPr/>
-        </p:nvCxnSpPr>
-        <p:spPr>
-          <a:xfrm>
-            <a:off x="2186771" y="1637438"/>
-            <a:ext cx="288032" cy="0"/>
-          </a:xfrm>
-          <a:prstGeom prst="line">
-            <a:avLst/>
-          </a:prstGeom>
-          <a:ln w="19050">
-            <a:solidFill>
-              <a:schemeClr val="tx1"/>
-            </a:solidFill>
-          </a:ln>
-        </p:spPr>
-        <p:style>
-          <a:lnRef idx="1">
-            <a:schemeClr val="accent1"/>
-          </a:lnRef>
-          <a:fillRef idx="0">
-            <a:schemeClr val="accent1"/>
-          </a:fillRef>
-          <a:effectRef idx="0">
-            <a:schemeClr val="accent1"/>
-          </a:effectRef>
-          <a:fontRef idx="minor">
-            <a:schemeClr val="tx1"/>
-          </a:fontRef>
-        </p:style>
-      </p:cxnSp>
-      <p:cxnSp>
-        <p:nvCxnSpPr>
-          <p:cNvPr id="69" name="Gerade Verbindung 68"/>
-          <p:cNvCxnSpPr/>
-          <p:nvPr/>
-        </p:nvCxnSpPr>
-        <p:spPr>
-          <a:xfrm flipH="1">
-            <a:off x="2862026" y="1637438"/>
-            <a:ext cx="288032" cy="0"/>
-          </a:xfrm>
-          <a:prstGeom prst="line">
-            <a:avLst/>
-          </a:prstGeom>
-          <a:ln w="19050">
-            <a:solidFill>
-              <a:schemeClr val="tx1"/>
-            </a:solidFill>
-          </a:ln>
-        </p:spPr>
-        <p:style>
-          <a:lnRef idx="1">
-            <a:schemeClr val="accent1"/>
-          </a:lnRef>
-          <a:fillRef idx="0">
-            <a:schemeClr val="accent1"/>
-          </a:fillRef>
-          <a:effectRef idx="0">
-            <a:schemeClr val="accent1"/>
-          </a:effectRef>
-          <a:fontRef idx="minor">
-            <a:schemeClr val="tx1"/>
-          </a:fontRef>
-        </p:style>
-      </p:cxnSp>
-      <p:cxnSp>
-        <p:nvCxnSpPr>
-          <p:cNvPr id="73" name="Gerade Verbindung 72"/>
-          <p:cNvCxnSpPr/>
-          <p:nvPr/>
-        </p:nvCxnSpPr>
-        <p:spPr>
-          <a:xfrm>
-            <a:off x="1763688" y="2462695"/>
-            <a:ext cx="288032" cy="0"/>
-          </a:xfrm>
-          <a:prstGeom prst="line">
-            <a:avLst/>
-          </a:prstGeom>
-          <a:ln w="19050">
-            <a:solidFill>
-              <a:schemeClr val="tx1"/>
-            </a:solidFill>
-            <a:prstDash val="solid"/>
-          </a:ln>
-        </p:spPr>
-        <p:style>
-          <a:lnRef idx="1">
-            <a:schemeClr val="accent1"/>
-          </a:lnRef>
-          <a:fillRef idx="0">
-            <a:schemeClr val="accent1"/>
-          </a:fillRef>
-          <a:effectRef idx="0">
-            <a:schemeClr val="accent1"/>
-          </a:effectRef>
-          <a:fontRef idx="minor">
-            <a:schemeClr val="tx1"/>
-          </a:fontRef>
-        </p:style>
-      </p:cxnSp>
-      <p:cxnSp>
-        <p:nvCxnSpPr>
-          <p:cNvPr id="74" name="Gerade Verbindung 73"/>
-          <p:cNvCxnSpPr/>
-          <p:nvPr/>
-        </p:nvCxnSpPr>
-        <p:spPr>
-          <a:xfrm>
-            <a:off x="1763688" y="2384740"/>
-            <a:ext cx="288032" cy="0"/>
-          </a:xfrm>
-          <a:prstGeom prst="line">
-            <a:avLst/>
-          </a:prstGeom>
-          <a:ln w="19050">
-            <a:solidFill>
-              <a:schemeClr val="tx1"/>
-            </a:solidFill>
-            <a:prstDash val="solid"/>
-          </a:ln>
-        </p:spPr>
-        <p:style>
-          <a:lnRef idx="1">
-            <a:schemeClr val="accent1"/>
-          </a:lnRef>
-          <a:fillRef idx="0">
-            <a:schemeClr val="accent1"/>
-          </a:fillRef>
-          <a:effectRef idx="0">
-            <a:schemeClr val="accent1"/>
-          </a:effectRef>
-          <a:fontRef idx="minor">
-            <a:schemeClr val="tx1"/>
-          </a:fontRef>
-        </p:style>
-      </p:cxnSp>
-      <p:cxnSp>
-        <p:nvCxnSpPr>
-          <p:cNvPr id="76" name="Gerade Verbindung 75"/>
-          <p:cNvCxnSpPr/>
-          <p:nvPr/>
-        </p:nvCxnSpPr>
-        <p:spPr>
-          <a:xfrm>
-            <a:off x="1979712" y="3068960"/>
-            <a:ext cx="432048" cy="0"/>
-          </a:xfrm>
-          <a:prstGeom prst="line">
-            <a:avLst/>
-          </a:prstGeom>
-          <a:ln w="19050">
-            <a:solidFill>
-              <a:schemeClr val="tx1"/>
-            </a:solidFill>
-          </a:ln>
-        </p:spPr>
-        <p:style>
-          <a:lnRef idx="1">
-            <a:schemeClr val="accent1"/>
-          </a:lnRef>
-          <a:fillRef idx="0">
-            <a:schemeClr val="accent1"/>
-          </a:fillRef>
-          <a:effectRef idx="0">
-            <a:schemeClr val="accent1"/>
-          </a:effectRef>
-          <a:fontRef idx="minor">
-            <a:schemeClr val="tx1"/>
-          </a:fontRef>
-        </p:style>
-      </p:cxnSp>
-      <p:cxnSp>
-        <p:nvCxnSpPr>
-          <p:cNvPr id="77" name="Gerade Verbindung 76"/>
-          <p:cNvCxnSpPr/>
-          <p:nvPr/>
-        </p:nvCxnSpPr>
-        <p:spPr>
-          <a:xfrm flipH="1">
-            <a:off x="2051720" y="3140968"/>
-            <a:ext cx="288032" cy="0"/>
-          </a:xfrm>
-          <a:prstGeom prst="line">
-            <a:avLst/>
-          </a:prstGeom>
-          <a:ln w="19050">
-            <a:solidFill>
-              <a:schemeClr val="tx1"/>
-            </a:solidFill>
-          </a:ln>
-        </p:spPr>
-        <p:style>
-          <a:lnRef idx="1">
-            <a:schemeClr val="accent1"/>
-          </a:lnRef>
-          <a:fillRef idx="0">
-            <a:schemeClr val="accent1"/>
-          </a:fillRef>
-          <a:effectRef idx="0">
-            <a:schemeClr val="accent1"/>
-          </a:effectRef>
-          <a:fontRef idx="minor">
-            <a:schemeClr val="tx1"/>
-          </a:fontRef>
-        </p:style>
-      </p:cxnSp>
-      <p:cxnSp>
-        <p:nvCxnSpPr>
-          <p:cNvPr id="78" name="Gerade Verbindung 77"/>
-          <p:cNvCxnSpPr/>
-          <p:nvPr/>
-        </p:nvCxnSpPr>
-        <p:spPr>
-          <a:xfrm flipH="1">
-            <a:off x="2123728" y="3212976"/>
-            <a:ext cx="144016" cy="0"/>
-          </a:xfrm>
-          <a:prstGeom prst="line">
-            <a:avLst/>
-          </a:prstGeom>
-          <a:ln w="19050">
-            <a:solidFill>
-              <a:schemeClr val="tx1"/>
-            </a:solidFill>
-          </a:ln>
-        </p:spPr>
-        <p:style>
-          <a:lnRef idx="1">
-            <a:schemeClr val="accent1"/>
-          </a:lnRef>
-          <a:fillRef idx="0">
-            <a:schemeClr val="accent1"/>
-          </a:fillRef>
-          <a:effectRef idx="0">
-            <a:schemeClr val="accent1"/>
-          </a:effectRef>
-          <a:fontRef idx="minor">
-            <a:schemeClr val="tx1"/>
-          </a:fontRef>
-        </p:style>
-      </p:cxnSp>
-      <p:sp>
-        <p:nvSpPr>
-          <p:cNvPr id="79" name="Textfeld 78"/>
-          <p:cNvSpPr txBox="1"/>
-          <p:nvPr/>
-        </p:nvSpPr>
-        <p:spPr>
-          <a:xfrm>
-            <a:off x="1331640" y="2204864"/>
-            <a:ext cx="429926" cy="369332"/>
+            <a:off x="1115580" y="1983648"/>
+            <a:ext cx="407484" cy="369332"/>
           </a:xfrm>
           <a:prstGeom prst="rect">
             <a:avLst/>
@@ -13383,11 +14939,11 @@
               <a:t>C</a:t>
             </a:r>
             <a:r>
-              <a:rPr lang="el-GR" i="1" baseline="-25000" dirty="0" smtClean="0">
+              <a:rPr lang="de-DE" i="1" baseline="-25000" dirty="0" smtClean="0">
                 <a:latin typeface="Times New Roman"/>
                 <a:cs typeface="Times New Roman"/>
               </a:rPr>
-              <a:t>Σ</a:t>
+              <a:t>J</a:t>
             </a:r>
             <a:endParaRPr lang="de-DE" i="1" baseline="-25000" dirty="0">
               <a:latin typeface="Times New Roman" pitchFamily="18" charset="0"/>
@@ -13398,13 +14954,13 @@
       </p:sp>
       <p:sp>
         <p:nvSpPr>
-          <p:cNvPr id="80" name="Textfeld 79"/>
+          <p:cNvPr id="96" name="Textfeld 95"/>
           <p:cNvSpPr txBox="1"/>
           <p:nvPr/>
         </p:nvSpPr>
         <p:spPr>
           <a:xfrm>
-            <a:off x="2555776" y="2204864"/>
+            <a:off x="2521156" y="2408588"/>
             <a:ext cx="394660" cy="369332"/>
           </a:xfrm>
           <a:prstGeom prst="rect">
@@ -13439,16 +14995,173 @@
           </a:p>
         </p:txBody>
       </p:sp>
+      <p:cxnSp>
+        <p:nvCxnSpPr>
+          <p:cNvPr id="100" name="Gerade Verbindung 99"/>
+          <p:cNvCxnSpPr/>
+          <p:nvPr/>
+        </p:nvCxnSpPr>
+        <p:spPr>
+          <a:xfrm>
+            <a:off x="2483768" y="2132856"/>
+            <a:ext cx="504056" cy="0"/>
+          </a:xfrm>
+          <a:prstGeom prst="line">
+            <a:avLst/>
+          </a:prstGeom>
+          <a:ln w="19050">
+            <a:solidFill>
+              <a:schemeClr val="tx1"/>
+            </a:solidFill>
+          </a:ln>
+        </p:spPr>
+        <p:style>
+          <a:lnRef idx="1">
+            <a:schemeClr val="accent1"/>
+          </a:lnRef>
+          <a:fillRef idx="0">
+            <a:schemeClr val="accent1"/>
+          </a:fillRef>
+          <a:effectRef idx="0">
+            <a:schemeClr val="accent1"/>
+          </a:effectRef>
+          <a:fontRef idx="minor">
+            <a:schemeClr val="tx1"/>
+          </a:fontRef>
+        </p:style>
+      </p:cxnSp>
+      <p:grpSp>
+        <p:nvGrpSpPr>
+          <p:cNvPr id="104" name="Gruppieren 103"/>
+          <p:cNvGrpSpPr/>
+          <p:nvPr/>
+        </p:nvGrpSpPr>
+        <p:grpSpPr>
+          <a:xfrm rot="5400000">
+            <a:off x="2897742" y="2078922"/>
+            <a:ext cx="288032" cy="107868"/>
+            <a:chOff x="2843808" y="2708920"/>
+            <a:chExt cx="288032" cy="107868"/>
+          </a:xfrm>
+        </p:grpSpPr>
+        <p:cxnSp>
+          <p:nvCxnSpPr>
+            <p:cNvPr id="102" name="Gerade Verbindung 101"/>
+            <p:cNvCxnSpPr/>
+            <p:nvPr/>
+          </p:nvCxnSpPr>
+          <p:spPr>
+            <a:xfrm>
+              <a:off x="2843808" y="2816788"/>
+              <a:ext cx="288032" cy="0"/>
+            </a:xfrm>
+            <a:prstGeom prst="line">
+              <a:avLst/>
+            </a:prstGeom>
+            <a:ln w="19050">
+              <a:solidFill>
+                <a:schemeClr val="tx1"/>
+              </a:solidFill>
+              <a:prstDash val="solid"/>
+            </a:ln>
+          </p:spPr>
+          <p:style>
+            <a:lnRef idx="1">
+              <a:schemeClr val="accent1"/>
+            </a:lnRef>
+            <a:fillRef idx="0">
+              <a:schemeClr val="accent1"/>
+            </a:fillRef>
+            <a:effectRef idx="0">
+              <a:schemeClr val="accent1"/>
+            </a:effectRef>
+            <a:fontRef idx="minor">
+              <a:schemeClr val="tx1"/>
+            </a:fontRef>
+          </p:style>
+        </p:cxnSp>
+        <p:cxnSp>
+          <p:nvCxnSpPr>
+            <p:cNvPr id="103" name="Gerade Verbindung 102"/>
+            <p:cNvCxnSpPr/>
+            <p:nvPr/>
+          </p:nvCxnSpPr>
+          <p:spPr>
+            <a:xfrm>
+              <a:off x="2843808" y="2708920"/>
+              <a:ext cx="288032" cy="0"/>
+            </a:xfrm>
+            <a:prstGeom prst="line">
+              <a:avLst/>
+            </a:prstGeom>
+            <a:ln w="19050">
+              <a:solidFill>
+                <a:schemeClr val="tx1"/>
+              </a:solidFill>
+              <a:prstDash val="solid"/>
+            </a:ln>
+          </p:spPr>
+          <p:style>
+            <a:lnRef idx="1">
+              <a:schemeClr val="accent1"/>
+            </a:lnRef>
+            <a:fillRef idx="0">
+              <a:schemeClr val="accent1"/>
+            </a:fillRef>
+            <a:effectRef idx="0">
+              <a:schemeClr val="accent1"/>
+            </a:effectRef>
+            <a:fontRef idx="minor">
+              <a:schemeClr val="tx1"/>
+            </a:fontRef>
+          </p:style>
+        </p:cxnSp>
+      </p:grpSp>
+      <p:cxnSp>
+        <p:nvCxnSpPr>
+          <p:cNvPr id="105" name="Gerade Verbindung 104"/>
+          <p:cNvCxnSpPr/>
+          <p:nvPr/>
+        </p:nvCxnSpPr>
+        <p:spPr>
+          <a:xfrm>
+            <a:off x="3088532" y="2128756"/>
+            <a:ext cx="559664" cy="0"/>
+          </a:xfrm>
+          <a:prstGeom prst="line">
+            <a:avLst/>
+          </a:prstGeom>
+          <a:ln w="19050">
+            <a:solidFill>
+              <a:schemeClr val="tx1"/>
+            </a:solidFill>
+          </a:ln>
+        </p:spPr>
+        <p:style>
+          <a:lnRef idx="1">
+            <a:schemeClr val="accent1"/>
+          </a:lnRef>
+          <a:fillRef idx="0">
+            <a:schemeClr val="accent1"/>
+          </a:fillRef>
+          <a:effectRef idx="0">
+            <a:schemeClr val="accent1"/>
+          </a:effectRef>
+          <a:fontRef idx="minor">
+            <a:schemeClr val="tx1"/>
+          </a:fontRef>
+        </p:style>
+      </p:cxnSp>
       <p:sp>
         <p:nvSpPr>
-          <p:cNvPr id="81" name="Textfeld 80"/>
+          <p:cNvPr id="110" name="Textfeld 109"/>
           <p:cNvSpPr txBox="1"/>
           <p:nvPr/>
         </p:nvSpPr>
         <p:spPr>
           <a:xfrm>
-            <a:off x="1628637" y="1673913"/>
-            <a:ext cx="415498" cy="369332"/>
+            <a:off x="2847908" y="2203772"/>
+            <a:ext cx="540533" cy="369332"/>
           </a:xfrm>
           <a:prstGeom prst="rect">
             <a:avLst/>
@@ -13469,62 +15182,16 @@
               <a:t>C</a:t>
             </a:r>
             <a:r>
-              <a:rPr lang="de-DE" i="1" u="sng" baseline="-25000" dirty="0" err="1" smtClean="0">
+              <a:rPr lang="de-DE" i="1" baseline="-25000" dirty="0" err="1" smtClean="0">
                 <a:latin typeface="Times New Roman" pitchFamily="18" charset="0"/>
                 <a:cs typeface="Times New Roman" pitchFamily="18" charset="0"/>
               </a:rPr>
-              <a:t>g</a:t>
-            </a:r>
-            <a:endParaRPr lang="de-DE" i="1" u="sng" baseline="-25000" dirty="0">
+              <a:t>g,fl</a:t>
+            </a:r>
+            <a:endParaRPr lang="de-DE" i="1" baseline="-25000" dirty="0">
               <a:latin typeface="Times New Roman" pitchFamily="18" charset="0"/>
               <a:cs typeface="Times New Roman" pitchFamily="18" charset="0"/>
             </a:endParaRPr>
-          </a:p>
-        </p:txBody>
-      </p:sp>
-      <p:sp>
-        <p:nvSpPr>
-          <p:cNvPr id="82" name="Rechteck 81"/>
-          <p:cNvSpPr/>
-          <p:nvPr/>
-        </p:nvSpPr>
-        <p:spPr>
-          <a:xfrm>
-            <a:off x="1763599" y="2393132"/>
-            <a:ext cx="288032" cy="60357"/>
-          </a:xfrm>
-          <a:prstGeom prst="rect">
-            <a:avLst/>
-          </a:prstGeom>
-          <a:solidFill>
-            <a:schemeClr val="bg1"/>
-          </a:solidFill>
-          <a:ln>
-            <a:noFill/>
-          </a:ln>
-        </p:spPr>
-        <p:style>
-          <a:lnRef idx="2">
-            <a:schemeClr val="accent1">
-              <a:shade val="50000"/>
-            </a:schemeClr>
-          </a:lnRef>
-          <a:fillRef idx="1">
-            <a:schemeClr val="accent1"/>
-          </a:fillRef>
-          <a:effectRef idx="0">
-            <a:schemeClr val="accent1"/>
-          </a:effectRef>
-          <a:fontRef idx="minor">
-            <a:schemeClr val="lt1"/>
-          </a:fontRef>
-        </p:style>
-        <p:txBody>
-          <a:bodyPr rtlCol="0" anchor="ctr"/>
-          <a:lstStyle/>
-          <a:p>
-            <a:pPr algn="ctr"/>
-            <a:endParaRPr lang="de-DE"/>
           </a:p>
         </p:txBody>
       </p:sp>

</xml_diff>